<commit_message>
Fixes on DBMS slides
</commit_message>
<xml_diff>
--- a/Courses/Software-Sciences/Module-3-Databases-New/02-DBMS/02-DBMS.pptx
+++ b/Courses/Software-Sciences/Module-3-Databases-New/02-DBMS/02-DBMS.pptx
@@ -14478,7 +14478,7 @@
             </a:r>
             <a:r>
               <a:rPr lang="bg-BG" dirty="0"/>
-              <a:t> Релационни и нерелационни бази данни.</a:t>
+              <a:t> Релационни и нерелационни бази данни</a:t>
             </a:r>
             <a:endParaRPr lang="en-US" dirty="0"/>
           </a:p>
@@ -14548,7 +14548,7 @@
         </p:blipFill>
         <p:spPr bwMode="auto">
           <a:xfrm>
-            <a:off x="4604062" y="3276600"/>
+            <a:off x="4604060" y="2977466"/>
             <a:ext cx="2983875" cy="2240095"/>
           </a:xfrm>
           <a:prstGeom prst="rect">
@@ -15229,6 +15229,85 @@
       <p:transition spd="slow" advClick="0" advTm="5000"/>
     </mc:Fallback>
   </mc:AlternateContent>
+  <p:timing>
+    <p:tnLst>
+      <p:par>
+        <p:cTn id="1" dur="indefinite" restart="never" nodeType="tmRoot">
+          <p:childTnLst>
+            <p:seq concurrent="1" nextAc="seek">
+              <p:cTn id="2" dur="indefinite" nodeType="mainSeq">
+                <p:childTnLst>
+                  <p:par>
+                    <p:cTn id="3" fill="hold">
+                      <p:stCondLst>
+                        <p:cond delay="indefinite"/>
+                      </p:stCondLst>
+                      <p:childTnLst>
+                        <p:par>
+                          <p:cTn id="4" fill="hold">
+                            <p:stCondLst>
+                              <p:cond delay="0"/>
+                            </p:stCondLst>
+                            <p:childTnLst>
+                              <p:par>
+                                <p:cTn id="5" presetID="1" presetClass="entr" presetSubtype="0" fill="hold" nodeType="clickEffect">
+                                  <p:stCondLst>
+                                    <p:cond delay="0"/>
+                                  </p:stCondLst>
+                                  <p:childTnLst>
+                                    <p:set>
+                                      <p:cBhvr>
+                                        <p:cTn id="6" dur="1" fill="hold">
+                                          <p:stCondLst>
+                                            <p:cond delay="0"/>
+                                          </p:stCondLst>
+                                        </p:cTn>
+                                        <p:tgtEl>
+                                          <p:spTgt spid="13">
+                                            <p:txEl>
+                                              <p:pRg st="2" end="2"/>
+                                            </p:txEl>
+                                          </p:spTgt>
+                                        </p:tgtEl>
+                                        <p:attrNameLst>
+                                          <p:attrName>style.visibility</p:attrName>
+                                        </p:attrNameLst>
+                                      </p:cBhvr>
+                                      <p:to>
+                                        <p:strVal val="visible"/>
+                                      </p:to>
+                                    </p:set>
+                                  </p:childTnLst>
+                                </p:cTn>
+                              </p:par>
+                            </p:childTnLst>
+                          </p:cTn>
+                        </p:par>
+                      </p:childTnLst>
+                    </p:cTn>
+                  </p:par>
+                </p:childTnLst>
+              </p:cTn>
+              <p:prevCondLst>
+                <p:cond evt="onPrev" delay="0">
+                  <p:tgtEl>
+                    <p:sldTgt/>
+                  </p:tgtEl>
+                </p:cond>
+              </p:prevCondLst>
+              <p:nextCondLst>
+                <p:cond evt="onNext" delay="0">
+                  <p:tgtEl>
+                    <p:sldTgt/>
+                  </p:tgtEl>
+                </p:cond>
+              </p:nextCondLst>
+            </p:seq>
+          </p:childTnLst>
+        </p:cTn>
+      </p:par>
+    </p:tnLst>
+  </p:timing>
 </p:sld>
 </file>
 
@@ -18520,7 +18599,7 @@
               </a:rPr>
               <a:t>Релационният модел на БД</a:t>
             </a:r>
-            <a:endParaRPr lang="en-BG"/>
+            <a:endParaRPr lang="x-none"/>
           </a:p>
         </p:txBody>
       </p:sp>
@@ -18572,6 +18651,32 @@
           </a:p>
         </p:txBody>
       </p:sp>
+      <p:pic>
+        <p:nvPicPr>
+          <p:cNvPr id="22532" name="Picture 4" descr="https://o.remove.bg/downloads/4fea28bc-78a4-4ba2-b4aa-080d9d833290/r-db-removebg-preview.png"/>
+          <p:cNvPicPr>
+            <a:picLocks noChangeAspect="1" noChangeArrowheads="1"/>
+          </p:cNvPicPr>
+          <p:nvPr/>
+        </p:nvPicPr>
+        <p:blipFill>
+          <a:blip r:embed="rId2" cstate="print"/>
+          <a:srcRect/>
+          <a:stretch>
+            <a:fillRect/>
+          </a:stretch>
+        </p:blipFill>
+        <p:spPr bwMode="auto">
+          <a:xfrm>
+            <a:off x="3971925" y="3962400"/>
+            <a:ext cx="4248150" cy="2738759"/>
+          </a:xfrm>
+          <a:prstGeom prst="rect">
+            <a:avLst/>
+          </a:prstGeom>
+          <a:noFill/>
+        </p:spPr>
+      </p:pic>
     </p:spTree>
     <p:extLst>
       <p:ext uri="{BB962C8B-B14F-4D97-AF65-F5344CB8AC3E}">
@@ -18590,6 +18695,130 @@
       <p:transition spd="slow" advClick="0" advTm="5000"/>
     </mc:Fallback>
   </mc:AlternateContent>
+  <p:timing>
+    <p:tnLst>
+      <p:par>
+        <p:cTn id="1" dur="indefinite" restart="never" nodeType="tmRoot">
+          <p:childTnLst>
+            <p:seq concurrent="1" nextAc="seek">
+              <p:cTn id="2" dur="indefinite" nodeType="mainSeq">
+                <p:childTnLst>
+                  <p:par>
+                    <p:cTn id="3" fill="hold">
+                      <p:stCondLst>
+                        <p:cond delay="indefinite"/>
+                      </p:stCondLst>
+                      <p:childTnLst>
+                        <p:par>
+                          <p:cTn id="4" fill="hold">
+                            <p:stCondLst>
+                              <p:cond delay="0"/>
+                            </p:stCondLst>
+                            <p:childTnLst>
+                              <p:par>
+                                <p:cTn id="5" presetID="1" presetClass="entr" presetSubtype="0" fill="hold" nodeType="clickEffect">
+                                  <p:stCondLst>
+                                    <p:cond delay="0"/>
+                                  </p:stCondLst>
+                                  <p:childTnLst>
+                                    <p:set>
+                                      <p:cBhvr>
+                                        <p:cTn id="6" dur="1" fill="hold">
+                                          <p:stCondLst>
+                                            <p:cond delay="0"/>
+                                          </p:stCondLst>
+                                        </p:cTn>
+                                        <p:tgtEl>
+                                          <p:spTgt spid="10">
+                                            <p:txEl>
+                                              <p:pRg st="2" end="2"/>
+                                            </p:txEl>
+                                          </p:spTgt>
+                                        </p:tgtEl>
+                                        <p:attrNameLst>
+                                          <p:attrName>style.visibility</p:attrName>
+                                        </p:attrNameLst>
+                                      </p:cBhvr>
+                                      <p:to>
+                                        <p:strVal val="visible"/>
+                                      </p:to>
+                                    </p:set>
+                                  </p:childTnLst>
+                                </p:cTn>
+                              </p:par>
+                            </p:childTnLst>
+                          </p:cTn>
+                        </p:par>
+                      </p:childTnLst>
+                    </p:cTn>
+                  </p:par>
+                  <p:par>
+                    <p:cTn id="7" fill="hold">
+                      <p:stCondLst>
+                        <p:cond delay="indefinite"/>
+                      </p:stCondLst>
+                      <p:childTnLst>
+                        <p:par>
+                          <p:cTn id="8" fill="hold">
+                            <p:stCondLst>
+                              <p:cond delay="0"/>
+                            </p:stCondLst>
+                            <p:childTnLst>
+                              <p:par>
+                                <p:cTn id="9" presetID="1" presetClass="entr" presetSubtype="0" fill="hold" nodeType="clickEffect">
+                                  <p:stCondLst>
+                                    <p:cond delay="0"/>
+                                  </p:stCondLst>
+                                  <p:childTnLst>
+                                    <p:set>
+                                      <p:cBhvr>
+                                        <p:cTn id="10" dur="1" fill="hold">
+                                          <p:stCondLst>
+                                            <p:cond delay="0"/>
+                                          </p:stCondLst>
+                                        </p:cTn>
+                                        <p:tgtEl>
+                                          <p:spTgt spid="22532"/>
+                                        </p:tgtEl>
+                                        <p:attrNameLst>
+                                          <p:attrName>style.visibility</p:attrName>
+                                        </p:attrNameLst>
+                                      </p:cBhvr>
+                                      <p:to>
+                                        <p:strVal val="visible"/>
+                                      </p:to>
+                                    </p:set>
+                                  </p:childTnLst>
+                                </p:cTn>
+                              </p:par>
+                            </p:childTnLst>
+                          </p:cTn>
+                        </p:par>
+                      </p:childTnLst>
+                    </p:cTn>
+                  </p:par>
+                </p:childTnLst>
+              </p:cTn>
+              <p:prevCondLst>
+                <p:cond evt="onPrev" delay="0">
+                  <p:tgtEl>
+                    <p:sldTgt/>
+                  </p:tgtEl>
+                </p:cond>
+              </p:prevCondLst>
+              <p:nextCondLst>
+                <p:cond evt="onNext" delay="0">
+                  <p:tgtEl>
+                    <p:sldTgt/>
+                  </p:tgtEl>
+                </p:cond>
+              </p:nextCondLst>
+            </p:seq>
+          </p:childTnLst>
+        </p:cTn>
+      </p:par>
+    </p:tnLst>
+  </p:timing>
 </p:sld>
 </file>
 
@@ -18638,7 +18867,7 @@
                 <a:latin typeface="Calibri"/>
                 <a:cs typeface="Calibri"/>
               </a:rPr>
-              <a:t>Релационният модел на БД</a:t>
+              <a:t>Релационният модел на БД </a:t>
             </a:r>
             <a:r>
               <a:rPr lang="en-US" sz="4000" spc="-10" dirty="0">
@@ -18654,7 +18883,7 @@
               </a:rPr>
               <a:t>пример</a:t>
             </a:r>
-            <a:endParaRPr lang="en-BG"/>
+            <a:endParaRPr lang="x-none"/>
           </a:p>
         </p:txBody>
       </p:sp>
@@ -18667,14 +18896,14 @@
           <p:nvPr>
             <p:extLst>
               <p:ext uri="{D42A27DB-BD31-4B8C-83A1-F6EECF244321}">
-                <p14:modId xmlns:p14="http://schemas.microsoft.com/office/powerpoint/2010/main" val="1791115330"/>
+                <p14:modId xmlns:p14="http://schemas.microsoft.com/office/powerpoint/2010/main" val="2863559516"/>
               </p:ext>
             </p:extLst>
           </p:nvPr>
         </p:nvGraphicFramePr>
         <p:xfrm>
-          <a:off x="1524000" y="2590800"/>
-          <a:ext cx="4855845" cy="1434252"/>
+          <a:off x="1219200" y="1821565"/>
+          <a:ext cx="5244557" cy="1873344"/>
         </p:xfrm>
         <a:graphic>
           <a:graphicData uri="http://schemas.openxmlformats.org/drawingml/2006/table">
@@ -18683,35 +18912,35 @@
                 <a:tableStyleId>{2D5ABB26-0587-4C30-8999-92F81FD0307C}</a:tableStyleId>
               </a:tblPr>
               <a:tblGrid>
-                <a:gridCol w="542925">
+                <a:gridCol w="586386">
                   <a:extLst>
                     <a:ext uri="{9D8B030D-6E8A-4147-A177-3AD203B41FA5}">
                       <a16:colId xmlns:a16="http://schemas.microsoft.com/office/drawing/2014/main" val="20000"/>
                     </a:ext>
                   </a:extLst>
                 </a:gridCol>
-                <a:gridCol w="1144905">
+                <a:gridCol w="1236555">
                   <a:extLst>
                     <a:ext uri="{9D8B030D-6E8A-4147-A177-3AD203B41FA5}">
                       <a16:colId xmlns:a16="http://schemas.microsoft.com/office/drawing/2014/main" val="20001"/>
                     </a:ext>
                   </a:extLst>
                 </a:gridCol>
-                <a:gridCol w="901700">
+                <a:gridCol w="973881">
                   <a:extLst>
                     <a:ext uri="{9D8B030D-6E8A-4147-A177-3AD203B41FA5}">
                       <a16:colId xmlns:a16="http://schemas.microsoft.com/office/drawing/2014/main" val="20002"/>
                     </a:ext>
                   </a:extLst>
                 </a:gridCol>
-                <a:gridCol w="1172845">
+                <a:gridCol w="1266732">
                   <a:extLst>
                     <a:ext uri="{9D8B030D-6E8A-4147-A177-3AD203B41FA5}">
                       <a16:colId xmlns:a16="http://schemas.microsoft.com/office/drawing/2014/main" val="20003"/>
                     </a:ext>
                   </a:extLst>
                 </a:gridCol>
-                <a:gridCol w="1093470">
+                <a:gridCol w="1181003">
                   <a:extLst>
                     <a:ext uri="{9D8B030D-6E8A-4147-A177-3AD203B41FA5}">
                       <a16:colId xmlns:a16="http://schemas.microsoft.com/office/drawing/2014/main" val="20004"/>
@@ -18719,7 +18948,7 @@
                   </a:extLst>
                 </a:gridCol>
               </a:tblGrid>
-              <a:tr h="152696">
+              <a:tr h="234592">
                 <a:tc gridSpan="5">
                   <a:txBody>
                     <a:bodyPr/>
@@ -18791,7 +19020,7 @@
                   </a:ext>
                 </a:extLst>
               </a:tr>
-              <a:tr h="480822">
+              <a:tr h="534643">
                 <a:tc>
                   <a:txBody>
                     <a:bodyPr/>
@@ -19113,7 +19342,7 @@
                   </a:ext>
                 </a:extLst>
               </a:tr>
-              <a:tr h="429259">
+              <a:tr h="533400">
                 <a:tc>
                   <a:txBody>
                     <a:bodyPr/>
@@ -19400,7 +19629,7 @@
                   </a:ext>
                 </a:extLst>
               </a:tr>
-              <a:tr h="371475">
+              <a:tr h="570709">
                 <a:tc>
                   <a:txBody>
                     <a:bodyPr/>
@@ -19700,14 +19929,14 @@
           <p:nvPr>
             <p:extLst>
               <p:ext uri="{D42A27DB-BD31-4B8C-83A1-F6EECF244321}">
-                <p14:modId xmlns:p14="http://schemas.microsoft.com/office/powerpoint/2010/main" val="1102571627"/>
+                <p14:modId xmlns:p14="http://schemas.microsoft.com/office/powerpoint/2010/main" val="1152961855"/>
               </p:ext>
             </p:extLst>
           </p:nvPr>
         </p:nvGraphicFramePr>
         <p:xfrm>
-          <a:off x="7010400" y="2743200"/>
-          <a:ext cx="3895090" cy="1281556"/>
+          <a:off x="7010400" y="2057400"/>
+          <a:ext cx="4038600" cy="1637063"/>
         </p:xfrm>
         <a:graphic>
           <a:graphicData uri="http://schemas.openxmlformats.org/drawingml/2006/table">
@@ -19716,21 +19945,21 @@
                 <a:tableStyleId>{2D5ABB26-0587-4C30-8999-92F81FD0307C}</a:tableStyleId>
               </a:tblPr>
               <a:tblGrid>
-                <a:gridCol w="810260">
+                <a:gridCol w="840113">
                   <a:extLst>
                     <a:ext uri="{9D8B030D-6E8A-4147-A177-3AD203B41FA5}">
                       <a16:colId xmlns:a16="http://schemas.microsoft.com/office/drawing/2014/main" val="20000"/>
                     </a:ext>
                   </a:extLst>
                 </a:gridCol>
-                <a:gridCol w="1035050">
+                <a:gridCol w="1073185">
                   <a:extLst>
                     <a:ext uri="{9D8B030D-6E8A-4147-A177-3AD203B41FA5}">
                       <a16:colId xmlns:a16="http://schemas.microsoft.com/office/drawing/2014/main" val="20001"/>
                     </a:ext>
                   </a:extLst>
                 </a:gridCol>
-                <a:gridCol w="2049780">
+                <a:gridCol w="2125302">
                   <a:extLst>
                     <a:ext uri="{9D8B030D-6E8A-4147-A177-3AD203B41FA5}">
                       <a16:colId xmlns:a16="http://schemas.microsoft.com/office/drawing/2014/main" val="20002"/>
@@ -19738,7 +19967,7 @@
                   </a:extLst>
                 </a:gridCol>
               </a:tblGrid>
-              <a:tr h="480822">
+              <a:tr h="533400">
                 <a:tc>
                   <a:txBody>
                     <a:bodyPr/>
@@ -19922,7 +20151,7 @@
                   </a:ext>
                 </a:extLst>
               </a:tr>
-              <a:tr h="429259">
+              <a:tr h="533400">
                 <a:tc>
                   <a:txBody>
                     <a:bodyPr/>
@@ -20059,7 +20288,7 @@
                         </a:rPr>
                         <a:t>peter@gmail.com</a:t>
                       </a:r>
-                      <a:endParaRPr sz="2000">
+                      <a:endParaRPr sz="2000" dirty="0">
                         <a:latin typeface="Calibri"/>
                         <a:cs typeface="Calibri"/>
                       </a:endParaRPr>
@@ -20098,7 +20327,7 @@
                   </a:ext>
                 </a:extLst>
               </a:tr>
-              <a:tr h="371475">
+              <a:tr h="570263">
                 <a:tc>
                   <a:txBody>
                     <a:bodyPr/>
@@ -20235,7 +20464,7 @@
                         </a:rPr>
                         <a:t>jayne@gmail.com</a:t>
                       </a:r>
-                      <a:endParaRPr sz="2000">
+                      <a:endParaRPr sz="2000" dirty="0">
                         <a:latin typeface="Calibri"/>
                         <a:cs typeface="Calibri"/>
                       </a:endParaRPr>
@@ -20287,14 +20516,14 @@
           <p:nvPr>
             <p:extLst>
               <p:ext uri="{D42A27DB-BD31-4B8C-83A1-F6EECF244321}">
-                <p14:modId xmlns:p14="http://schemas.microsoft.com/office/powerpoint/2010/main" val="2408118224"/>
+                <p14:modId xmlns:p14="http://schemas.microsoft.com/office/powerpoint/2010/main" val="2948368588"/>
               </p:ext>
             </p:extLst>
           </p:nvPr>
         </p:nvGraphicFramePr>
         <p:xfrm>
-          <a:off x="3200400" y="4876800"/>
-          <a:ext cx="5184140" cy="1281225"/>
+          <a:off x="3172657" y="4863994"/>
+          <a:ext cx="5273727" cy="1667070"/>
         </p:xfrm>
         <a:graphic>
           <a:graphicData uri="http://schemas.openxmlformats.org/drawingml/2006/table">
@@ -20303,28 +20532,28 @@
                 <a:tableStyleId>{2D5ABB26-0587-4C30-8999-92F81FD0307C}</a:tableStyleId>
               </a:tblPr>
               <a:tblGrid>
-                <a:gridCol w="793750">
+                <a:gridCol w="807467">
                   <a:extLst>
                     <a:ext uri="{9D8B030D-6E8A-4147-A177-3AD203B41FA5}">
                       <a16:colId xmlns:a16="http://schemas.microsoft.com/office/drawing/2014/main" val="20000"/>
                     </a:ext>
                   </a:extLst>
                 </a:gridCol>
-                <a:gridCol w="1506220">
+                <a:gridCol w="1532249">
                   <a:extLst>
                     <a:ext uri="{9D8B030D-6E8A-4147-A177-3AD203B41FA5}">
                       <a16:colId xmlns:a16="http://schemas.microsoft.com/office/drawing/2014/main" val="20001"/>
                     </a:ext>
                   </a:extLst>
                 </a:gridCol>
-                <a:gridCol w="1288415">
+                <a:gridCol w="1310680">
                   <a:extLst>
                     <a:ext uri="{9D8B030D-6E8A-4147-A177-3AD203B41FA5}">
                       <a16:colId xmlns:a16="http://schemas.microsoft.com/office/drawing/2014/main" val="20002"/>
                     </a:ext>
                   </a:extLst>
                 </a:gridCol>
-                <a:gridCol w="1595755">
+                <a:gridCol w="1623331">
                   <a:extLst>
                     <a:ext uri="{9D8B030D-6E8A-4147-A177-3AD203B41FA5}">
                       <a16:colId xmlns:a16="http://schemas.microsoft.com/office/drawing/2014/main" val="20003"/>
@@ -20332,7 +20561,7 @@
                   </a:extLst>
                 </a:gridCol>
               </a:tblGrid>
-              <a:tr h="480758">
+              <a:tr h="533439">
                 <a:tc>
                   <a:txBody>
                     <a:bodyPr/>
@@ -20615,7 +20844,7 @@
                   </a:ext>
                 </a:extLst>
               </a:tr>
-              <a:tr h="429094">
+              <a:tr h="607688">
                 <a:tc>
                   <a:txBody>
                     <a:bodyPr/>
@@ -20846,7 +21075,7 @@
                   </a:ext>
                 </a:extLst>
               </a:tr>
-              <a:tr h="371373">
+              <a:tr h="525943">
                 <a:tc>
                   <a:txBody>
                     <a:bodyPr/>
@@ -21089,8 +21318,8 @@
         </p:nvSpPr>
         <p:spPr>
           <a:xfrm>
-            <a:off x="3657600" y="4191000"/>
-            <a:ext cx="1213802" cy="382156"/>
+            <a:off x="3657600" y="4267200"/>
+            <a:ext cx="1234778" cy="382156"/>
           </a:xfrm>
           <a:prstGeom prst="rect">
             <a:avLst/>
@@ -21135,8 +21364,8 @@
         </p:nvGrpSpPr>
         <p:grpSpPr>
           <a:xfrm>
-            <a:off x="4876800" y="3886200"/>
-            <a:ext cx="2720340" cy="1059180"/>
+            <a:off x="4876799" y="3886200"/>
+            <a:ext cx="2767349" cy="914400"/>
             <a:chOff x="5446776" y="4224578"/>
             <a:chExt cx="2720340" cy="1059180"/>
           </a:xfrm>
@@ -21363,8 +21592,8 @@
         </p:nvGrpSpPr>
         <p:grpSpPr>
           <a:xfrm>
-            <a:off x="2590800" y="4038600"/>
-            <a:ext cx="1135202" cy="1052893"/>
+            <a:off x="2590799" y="4038600"/>
+            <a:ext cx="1154819" cy="838201"/>
             <a:chOff x="2673541" y="4184396"/>
             <a:chExt cx="1135202" cy="1052893"/>
           </a:xfrm>
@@ -21639,8 +21868,8 @@
         </p:nvSpPr>
         <p:spPr>
           <a:xfrm>
-            <a:off x="1513114" y="1672224"/>
-            <a:ext cx="1600200" cy="382156"/>
+            <a:off x="1219200" y="1487426"/>
+            <a:ext cx="1627853" cy="382156"/>
           </a:xfrm>
           <a:prstGeom prst="rect">
             <a:avLst/>
@@ -21691,8 +21920,8 @@
         </p:nvSpPr>
         <p:spPr>
           <a:xfrm>
-            <a:off x="7010400" y="1683110"/>
-            <a:ext cx="1524000" cy="382156"/>
+            <a:off x="7010400" y="1487426"/>
+            <a:ext cx="1550336" cy="382156"/>
           </a:xfrm>
           <a:prstGeom prst="rect">
             <a:avLst/>
@@ -21768,7 +21997,7 @@
                             </p:stCondLst>
                             <p:childTnLst>
                               <p:par>
-                                <p:cTn id="5" presetID="1" presetClass="entr" presetSubtype="0" fill="hold" grpId="0" nodeType="clickEffect">
+                                <p:cTn id="5" presetID="1" presetClass="entr" presetSubtype="0" fill="hold" nodeType="clickEffect">
                                   <p:stCondLst>
                                     <p:cond delay="0"/>
                                   </p:stCondLst>
@@ -21781,7 +22010,7 @@
                                           </p:stCondLst>
                                         </p:cTn>
                                         <p:tgtEl>
-                                          <p:spTgt spid="17"/>
+                                          <p:spTgt spid="14"/>
                                         </p:tgtEl>
                                         <p:attrNameLst>
                                           <p:attrName>style.visibility</p:attrName>
@@ -21795,7 +22024,7 @@
                                 </p:cTn>
                               </p:par>
                               <p:par>
-                                <p:cTn id="7" presetID="1" presetClass="entr" presetSubtype="0" fill="hold" nodeType="withEffect">
+                                <p:cTn id="7" presetID="1" presetClass="entr" presetSubtype="0" fill="hold" grpId="0" nodeType="withEffect">
                                   <p:stCondLst>
                                     <p:cond delay="0"/>
                                   </p:stCondLst>
@@ -21808,7 +22037,34 @@
                                           </p:stCondLst>
                                         </p:cTn>
                                         <p:tgtEl>
-                                          <p:spTgt spid="16"/>
+                                          <p:spTgt spid="7"/>
+                                        </p:tgtEl>
+                                        <p:attrNameLst>
+                                          <p:attrName>style.visibility</p:attrName>
+                                        </p:attrNameLst>
+                                      </p:cBhvr>
+                                      <p:to>
+                                        <p:strVal val="visible"/>
+                                      </p:to>
+                                    </p:set>
+                                  </p:childTnLst>
+                                </p:cTn>
+                              </p:par>
+                              <p:par>
+                                <p:cTn id="9" presetID="1" presetClass="entr" presetSubtype="0" fill="hold" nodeType="withEffect">
+                                  <p:stCondLst>
+                                    <p:cond delay="0"/>
+                                  </p:stCondLst>
+                                  <p:childTnLst>
+                                    <p:set>
+                                      <p:cBhvr>
+                                        <p:cTn id="10" dur="1" fill="hold">
+                                          <p:stCondLst>
+                                            <p:cond delay="0"/>
+                                          </p:stCondLst>
+                                        </p:cTn>
+                                        <p:tgtEl>
+                                          <p:spTgt spid="2"/>
                                         </p:tgtEl>
                                         <p:attrNameLst>
                                           <p:attrName>style.visibility</p:attrName>
@@ -21828,46 +22084,19 @@
                     </p:cTn>
                   </p:par>
                   <p:par>
-                    <p:cTn id="9" fill="hold">
+                    <p:cTn id="11" fill="hold">
                       <p:stCondLst>
                         <p:cond delay="indefinite"/>
                       </p:stCondLst>
                       <p:childTnLst>
                         <p:par>
-                          <p:cTn id="10" fill="hold">
+                          <p:cTn id="12" fill="hold">
                             <p:stCondLst>
                               <p:cond delay="0"/>
                             </p:stCondLst>
                             <p:childTnLst>
                               <p:par>
-                                <p:cTn id="11" presetID="1" presetClass="entr" presetSubtype="0" fill="hold" nodeType="clickEffect">
-                                  <p:stCondLst>
-                                    <p:cond delay="0"/>
-                                  </p:stCondLst>
-                                  <p:childTnLst>
-                                    <p:set>
-                                      <p:cBhvr>
-                                        <p:cTn id="12" dur="1" fill="hold">
-                                          <p:stCondLst>
-                                            <p:cond delay="0"/>
-                                          </p:stCondLst>
-                                        </p:cTn>
-                                        <p:tgtEl>
-                                          <p:spTgt spid="14"/>
-                                        </p:tgtEl>
-                                        <p:attrNameLst>
-                                          <p:attrName>style.visibility</p:attrName>
-                                        </p:attrNameLst>
-                                      </p:cBhvr>
-                                      <p:to>
-                                        <p:strVal val="visible"/>
-                                      </p:to>
-                                    </p:set>
-                                  </p:childTnLst>
-                                </p:cTn>
-                              </p:par>
-                              <p:par>
-                                <p:cTn id="13" presetID="1" presetClass="entr" presetSubtype="0" fill="hold" grpId="0" nodeType="withEffect">
+                                <p:cTn id="13" presetID="1" presetClass="entr" presetSubtype="0" fill="hold" grpId="0" nodeType="clickEffect">
                                   <p:stCondLst>
                                     <p:cond delay="0"/>
                                   </p:stCondLst>
@@ -21880,7 +22109,7 @@
                                           </p:stCondLst>
                                         </p:cTn>
                                         <p:tgtEl>
-                                          <p:spTgt spid="7"/>
+                                          <p:spTgt spid="6"/>
                                         </p:tgtEl>
                                         <p:attrNameLst>
                                           <p:attrName>style.visibility</p:attrName>
@@ -21907,78 +22136,6 @@
                                           </p:stCondLst>
                                         </p:cTn>
                                         <p:tgtEl>
-                                          <p:spTgt spid="2"/>
-                                        </p:tgtEl>
-                                        <p:attrNameLst>
-                                          <p:attrName>style.visibility</p:attrName>
-                                        </p:attrNameLst>
-                                      </p:cBhvr>
-                                      <p:to>
-                                        <p:strVal val="visible"/>
-                                      </p:to>
-                                    </p:set>
-                                  </p:childTnLst>
-                                </p:cTn>
-                              </p:par>
-                            </p:childTnLst>
-                          </p:cTn>
-                        </p:par>
-                      </p:childTnLst>
-                    </p:cTn>
-                  </p:par>
-                  <p:par>
-                    <p:cTn id="17" fill="hold">
-                      <p:stCondLst>
-                        <p:cond delay="indefinite"/>
-                      </p:stCondLst>
-                      <p:childTnLst>
-                        <p:par>
-                          <p:cTn id="18" fill="hold">
-                            <p:stCondLst>
-                              <p:cond delay="0"/>
-                            </p:stCondLst>
-                            <p:childTnLst>
-                              <p:par>
-                                <p:cTn id="19" presetID="1" presetClass="entr" presetSubtype="0" fill="hold" grpId="0" nodeType="clickEffect">
-                                  <p:stCondLst>
-                                    <p:cond delay="0"/>
-                                  </p:stCondLst>
-                                  <p:childTnLst>
-                                    <p:set>
-                                      <p:cBhvr>
-                                        <p:cTn id="20" dur="1" fill="hold">
-                                          <p:stCondLst>
-                                            <p:cond delay="0"/>
-                                          </p:stCondLst>
-                                        </p:cTn>
-                                        <p:tgtEl>
-                                          <p:spTgt spid="6"/>
-                                        </p:tgtEl>
-                                        <p:attrNameLst>
-                                          <p:attrName>style.visibility</p:attrName>
-                                        </p:attrNameLst>
-                                      </p:cBhvr>
-                                      <p:to>
-                                        <p:strVal val="visible"/>
-                                      </p:to>
-                                    </p:set>
-                                  </p:childTnLst>
-                                </p:cTn>
-                              </p:par>
-                              <p:par>
-                                <p:cTn id="21" presetID="1" presetClass="entr" presetSubtype="0" fill="hold" nodeType="withEffect">
-                                  <p:stCondLst>
-                                    <p:cond delay="0"/>
-                                  </p:stCondLst>
-                                  <p:childTnLst>
-                                    <p:set>
-                                      <p:cBhvr>
-                                        <p:cTn id="22" dur="1" fill="hold">
-                                          <p:stCondLst>
-                                            <p:cond delay="0"/>
-                                          </p:stCondLst>
-                                        </p:cTn>
-                                        <p:tgtEl>
                                           <p:spTgt spid="13"/>
                                         </p:tgtEl>
                                         <p:attrNameLst>
@@ -21993,14 +22150,14 @@
                                 </p:cTn>
                               </p:par>
                               <p:par>
-                                <p:cTn id="23" presetID="1" presetClass="entr" presetSubtype="0" fill="hold" nodeType="withEffect">
+                                <p:cTn id="17" presetID="1" presetClass="entr" presetSubtype="0" fill="hold" nodeType="withEffect">
                                   <p:stCondLst>
                                     <p:cond delay="0"/>
                                   </p:stCondLst>
                                   <p:childTnLst>
                                     <p:set>
                                       <p:cBhvr>
-                                        <p:cTn id="24" dur="1" fill="hold">
+                                        <p:cTn id="18" dur="1" fill="hold">
                                           <p:stCondLst>
                                             <p:cond delay="0"/>
                                           </p:stCondLst>
@@ -22047,7 +22204,6 @@
       </p:par>
     </p:tnLst>
     <p:bldLst>
-      <p:bldP spid="17" grpId="0"/>
       <p:bldP spid="6" grpId="0"/>
       <p:bldP spid="7" grpId="0"/>
     </p:bldLst>
@@ -23433,9 +23589,10 @@
             <a:avLst/>
           </a:prstGeom>
           <a:solidFill>
-            <a:srgbClr val="D9D5C7">
+            <a:schemeClr val="bg2">
+              <a:lumMod val="85000"/>
               <a:alpha val="20000"/>
-            </a:srgbClr>
+            </a:schemeClr>
           </a:solidFill>
           <a:ln w="12700">
             <a:solidFill>
@@ -27282,6 +27439,85 @@
       <p:transition spd="slow" advClick="0" advTm="5000"/>
     </mc:Fallback>
   </mc:AlternateContent>
+  <p:timing>
+    <p:tnLst>
+      <p:par>
+        <p:cTn id="1" dur="indefinite" restart="never" nodeType="tmRoot">
+          <p:childTnLst>
+            <p:seq concurrent="1" nextAc="seek">
+              <p:cTn id="2" dur="indefinite" nodeType="mainSeq">
+                <p:childTnLst>
+                  <p:par>
+                    <p:cTn id="3" fill="hold">
+                      <p:stCondLst>
+                        <p:cond delay="indefinite"/>
+                      </p:stCondLst>
+                      <p:childTnLst>
+                        <p:par>
+                          <p:cTn id="4" fill="hold">
+                            <p:stCondLst>
+                              <p:cond delay="0"/>
+                            </p:stCondLst>
+                            <p:childTnLst>
+                              <p:par>
+                                <p:cTn id="5" presetID="1" presetClass="entr" presetSubtype="0" fill="hold" nodeType="clickEffect">
+                                  <p:stCondLst>
+                                    <p:cond delay="0"/>
+                                  </p:stCondLst>
+                                  <p:childTnLst>
+                                    <p:set>
+                                      <p:cBhvr>
+                                        <p:cTn id="6" dur="1" fill="hold">
+                                          <p:stCondLst>
+                                            <p:cond delay="0"/>
+                                          </p:stCondLst>
+                                        </p:cTn>
+                                        <p:tgtEl>
+                                          <p:spTgt spid="3">
+                                            <p:txEl>
+                                              <p:pRg st="2" end="2"/>
+                                            </p:txEl>
+                                          </p:spTgt>
+                                        </p:tgtEl>
+                                        <p:attrNameLst>
+                                          <p:attrName>style.visibility</p:attrName>
+                                        </p:attrNameLst>
+                                      </p:cBhvr>
+                                      <p:to>
+                                        <p:strVal val="visible"/>
+                                      </p:to>
+                                    </p:set>
+                                  </p:childTnLst>
+                                </p:cTn>
+                              </p:par>
+                            </p:childTnLst>
+                          </p:cTn>
+                        </p:par>
+                      </p:childTnLst>
+                    </p:cTn>
+                  </p:par>
+                </p:childTnLst>
+              </p:cTn>
+              <p:prevCondLst>
+                <p:cond evt="onPrev" delay="0">
+                  <p:tgtEl>
+                    <p:sldTgt/>
+                  </p:tgtEl>
+                </p:cond>
+              </p:prevCondLst>
+              <p:nextCondLst>
+                <p:cond evt="onNext" delay="0">
+                  <p:tgtEl>
+                    <p:sldTgt/>
+                  </p:tgtEl>
+                </p:cond>
+              </p:nextCondLst>
+            </p:seq>
+          </p:childTnLst>
+        </p:cTn>
+      </p:par>
+    </p:tnLst>
+  </p:timing>
 </p:sld>
 </file>
 
@@ -27896,7 +28132,7 @@
               </a:rPr>
               <a:t>Дати</a:t>
             </a:r>
-            <a:endParaRPr lang="en-BG" sz="3200">
+            <a:endParaRPr lang="x-none" sz="3200">
               <a:solidFill>
                 <a:schemeClr val="bg2"/>
               </a:solidFill>
@@ -38984,385 +39220,41 @@
           </p:txBody>
         </p:sp>
       </p:grpSp>
-      <p:grpSp>
-        <p:nvGrpSpPr>
-          <p:cNvPr id="21" name="object 152">
+      <p:sp>
+        <p:nvSpPr>
+          <p:cNvPr id="107" name="object 153">
             <a:extLst>
               <a:ext uri="{FF2B5EF4-FFF2-40B4-BE49-F238E27FC236}">
-                <a16:creationId xmlns:a16="http://schemas.microsoft.com/office/drawing/2014/main" id="{51A3F4A3-8F92-5B91-7B84-AB178CE80708}"/>
+                <a16:creationId xmlns:a16="http://schemas.microsoft.com/office/drawing/2014/main" id="{94BC307B-E855-713A-26B8-5FC4508505D2}"/>
               </a:ext>
             </a:extLst>
           </p:cNvPr>
-          <p:cNvGrpSpPr/>
-          <p:nvPr/>
-        </p:nvGrpSpPr>
-        <p:grpSpPr>
-          <a:xfrm>
-            <a:off x="7239000" y="1524000"/>
-            <a:ext cx="3886200" cy="1216660"/>
-            <a:chOff x="7300214" y="1572768"/>
-            <a:chExt cx="2484120" cy="1216660"/>
-          </a:xfrm>
-        </p:grpSpPr>
-        <p:sp>
-          <p:nvSpPr>
-            <p:cNvPr id="107" name="object 153">
-              <a:extLst>
-                <a:ext uri="{FF2B5EF4-FFF2-40B4-BE49-F238E27FC236}">
-                  <a16:creationId xmlns:a16="http://schemas.microsoft.com/office/drawing/2014/main" id="{94BC307B-E855-713A-26B8-5FC4508505D2}"/>
-                </a:ext>
-              </a:extLst>
-            </p:cNvPr>
-            <p:cNvSpPr/>
-            <p:nvPr/>
-          </p:nvSpPr>
-          <p:spPr>
-            <a:xfrm>
-              <a:off x="7300214" y="1572768"/>
-              <a:ext cx="2484120" cy="1216660"/>
-            </a:xfrm>
-            <a:custGeom>
-              <a:avLst/>
-              <a:gdLst/>
-              <a:ahLst/>
-              <a:cxnLst/>
-              <a:rect l="l" t="t" r="r" b="b"/>
-              <a:pathLst>
-                <a:path w="2484120" h="1216660">
-                  <a:moveTo>
-                    <a:pt x="2483865" y="1013460"/>
-                  </a:moveTo>
-                  <a:lnTo>
-                    <a:pt x="502665" y="1013460"/>
-                  </a:lnTo>
-                  <a:lnTo>
-                    <a:pt x="508022" y="1059917"/>
-                  </a:lnTo>
-                  <a:lnTo>
-                    <a:pt x="523277" y="1102574"/>
-                  </a:lnTo>
-                  <a:lnTo>
-                    <a:pt x="547213" y="1140209"/>
-                  </a:lnTo>
-                  <a:lnTo>
-                    <a:pt x="578608" y="1171604"/>
-                  </a:lnTo>
-                  <a:lnTo>
-                    <a:pt x="616243" y="1195540"/>
-                  </a:lnTo>
-                  <a:lnTo>
-                    <a:pt x="658900" y="1210795"/>
-                  </a:lnTo>
-                  <a:lnTo>
-                    <a:pt x="705357" y="1216152"/>
-                  </a:lnTo>
-                  <a:lnTo>
-                    <a:pt x="2281174" y="1216152"/>
-                  </a:lnTo>
-                  <a:lnTo>
-                    <a:pt x="2327631" y="1210795"/>
-                  </a:lnTo>
-                  <a:lnTo>
-                    <a:pt x="2370288" y="1195540"/>
-                  </a:lnTo>
-                  <a:lnTo>
-                    <a:pt x="2407923" y="1171604"/>
-                  </a:lnTo>
-                  <a:lnTo>
-                    <a:pt x="2439318" y="1140209"/>
-                  </a:lnTo>
-                  <a:lnTo>
-                    <a:pt x="2463254" y="1102574"/>
-                  </a:lnTo>
-                  <a:lnTo>
-                    <a:pt x="2478509" y="1059917"/>
-                  </a:lnTo>
-                  <a:lnTo>
-                    <a:pt x="2483865" y="1013460"/>
-                  </a:lnTo>
-                  <a:close/>
-                </a:path>
-                <a:path w="2484120" h="1216660">
-                  <a:moveTo>
-                    <a:pt x="2281174" y="0"/>
-                  </a:moveTo>
-                  <a:lnTo>
-                    <a:pt x="705357" y="0"/>
-                  </a:lnTo>
-                  <a:lnTo>
-                    <a:pt x="658900" y="5356"/>
-                  </a:lnTo>
-                  <a:lnTo>
-                    <a:pt x="616243" y="20611"/>
-                  </a:lnTo>
-                  <a:lnTo>
-                    <a:pt x="578608" y="44547"/>
-                  </a:lnTo>
-                  <a:lnTo>
-                    <a:pt x="547213" y="75942"/>
-                  </a:lnTo>
-                  <a:lnTo>
-                    <a:pt x="523277" y="113577"/>
-                  </a:lnTo>
-                  <a:lnTo>
-                    <a:pt x="508022" y="156234"/>
-                  </a:lnTo>
-                  <a:lnTo>
-                    <a:pt x="502665" y="202692"/>
-                  </a:lnTo>
-                  <a:lnTo>
-                    <a:pt x="502665" y="709422"/>
-                  </a:lnTo>
-                  <a:lnTo>
-                    <a:pt x="0" y="1060450"/>
-                  </a:lnTo>
-                  <a:lnTo>
-                    <a:pt x="502665" y="1013460"/>
-                  </a:lnTo>
-                  <a:lnTo>
-                    <a:pt x="2483865" y="1013460"/>
-                  </a:lnTo>
-                  <a:lnTo>
-                    <a:pt x="2483865" y="202692"/>
-                  </a:lnTo>
-                  <a:lnTo>
-                    <a:pt x="2478509" y="156234"/>
-                  </a:lnTo>
-                  <a:lnTo>
-                    <a:pt x="2463254" y="113577"/>
-                  </a:lnTo>
-                  <a:lnTo>
-                    <a:pt x="2439318" y="75942"/>
-                  </a:lnTo>
-                  <a:lnTo>
-                    <a:pt x="2407923" y="44547"/>
-                  </a:lnTo>
-                  <a:lnTo>
-                    <a:pt x="2370288" y="20611"/>
-                  </a:lnTo>
-                  <a:lnTo>
-                    <a:pt x="2327631" y="5356"/>
-                  </a:lnTo>
-                  <a:lnTo>
-                    <a:pt x="2281174" y="0"/>
-                  </a:lnTo>
-                  <a:close/>
-                </a:path>
-              </a:pathLst>
-            </a:custGeom>
-            <a:solidFill>
-              <a:srgbClr val="224464">
-                <a:alpha val="79998"/>
-              </a:srgbClr>
-            </a:solidFill>
-          </p:spPr>
-          <p:txBody>
-            <a:bodyPr wrap="square" lIns="0" tIns="0" rIns="0" bIns="0" rtlCol="0"/>
-            <a:lstStyle/>
-            <a:p>
-              <a:endParaRPr dirty="0"/>
-            </a:p>
-          </p:txBody>
-        </p:sp>
-        <p:sp>
-          <p:nvSpPr>
-            <p:cNvPr id="108" name="object 154">
-              <a:extLst>
-                <a:ext uri="{FF2B5EF4-FFF2-40B4-BE49-F238E27FC236}">
-                  <a16:creationId xmlns:a16="http://schemas.microsoft.com/office/drawing/2014/main" id="{C8DFC1F6-CDA0-A23D-71B5-345536C08FED}"/>
-                </a:ext>
-              </a:extLst>
-            </p:cNvPr>
-            <p:cNvSpPr/>
-            <p:nvPr/>
-          </p:nvSpPr>
-          <p:spPr>
-            <a:xfrm>
-              <a:off x="7300214" y="1572768"/>
-              <a:ext cx="2484120" cy="1216660"/>
-            </a:xfrm>
-            <a:custGeom>
-              <a:avLst/>
-              <a:gdLst/>
-              <a:ahLst/>
-              <a:cxnLst/>
-              <a:rect l="l" t="t" r="r" b="b"/>
-              <a:pathLst>
-                <a:path w="2484120" h="1216660">
-                  <a:moveTo>
-                    <a:pt x="502665" y="202692"/>
-                  </a:moveTo>
-                  <a:lnTo>
-                    <a:pt x="508022" y="156234"/>
-                  </a:lnTo>
-                  <a:lnTo>
-                    <a:pt x="523277" y="113577"/>
-                  </a:lnTo>
-                  <a:lnTo>
-                    <a:pt x="547213" y="75942"/>
-                  </a:lnTo>
-                  <a:lnTo>
-                    <a:pt x="578608" y="44547"/>
-                  </a:lnTo>
-                  <a:lnTo>
-                    <a:pt x="616243" y="20611"/>
-                  </a:lnTo>
-                  <a:lnTo>
-                    <a:pt x="658900" y="5356"/>
-                  </a:lnTo>
-                  <a:lnTo>
-                    <a:pt x="705357" y="0"/>
-                  </a:lnTo>
-                  <a:lnTo>
-                    <a:pt x="832865" y="0"/>
-                  </a:lnTo>
-                  <a:lnTo>
-                    <a:pt x="1328165" y="0"/>
-                  </a:lnTo>
-                  <a:lnTo>
-                    <a:pt x="2281174" y="0"/>
-                  </a:lnTo>
-                  <a:lnTo>
-                    <a:pt x="2327631" y="5356"/>
-                  </a:lnTo>
-                  <a:lnTo>
-                    <a:pt x="2370288" y="20611"/>
-                  </a:lnTo>
-                  <a:lnTo>
-                    <a:pt x="2407923" y="44547"/>
-                  </a:lnTo>
-                  <a:lnTo>
-                    <a:pt x="2439318" y="75942"/>
-                  </a:lnTo>
-                  <a:lnTo>
-                    <a:pt x="2463254" y="113577"/>
-                  </a:lnTo>
-                  <a:lnTo>
-                    <a:pt x="2478509" y="156234"/>
-                  </a:lnTo>
-                  <a:lnTo>
-                    <a:pt x="2483865" y="202692"/>
-                  </a:lnTo>
-                  <a:lnTo>
-                    <a:pt x="2483865" y="709422"/>
-                  </a:lnTo>
-                  <a:lnTo>
-                    <a:pt x="2483865" y="1013460"/>
-                  </a:lnTo>
-                  <a:lnTo>
-                    <a:pt x="2478509" y="1059917"/>
-                  </a:lnTo>
-                  <a:lnTo>
-                    <a:pt x="2463254" y="1102574"/>
-                  </a:lnTo>
-                  <a:lnTo>
-                    <a:pt x="2439318" y="1140209"/>
-                  </a:lnTo>
-                  <a:lnTo>
-                    <a:pt x="2407923" y="1171604"/>
-                  </a:lnTo>
-                  <a:lnTo>
-                    <a:pt x="2370288" y="1195540"/>
-                  </a:lnTo>
-                  <a:lnTo>
-                    <a:pt x="2327631" y="1210795"/>
-                  </a:lnTo>
-                  <a:lnTo>
-                    <a:pt x="2281174" y="1216152"/>
-                  </a:lnTo>
-                  <a:lnTo>
-                    <a:pt x="1328165" y="1216152"/>
-                  </a:lnTo>
-                  <a:lnTo>
-                    <a:pt x="832865" y="1216152"/>
-                  </a:lnTo>
-                  <a:lnTo>
-                    <a:pt x="705357" y="1216152"/>
-                  </a:lnTo>
-                  <a:lnTo>
-                    <a:pt x="658900" y="1210795"/>
-                  </a:lnTo>
-                  <a:lnTo>
-                    <a:pt x="616243" y="1195540"/>
-                  </a:lnTo>
-                  <a:lnTo>
-                    <a:pt x="578608" y="1171604"/>
-                  </a:lnTo>
-                  <a:lnTo>
-                    <a:pt x="547213" y="1140209"/>
-                  </a:lnTo>
-                  <a:lnTo>
-                    <a:pt x="523277" y="1102574"/>
-                  </a:lnTo>
-                  <a:lnTo>
-                    <a:pt x="508022" y="1059917"/>
-                  </a:lnTo>
-                  <a:lnTo>
-                    <a:pt x="502665" y="1013460"/>
-                  </a:lnTo>
-                  <a:lnTo>
-                    <a:pt x="0" y="1060450"/>
-                  </a:lnTo>
-                  <a:lnTo>
-                    <a:pt x="502665" y="709422"/>
-                  </a:lnTo>
-                  <a:lnTo>
-                    <a:pt x="502665" y="202692"/>
-                  </a:lnTo>
-                  <a:close/>
-                </a:path>
-              </a:pathLst>
-            </a:custGeom>
-            <a:ln w="19049">
-              <a:solidFill>
-                <a:srgbClr val="1A334B"/>
-              </a:solidFill>
-            </a:ln>
-          </p:spPr>
-          <p:txBody>
-            <a:bodyPr wrap="square" lIns="0" tIns="0" rIns="0" bIns="0" rtlCol="0"/>
-            <a:lstStyle/>
-            <a:p>
-              <a:endParaRPr dirty="0"/>
-            </a:p>
-          </p:txBody>
-        </p:sp>
-      </p:grpSp>
-      <p:sp>
-        <p:nvSpPr>
-          <p:cNvPr id="111" name="object 157">
-            <a:extLst>
-              <a:ext uri="{FF2B5EF4-FFF2-40B4-BE49-F238E27FC236}">
-                <a16:creationId xmlns:a16="http://schemas.microsoft.com/office/drawing/2014/main" id="{E842716A-7335-56EF-93A9-D03FE2B646E6}"/>
-              </a:ext>
-            </a:extLst>
-          </p:cNvPr>
-          <p:cNvSpPr txBox="1"/>
+          <p:cNvSpPr/>
           <p:nvPr/>
         </p:nvSpPr>
         <p:spPr>
           <a:xfrm>
-            <a:off x="8534400" y="1600200"/>
-            <a:ext cx="2409318" cy="1059906"/>
+            <a:off x="8217896" y="2209292"/>
+            <a:ext cx="2871213" cy="1216660"/>
           </a:xfrm>
-          <a:prstGeom prst="rect">
-            <a:avLst/>
+          <a:prstGeom prst="wedgeRoundRectCallout">
+            <a:avLst>
+              <a:gd name="adj1" fmla="val -82168"/>
+              <a:gd name="adj2" fmla="val 8366"/>
+              <a:gd name="adj3" fmla="val 16667"/>
+            </a:avLst>
           </a:prstGeom>
+          <a:solidFill>
+            <a:srgbClr val="224464">
+              <a:alpha val="79998"/>
+            </a:srgbClr>
+          </a:solidFill>
         </p:spPr>
         <p:txBody>
-          <a:bodyPr vert="horz" wrap="square" lIns="0" tIns="13335" rIns="0" bIns="0" rtlCol="0">
-            <a:spAutoFit/>
-          </a:bodyPr>
+          <a:bodyPr wrap="square" lIns="0" tIns="0" rIns="0" bIns="0" rtlCol="0"/>
           <a:lstStyle/>
           <a:p>
-            <a:pPr marL="12700" marR="5080" indent="64135">
-              <a:lnSpc>
-                <a:spcPct val="100000"/>
-              </a:lnSpc>
-              <a:spcBef>
-                <a:spcPts val="105"/>
-              </a:spcBef>
-            </a:pPr>
+            <a:pPr algn="ctr"/>
             <a:r>
               <a:rPr lang="bg-BG" sz="3400" b="1" spc="-10" dirty="0">
                 <a:solidFill>
@@ -39373,392 +39265,48 @@
               </a:rPr>
               <a:t>Логическо съхранение</a:t>
             </a:r>
-            <a:endParaRPr sz="3400" dirty="0">
+            <a:endParaRPr lang="bg-BG" sz="3400" dirty="0">
               <a:latin typeface="Calibri"/>
               <a:cs typeface="Calibri"/>
             </a:endParaRPr>
           </a:p>
         </p:txBody>
       </p:sp>
-      <p:grpSp>
-        <p:nvGrpSpPr>
-          <p:cNvPr id="22" name="object 158">
+      <p:sp>
+        <p:nvSpPr>
+          <p:cNvPr id="113" name="object 159">
             <a:extLst>
               <a:ext uri="{FF2B5EF4-FFF2-40B4-BE49-F238E27FC236}">
-                <a16:creationId xmlns:a16="http://schemas.microsoft.com/office/drawing/2014/main" id="{5CF8FA80-10CA-2F1C-2E33-EBBFCB5BCA74}"/>
+                <a16:creationId xmlns:a16="http://schemas.microsoft.com/office/drawing/2014/main" id="{A90ADED9-FB90-96EF-7A4F-2A9EBDE34947}"/>
               </a:ext>
             </a:extLst>
           </p:cNvPr>
-          <p:cNvGrpSpPr/>
-          <p:nvPr/>
-        </p:nvGrpSpPr>
-        <p:grpSpPr>
-          <a:xfrm>
-            <a:off x="7315201" y="4242879"/>
-            <a:ext cx="4267200" cy="1216660"/>
-            <a:chOff x="7244715" y="3636263"/>
-            <a:chExt cx="2539365" cy="1216660"/>
-          </a:xfrm>
-        </p:grpSpPr>
-        <p:sp>
-          <p:nvSpPr>
-            <p:cNvPr id="113" name="object 159">
-              <a:extLst>
-                <a:ext uri="{FF2B5EF4-FFF2-40B4-BE49-F238E27FC236}">
-                  <a16:creationId xmlns:a16="http://schemas.microsoft.com/office/drawing/2014/main" id="{A90ADED9-FB90-96EF-7A4F-2A9EBDE34947}"/>
-                </a:ext>
-              </a:extLst>
-            </p:cNvPr>
-            <p:cNvSpPr/>
-            <p:nvPr/>
-          </p:nvSpPr>
-          <p:spPr>
-            <a:xfrm>
-              <a:off x="7244715" y="3636263"/>
-              <a:ext cx="2539365" cy="1216660"/>
-            </a:xfrm>
-            <a:custGeom>
-              <a:avLst/>
-              <a:gdLst/>
-              <a:ahLst/>
-              <a:cxnLst/>
-              <a:rect l="l" t="t" r="r" b="b"/>
-              <a:pathLst>
-                <a:path w="2539365" h="1216660">
-                  <a:moveTo>
-                    <a:pt x="2539364" y="1013460"/>
-                  </a:moveTo>
-                  <a:lnTo>
-                    <a:pt x="558164" y="1013460"/>
-                  </a:lnTo>
-                  <a:lnTo>
-                    <a:pt x="563521" y="1059917"/>
-                  </a:lnTo>
-                  <a:lnTo>
-                    <a:pt x="578776" y="1102574"/>
-                  </a:lnTo>
-                  <a:lnTo>
-                    <a:pt x="602712" y="1140209"/>
-                  </a:lnTo>
-                  <a:lnTo>
-                    <a:pt x="634107" y="1171604"/>
-                  </a:lnTo>
-                  <a:lnTo>
-                    <a:pt x="671742" y="1195540"/>
-                  </a:lnTo>
-                  <a:lnTo>
-                    <a:pt x="714399" y="1210795"/>
-                  </a:lnTo>
-                  <a:lnTo>
-                    <a:pt x="760856" y="1216152"/>
-                  </a:lnTo>
-                  <a:lnTo>
-                    <a:pt x="2336673" y="1216152"/>
-                  </a:lnTo>
-                  <a:lnTo>
-                    <a:pt x="2383130" y="1210795"/>
-                  </a:lnTo>
-                  <a:lnTo>
-                    <a:pt x="2425787" y="1195540"/>
-                  </a:lnTo>
-                  <a:lnTo>
-                    <a:pt x="2463422" y="1171604"/>
-                  </a:lnTo>
-                  <a:lnTo>
-                    <a:pt x="2494817" y="1140209"/>
-                  </a:lnTo>
-                  <a:lnTo>
-                    <a:pt x="2518753" y="1102574"/>
-                  </a:lnTo>
-                  <a:lnTo>
-                    <a:pt x="2534008" y="1059917"/>
-                  </a:lnTo>
-                  <a:lnTo>
-                    <a:pt x="2539364" y="1013460"/>
-                  </a:lnTo>
-                  <a:close/>
-                </a:path>
-                <a:path w="2539365" h="1216660">
-                  <a:moveTo>
-                    <a:pt x="2336673" y="0"/>
-                  </a:moveTo>
-                  <a:lnTo>
-                    <a:pt x="760856" y="0"/>
-                  </a:lnTo>
-                  <a:lnTo>
-                    <a:pt x="714399" y="5356"/>
-                  </a:lnTo>
-                  <a:lnTo>
-                    <a:pt x="671742" y="20611"/>
-                  </a:lnTo>
-                  <a:lnTo>
-                    <a:pt x="634107" y="44547"/>
-                  </a:lnTo>
-                  <a:lnTo>
-                    <a:pt x="602712" y="75942"/>
-                  </a:lnTo>
-                  <a:lnTo>
-                    <a:pt x="578776" y="113577"/>
-                  </a:lnTo>
-                  <a:lnTo>
-                    <a:pt x="563521" y="156234"/>
-                  </a:lnTo>
-                  <a:lnTo>
-                    <a:pt x="558164" y="202692"/>
-                  </a:lnTo>
-                  <a:lnTo>
-                    <a:pt x="558164" y="709422"/>
-                  </a:lnTo>
-                  <a:lnTo>
-                    <a:pt x="0" y="1199769"/>
-                  </a:lnTo>
-                  <a:lnTo>
-                    <a:pt x="558164" y="1013460"/>
-                  </a:lnTo>
-                  <a:lnTo>
-                    <a:pt x="2539364" y="1013460"/>
-                  </a:lnTo>
-                  <a:lnTo>
-                    <a:pt x="2539364" y="202692"/>
-                  </a:lnTo>
-                  <a:lnTo>
-                    <a:pt x="2534008" y="156234"/>
-                  </a:lnTo>
-                  <a:lnTo>
-                    <a:pt x="2518753" y="113577"/>
-                  </a:lnTo>
-                  <a:lnTo>
-                    <a:pt x="2494817" y="75942"/>
-                  </a:lnTo>
-                  <a:lnTo>
-                    <a:pt x="2463422" y="44547"/>
-                  </a:lnTo>
-                  <a:lnTo>
-                    <a:pt x="2425787" y="20611"/>
-                  </a:lnTo>
-                  <a:lnTo>
-                    <a:pt x="2383130" y="5356"/>
-                  </a:lnTo>
-                  <a:lnTo>
-                    <a:pt x="2336673" y="0"/>
-                  </a:lnTo>
-                  <a:close/>
-                </a:path>
-              </a:pathLst>
-            </a:custGeom>
-            <a:solidFill>
-              <a:srgbClr val="224464">
-                <a:alpha val="79998"/>
-              </a:srgbClr>
-            </a:solidFill>
-          </p:spPr>
-          <p:txBody>
-            <a:bodyPr wrap="square" lIns="0" tIns="0" rIns="0" bIns="0" rtlCol="0"/>
-            <a:lstStyle/>
-            <a:p>
-              <a:endParaRPr dirty="0"/>
-            </a:p>
-          </p:txBody>
-        </p:sp>
-        <p:sp>
-          <p:nvSpPr>
-            <p:cNvPr id="114" name="object 160">
-              <a:extLst>
-                <a:ext uri="{FF2B5EF4-FFF2-40B4-BE49-F238E27FC236}">
-                  <a16:creationId xmlns:a16="http://schemas.microsoft.com/office/drawing/2014/main" id="{6A239820-4188-602B-A223-F0A9FEF98CBE}"/>
-                </a:ext>
-              </a:extLst>
-            </p:cNvPr>
-            <p:cNvSpPr/>
-            <p:nvPr/>
-          </p:nvSpPr>
-          <p:spPr>
-            <a:xfrm>
-              <a:off x="7244715" y="3636263"/>
-              <a:ext cx="2539365" cy="1216660"/>
-            </a:xfrm>
-            <a:custGeom>
-              <a:avLst/>
-              <a:gdLst/>
-              <a:ahLst/>
-              <a:cxnLst/>
-              <a:rect l="l" t="t" r="r" b="b"/>
-              <a:pathLst>
-                <a:path w="2539365" h="1216660">
-                  <a:moveTo>
-                    <a:pt x="558164" y="202692"/>
-                  </a:moveTo>
-                  <a:lnTo>
-                    <a:pt x="563521" y="156234"/>
-                  </a:lnTo>
-                  <a:lnTo>
-                    <a:pt x="578776" y="113577"/>
-                  </a:lnTo>
-                  <a:lnTo>
-                    <a:pt x="602712" y="75942"/>
-                  </a:lnTo>
-                  <a:lnTo>
-                    <a:pt x="634107" y="44547"/>
-                  </a:lnTo>
-                  <a:lnTo>
-                    <a:pt x="671742" y="20611"/>
-                  </a:lnTo>
-                  <a:lnTo>
-                    <a:pt x="714399" y="5356"/>
-                  </a:lnTo>
-                  <a:lnTo>
-                    <a:pt x="760856" y="0"/>
-                  </a:lnTo>
-                  <a:lnTo>
-                    <a:pt x="888364" y="0"/>
-                  </a:lnTo>
-                  <a:lnTo>
-                    <a:pt x="1383664" y="0"/>
-                  </a:lnTo>
-                  <a:lnTo>
-                    <a:pt x="2336673" y="0"/>
-                  </a:lnTo>
-                  <a:lnTo>
-                    <a:pt x="2383130" y="5356"/>
-                  </a:lnTo>
-                  <a:lnTo>
-                    <a:pt x="2425787" y="20611"/>
-                  </a:lnTo>
-                  <a:lnTo>
-                    <a:pt x="2463422" y="44547"/>
-                  </a:lnTo>
-                  <a:lnTo>
-                    <a:pt x="2494817" y="75942"/>
-                  </a:lnTo>
-                  <a:lnTo>
-                    <a:pt x="2518753" y="113577"/>
-                  </a:lnTo>
-                  <a:lnTo>
-                    <a:pt x="2534008" y="156234"/>
-                  </a:lnTo>
-                  <a:lnTo>
-                    <a:pt x="2539364" y="202692"/>
-                  </a:lnTo>
-                  <a:lnTo>
-                    <a:pt x="2539364" y="709422"/>
-                  </a:lnTo>
-                  <a:lnTo>
-                    <a:pt x="2539364" y="1013460"/>
-                  </a:lnTo>
-                  <a:lnTo>
-                    <a:pt x="2534008" y="1059917"/>
-                  </a:lnTo>
-                  <a:lnTo>
-                    <a:pt x="2518753" y="1102574"/>
-                  </a:lnTo>
-                  <a:lnTo>
-                    <a:pt x="2494817" y="1140209"/>
-                  </a:lnTo>
-                  <a:lnTo>
-                    <a:pt x="2463422" y="1171604"/>
-                  </a:lnTo>
-                  <a:lnTo>
-                    <a:pt x="2425787" y="1195540"/>
-                  </a:lnTo>
-                  <a:lnTo>
-                    <a:pt x="2383130" y="1210795"/>
-                  </a:lnTo>
-                  <a:lnTo>
-                    <a:pt x="2336673" y="1216152"/>
-                  </a:lnTo>
-                  <a:lnTo>
-                    <a:pt x="1383664" y="1216152"/>
-                  </a:lnTo>
-                  <a:lnTo>
-                    <a:pt x="888364" y="1216152"/>
-                  </a:lnTo>
-                  <a:lnTo>
-                    <a:pt x="760856" y="1216152"/>
-                  </a:lnTo>
-                  <a:lnTo>
-                    <a:pt x="714399" y="1210795"/>
-                  </a:lnTo>
-                  <a:lnTo>
-                    <a:pt x="671742" y="1195540"/>
-                  </a:lnTo>
-                  <a:lnTo>
-                    <a:pt x="634107" y="1171604"/>
-                  </a:lnTo>
-                  <a:lnTo>
-                    <a:pt x="602712" y="1140209"/>
-                  </a:lnTo>
-                  <a:lnTo>
-                    <a:pt x="578776" y="1102574"/>
-                  </a:lnTo>
-                  <a:lnTo>
-                    <a:pt x="563521" y="1059917"/>
-                  </a:lnTo>
-                  <a:lnTo>
-                    <a:pt x="558164" y="1013460"/>
-                  </a:lnTo>
-                  <a:lnTo>
-                    <a:pt x="0" y="1199769"/>
-                  </a:lnTo>
-                  <a:lnTo>
-                    <a:pt x="558164" y="709422"/>
-                  </a:lnTo>
-                  <a:lnTo>
-                    <a:pt x="558164" y="202692"/>
-                  </a:lnTo>
-                  <a:close/>
-                </a:path>
-              </a:pathLst>
-            </a:custGeom>
-            <a:ln w="19049">
-              <a:solidFill>
-                <a:srgbClr val="1A334B"/>
-              </a:solidFill>
-            </a:ln>
-          </p:spPr>
-          <p:txBody>
-            <a:bodyPr wrap="square" lIns="0" tIns="0" rIns="0" bIns="0" rtlCol="0"/>
-            <a:lstStyle/>
-            <a:p>
-              <a:endParaRPr dirty="0"/>
-            </a:p>
-          </p:txBody>
-        </p:sp>
-      </p:grpSp>
-      <p:sp>
-        <p:nvSpPr>
-          <p:cNvPr id="117" name="object 163">
-            <a:extLst>
-              <a:ext uri="{FF2B5EF4-FFF2-40B4-BE49-F238E27FC236}">
-                <a16:creationId xmlns:a16="http://schemas.microsoft.com/office/drawing/2014/main" id="{145C91B0-2DB6-3CD7-4E6A-3387E19BC204}"/>
-              </a:ext>
-            </a:extLst>
-          </p:cNvPr>
-          <p:cNvSpPr txBox="1"/>
+          <p:cNvSpPr/>
           <p:nvPr/>
         </p:nvSpPr>
         <p:spPr>
           <a:xfrm>
-            <a:off x="8839200" y="4267200"/>
-            <a:ext cx="2677542" cy="1060547"/>
+            <a:off x="8225958" y="5041265"/>
+            <a:ext cx="2871213" cy="1216660"/>
           </a:xfrm>
-          <a:prstGeom prst="rect">
-            <a:avLst/>
+          <a:prstGeom prst="wedgeRoundRectCallout">
+            <a:avLst>
+              <a:gd name="adj1" fmla="val -81579"/>
+              <a:gd name="adj2" fmla="val 12396"/>
+              <a:gd name="adj3" fmla="val 16667"/>
+            </a:avLst>
           </a:prstGeom>
+          <a:solidFill>
+            <a:srgbClr val="224464">
+              <a:alpha val="79998"/>
+            </a:srgbClr>
+          </a:solidFill>
         </p:spPr>
         <p:txBody>
-          <a:bodyPr vert="horz" wrap="square" lIns="0" tIns="13970" rIns="0" bIns="0" rtlCol="0">
-            <a:spAutoFit/>
-          </a:bodyPr>
+          <a:bodyPr wrap="square" lIns="0" tIns="0" rIns="0" bIns="0" rtlCol="0"/>
           <a:lstStyle/>
           <a:p>
-            <a:pPr marL="52069" marR="5080" indent="-40005">
-              <a:lnSpc>
-                <a:spcPct val="100000"/>
-              </a:lnSpc>
-              <a:spcBef>
-                <a:spcPts val="110"/>
-              </a:spcBef>
-            </a:pPr>
+            <a:pPr algn="ctr"/>
             <a:r>
               <a:rPr lang="bg-BG" sz="3400" b="1" spc="-25" dirty="0">
                 <a:solidFill>
@@ -39769,7 +39317,7 @@
               </a:rPr>
               <a:t>Физическо съхранение</a:t>
             </a:r>
-            <a:endParaRPr sz="3400" dirty="0">
+            <a:endParaRPr lang="bg-BG" sz="3400" dirty="0">
               <a:latin typeface="Calibri"/>
               <a:cs typeface="Calibri"/>
             </a:endParaRPr>
@@ -40699,7 +40247,7 @@
                             </p:stCondLst>
                             <p:childTnLst>
                               <p:par>
-                                <p:cTn id="17" presetID="1" presetClass="entr" presetSubtype="0" fill="hold" nodeType="clickEffect">
+                                <p:cTn id="17" presetID="1" presetClass="entr" presetSubtype="0" fill="hold" grpId="0" nodeType="clickEffect">
                                   <p:stCondLst>
                                     <p:cond delay="0"/>
                                   </p:stCondLst>
@@ -40712,7 +40260,7 @@
                                           </p:stCondLst>
                                         </p:cTn>
                                         <p:tgtEl>
-                                          <p:spTgt spid="21"/>
+                                          <p:spTgt spid="107"/>
                                         </p:tgtEl>
                                         <p:attrNameLst>
                                           <p:attrName>style.visibility</p:attrName>
@@ -40906,7 +40454,7 @@
                             </p:stCondLst>
                             <p:childTnLst>
                               <p:par>
-                                <p:cTn id="35" presetID="1" presetClass="entr" presetSubtype="0" fill="hold" nodeType="clickEffect">
+                                <p:cTn id="35" presetID="1" presetClass="entr" presetSubtype="0" fill="hold" grpId="0" nodeType="clickEffect">
                                   <p:stCondLst>
                                     <p:cond delay="0"/>
                                   </p:stCondLst>
@@ -40919,7 +40467,7 @@
                                           </p:stCondLst>
                                         </p:cTn>
                                         <p:tgtEl>
-                                          <p:spTgt spid="22"/>
+                                          <p:spTgt spid="113"/>
                                         </p:tgtEl>
                                         <p:attrNameLst>
                                           <p:attrName>style.visibility</p:attrName>
@@ -40959,6 +40507,10 @@
         </p:cTn>
       </p:par>
     </p:tnLst>
+    <p:bldLst>
+      <p:bldP spid="107" grpId="0" animBg="1"/>
+      <p:bldP spid="113" grpId="0" animBg="1"/>
+    </p:bldLst>
   </p:timing>
 </p:sld>
 </file>
@@ -41876,12 +41428,6 @@
 </file>
 
 <file path=customXml/item1.xml><?xml version="1.0" encoding="utf-8"?>
-<p:properties xmlns:p="http://schemas.microsoft.com/office/2006/metadata/properties" xmlns:xsi="http://www.w3.org/2001/XMLSchema-instance" xmlns:pc="http://schemas.microsoft.com/office/infopath/2007/PartnerControls">
-  <documentManagement/>
-</p:properties>
-</file>
-
-<file path=customXml/item2.xml><?xml version="1.0" encoding="utf-8"?>
 <?mso-contentType ?>
 <FormTemplates xmlns="http://schemas.microsoft.com/sharepoint/v3/contenttype/forms">
   <Display>DocumentLibraryForm</Display>
@@ -41890,7 +41436,7 @@
 </FormTemplates>
 </file>
 
-<file path=customXml/item3.xml><?xml version="1.0" encoding="utf-8"?>
+<file path=customXml/item2.xml><?xml version="1.0" encoding="utf-8"?>
 <ct:contentTypeSchema xmlns:ct="http://schemas.microsoft.com/office/2006/metadata/contentType" xmlns:ma="http://schemas.microsoft.com/office/2006/metadata/properties/metaAttributes" ct:_="" ma:_="" ma:contentTypeName="Документ" ma:contentTypeID="0x010100B6C18B0EB80FEC43B96FC4929E3ACDFF" ma:contentTypeVersion="8" ma:contentTypeDescription="Създаване на нов документ" ma:contentTypeScope="" ma:versionID="5e73c28b7fde86b7f49c9d6b9be21d41">
   <xsd:schema xmlns:xsd="http://www.w3.org/2001/XMLSchema" xmlns:xs="http://www.w3.org/2001/XMLSchema" xmlns:p="http://schemas.microsoft.com/office/2006/metadata/properties" xmlns:ns2="4f985cec-e092-4bcf-a1e1-b816bd0221d8" targetNamespace="http://schemas.microsoft.com/office/2006/metadata/properties" ma:root="true" ma:fieldsID="f7a640d6aa79659634b3275499e0d9c9" ns2:_="">
     <xsd:import namespace="4f985cec-e092-4bcf-a1e1-b816bd0221d8"/>
@@ -42062,23 +41608,13 @@
 </ct:contentTypeSchema>
 </file>
 
-<file path=customXml/itemProps1.xml><?xml version="1.0" encoding="utf-8"?>
-<ds:datastoreItem xmlns:ds="http://schemas.openxmlformats.org/officeDocument/2006/customXml" ds:itemID="{5E2F4A33-1866-4BB8-8A35-8D6BDFE8D9F5}">
-  <ds:schemaRefs>
-    <ds:schemaRef ds:uri="http://schemas.microsoft.com/office/infopath/2007/PartnerControls"/>
-    <ds:schemaRef ds:uri="http://purl.org/dc/dcmitype/"/>
-    <ds:schemaRef ds:uri="http://schemas.microsoft.com/office/2006/documentManagement/types"/>
-    <ds:schemaRef ds:uri="http://schemas.microsoft.com/office/2006/metadata/properties"/>
-    <ds:schemaRef ds:uri="http://www.w3.org/XML/1998/namespace"/>
-    <ds:schemaRef ds:uri="4f985cec-e092-4bcf-a1e1-b816bd0221d8"/>
-    <ds:schemaRef ds:uri="http://schemas.openxmlformats.org/package/2006/metadata/core-properties"/>
-    <ds:schemaRef ds:uri="http://purl.org/dc/terms/"/>
-    <ds:schemaRef ds:uri="http://purl.org/dc/elements/1.1/"/>
-  </ds:schemaRefs>
-</ds:datastoreItem>
+<file path=customXml/item3.xml><?xml version="1.0" encoding="utf-8"?>
+<p:properties xmlns:p="http://schemas.microsoft.com/office/2006/metadata/properties" xmlns:xsi="http://www.w3.org/2001/XMLSchema-instance" xmlns:pc="http://schemas.microsoft.com/office/infopath/2007/PartnerControls">
+  <documentManagement/>
+</p:properties>
 </file>
 
-<file path=customXml/itemProps2.xml><?xml version="1.0" encoding="utf-8"?>
+<file path=customXml/itemProps1.xml><?xml version="1.0" encoding="utf-8"?>
 <ds:datastoreItem xmlns:ds="http://schemas.openxmlformats.org/officeDocument/2006/customXml" ds:itemID="{68A20BEC-F81B-49CD-951D-E62C4BAE7796}">
   <ds:schemaRefs>
     <ds:schemaRef ds:uri="http://schemas.microsoft.com/sharepoint/v3/contenttype/forms"/>
@@ -42086,7 +41622,7 @@
 </ds:datastoreItem>
 </file>
 
-<file path=customXml/itemProps3.xml><?xml version="1.0" encoding="utf-8"?>
+<file path=customXml/itemProps2.xml><?xml version="1.0" encoding="utf-8"?>
 <ds:datastoreItem xmlns:ds="http://schemas.openxmlformats.org/officeDocument/2006/customXml" ds:itemID="{4443A303-689A-4436-B140-8B2DF827EBE9}">
   <ds:schemaRefs>
     <ds:schemaRef ds:uri="http://schemas.microsoft.com/office/2006/metadata/contentType"/>
@@ -42102,4 +41638,20 @@
     <ds:schemaRef ds:uri="http://schemas.microsoft.com/internal/obd"/>
   </ds:schemaRefs>
 </ds:datastoreItem>
+</file>
+
+<file path=customXml/itemProps3.xml><?xml version="1.0" encoding="utf-8"?>
+<ds:datastoreItem xmlns:ds="http://schemas.openxmlformats.org/officeDocument/2006/customXml" ds:itemID="{5E2F4A33-1866-4BB8-8A35-8D6BDFE8D9F5}">
+  <ds:schemaRefs>
+    <ds:schemaRef ds:uri="http://schemas.microsoft.com/office/infopath/2007/PartnerControls"/>
+    <ds:schemaRef ds:uri="http://purl.org/dc/dcmitype/"/>
+    <ds:schemaRef ds:uri="http://schemas.microsoft.com/office/2006/documentManagement/types"/>
+    <ds:schemaRef ds:uri="http://schemas.microsoft.com/office/2006/metadata/properties"/>
+    <ds:schemaRef ds:uri="http://www.w3.org/XML/1998/namespace"/>
+    <ds:schemaRef ds:uri="4f985cec-e092-4bcf-a1e1-b816bd0221d8"/>
+    <ds:schemaRef ds:uri="http://schemas.openxmlformats.org/package/2006/metadata/core-properties"/>
+    <ds:schemaRef ds:uri="http://purl.org/dc/terms/"/>
+    <ds:schemaRef ds:uri="http://purl.org/dc/elements/1.1/"/>
+  </ds:schemaRefs>
+</ds:datastoreItem>
 </file>
</xml_diff>

<commit_message>
Fixing slides for DBMS
</commit_message>
<xml_diff>
--- a/Courses/Software-Sciences/Module-3-Databases-New/02-DBMS/02-DBMS.pptx
+++ b/Courses/Software-Sciences/Module-3-Databases-New/02-DBMS/02-DBMS.pptx
@@ -500,7 +500,7 @@
           <a:p>
             <a:fld id="{4E087215-0C8F-4762-A664-737A353EC9A4}" type="datetimeFigureOut">
               <a:rPr lang="bg-BG" smtClean="0"/>
-              <a:t>5.10.2023 г.</a:t>
+              <a:t>19.10.2023 г.</a:t>
             </a:fld>
             <a:endParaRPr lang="bg-BG"/>
           </a:p>
@@ -696,7 +696,7 @@
           <a:p>
             <a:fld id="{72D84649-876A-46C9-8472-14CB09C070D8}" type="datetimeFigureOut">
               <a:rPr lang="en-US" smtClean="0"/>
-              <a:t>10/5/2023</a:t>
+              <a:t>10/19/2023</a:t>
             </a:fld>
             <a:endParaRPr lang="en-US"/>
           </a:p>
@@ -1312,6 +1312,127 @@
           <a:bodyPr/>
           <a:lstStyle/>
           <a:p>
+            <a:endParaRPr lang="en-US"/>
+          </a:p>
+        </p:txBody>
+      </p:sp>
+      <p:sp>
+        <p:nvSpPr>
+          <p:cNvPr id="4" name="Slide Number Placeholder 3"/>
+          <p:cNvSpPr>
+            <a:spLocks noGrp="1"/>
+          </p:cNvSpPr>
+          <p:nvPr>
+            <p:ph type="sldNum" sz="quarter" idx="5"/>
+          </p:nvPr>
+        </p:nvSpPr>
+        <p:spPr/>
+        <p:txBody>
+          <a:bodyPr/>
+          <a:lstStyle/>
+          <a:p>
+            <a:fld id="{2BF067CD-8E6B-4360-9AA8-C5DF2A48A6D1}" type="slidenum">
+              <a:rPr lang="en-US" smtClean="0"/>
+              <a:t>24</a:t>
+            </a:fld>
+            <a:endParaRPr lang="en-US" dirty="0"/>
+          </a:p>
+        </p:txBody>
+      </p:sp>
+      <p:sp>
+        <p:nvSpPr>
+          <p:cNvPr id="5" name="Footer Placeholder 4"/>
+          <p:cNvSpPr>
+            <a:spLocks noGrp="1"/>
+          </p:cNvSpPr>
+          <p:nvPr>
+            <p:ph type="ftr" sz="quarter" idx="4"/>
+          </p:nvPr>
+        </p:nvSpPr>
+        <p:spPr/>
+        <p:txBody>
+          <a:bodyPr/>
+          <a:lstStyle/>
+          <a:p>
+            <a:r>
+              <a:rPr lang="bg-BG" sz="1100"/>
+              <a:t>Работна група </a:t>
+            </a:r>
+            <a:r>
+              <a:rPr lang="bg-BG"/>
+              <a:t>"Образование по програмиране и ИТ"</a:t>
+            </a:r>
+            <a:r>
+              <a:rPr lang="bg-BG" sz="1100"/>
+              <a:t>, с подкрепата на </a:t>
+            </a:r>
+            <a:r>
+              <a:rPr lang="en-US" sz="1100">
+                <a:hlinkClick r:id="rId3"/>
+              </a:rPr>
+              <a:t>SoftUni</a:t>
+            </a:r>
+            <a:endParaRPr lang="en-US" sz="1100" dirty="0"/>
+          </a:p>
+        </p:txBody>
+      </p:sp>
+    </p:spTree>
+    <p:extLst>
+      <p:ext uri="{BB962C8B-B14F-4D97-AF65-F5344CB8AC3E}">
+        <p14:creationId xmlns:p14="http://schemas.microsoft.com/office/powerpoint/2010/main" val="2526416516"/>
+      </p:ext>
+    </p:extLst>
+  </p:cSld>
+  <p:clrMapOvr>
+    <a:masterClrMapping/>
+  </p:clrMapOvr>
+</p:notes>
+</file>
+
+<file path=ppt/notesSlides/notesSlide12.xml><?xml version="1.0" encoding="utf-8"?>
+<p:notes xmlns:a="http://schemas.openxmlformats.org/drawingml/2006/main" xmlns:r="http://schemas.openxmlformats.org/officeDocument/2006/relationships" xmlns:p="http://schemas.openxmlformats.org/presentationml/2006/main">
+  <p:cSld>
+    <p:spTree>
+      <p:nvGrpSpPr>
+        <p:cNvPr id="1" name=""/>
+        <p:cNvGrpSpPr/>
+        <p:nvPr/>
+      </p:nvGrpSpPr>
+      <p:grpSpPr>
+        <a:xfrm>
+          <a:off x="0" y="0"/>
+          <a:ext cx="0" cy="0"/>
+          <a:chOff x="0" y="0"/>
+          <a:chExt cx="0" cy="0"/>
+        </a:xfrm>
+      </p:grpSpPr>
+      <p:sp>
+        <p:nvSpPr>
+          <p:cNvPr id="2" name="Slide Image Placeholder 1"/>
+          <p:cNvSpPr>
+            <a:spLocks noGrp="1" noRot="1" noChangeAspect="1"/>
+          </p:cNvSpPr>
+          <p:nvPr>
+            <p:ph type="sldImg"/>
+          </p:nvPr>
+        </p:nvSpPr>
+        <p:spPr/>
+      </p:sp>
+      <p:sp>
+        <p:nvSpPr>
+          <p:cNvPr id="3" name="Notes Placeholder 2"/>
+          <p:cNvSpPr>
+            <a:spLocks noGrp="1"/>
+          </p:cNvSpPr>
+          <p:nvPr>
+            <p:ph type="body" idx="1"/>
+          </p:nvPr>
+        </p:nvSpPr>
+        <p:spPr/>
+        <p:txBody>
+          <a:bodyPr/>
+          <a:lstStyle/>
+          <a:p>
             <a:endParaRPr lang="en-US" dirty="0"/>
           </a:p>
         </p:txBody>
@@ -1514,7 +1635,7 @@
 </p:notes>
 </file>
 
-<file path=ppt/notesSlides/notesSlide12.xml><?xml version="1.0" encoding="utf-8"?>
+<file path=ppt/notesSlides/notesSlide13.xml><?xml version="1.0" encoding="utf-8"?>
 <p:notes xmlns:a="http://schemas.openxmlformats.org/drawingml/2006/main" xmlns:r="http://schemas.openxmlformats.org/officeDocument/2006/relationships" xmlns:p="http://schemas.openxmlformats.org/presentationml/2006/main">
   <p:cSld>
     <p:spTree>
@@ -1760,7 +1881,7 @@
 </p:notes>
 </file>
 
-<file path=ppt/notesSlides/notesSlide13.xml><?xml version="1.0" encoding="utf-8"?>
+<file path=ppt/notesSlides/notesSlide14.xml><?xml version="1.0" encoding="utf-8"?>
 <p:notes xmlns:a="http://schemas.openxmlformats.org/drawingml/2006/main" xmlns:r="http://schemas.openxmlformats.org/officeDocument/2006/relationships" xmlns:p="http://schemas.openxmlformats.org/presentationml/2006/main">
   <p:cSld>
     <p:spTree>
@@ -22287,7 +22408,7 @@
             </a:r>
             <a:r>
               <a:rPr lang="en-US" sz="3600" dirty="0">
-                <a:hlinkClick r:id="rId2"/>
+                <a:hlinkClick r:id="rId3"/>
               </a:rPr>
               <a:t>https://www.w3schools.com/sql/</a:t>
             </a:r>
@@ -22323,8 +22444,16 @@
               </a:buClr>
             </a:pPr>
             <a:r>
+              <a:rPr lang="bg-BG" sz="3400" b="1" dirty="0">
+                <a:solidFill>
+                  <a:schemeClr val="bg1"/>
+                </a:solidFill>
+              </a:rPr>
+              <a:t>...</a:t>
+            </a:r>
+            <a:r>
               <a:rPr lang="bg-BG" sz="3400" dirty="0"/>
-              <a:t>... </a:t>
+              <a:t> </a:t>
             </a:r>
             <a:r>
               <a:rPr lang="en-US" sz="3400" dirty="0"/>
@@ -22370,7 +22499,7 @@
           <p:nvPr/>
         </p:nvPicPr>
         <p:blipFill>
-          <a:blip r:embed="rId3" cstate="print"/>
+          <a:blip r:embed="rId4" cstate="print"/>
           <a:srcRect/>
           <a:stretch>
             <a:fillRect/>

</xml_diff>

<commit_message>
Adding MON's terms and updating presentations for IT Systems and DBMS
</commit_message>
<xml_diff>
--- a/Courses/Software-Sciences/Module-3-Databases-New/02-DBMS/02-DBMS.pptx
+++ b/Courses/Software-Sciences/Module-3-Databases-New/02-DBMS/02-DBMS.pptx
@@ -5,10 +5,10 @@
     <p:sldMasterId id="2147483675" r:id="rId1"/>
   </p:sldMasterIdLst>
   <p:notesMasterIdLst>
-    <p:notesMasterId r:id="rId29"/>
+    <p:notesMasterId r:id="rId30"/>
   </p:notesMasterIdLst>
   <p:handoutMasterIdLst>
-    <p:handoutMasterId r:id="rId30"/>
+    <p:handoutMasterId r:id="rId31"/>
   </p:handoutMasterIdLst>
   <p:sldIdLst>
     <p:sldId id="627" r:id="rId2"/>
@@ -20,24 +20,25 @@
     <p:sldId id="1196" r:id="rId8"/>
     <p:sldId id="1228" r:id="rId9"/>
     <p:sldId id="1197" r:id="rId10"/>
-    <p:sldId id="1187" r:id="rId11"/>
-    <p:sldId id="1188" r:id="rId12"/>
-    <p:sldId id="1200" r:id="rId13"/>
-    <p:sldId id="1189" r:id="rId14"/>
-    <p:sldId id="1190" r:id="rId15"/>
-    <p:sldId id="1239" r:id="rId16"/>
-    <p:sldId id="1236" r:id="rId17"/>
-    <p:sldId id="1237" r:id="rId18"/>
-    <p:sldId id="1238" r:id="rId19"/>
-    <p:sldId id="1229" r:id="rId20"/>
-    <p:sldId id="1230" r:id="rId21"/>
-    <p:sldId id="1231" r:id="rId22"/>
-    <p:sldId id="1232" r:id="rId23"/>
-    <p:sldId id="1233" r:id="rId24"/>
-    <p:sldId id="1234" r:id="rId25"/>
-    <p:sldId id="349" r:id="rId26"/>
-    <p:sldId id="504" r:id="rId27"/>
-    <p:sldId id="505" r:id="rId28"/>
+    <p:sldId id="1240" r:id="rId11"/>
+    <p:sldId id="1187" r:id="rId12"/>
+    <p:sldId id="1188" r:id="rId13"/>
+    <p:sldId id="1200" r:id="rId14"/>
+    <p:sldId id="1189" r:id="rId15"/>
+    <p:sldId id="1190" r:id="rId16"/>
+    <p:sldId id="1239" r:id="rId17"/>
+    <p:sldId id="1236" r:id="rId18"/>
+    <p:sldId id="1237" r:id="rId19"/>
+    <p:sldId id="1238" r:id="rId20"/>
+    <p:sldId id="1229" r:id="rId21"/>
+    <p:sldId id="1230" r:id="rId22"/>
+    <p:sldId id="1231" r:id="rId23"/>
+    <p:sldId id="1232" r:id="rId24"/>
+    <p:sldId id="1233" r:id="rId25"/>
+    <p:sldId id="1234" r:id="rId26"/>
+    <p:sldId id="349" r:id="rId27"/>
+    <p:sldId id="504" r:id="rId28"/>
+    <p:sldId id="505" r:id="rId29"/>
   </p:sldIdLst>
   <p:sldSz cx="12192000" cy="6858000"/>
   <p:notesSz cx="6858000" cy="9144000"/>
@@ -154,6 +155,7 @@
             <p14:sldId id="1196"/>
             <p14:sldId id="1228"/>
             <p14:sldId id="1197"/>
+            <p14:sldId id="1240"/>
           </p14:sldIdLst>
         </p14:section>
         <p14:section name="Релационни БД" id="{3745F6D7-2AC2-4357-A966-2B713D2F393F}">
@@ -500,7 +502,7 @@
           <a:p>
             <a:fld id="{4E087215-0C8F-4762-A664-737A353EC9A4}" type="datetimeFigureOut">
               <a:rPr lang="bg-BG" smtClean="0"/>
-              <a:t>19.10.2023 г.</a:t>
+              <a:t>18.2.2024 г.</a:t>
             </a:fld>
             <a:endParaRPr lang="bg-BG"/>
           </a:p>
@@ -696,7 +698,7 @@
           <a:p>
             <a:fld id="{72D84649-876A-46C9-8472-14CB09C070D8}" type="datetimeFigureOut">
               <a:rPr lang="en-US" smtClean="0"/>
-              <a:t>10/19/2023</a:t>
+              <a:t>2/18/2024</a:t>
             </a:fld>
             <a:endParaRPr lang="en-US"/>
           </a:p>
@@ -1172,6 +1174,66 @@
           <a:bodyPr/>
           <a:lstStyle/>
           <a:p>
+            <a:r>
+              <a:rPr lang="en-US" sz="1200" kern="1200" dirty="0">
+                <a:solidFill>
+                  <a:schemeClr val="tx1"/>
+                </a:solidFill>
+                <a:latin typeface="+mn-lt"/>
+                <a:ea typeface="+mn-ea"/>
+                <a:cs typeface="+mn-cs"/>
+              </a:rPr>
+              <a:t>DECLARE @VarcharVar VARCHAR(5) = 'Test';</a:t>
+            </a:r>
+          </a:p>
+          <a:p>
+            <a:r>
+              <a:rPr lang="en-US" sz="1200" kern="1200" dirty="0">
+                <a:solidFill>
+                  <a:schemeClr val="tx1"/>
+                </a:solidFill>
+                <a:latin typeface="+mn-lt"/>
+                <a:ea typeface="+mn-ea"/>
+                <a:cs typeface="+mn-cs"/>
+              </a:rPr>
+              <a:t>DECLARE @NVarcharVar NVARCHAR(5) = 'Test';</a:t>
+            </a:r>
+          </a:p>
+          <a:p>
+            <a:r>
+              <a:rPr lang="en-US" sz="1200" kern="1200" dirty="0">
+                <a:solidFill>
+                  <a:schemeClr val="tx1"/>
+                </a:solidFill>
+                <a:latin typeface="+mn-lt"/>
+                <a:ea typeface="+mn-ea"/>
+                <a:cs typeface="+mn-cs"/>
+              </a:rPr>
+              <a:t>DECLARE @Char CHAR(5) = 'Test';</a:t>
+            </a:r>
+          </a:p>
+          <a:p>
+            <a:endParaRPr lang="en-US" sz="1200" kern="1200" dirty="0">
+              <a:solidFill>
+                <a:schemeClr val="tx1"/>
+              </a:solidFill>
+              <a:latin typeface="+mn-lt"/>
+              <a:ea typeface="+mn-ea"/>
+              <a:cs typeface="+mn-cs"/>
+            </a:endParaRPr>
+          </a:p>
+          <a:p>
+            <a:r>
+              <a:rPr lang="en-US" sz="1200" kern="1200" dirty="0">
+                <a:solidFill>
+                  <a:schemeClr val="tx1"/>
+                </a:solidFill>
+                <a:latin typeface="+mn-lt"/>
+                <a:ea typeface="+mn-ea"/>
+                <a:cs typeface="+mn-cs"/>
+              </a:rPr>
+              <a:t>SELECT DATALENGTH(@VarcharVar), DATALENGTH(@NVarcharVar), DATALENGTH(@Char)</a:t>
+            </a:r>
             <a:endParaRPr lang="en-US" dirty="0"/>
           </a:p>
         </p:txBody>
@@ -1194,7 +1256,147 @@
             <a:fld id="{2BF067CD-8E6B-4360-9AA8-C5DF2A48A6D1}" type="slidenum">
               <a:rPr lang="en-US" smtClean="0"/>
               <a:pPr/>
-              <a:t>22</a:t>
+              <a:t>21</a:t>
+            </a:fld>
+            <a:endParaRPr lang="en-US" dirty="0"/>
+          </a:p>
+        </p:txBody>
+      </p:sp>
+      <p:sp>
+        <p:nvSpPr>
+          <p:cNvPr id="5" name="Footer Placeholder 7">
+            <a:extLst>
+              <a:ext uri="{FF2B5EF4-FFF2-40B4-BE49-F238E27FC236}">
+                <a16:creationId xmlns:a16="http://schemas.microsoft.com/office/drawing/2014/main" id="{7DFA047E-DE5C-0BC9-D80D-44995B117383}"/>
+              </a:ext>
+            </a:extLst>
+          </p:cNvPr>
+          <p:cNvSpPr>
+            <a:spLocks noGrp="1"/>
+          </p:cNvSpPr>
+          <p:nvPr>
+            <p:ph type="ftr" sz="quarter" idx="4"/>
+          </p:nvPr>
+        </p:nvSpPr>
+        <p:spPr>
+          <a:xfrm>
+            <a:off x="-1" y="8892000"/>
+            <a:ext cx="6488999" cy="252000"/>
+          </a:xfrm>
+          <a:prstGeom prst="rect">
+            <a:avLst/>
+          </a:prstGeom>
+        </p:spPr>
+        <p:txBody>
+          <a:bodyPr vert="horz" lIns="91440" tIns="45720" rIns="91440" bIns="45720" rtlCol="0" anchor="b"/>
+          <a:lstStyle>
+            <a:lvl1pPr algn="l">
+              <a:defRPr sz="1100"/>
+            </a:lvl1pPr>
+          </a:lstStyle>
+          <a:p>
+            <a:r>
+              <a:rPr lang="bg-BG" sz="1100" dirty="0"/>
+              <a:t>Работна група </a:t>
+            </a:r>
+            <a:r>
+              <a:rPr lang="bg-BG" dirty="0"/>
+              <a:t>"Образование по програмиране и ИТ"</a:t>
+            </a:r>
+            <a:r>
+              <a:rPr lang="bg-BG" sz="1100" dirty="0"/>
+              <a:t>, с подкрепата на </a:t>
+            </a:r>
+            <a:r>
+              <a:rPr lang="en-US" sz="1100" dirty="0">
+                <a:hlinkClick r:id="rId3"/>
+              </a:rPr>
+              <a:t>SoftUni</a:t>
+            </a:r>
+            <a:endParaRPr lang="en-US" sz="1100" dirty="0"/>
+          </a:p>
+        </p:txBody>
+      </p:sp>
+    </p:spTree>
+    <p:extLst>
+      <p:ext uri="{BB962C8B-B14F-4D97-AF65-F5344CB8AC3E}">
+        <p14:creationId xmlns:p14="http://schemas.microsoft.com/office/powerpoint/2010/main" val="2046401278"/>
+      </p:ext>
+    </p:extLst>
+  </p:cSld>
+  <p:clrMapOvr>
+    <a:masterClrMapping/>
+  </p:clrMapOvr>
+</p:notes>
+</file>
+
+<file path=ppt/notesSlides/notesSlide11.xml><?xml version="1.0" encoding="utf-8"?>
+<p:notes xmlns:a="http://schemas.openxmlformats.org/drawingml/2006/main" xmlns:r="http://schemas.openxmlformats.org/officeDocument/2006/relationships" xmlns:p="http://schemas.openxmlformats.org/presentationml/2006/main">
+  <p:cSld>
+    <p:spTree>
+      <p:nvGrpSpPr>
+        <p:cNvPr id="1" name=""/>
+        <p:cNvGrpSpPr/>
+        <p:nvPr/>
+      </p:nvGrpSpPr>
+      <p:grpSpPr>
+        <a:xfrm>
+          <a:off x="0" y="0"/>
+          <a:ext cx="0" cy="0"/>
+          <a:chOff x="0" y="0"/>
+          <a:chExt cx="0" cy="0"/>
+        </a:xfrm>
+      </p:grpSpPr>
+      <p:sp>
+        <p:nvSpPr>
+          <p:cNvPr id="2" name="Slide Image Placeholder 1"/>
+          <p:cNvSpPr>
+            <a:spLocks noGrp="1" noRot="1" noChangeAspect="1"/>
+          </p:cNvSpPr>
+          <p:nvPr>
+            <p:ph type="sldImg"/>
+          </p:nvPr>
+        </p:nvSpPr>
+        <p:spPr/>
+      </p:sp>
+      <p:sp>
+        <p:nvSpPr>
+          <p:cNvPr id="3" name="Notes Placeholder 2"/>
+          <p:cNvSpPr>
+            <a:spLocks noGrp="1"/>
+          </p:cNvSpPr>
+          <p:nvPr>
+            <p:ph type="body" idx="1"/>
+          </p:nvPr>
+        </p:nvSpPr>
+        <p:spPr/>
+        <p:txBody>
+          <a:bodyPr/>
+          <a:lstStyle/>
+          <a:p>
+            <a:endParaRPr lang="en-US" dirty="0"/>
+          </a:p>
+        </p:txBody>
+      </p:sp>
+      <p:sp>
+        <p:nvSpPr>
+          <p:cNvPr id="4" name="Slide Number Placeholder 3"/>
+          <p:cNvSpPr>
+            <a:spLocks noGrp="1"/>
+          </p:cNvSpPr>
+          <p:nvPr>
+            <p:ph type="sldNum" sz="quarter" idx="10"/>
+          </p:nvPr>
+        </p:nvSpPr>
+        <p:spPr/>
+        <p:txBody>
+          <a:bodyPr/>
+          <a:lstStyle/>
+          <a:p>
+            <a:fld id="{2BF067CD-8E6B-4360-9AA8-C5DF2A48A6D1}" type="slidenum">
+              <a:rPr lang="en-US" smtClean="0"/>
+              <a:pPr/>
+              <a:t>23</a:t>
             </a:fld>
             <a:endParaRPr lang="en-US" dirty="0"/>
           </a:p>
@@ -1268,7 +1470,7 @@
 </p:notes>
 </file>
 
-<file path=ppt/notesSlides/notesSlide11.xml><?xml version="1.0" encoding="utf-8"?>
+<file path=ppt/notesSlides/notesSlide12.xml><?xml version="1.0" encoding="utf-8"?>
 <p:notes xmlns:a="http://schemas.openxmlformats.org/drawingml/2006/main" xmlns:r="http://schemas.openxmlformats.org/officeDocument/2006/relationships" xmlns:p="http://schemas.openxmlformats.org/presentationml/2006/main">
   <p:cSld>
     <p:spTree>
@@ -1333,7 +1535,7 @@
           <a:p>
             <a:fld id="{2BF067CD-8E6B-4360-9AA8-C5DF2A48A6D1}" type="slidenum">
               <a:rPr lang="en-US" smtClean="0"/>
-              <a:t>24</a:t>
+              <a:t>25</a:t>
             </a:fld>
             <a:endParaRPr lang="en-US" dirty="0"/>
           </a:p>
@@ -1389,7 +1591,7 @@
 </p:notes>
 </file>
 
-<file path=ppt/notesSlides/notesSlide12.xml><?xml version="1.0" encoding="utf-8"?>
+<file path=ppt/notesSlides/notesSlide13.xml><?xml version="1.0" encoding="utf-8"?>
 <p:notes xmlns:a="http://schemas.openxmlformats.org/drawingml/2006/main" xmlns:r="http://schemas.openxmlformats.org/officeDocument/2006/relationships" xmlns:p="http://schemas.openxmlformats.org/presentationml/2006/main">
   <p:cSld>
     <p:spTree>
@@ -1561,7 +1763,7 @@
             <a:fld id="{3EBA5BD7-F043-4D1B-AA17-CD412FC534DE}" type="slidenum">
               <a:rPr lang="en-US" smtClean="0"/>
               <a:pPr/>
-              <a:t>25</a:t>
+              <a:t>26</a:t>
             </a:fld>
             <a:endParaRPr lang="en-US" dirty="0"/>
           </a:p>
@@ -1635,7 +1837,7 @@
 </p:notes>
 </file>
 
-<file path=ppt/notesSlides/notesSlide13.xml><?xml version="1.0" encoding="utf-8"?>
+<file path=ppt/notesSlides/notesSlide14.xml><?xml version="1.0" encoding="utf-8"?>
 <p:notes xmlns:a="http://schemas.openxmlformats.org/drawingml/2006/main" xmlns:r="http://schemas.openxmlformats.org/officeDocument/2006/relationships" xmlns:p="http://schemas.openxmlformats.org/presentationml/2006/main">
   <p:cSld>
     <p:spTree>
@@ -1807,7 +2009,7 @@
             <a:fld id="{3EBA5BD7-F043-4D1B-AA17-CD412FC534DE}" type="slidenum">
               <a:rPr lang="en-US" smtClean="0"/>
               <a:pPr/>
-              <a:t>26</a:t>
+              <a:t>27</a:t>
             </a:fld>
             <a:endParaRPr lang="en-US" dirty="0"/>
           </a:p>
@@ -1881,7 +2083,7 @@
 </p:notes>
 </file>
 
-<file path=ppt/notesSlides/notesSlide14.xml><?xml version="1.0" encoding="utf-8"?>
+<file path=ppt/notesSlides/notesSlide15.xml><?xml version="1.0" encoding="utf-8"?>
 <p:notes xmlns:a="http://schemas.openxmlformats.org/drawingml/2006/main" xmlns:r="http://schemas.openxmlformats.org/officeDocument/2006/relationships" xmlns:p="http://schemas.openxmlformats.org/presentationml/2006/main">
   <p:cSld>
     <p:spTree>
@@ -2053,7 +2255,7 @@
             <a:fld id="{3EBA5BD7-F043-4D1B-AA17-CD412FC534DE}" type="slidenum">
               <a:rPr lang="en-US" smtClean="0"/>
               <a:pPr/>
-              <a:t>27</a:t>
+              <a:t>28</a:t>
             </a:fld>
             <a:endParaRPr lang="en-US" dirty="0"/>
           </a:p>
@@ -2823,128 +3025,21 @@
       </p:sp>
       <p:sp>
         <p:nvSpPr>
-          <p:cNvPr id="7" name="Slide Number Placeholder 5">
-            <a:extLst>
-              <a:ext uri="{FF2B5EF4-FFF2-40B4-BE49-F238E27FC236}">
-                <a16:creationId xmlns:a16="http://schemas.microsoft.com/office/drawing/2014/main" id="{BD88B0D8-949C-482D-990A-2DAB14AD4AD1}"/>
-              </a:ext>
-            </a:extLst>
-          </p:cNvPr>
-          <p:cNvSpPr txBox="1">
-            <a:spLocks/>
+          <p:cNvPr id="4" name="Slide Number Placeholder 3"/>
+          <p:cNvSpPr>
+            <a:spLocks noGrp="1"/>
           </p:cNvSpPr>
-          <p:nvPr/>
+          <p:nvPr>
+            <p:ph type="sldNum" sz="quarter" idx="5"/>
+          </p:nvPr>
         </p:nvSpPr>
-        <p:spPr>
-          <a:xfrm>
-            <a:off x="6488999" y="8847000"/>
-            <a:ext cx="367414" cy="297000"/>
-          </a:xfrm>
-          <a:prstGeom prst="rect">
-            <a:avLst/>
-          </a:prstGeom>
-        </p:spPr>
+        <p:spPr/>
         <p:txBody>
-          <a:bodyPr vert="horz" lIns="91440" tIns="45720" rIns="91440" bIns="45720" rtlCol="0" anchor="b"/>
-          <a:lstStyle>
-            <a:defPPr>
-              <a:defRPr lang="en-US"/>
-            </a:defPPr>
-            <a:lvl1pPr marL="0" algn="r" defTabSz="914400" rtl="0" eaLnBrk="1" latinLnBrk="0" hangingPunct="1">
-              <a:defRPr sz="1200" kern="1200">
-                <a:solidFill>
-                  <a:schemeClr val="tx1"/>
-                </a:solidFill>
-                <a:latin typeface="+mn-lt"/>
-                <a:ea typeface="+mn-ea"/>
-                <a:cs typeface="+mn-cs"/>
-              </a:defRPr>
-            </a:lvl1pPr>
-            <a:lvl2pPr marL="457200" algn="l" defTabSz="914400" rtl="0" eaLnBrk="1" latinLnBrk="0" hangingPunct="1">
-              <a:defRPr sz="1800" kern="1200">
-                <a:solidFill>
-                  <a:schemeClr val="tx1"/>
-                </a:solidFill>
-                <a:latin typeface="+mn-lt"/>
-                <a:ea typeface="+mn-ea"/>
-                <a:cs typeface="+mn-cs"/>
-              </a:defRPr>
-            </a:lvl2pPr>
-            <a:lvl3pPr marL="914400" algn="l" defTabSz="914400" rtl="0" eaLnBrk="1" latinLnBrk="0" hangingPunct="1">
-              <a:defRPr sz="1800" kern="1200">
-                <a:solidFill>
-                  <a:schemeClr val="tx1"/>
-                </a:solidFill>
-                <a:latin typeface="+mn-lt"/>
-                <a:ea typeface="+mn-ea"/>
-                <a:cs typeface="+mn-cs"/>
-              </a:defRPr>
-            </a:lvl3pPr>
-            <a:lvl4pPr marL="1371600" algn="l" defTabSz="914400" rtl="0" eaLnBrk="1" latinLnBrk="0" hangingPunct="1">
-              <a:defRPr sz="1800" kern="1200">
-                <a:solidFill>
-                  <a:schemeClr val="tx1"/>
-                </a:solidFill>
-                <a:latin typeface="+mn-lt"/>
-                <a:ea typeface="+mn-ea"/>
-                <a:cs typeface="+mn-cs"/>
-              </a:defRPr>
-            </a:lvl4pPr>
-            <a:lvl5pPr marL="1828800" algn="l" defTabSz="914400" rtl="0" eaLnBrk="1" latinLnBrk="0" hangingPunct="1">
-              <a:defRPr sz="1800" kern="1200">
-                <a:solidFill>
-                  <a:schemeClr val="tx1"/>
-                </a:solidFill>
-                <a:latin typeface="+mn-lt"/>
-                <a:ea typeface="+mn-ea"/>
-                <a:cs typeface="+mn-cs"/>
-              </a:defRPr>
-            </a:lvl5pPr>
-            <a:lvl6pPr marL="2286000" algn="l" defTabSz="914400" rtl="0" eaLnBrk="1" latinLnBrk="0" hangingPunct="1">
-              <a:defRPr sz="1800" kern="1200">
-                <a:solidFill>
-                  <a:schemeClr val="tx1"/>
-                </a:solidFill>
-                <a:latin typeface="+mn-lt"/>
-                <a:ea typeface="+mn-ea"/>
-                <a:cs typeface="+mn-cs"/>
-              </a:defRPr>
-            </a:lvl6pPr>
-            <a:lvl7pPr marL="2743200" algn="l" defTabSz="914400" rtl="0" eaLnBrk="1" latinLnBrk="0" hangingPunct="1">
-              <a:defRPr sz="1800" kern="1200">
-                <a:solidFill>
-                  <a:schemeClr val="tx1"/>
-                </a:solidFill>
-                <a:latin typeface="+mn-lt"/>
-                <a:ea typeface="+mn-ea"/>
-                <a:cs typeface="+mn-cs"/>
-              </a:defRPr>
-            </a:lvl7pPr>
-            <a:lvl8pPr marL="3200400" algn="l" defTabSz="914400" rtl="0" eaLnBrk="1" latinLnBrk="0" hangingPunct="1">
-              <a:defRPr sz="1800" kern="1200">
-                <a:solidFill>
-                  <a:schemeClr val="tx1"/>
-                </a:solidFill>
-                <a:latin typeface="+mn-lt"/>
-                <a:ea typeface="+mn-ea"/>
-                <a:cs typeface="+mn-cs"/>
-              </a:defRPr>
-            </a:lvl8pPr>
-            <a:lvl9pPr marL="3657600" algn="l" defTabSz="914400" rtl="0" eaLnBrk="1" latinLnBrk="0" hangingPunct="1">
-              <a:defRPr sz="1800" kern="1200">
-                <a:solidFill>
-                  <a:schemeClr val="tx1"/>
-                </a:solidFill>
-                <a:latin typeface="+mn-lt"/>
-                <a:ea typeface="+mn-ea"/>
-                <a:cs typeface="+mn-cs"/>
-              </a:defRPr>
-            </a:lvl9pPr>
-          </a:lstStyle>
+          <a:bodyPr/>
+          <a:lstStyle/>
           <a:p>
-            <a:fld id="{3EBA5BD7-F043-4D1B-AA17-CD412FC534DE}" type="slidenum">
+            <a:fld id="{2BF067CD-8E6B-4360-9AA8-C5DF2A48A6D1}" type="slidenum">
               <a:rPr lang="en-US" smtClean="0"/>
-              <a:pPr/>
               <a:t>10</a:t>
             </a:fld>
             <a:endParaRPr lang="en-US" dirty="0"/>
@@ -2953,13 +3048,7 @@
       </p:sp>
       <p:sp>
         <p:nvSpPr>
-          <p:cNvPr id="5" name="Footer Placeholder 7">
-            <a:extLst>
-              <a:ext uri="{FF2B5EF4-FFF2-40B4-BE49-F238E27FC236}">
-                <a16:creationId xmlns:a16="http://schemas.microsoft.com/office/drawing/2014/main" id="{0A4D3A2C-3BFC-6602-1212-E998CC7D4739}"/>
-              </a:ext>
-            </a:extLst>
-          </p:cNvPr>
+          <p:cNvPr id="5" name="Footer Placeholder 4"/>
           <p:cNvSpPr>
             <a:spLocks noGrp="1"/>
           </p:cNvSpPr>
@@ -2967,37 +3056,25 @@
             <p:ph type="ftr" sz="quarter" idx="4"/>
           </p:nvPr>
         </p:nvSpPr>
-        <p:spPr>
-          <a:xfrm>
-            <a:off x="-1" y="8892000"/>
-            <a:ext cx="6488999" cy="252000"/>
-          </a:xfrm>
-          <a:prstGeom prst="rect">
-            <a:avLst/>
-          </a:prstGeom>
-        </p:spPr>
+        <p:spPr/>
         <p:txBody>
-          <a:bodyPr vert="horz" lIns="91440" tIns="45720" rIns="91440" bIns="45720" rtlCol="0" anchor="b"/>
-          <a:lstStyle>
-            <a:lvl1pPr algn="l">
-              <a:defRPr sz="1100"/>
-            </a:lvl1pPr>
-          </a:lstStyle>
+          <a:bodyPr/>
+          <a:lstStyle/>
           <a:p>
             <a:r>
-              <a:rPr lang="bg-BG" sz="1100" dirty="0"/>
+              <a:rPr lang="bg-BG" sz="1100"/>
               <a:t>Работна група </a:t>
             </a:r>
             <a:r>
-              <a:rPr lang="bg-BG" dirty="0"/>
+              <a:rPr lang="bg-BG"/>
               <a:t>"Образование по програмиране и ИТ"</a:t>
             </a:r>
             <a:r>
-              <a:rPr lang="bg-BG" sz="1100" dirty="0"/>
+              <a:rPr lang="bg-BG" sz="1100"/>
               <a:t>, с подкрепата на </a:t>
             </a:r>
             <a:r>
-              <a:rPr lang="en-US" sz="1100" dirty="0">
+              <a:rPr lang="en-US" sz="1100">
                 <a:hlinkClick r:id="rId3"/>
               </a:rPr>
               <a:t>SoftUni</a:t>
@@ -3009,7 +3086,7 @@
     </p:spTree>
     <p:extLst>
       <p:ext uri="{BB962C8B-B14F-4D97-AF65-F5344CB8AC3E}">
-        <p14:creationId xmlns:p14="http://schemas.microsoft.com/office/powerpoint/2010/main" val="1590414964"/>
+        <p14:creationId xmlns:p14="http://schemas.microsoft.com/office/powerpoint/2010/main" val="823065312"/>
       </p:ext>
     </p:extLst>
   </p:cSld>
@@ -3020,154 +3097,6 @@
 </file>
 
 <file path=ppt/notesSlides/notesSlide6.xml><?xml version="1.0" encoding="utf-8"?>
-<p:notes xmlns:a="http://schemas.openxmlformats.org/drawingml/2006/main" xmlns:r="http://schemas.openxmlformats.org/officeDocument/2006/relationships" xmlns:p="http://schemas.openxmlformats.org/presentationml/2006/main">
-  <p:cSld>
-    <p:spTree>
-      <p:nvGrpSpPr>
-        <p:cNvPr id="1" name=""/>
-        <p:cNvGrpSpPr/>
-        <p:nvPr/>
-      </p:nvGrpSpPr>
-      <p:grpSpPr>
-        <a:xfrm>
-          <a:off x="0" y="0"/>
-          <a:ext cx="0" cy="0"/>
-          <a:chOff x="0" y="0"/>
-          <a:chExt cx="0" cy="0"/>
-        </a:xfrm>
-      </p:grpSpPr>
-      <p:sp>
-        <p:nvSpPr>
-          <p:cNvPr id="2" name="Slide Image Placeholder 1"/>
-          <p:cNvSpPr>
-            <a:spLocks noGrp="1" noRot="1" noChangeAspect="1"/>
-          </p:cNvSpPr>
-          <p:nvPr>
-            <p:ph type="sldImg"/>
-          </p:nvPr>
-        </p:nvSpPr>
-        <p:spPr/>
-      </p:sp>
-      <p:sp>
-        <p:nvSpPr>
-          <p:cNvPr id="3" name="Notes Placeholder 2"/>
-          <p:cNvSpPr>
-            <a:spLocks noGrp="1"/>
-          </p:cNvSpPr>
-          <p:nvPr>
-            <p:ph type="body" idx="1"/>
-          </p:nvPr>
-        </p:nvSpPr>
-        <p:spPr/>
-        <p:txBody>
-          <a:bodyPr/>
-          <a:lstStyle/>
-          <a:p>
-            <a:r>
-              <a:rPr lang="en-US" dirty="0"/>
-              <a:t>The table is the</a:t>
-            </a:r>
-            <a:r>
-              <a:rPr lang="en-US" baseline="0" dirty="0"/>
-              <a:t> main unit of data storage. It has rows, columns and cells. Cells contain stored data. Each column has a data type. Types can be VARCHAR(String), INT, DATE etc.</a:t>
-            </a:r>
-            <a:endParaRPr lang="en-US" dirty="0"/>
-          </a:p>
-        </p:txBody>
-      </p:sp>
-      <p:sp>
-        <p:nvSpPr>
-          <p:cNvPr id="5" name="Slide Number Placeholder 4"/>
-          <p:cNvSpPr>
-            <a:spLocks noGrp="1"/>
-          </p:cNvSpPr>
-          <p:nvPr>
-            <p:ph type="sldNum" sz="quarter" idx="11"/>
-          </p:nvPr>
-        </p:nvSpPr>
-        <p:spPr/>
-        <p:txBody>
-          <a:bodyPr/>
-          <a:lstStyle/>
-          <a:p>
-            <a:fld id="{3EBA5BD7-F043-4D1B-AA17-CD412FC534DE}" type="slidenum">
-              <a:rPr lang="en-US" smtClean="0"/>
-              <a:pPr/>
-              <a:t>13</a:t>
-            </a:fld>
-            <a:endParaRPr lang="en-US" dirty="0"/>
-          </a:p>
-        </p:txBody>
-      </p:sp>
-      <p:sp>
-        <p:nvSpPr>
-          <p:cNvPr id="4" name="Footer Placeholder 7">
-            <a:extLst>
-              <a:ext uri="{FF2B5EF4-FFF2-40B4-BE49-F238E27FC236}">
-                <a16:creationId xmlns:a16="http://schemas.microsoft.com/office/drawing/2014/main" id="{3C6E4365-C2C6-EADC-E2EB-76A5CDFDE20C}"/>
-              </a:ext>
-            </a:extLst>
-          </p:cNvPr>
-          <p:cNvSpPr>
-            <a:spLocks noGrp="1"/>
-          </p:cNvSpPr>
-          <p:nvPr>
-            <p:ph type="ftr" sz="quarter" idx="4"/>
-          </p:nvPr>
-        </p:nvSpPr>
-        <p:spPr>
-          <a:xfrm>
-            <a:off x="-1" y="8892000"/>
-            <a:ext cx="6488999" cy="252000"/>
-          </a:xfrm>
-          <a:prstGeom prst="rect">
-            <a:avLst/>
-          </a:prstGeom>
-        </p:spPr>
-        <p:txBody>
-          <a:bodyPr vert="horz" lIns="91440" tIns="45720" rIns="91440" bIns="45720" rtlCol="0" anchor="b"/>
-          <a:lstStyle>
-            <a:lvl1pPr algn="l">
-              <a:defRPr sz="1100"/>
-            </a:lvl1pPr>
-          </a:lstStyle>
-          <a:p>
-            <a:r>
-              <a:rPr lang="bg-BG" sz="1100" dirty="0"/>
-              <a:t>Работна група </a:t>
-            </a:r>
-            <a:r>
-              <a:rPr lang="bg-BG" dirty="0"/>
-              <a:t>"Образование по програмиране и ИТ"</a:t>
-            </a:r>
-            <a:r>
-              <a:rPr lang="bg-BG" sz="1100" dirty="0"/>
-              <a:t>, с подкрепата на </a:t>
-            </a:r>
-            <a:r>
-              <a:rPr lang="en-US" sz="1100" dirty="0">
-                <a:hlinkClick r:id="rId3"/>
-              </a:rPr>
-              <a:t>SoftUni</a:t>
-            </a:r>
-            <a:endParaRPr lang="en-US" sz="1100" dirty="0"/>
-          </a:p>
-        </p:txBody>
-      </p:sp>
-    </p:spTree>
-    <p:extLst>
-      <p:ext uri="{BB962C8B-B14F-4D97-AF65-F5344CB8AC3E}">
-        <p14:creationId xmlns:p14="http://schemas.microsoft.com/office/powerpoint/2010/main" val="2324145607"/>
-      </p:ext>
-    </p:extLst>
-  </p:cSld>
-  <p:clrMapOvr>
-    <a:masterClrMapping/>
-  </p:clrMapOvr>
-</p:notes>
-</file>
-
-<file path=ppt/notesSlides/notesSlide7.xml><?xml version="1.0" encoding="utf-8"?>
 <p:notes xmlns:a="http://schemas.openxmlformats.org/drawingml/2006/main" xmlns:r="http://schemas.openxmlformats.org/officeDocument/2006/relationships" xmlns:p="http://schemas.openxmlformats.org/presentationml/2006/main">
   <p:cSld>
     <p:spTree>
@@ -3339,7 +3268,401 @@
             <a:fld id="{3EBA5BD7-F043-4D1B-AA17-CD412FC534DE}" type="slidenum">
               <a:rPr lang="en-US" smtClean="0"/>
               <a:pPr/>
-              <a:t>16</a:t>
+              <a:t>11</a:t>
+            </a:fld>
+            <a:endParaRPr lang="en-US" dirty="0"/>
+          </a:p>
+        </p:txBody>
+      </p:sp>
+      <p:sp>
+        <p:nvSpPr>
+          <p:cNvPr id="5" name="Footer Placeholder 7">
+            <a:extLst>
+              <a:ext uri="{FF2B5EF4-FFF2-40B4-BE49-F238E27FC236}">
+                <a16:creationId xmlns:a16="http://schemas.microsoft.com/office/drawing/2014/main" id="{0A4D3A2C-3BFC-6602-1212-E998CC7D4739}"/>
+              </a:ext>
+            </a:extLst>
+          </p:cNvPr>
+          <p:cNvSpPr>
+            <a:spLocks noGrp="1"/>
+          </p:cNvSpPr>
+          <p:nvPr>
+            <p:ph type="ftr" sz="quarter" idx="4"/>
+          </p:nvPr>
+        </p:nvSpPr>
+        <p:spPr>
+          <a:xfrm>
+            <a:off x="-1" y="8892000"/>
+            <a:ext cx="6488999" cy="252000"/>
+          </a:xfrm>
+          <a:prstGeom prst="rect">
+            <a:avLst/>
+          </a:prstGeom>
+        </p:spPr>
+        <p:txBody>
+          <a:bodyPr vert="horz" lIns="91440" tIns="45720" rIns="91440" bIns="45720" rtlCol="0" anchor="b"/>
+          <a:lstStyle>
+            <a:lvl1pPr algn="l">
+              <a:defRPr sz="1100"/>
+            </a:lvl1pPr>
+          </a:lstStyle>
+          <a:p>
+            <a:r>
+              <a:rPr lang="bg-BG" sz="1100" dirty="0"/>
+              <a:t>Работна група </a:t>
+            </a:r>
+            <a:r>
+              <a:rPr lang="bg-BG" dirty="0"/>
+              <a:t>"Образование по програмиране и ИТ"</a:t>
+            </a:r>
+            <a:r>
+              <a:rPr lang="bg-BG" sz="1100" dirty="0"/>
+              <a:t>, с подкрепата на </a:t>
+            </a:r>
+            <a:r>
+              <a:rPr lang="en-US" sz="1100" dirty="0">
+                <a:hlinkClick r:id="rId3"/>
+              </a:rPr>
+              <a:t>SoftUni</a:t>
+            </a:r>
+            <a:endParaRPr lang="en-US" sz="1100" dirty="0"/>
+          </a:p>
+        </p:txBody>
+      </p:sp>
+    </p:spTree>
+    <p:extLst>
+      <p:ext uri="{BB962C8B-B14F-4D97-AF65-F5344CB8AC3E}">
+        <p14:creationId xmlns:p14="http://schemas.microsoft.com/office/powerpoint/2010/main" val="1590414964"/>
+      </p:ext>
+    </p:extLst>
+  </p:cSld>
+  <p:clrMapOvr>
+    <a:masterClrMapping/>
+  </p:clrMapOvr>
+</p:notes>
+</file>
+
+<file path=ppt/notesSlides/notesSlide7.xml><?xml version="1.0" encoding="utf-8"?>
+<p:notes xmlns:a="http://schemas.openxmlformats.org/drawingml/2006/main" xmlns:r="http://schemas.openxmlformats.org/officeDocument/2006/relationships" xmlns:p="http://schemas.openxmlformats.org/presentationml/2006/main">
+  <p:cSld>
+    <p:spTree>
+      <p:nvGrpSpPr>
+        <p:cNvPr id="1" name=""/>
+        <p:cNvGrpSpPr/>
+        <p:nvPr/>
+      </p:nvGrpSpPr>
+      <p:grpSpPr>
+        <a:xfrm>
+          <a:off x="0" y="0"/>
+          <a:ext cx="0" cy="0"/>
+          <a:chOff x="0" y="0"/>
+          <a:chExt cx="0" cy="0"/>
+        </a:xfrm>
+      </p:grpSpPr>
+      <p:sp>
+        <p:nvSpPr>
+          <p:cNvPr id="2" name="Slide Image Placeholder 1"/>
+          <p:cNvSpPr>
+            <a:spLocks noGrp="1" noRot="1" noChangeAspect="1"/>
+          </p:cNvSpPr>
+          <p:nvPr>
+            <p:ph type="sldImg"/>
+          </p:nvPr>
+        </p:nvSpPr>
+        <p:spPr/>
+      </p:sp>
+      <p:sp>
+        <p:nvSpPr>
+          <p:cNvPr id="3" name="Notes Placeholder 2"/>
+          <p:cNvSpPr>
+            <a:spLocks noGrp="1"/>
+          </p:cNvSpPr>
+          <p:nvPr>
+            <p:ph type="body" idx="1"/>
+          </p:nvPr>
+        </p:nvSpPr>
+        <p:spPr/>
+        <p:txBody>
+          <a:bodyPr/>
+          <a:lstStyle/>
+          <a:p>
+            <a:r>
+              <a:rPr lang="en-US" dirty="0"/>
+              <a:t>The table is the</a:t>
+            </a:r>
+            <a:r>
+              <a:rPr lang="en-US" baseline="0" dirty="0"/>
+              <a:t> main unit of data storage. It has rows, columns and cells. Cells contain stored data. Each column has a data type. Types can be VARCHAR(String), INT, DATE etc.</a:t>
+            </a:r>
+            <a:endParaRPr lang="en-US" dirty="0"/>
+          </a:p>
+        </p:txBody>
+      </p:sp>
+      <p:sp>
+        <p:nvSpPr>
+          <p:cNvPr id="5" name="Slide Number Placeholder 4"/>
+          <p:cNvSpPr>
+            <a:spLocks noGrp="1"/>
+          </p:cNvSpPr>
+          <p:nvPr>
+            <p:ph type="sldNum" sz="quarter" idx="11"/>
+          </p:nvPr>
+        </p:nvSpPr>
+        <p:spPr/>
+        <p:txBody>
+          <a:bodyPr/>
+          <a:lstStyle/>
+          <a:p>
+            <a:fld id="{3EBA5BD7-F043-4D1B-AA17-CD412FC534DE}" type="slidenum">
+              <a:rPr lang="en-US" smtClean="0"/>
+              <a:pPr/>
+              <a:t>14</a:t>
+            </a:fld>
+            <a:endParaRPr lang="en-US" dirty="0"/>
+          </a:p>
+        </p:txBody>
+      </p:sp>
+      <p:sp>
+        <p:nvSpPr>
+          <p:cNvPr id="4" name="Footer Placeholder 7">
+            <a:extLst>
+              <a:ext uri="{FF2B5EF4-FFF2-40B4-BE49-F238E27FC236}">
+                <a16:creationId xmlns:a16="http://schemas.microsoft.com/office/drawing/2014/main" id="{3C6E4365-C2C6-EADC-E2EB-76A5CDFDE20C}"/>
+              </a:ext>
+            </a:extLst>
+          </p:cNvPr>
+          <p:cNvSpPr>
+            <a:spLocks noGrp="1"/>
+          </p:cNvSpPr>
+          <p:nvPr>
+            <p:ph type="ftr" sz="quarter" idx="4"/>
+          </p:nvPr>
+        </p:nvSpPr>
+        <p:spPr>
+          <a:xfrm>
+            <a:off x="-1" y="8892000"/>
+            <a:ext cx="6488999" cy="252000"/>
+          </a:xfrm>
+          <a:prstGeom prst="rect">
+            <a:avLst/>
+          </a:prstGeom>
+        </p:spPr>
+        <p:txBody>
+          <a:bodyPr vert="horz" lIns="91440" tIns="45720" rIns="91440" bIns="45720" rtlCol="0" anchor="b"/>
+          <a:lstStyle>
+            <a:lvl1pPr algn="l">
+              <a:defRPr sz="1100"/>
+            </a:lvl1pPr>
+          </a:lstStyle>
+          <a:p>
+            <a:r>
+              <a:rPr lang="bg-BG" sz="1100" dirty="0"/>
+              <a:t>Работна група </a:t>
+            </a:r>
+            <a:r>
+              <a:rPr lang="bg-BG" dirty="0"/>
+              <a:t>"Образование по програмиране и ИТ"</a:t>
+            </a:r>
+            <a:r>
+              <a:rPr lang="bg-BG" sz="1100" dirty="0"/>
+              <a:t>, с подкрепата на </a:t>
+            </a:r>
+            <a:r>
+              <a:rPr lang="en-US" sz="1100" dirty="0">
+                <a:hlinkClick r:id="rId3"/>
+              </a:rPr>
+              <a:t>SoftUni</a:t>
+            </a:r>
+            <a:endParaRPr lang="en-US" sz="1100" dirty="0"/>
+          </a:p>
+        </p:txBody>
+      </p:sp>
+    </p:spTree>
+    <p:extLst>
+      <p:ext uri="{BB962C8B-B14F-4D97-AF65-F5344CB8AC3E}">
+        <p14:creationId xmlns:p14="http://schemas.microsoft.com/office/powerpoint/2010/main" val="2324145607"/>
+      </p:ext>
+    </p:extLst>
+  </p:cSld>
+  <p:clrMapOvr>
+    <a:masterClrMapping/>
+  </p:clrMapOvr>
+</p:notes>
+</file>
+
+<file path=ppt/notesSlides/notesSlide8.xml><?xml version="1.0" encoding="utf-8"?>
+<p:notes xmlns:a="http://schemas.openxmlformats.org/drawingml/2006/main" xmlns:r="http://schemas.openxmlformats.org/officeDocument/2006/relationships" xmlns:p="http://schemas.openxmlformats.org/presentationml/2006/main">
+  <p:cSld>
+    <p:spTree>
+      <p:nvGrpSpPr>
+        <p:cNvPr id="1" name=""/>
+        <p:cNvGrpSpPr/>
+        <p:nvPr/>
+      </p:nvGrpSpPr>
+      <p:grpSpPr>
+        <a:xfrm>
+          <a:off x="0" y="0"/>
+          <a:ext cx="0" cy="0"/>
+          <a:chOff x="0" y="0"/>
+          <a:chExt cx="0" cy="0"/>
+        </a:xfrm>
+      </p:grpSpPr>
+      <p:sp>
+        <p:nvSpPr>
+          <p:cNvPr id="2" name="Slide Image Placeholder 1"/>
+          <p:cNvSpPr>
+            <a:spLocks noGrp="1" noRot="1" noChangeAspect="1"/>
+          </p:cNvSpPr>
+          <p:nvPr>
+            <p:ph type="sldImg"/>
+          </p:nvPr>
+        </p:nvSpPr>
+        <p:spPr/>
+      </p:sp>
+      <p:sp>
+        <p:nvSpPr>
+          <p:cNvPr id="3" name="Notes Placeholder 2"/>
+          <p:cNvSpPr>
+            <a:spLocks noGrp="1"/>
+          </p:cNvSpPr>
+          <p:nvPr>
+            <p:ph type="body" idx="1"/>
+          </p:nvPr>
+        </p:nvSpPr>
+        <p:spPr/>
+        <p:txBody>
+          <a:bodyPr/>
+          <a:lstStyle/>
+          <a:p>
+            <a:endParaRPr lang="en-US" dirty="0"/>
+          </a:p>
+        </p:txBody>
+      </p:sp>
+      <p:sp>
+        <p:nvSpPr>
+          <p:cNvPr id="7" name="Slide Number Placeholder 5">
+            <a:extLst>
+              <a:ext uri="{FF2B5EF4-FFF2-40B4-BE49-F238E27FC236}">
+                <a16:creationId xmlns:a16="http://schemas.microsoft.com/office/drawing/2014/main" id="{BD88B0D8-949C-482D-990A-2DAB14AD4AD1}"/>
+              </a:ext>
+            </a:extLst>
+          </p:cNvPr>
+          <p:cNvSpPr txBox="1">
+            <a:spLocks/>
+          </p:cNvSpPr>
+          <p:nvPr/>
+        </p:nvSpPr>
+        <p:spPr>
+          <a:xfrm>
+            <a:off x="6488999" y="8847000"/>
+            <a:ext cx="367414" cy="297000"/>
+          </a:xfrm>
+          <a:prstGeom prst="rect">
+            <a:avLst/>
+          </a:prstGeom>
+        </p:spPr>
+        <p:txBody>
+          <a:bodyPr vert="horz" lIns="91440" tIns="45720" rIns="91440" bIns="45720" rtlCol="0" anchor="b"/>
+          <a:lstStyle>
+            <a:defPPr>
+              <a:defRPr lang="en-US"/>
+            </a:defPPr>
+            <a:lvl1pPr marL="0" algn="r" defTabSz="914400" rtl="0" eaLnBrk="1" latinLnBrk="0" hangingPunct="1">
+              <a:defRPr sz="1200" kern="1200">
+                <a:solidFill>
+                  <a:schemeClr val="tx1"/>
+                </a:solidFill>
+                <a:latin typeface="+mn-lt"/>
+                <a:ea typeface="+mn-ea"/>
+                <a:cs typeface="+mn-cs"/>
+              </a:defRPr>
+            </a:lvl1pPr>
+            <a:lvl2pPr marL="457200" algn="l" defTabSz="914400" rtl="0" eaLnBrk="1" latinLnBrk="0" hangingPunct="1">
+              <a:defRPr sz="1800" kern="1200">
+                <a:solidFill>
+                  <a:schemeClr val="tx1"/>
+                </a:solidFill>
+                <a:latin typeface="+mn-lt"/>
+                <a:ea typeface="+mn-ea"/>
+                <a:cs typeface="+mn-cs"/>
+              </a:defRPr>
+            </a:lvl2pPr>
+            <a:lvl3pPr marL="914400" algn="l" defTabSz="914400" rtl="0" eaLnBrk="1" latinLnBrk="0" hangingPunct="1">
+              <a:defRPr sz="1800" kern="1200">
+                <a:solidFill>
+                  <a:schemeClr val="tx1"/>
+                </a:solidFill>
+                <a:latin typeface="+mn-lt"/>
+                <a:ea typeface="+mn-ea"/>
+                <a:cs typeface="+mn-cs"/>
+              </a:defRPr>
+            </a:lvl3pPr>
+            <a:lvl4pPr marL="1371600" algn="l" defTabSz="914400" rtl="0" eaLnBrk="1" latinLnBrk="0" hangingPunct="1">
+              <a:defRPr sz="1800" kern="1200">
+                <a:solidFill>
+                  <a:schemeClr val="tx1"/>
+                </a:solidFill>
+                <a:latin typeface="+mn-lt"/>
+                <a:ea typeface="+mn-ea"/>
+                <a:cs typeface="+mn-cs"/>
+              </a:defRPr>
+            </a:lvl4pPr>
+            <a:lvl5pPr marL="1828800" algn="l" defTabSz="914400" rtl="0" eaLnBrk="1" latinLnBrk="0" hangingPunct="1">
+              <a:defRPr sz="1800" kern="1200">
+                <a:solidFill>
+                  <a:schemeClr val="tx1"/>
+                </a:solidFill>
+                <a:latin typeface="+mn-lt"/>
+                <a:ea typeface="+mn-ea"/>
+                <a:cs typeface="+mn-cs"/>
+              </a:defRPr>
+            </a:lvl5pPr>
+            <a:lvl6pPr marL="2286000" algn="l" defTabSz="914400" rtl="0" eaLnBrk="1" latinLnBrk="0" hangingPunct="1">
+              <a:defRPr sz="1800" kern="1200">
+                <a:solidFill>
+                  <a:schemeClr val="tx1"/>
+                </a:solidFill>
+                <a:latin typeface="+mn-lt"/>
+                <a:ea typeface="+mn-ea"/>
+                <a:cs typeface="+mn-cs"/>
+              </a:defRPr>
+            </a:lvl6pPr>
+            <a:lvl7pPr marL="2743200" algn="l" defTabSz="914400" rtl="0" eaLnBrk="1" latinLnBrk="0" hangingPunct="1">
+              <a:defRPr sz="1800" kern="1200">
+                <a:solidFill>
+                  <a:schemeClr val="tx1"/>
+                </a:solidFill>
+                <a:latin typeface="+mn-lt"/>
+                <a:ea typeface="+mn-ea"/>
+                <a:cs typeface="+mn-cs"/>
+              </a:defRPr>
+            </a:lvl7pPr>
+            <a:lvl8pPr marL="3200400" algn="l" defTabSz="914400" rtl="0" eaLnBrk="1" latinLnBrk="0" hangingPunct="1">
+              <a:defRPr sz="1800" kern="1200">
+                <a:solidFill>
+                  <a:schemeClr val="tx1"/>
+                </a:solidFill>
+                <a:latin typeface="+mn-lt"/>
+                <a:ea typeface="+mn-ea"/>
+                <a:cs typeface="+mn-cs"/>
+              </a:defRPr>
+            </a:lvl8pPr>
+            <a:lvl9pPr marL="3657600" algn="l" defTabSz="914400" rtl="0" eaLnBrk="1" latinLnBrk="0" hangingPunct="1">
+              <a:defRPr sz="1800" kern="1200">
+                <a:solidFill>
+                  <a:schemeClr val="tx1"/>
+                </a:solidFill>
+                <a:latin typeface="+mn-lt"/>
+                <a:ea typeface="+mn-ea"/>
+                <a:cs typeface="+mn-cs"/>
+              </a:defRPr>
+            </a:lvl9pPr>
+          </a:lstStyle>
+          <a:p>
+            <a:fld id="{3EBA5BD7-F043-4D1B-AA17-CD412FC534DE}" type="slidenum">
+              <a:rPr lang="en-US" smtClean="0"/>
+              <a:pPr/>
+              <a:t>17</a:t>
             </a:fld>
             <a:endParaRPr lang="en-US" dirty="0"/>
           </a:p>
@@ -3413,7 +3736,7 @@
 </p:notes>
 </file>
 
-<file path=ppt/notesSlides/notesSlide8.xml><?xml version="1.0" encoding="utf-8"?>
+<file path=ppt/notesSlides/notesSlide9.xml><?xml version="1.0" encoding="utf-8"?>
 <p:notes xmlns:a="http://schemas.openxmlformats.org/drawingml/2006/main" xmlns:r="http://schemas.openxmlformats.org/officeDocument/2006/relationships" xmlns:p="http://schemas.openxmlformats.org/presentationml/2006/main">
   <p:cSld>
     <p:spTree>
@@ -3479,7 +3802,7 @@
             <a:fld id="{2BF067CD-8E6B-4360-9AA8-C5DF2A48A6D1}" type="slidenum">
               <a:rPr lang="en-US" smtClean="0"/>
               <a:pPr/>
-              <a:t>18</a:t>
+              <a:t>19</a:t>
             </a:fld>
             <a:endParaRPr lang="en-US" dirty="0"/>
           </a:p>
@@ -3544,206 +3867,6 @@
     <p:extLst>
       <p:ext uri="{BB962C8B-B14F-4D97-AF65-F5344CB8AC3E}">
         <p14:creationId xmlns:p14="http://schemas.microsoft.com/office/powerpoint/2010/main" val="4004706591"/>
-      </p:ext>
-    </p:extLst>
-  </p:cSld>
-  <p:clrMapOvr>
-    <a:masterClrMapping/>
-  </p:clrMapOvr>
-</p:notes>
-</file>
-
-<file path=ppt/notesSlides/notesSlide9.xml><?xml version="1.0" encoding="utf-8"?>
-<p:notes xmlns:a="http://schemas.openxmlformats.org/drawingml/2006/main" xmlns:r="http://schemas.openxmlformats.org/officeDocument/2006/relationships" xmlns:p="http://schemas.openxmlformats.org/presentationml/2006/main">
-  <p:cSld>
-    <p:spTree>
-      <p:nvGrpSpPr>
-        <p:cNvPr id="1" name=""/>
-        <p:cNvGrpSpPr/>
-        <p:nvPr/>
-      </p:nvGrpSpPr>
-      <p:grpSpPr>
-        <a:xfrm>
-          <a:off x="0" y="0"/>
-          <a:ext cx="0" cy="0"/>
-          <a:chOff x="0" y="0"/>
-          <a:chExt cx="0" cy="0"/>
-        </a:xfrm>
-      </p:grpSpPr>
-      <p:sp>
-        <p:nvSpPr>
-          <p:cNvPr id="2" name="Slide Image Placeholder 1"/>
-          <p:cNvSpPr>
-            <a:spLocks noGrp="1" noRot="1" noChangeAspect="1"/>
-          </p:cNvSpPr>
-          <p:nvPr>
-            <p:ph type="sldImg"/>
-          </p:nvPr>
-        </p:nvSpPr>
-        <p:spPr/>
-      </p:sp>
-      <p:sp>
-        <p:nvSpPr>
-          <p:cNvPr id="3" name="Notes Placeholder 2"/>
-          <p:cNvSpPr>
-            <a:spLocks noGrp="1"/>
-          </p:cNvSpPr>
-          <p:nvPr>
-            <p:ph type="body" idx="1"/>
-          </p:nvPr>
-        </p:nvSpPr>
-        <p:spPr/>
-        <p:txBody>
-          <a:bodyPr/>
-          <a:lstStyle/>
-          <a:p>
-            <a:r>
-              <a:rPr lang="en-US" sz="1200" kern="1200" dirty="0">
-                <a:solidFill>
-                  <a:schemeClr val="tx1"/>
-                </a:solidFill>
-                <a:latin typeface="+mn-lt"/>
-                <a:ea typeface="+mn-ea"/>
-                <a:cs typeface="+mn-cs"/>
-              </a:rPr>
-              <a:t>DECLARE @VarcharVar VARCHAR(5) = 'Test';</a:t>
-            </a:r>
-          </a:p>
-          <a:p>
-            <a:r>
-              <a:rPr lang="en-US" sz="1200" kern="1200" dirty="0">
-                <a:solidFill>
-                  <a:schemeClr val="tx1"/>
-                </a:solidFill>
-                <a:latin typeface="+mn-lt"/>
-                <a:ea typeface="+mn-ea"/>
-                <a:cs typeface="+mn-cs"/>
-              </a:rPr>
-              <a:t>DECLARE @NVarcharVar NVARCHAR(5) = 'Test';</a:t>
-            </a:r>
-          </a:p>
-          <a:p>
-            <a:r>
-              <a:rPr lang="en-US" sz="1200" kern="1200" dirty="0">
-                <a:solidFill>
-                  <a:schemeClr val="tx1"/>
-                </a:solidFill>
-                <a:latin typeface="+mn-lt"/>
-                <a:ea typeface="+mn-ea"/>
-                <a:cs typeface="+mn-cs"/>
-              </a:rPr>
-              <a:t>DECLARE @Char CHAR(5) = 'Test';</a:t>
-            </a:r>
-          </a:p>
-          <a:p>
-            <a:endParaRPr lang="en-US" sz="1200" kern="1200" dirty="0">
-              <a:solidFill>
-                <a:schemeClr val="tx1"/>
-              </a:solidFill>
-              <a:latin typeface="+mn-lt"/>
-              <a:ea typeface="+mn-ea"/>
-              <a:cs typeface="+mn-cs"/>
-            </a:endParaRPr>
-          </a:p>
-          <a:p>
-            <a:r>
-              <a:rPr lang="en-US" sz="1200" kern="1200" dirty="0">
-                <a:solidFill>
-                  <a:schemeClr val="tx1"/>
-                </a:solidFill>
-                <a:latin typeface="+mn-lt"/>
-                <a:ea typeface="+mn-ea"/>
-                <a:cs typeface="+mn-cs"/>
-              </a:rPr>
-              <a:t>SELECT DATALENGTH(@VarcharVar), DATALENGTH(@NVarcharVar), DATALENGTH(@Char)</a:t>
-            </a:r>
-            <a:endParaRPr lang="en-US" dirty="0"/>
-          </a:p>
-        </p:txBody>
-      </p:sp>
-      <p:sp>
-        <p:nvSpPr>
-          <p:cNvPr id="4" name="Slide Number Placeholder 3"/>
-          <p:cNvSpPr>
-            <a:spLocks noGrp="1"/>
-          </p:cNvSpPr>
-          <p:nvPr>
-            <p:ph type="sldNum" sz="quarter" idx="10"/>
-          </p:nvPr>
-        </p:nvSpPr>
-        <p:spPr/>
-        <p:txBody>
-          <a:bodyPr/>
-          <a:lstStyle/>
-          <a:p>
-            <a:fld id="{2BF067CD-8E6B-4360-9AA8-C5DF2A48A6D1}" type="slidenum">
-              <a:rPr lang="en-US" smtClean="0"/>
-              <a:pPr/>
-              <a:t>20</a:t>
-            </a:fld>
-            <a:endParaRPr lang="en-US" dirty="0"/>
-          </a:p>
-        </p:txBody>
-      </p:sp>
-      <p:sp>
-        <p:nvSpPr>
-          <p:cNvPr id="5" name="Footer Placeholder 7">
-            <a:extLst>
-              <a:ext uri="{FF2B5EF4-FFF2-40B4-BE49-F238E27FC236}">
-                <a16:creationId xmlns:a16="http://schemas.microsoft.com/office/drawing/2014/main" id="{7DFA047E-DE5C-0BC9-D80D-44995B117383}"/>
-              </a:ext>
-            </a:extLst>
-          </p:cNvPr>
-          <p:cNvSpPr>
-            <a:spLocks noGrp="1"/>
-          </p:cNvSpPr>
-          <p:nvPr>
-            <p:ph type="ftr" sz="quarter" idx="4"/>
-          </p:nvPr>
-        </p:nvSpPr>
-        <p:spPr>
-          <a:xfrm>
-            <a:off x="-1" y="8892000"/>
-            <a:ext cx="6488999" cy="252000"/>
-          </a:xfrm>
-          <a:prstGeom prst="rect">
-            <a:avLst/>
-          </a:prstGeom>
-        </p:spPr>
-        <p:txBody>
-          <a:bodyPr vert="horz" lIns="91440" tIns="45720" rIns="91440" bIns="45720" rtlCol="0" anchor="b"/>
-          <a:lstStyle>
-            <a:lvl1pPr algn="l">
-              <a:defRPr sz="1100"/>
-            </a:lvl1pPr>
-          </a:lstStyle>
-          <a:p>
-            <a:r>
-              <a:rPr lang="bg-BG" sz="1100" dirty="0"/>
-              <a:t>Работна група </a:t>
-            </a:r>
-            <a:r>
-              <a:rPr lang="bg-BG" dirty="0"/>
-              <a:t>"Образование по програмиране и ИТ"</a:t>
-            </a:r>
-            <a:r>
-              <a:rPr lang="bg-BG" sz="1100" dirty="0"/>
-              <a:t>, с подкрепата на </a:t>
-            </a:r>
-            <a:r>
-              <a:rPr lang="en-US" sz="1100" dirty="0">
-                <a:hlinkClick r:id="rId3"/>
-              </a:rPr>
-              <a:t>SoftUni</a:t>
-            </a:r>
-            <a:endParaRPr lang="en-US" sz="1100" dirty="0"/>
-          </a:p>
-        </p:txBody>
-      </p:sp>
-    </p:spTree>
-    <p:extLst>
-      <p:ext uri="{BB962C8B-B14F-4D97-AF65-F5344CB8AC3E}">
-        <p14:creationId xmlns:p14="http://schemas.microsoft.com/office/powerpoint/2010/main" val="2046401278"/>
       </p:ext>
     </p:extLst>
   </p:cSld>
@@ -9105,6 +9228,672 @@
           <a:chExt cx="0" cy="0"/>
         </a:xfrm>
       </p:grpSpPr>
+      <p:sp>
+        <p:nvSpPr>
+          <p:cNvPr id="2" name="Slide Number Placeholder 1">
+            <a:extLst>
+              <a:ext uri="{FF2B5EF4-FFF2-40B4-BE49-F238E27FC236}">
+                <a16:creationId xmlns:a16="http://schemas.microsoft.com/office/drawing/2014/main" id="{3E8F03B4-0724-EDF0-7228-589D87072439}"/>
+              </a:ext>
+            </a:extLst>
+          </p:cNvPr>
+          <p:cNvSpPr>
+            <a:spLocks noGrp="1"/>
+          </p:cNvSpPr>
+          <p:nvPr>
+            <p:ph type="sldNum" sz="quarter" idx="5"/>
+          </p:nvPr>
+        </p:nvSpPr>
+        <p:spPr/>
+        <p:txBody>
+          <a:bodyPr/>
+          <a:lstStyle/>
+          <a:p>
+            <a:fld id="{2BF067CD-8E6B-4360-9AA8-C5DF2A48A6D1}" type="slidenum">
+              <a:rPr lang="en-US" noProof="0" smtClean="0"/>
+              <a:pPr/>
+              <a:t>10</a:t>
+            </a:fld>
+            <a:endParaRPr lang="en-US" noProof="0" dirty="0"/>
+          </a:p>
+        </p:txBody>
+      </p:sp>
+      <p:sp>
+        <p:nvSpPr>
+          <p:cNvPr id="3" name="Text Placeholder 2">
+            <a:extLst>
+              <a:ext uri="{FF2B5EF4-FFF2-40B4-BE49-F238E27FC236}">
+                <a16:creationId xmlns:a16="http://schemas.microsoft.com/office/drawing/2014/main" id="{B8029E82-797E-D148-F18B-76C204749C80}"/>
+              </a:ext>
+            </a:extLst>
+          </p:cNvPr>
+          <p:cNvSpPr>
+            <a:spLocks noGrp="1"/>
+          </p:cNvSpPr>
+          <p:nvPr>
+            <p:ph type="body" sz="quarter" idx="10"/>
+          </p:nvPr>
+        </p:nvSpPr>
+        <p:spPr/>
+        <p:txBody>
+          <a:bodyPr/>
+          <a:lstStyle/>
+          <a:p>
+            <a:r>
+              <a:rPr lang="bg-BG" sz="3400" spc="-5" dirty="0">
+                <a:solidFill>
+                  <a:srgbClr val="224464"/>
+                </a:solidFill>
+                <a:cs typeface="Calibri"/>
+              </a:rPr>
+              <a:t>У</a:t>
+            </a:r>
+            <a:r>
+              <a:rPr lang="ru-RU" sz="3400" spc="-5" dirty="0">
+                <a:solidFill>
+                  <a:srgbClr val="224464"/>
+                </a:solidFill>
+                <a:cs typeface="Calibri"/>
+              </a:rPr>
+              <a:t>правлява </a:t>
+            </a:r>
+            <a:r>
+              <a:rPr lang="ru-RU" sz="3400" b="1" spc="-5" dirty="0">
+                <a:solidFill>
+                  <a:schemeClr val="bg1"/>
+                </a:solidFill>
+                <a:cs typeface="Calibri"/>
+              </a:rPr>
+              <a:t>съхранението</a:t>
+            </a:r>
+            <a:r>
+              <a:rPr lang="ru-RU" sz="3400" spc="-5" dirty="0">
+                <a:solidFill>
+                  <a:srgbClr val="224464"/>
+                </a:solidFill>
+                <a:cs typeface="Calibri"/>
+              </a:rPr>
+              <a:t> и </a:t>
+            </a:r>
+            <a:r>
+              <a:rPr lang="ru-RU" sz="3400" b="1" spc="-5" dirty="0">
+                <a:solidFill>
+                  <a:schemeClr val="bg1"/>
+                </a:solidFill>
+                <a:cs typeface="Calibri"/>
+              </a:rPr>
+              <a:t>достъпа</a:t>
+            </a:r>
+            <a:r>
+              <a:rPr lang="ru-RU" sz="3400" spc="-5" dirty="0">
+                <a:solidFill>
+                  <a:srgbClr val="224464"/>
+                </a:solidFill>
+                <a:cs typeface="Calibri"/>
+              </a:rPr>
+              <a:t> до </a:t>
+            </a:r>
+            <a:r>
+              <a:rPr lang="ru-RU" sz="3400" b="1" spc="-5" dirty="0">
+                <a:solidFill>
+                  <a:schemeClr val="bg1"/>
+                </a:solidFill>
+                <a:cs typeface="Calibri"/>
+              </a:rPr>
+              <a:t>файлове</a:t>
+            </a:r>
+            <a:r>
+              <a:rPr lang="ru-RU" sz="3400" spc="-5" dirty="0">
+                <a:solidFill>
+                  <a:srgbClr val="224464"/>
+                </a:solidFill>
+                <a:cs typeface="Calibri"/>
+              </a:rPr>
+              <a:t>, които</a:t>
+            </a:r>
+            <a:r>
+              <a:rPr lang="en-US" sz="3400" spc="-5" dirty="0">
+                <a:solidFill>
+                  <a:srgbClr val="224464"/>
+                </a:solidFill>
+                <a:cs typeface="Calibri"/>
+              </a:rPr>
+              <a:t> </a:t>
+            </a:r>
+            <a:r>
+              <a:rPr lang="ru-RU" sz="3400" spc="-5" dirty="0">
+                <a:solidFill>
+                  <a:srgbClr val="224464"/>
+                </a:solidFill>
+                <a:cs typeface="Calibri"/>
+              </a:rPr>
+              <a:t>съдържат </a:t>
+            </a:r>
+            <a:r>
+              <a:rPr lang="ru-RU" sz="3400" b="1" spc="-5" dirty="0">
+                <a:solidFill>
+                  <a:schemeClr val="bg1"/>
+                </a:solidFill>
+                <a:cs typeface="Calibri"/>
+              </a:rPr>
+              <a:t>бази данни</a:t>
+            </a:r>
+            <a:r>
+              <a:rPr lang="ru-RU" sz="3400" spc="-5" dirty="0">
+                <a:solidFill>
+                  <a:srgbClr val="224464"/>
+                </a:solidFill>
+                <a:cs typeface="Calibri"/>
+              </a:rPr>
+              <a:t> и свързаната с тях </a:t>
+            </a:r>
+            <a:r>
+              <a:rPr lang="ru-RU" sz="3400" b="1" spc="-5" dirty="0">
+                <a:solidFill>
+                  <a:schemeClr val="bg1"/>
+                </a:solidFill>
+                <a:cs typeface="Calibri"/>
+              </a:rPr>
+              <a:t>информация</a:t>
+            </a:r>
+            <a:endParaRPr lang="en-US" sz="3400" b="1" spc="-5" dirty="0">
+              <a:solidFill>
+                <a:schemeClr val="bg1"/>
+              </a:solidFill>
+              <a:cs typeface="Calibri"/>
+            </a:endParaRPr>
+          </a:p>
+          <a:p>
+            <a:r>
+              <a:rPr lang="ru-RU" sz="3400" spc="-5" dirty="0">
+                <a:solidFill>
+                  <a:srgbClr val="224464"/>
+                </a:solidFill>
+                <a:cs typeface="Calibri"/>
+              </a:rPr>
+              <a:t>Централизиран ресурс, който осигурява:</a:t>
+            </a:r>
+          </a:p>
+          <a:p>
+            <a:pPr lvl="1"/>
+            <a:r>
+              <a:rPr lang="ru-RU" sz="3200" spc="-5" dirty="0">
+                <a:solidFill>
+                  <a:srgbClr val="224464"/>
+                </a:solidFill>
+                <a:cs typeface="Calibri"/>
+              </a:rPr>
+              <a:t>Централизирано съхранение</a:t>
+            </a:r>
+          </a:p>
+          <a:p>
+            <a:pPr lvl="1"/>
+            <a:r>
+              <a:rPr lang="ru-RU" sz="3200" spc="-5" dirty="0">
+                <a:solidFill>
+                  <a:srgbClr val="224464"/>
+                </a:solidFill>
+                <a:cs typeface="Calibri"/>
+              </a:rPr>
+              <a:t>Контрол на достъпа</a:t>
+            </a:r>
+          </a:p>
+          <a:p>
+            <a:pPr lvl="1"/>
+            <a:r>
+              <a:rPr lang="ru-RU" sz="3200" spc="-5" dirty="0">
+                <a:solidFill>
+                  <a:srgbClr val="224464"/>
+                </a:solidFill>
+                <a:cs typeface="Calibri"/>
+              </a:rPr>
+              <a:t>Ефективност и производителност</a:t>
+            </a:r>
+          </a:p>
+          <a:p>
+            <a:pPr lvl="1"/>
+            <a:r>
+              <a:rPr lang="ru-RU" sz="3200" spc="-5" dirty="0">
+                <a:solidFill>
+                  <a:srgbClr val="224464"/>
+                </a:solidFill>
+                <a:cs typeface="Calibri"/>
+              </a:rPr>
+              <a:t>Споделяне на данни</a:t>
+            </a:r>
+          </a:p>
+          <a:p>
+            <a:pPr lvl="1"/>
+            <a:r>
+              <a:rPr lang="ru-RU" sz="3200" spc="-5" dirty="0">
+                <a:solidFill>
+                  <a:srgbClr val="224464"/>
+                </a:solidFill>
+                <a:cs typeface="Calibri"/>
+              </a:rPr>
+              <a:t>Мащабируемост</a:t>
+            </a:r>
+          </a:p>
+          <a:p>
+            <a:pPr lvl="1"/>
+            <a:endParaRPr lang="en-US" sz="3200" spc="-5" dirty="0">
+              <a:solidFill>
+                <a:srgbClr val="224464"/>
+              </a:solidFill>
+              <a:cs typeface="Calibri"/>
+            </a:endParaRPr>
+          </a:p>
+        </p:txBody>
+      </p:sp>
+      <p:sp>
+        <p:nvSpPr>
+          <p:cNvPr id="4" name="Title 3">
+            <a:extLst>
+              <a:ext uri="{FF2B5EF4-FFF2-40B4-BE49-F238E27FC236}">
+                <a16:creationId xmlns:a16="http://schemas.microsoft.com/office/drawing/2014/main" id="{713A91E9-E451-1879-19F5-1CA03F3B9495}"/>
+              </a:ext>
+            </a:extLst>
+          </p:cNvPr>
+          <p:cNvSpPr>
+            <a:spLocks noGrp="1"/>
+          </p:cNvSpPr>
+          <p:nvPr>
+            <p:ph type="title"/>
+          </p:nvPr>
+        </p:nvSpPr>
+        <p:spPr/>
+        <p:txBody>
+          <a:bodyPr/>
+          <a:lstStyle/>
+          <a:p>
+            <a:r>
+              <a:rPr lang="bg-BG" dirty="0"/>
+              <a:t>Файлов сървър</a:t>
+            </a:r>
+            <a:endParaRPr lang="en-US" dirty="0"/>
+          </a:p>
+        </p:txBody>
+      </p:sp>
+      <p:pic>
+        <p:nvPicPr>
+          <p:cNvPr id="7" name="Picture 6" descr="A logo of a computer server&#10;&#10;Description automatically generated">
+            <a:extLst>
+              <a:ext uri="{FF2B5EF4-FFF2-40B4-BE49-F238E27FC236}">
+                <a16:creationId xmlns:a16="http://schemas.microsoft.com/office/drawing/2014/main" id="{CBBB6DF4-ED9F-39C9-CCB9-6A68B10EC040}"/>
+              </a:ext>
+            </a:extLst>
+          </p:cNvPr>
+          <p:cNvPicPr>
+            <a:picLocks noChangeAspect="1"/>
+          </p:cNvPicPr>
+          <p:nvPr/>
+        </p:nvPicPr>
+        <p:blipFill>
+          <a:blip r:embed="rId3">
+            <a:extLst>
+              <a:ext uri="{28A0092B-C50C-407E-A947-70E740481C1C}">
+                <a14:useLocalDpi xmlns:a14="http://schemas.microsoft.com/office/drawing/2010/main" val="0"/>
+              </a:ext>
+            </a:extLst>
+          </a:blip>
+          <a:stretch>
+            <a:fillRect/>
+          </a:stretch>
+        </p:blipFill>
+        <p:spPr>
+          <a:xfrm>
+            <a:off x="7986000" y="3435552"/>
+            <a:ext cx="3114000" cy="3114000"/>
+          </a:xfrm>
+          <a:prstGeom prst="rect">
+            <a:avLst/>
+          </a:prstGeom>
+        </p:spPr>
+      </p:pic>
+    </p:spTree>
+    <p:extLst>
+      <p:ext uri="{BB962C8B-B14F-4D97-AF65-F5344CB8AC3E}">
+        <p14:creationId xmlns:p14="http://schemas.microsoft.com/office/powerpoint/2010/main" val="2955863129"/>
+      </p:ext>
+    </p:extLst>
+  </p:cSld>
+  <p:clrMapOvr>
+    <a:masterClrMapping/>
+  </p:clrMapOvr>
+  <mc:AlternateContent xmlns:mc="http://schemas.openxmlformats.org/markup-compatibility/2006" xmlns:p14="http://schemas.microsoft.com/office/powerpoint/2010/main">
+    <mc:Choice Requires="p14">
+      <p:transition spd="slow" p14:dur="2000" advClick="0" advTm="5000"/>
+    </mc:Choice>
+    <mc:Fallback xmlns="">
+      <p:transition spd="slow" advClick="0" advTm="5000"/>
+    </mc:Fallback>
+  </mc:AlternateContent>
+  <p:timing>
+    <p:tnLst>
+      <p:par>
+        <p:cTn id="1" dur="indefinite" restart="never" nodeType="tmRoot">
+          <p:childTnLst>
+            <p:seq concurrent="1" nextAc="seek">
+              <p:cTn id="2" dur="indefinite" nodeType="mainSeq">
+                <p:childTnLst>
+                  <p:par>
+                    <p:cTn id="3" fill="hold">
+                      <p:stCondLst>
+                        <p:cond delay="indefinite"/>
+                      </p:stCondLst>
+                      <p:childTnLst>
+                        <p:par>
+                          <p:cTn id="4" fill="hold">
+                            <p:stCondLst>
+                              <p:cond delay="0"/>
+                            </p:stCondLst>
+                            <p:childTnLst>
+                              <p:par>
+                                <p:cTn id="5" presetID="1" presetClass="entr" presetSubtype="0" fill="hold" nodeType="clickEffect">
+                                  <p:stCondLst>
+                                    <p:cond delay="0"/>
+                                  </p:stCondLst>
+                                  <p:childTnLst>
+                                    <p:set>
+                                      <p:cBhvr>
+                                        <p:cTn id="6" dur="1" fill="hold">
+                                          <p:stCondLst>
+                                            <p:cond delay="0"/>
+                                          </p:stCondLst>
+                                        </p:cTn>
+                                        <p:tgtEl>
+                                          <p:spTgt spid="3">
+                                            <p:txEl>
+                                              <p:pRg st="1" end="1"/>
+                                            </p:txEl>
+                                          </p:spTgt>
+                                        </p:tgtEl>
+                                        <p:attrNameLst>
+                                          <p:attrName>style.visibility</p:attrName>
+                                        </p:attrNameLst>
+                                      </p:cBhvr>
+                                      <p:to>
+                                        <p:strVal val="visible"/>
+                                      </p:to>
+                                    </p:set>
+                                  </p:childTnLst>
+                                </p:cTn>
+                              </p:par>
+                              <p:par>
+                                <p:cTn id="7" presetID="1" presetClass="entr" presetSubtype="0" fill="hold" nodeType="withEffect">
+                                  <p:stCondLst>
+                                    <p:cond delay="0"/>
+                                  </p:stCondLst>
+                                  <p:childTnLst>
+                                    <p:set>
+                                      <p:cBhvr>
+                                        <p:cTn id="8" dur="1" fill="hold">
+                                          <p:stCondLst>
+                                            <p:cond delay="0"/>
+                                          </p:stCondLst>
+                                        </p:cTn>
+                                        <p:tgtEl>
+                                          <p:spTgt spid="3">
+                                            <p:txEl>
+                                              <p:pRg st="2" end="2"/>
+                                            </p:txEl>
+                                          </p:spTgt>
+                                        </p:tgtEl>
+                                        <p:attrNameLst>
+                                          <p:attrName>style.visibility</p:attrName>
+                                        </p:attrNameLst>
+                                      </p:cBhvr>
+                                      <p:to>
+                                        <p:strVal val="visible"/>
+                                      </p:to>
+                                    </p:set>
+                                  </p:childTnLst>
+                                </p:cTn>
+                              </p:par>
+                            </p:childTnLst>
+                          </p:cTn>
+                        </p:par>
+                      </p:childTnLst>
+                    </p:cTn>
+                  </p:par>
+                  <p:par>
+                    <p:cTn id="9" fill="hold">
+                      <p:stCondLst>
+                        <p:cond delay="indefinite"/>
+                      </p:stCondLst>
+                      <p:childTnLst>
+                        <p:par>
+                          <p:cTn id="10" fill="hold">
+                            <p:stCondLst>
+                              <p:cond delay="0"/>
+                            </p:stCondLst>
+                            <p:childTnLst>
+                              <p:par>
+                                <p:cTn id="11" presetID="1" presetClass="entr" presetSubtype="0" fill="hold" nodeType="clickEffect">
+                                  <p:stCondLst>
+                                    <p:cond delay="0"/>
+                                  </p:stCondLst>
+                                  <p:childTnLst>
+                                    <p:set>
+                                      <p:cBhvr>
+                                        <p:cTn id="12" dur="1" fill="hold">
+                                          <p:stCondLst>
+                                            <p:cond delay="0"/>
+                                          </p:stCondLst>
+                                        </p:cTn>
+                                        <p:tgtEl>
+                                          <p:spTgt spid="3">
+                                            <p:txEl>
+                                              <p:pRg st="3" end="3"/>
+                                            </p:txEl>
+                                          </p:spTgt>
+                                        </p:tgtEl>
+                                        <p:attrNameLst>
+                                          <p:attrName>style.visibility</p:attrName>
+                                        </p:attrNameLst>
+                                      </p:cBhvr>
+                                      <p:to>
+                                        <p:strVal val="visible"/>
+                                      </p:to>
+                                    </p:set>
+                                  </p:childTnLst>
+                                </p:cTn>
+                              </p:par>
+                            </p:childTnLst>
+                          </p:cTn>
+                        </p:par>
+                      </p:childTnLst>
+                    </p:cTn>
+                  </p:par>
+                  <p:par>
+                    <p:cTn id="13" fill="hold">
+                      <p:stCondLst>
+                        <p:cond delay="indefinite"/>
+                      </p:stCondLst>
+                      <p:childTnLst>
+                        <p:par>
+                          <p:cTn id="14" fill="hold">
+                            <p:stCondLst>
+                              <p:cond delay="0"/>
+                            </p:stCondLst>
+                            <p:childTnLst>
+                              <p:par>
+                                <p:cTn id="15" presetID="1" presetClass="entr" presetSubtype="0" fill="hold" nodeType="clickEffect">
+                                  <p:stCondLst>
+                                    <p:cond delay="0"/>
+                                  </p:stCondLst>
+                                  <p:childTnLst>
+                                    <p:set>
+                                      <p:cBhvr>
+                                        <p:cTn id="16" dur="1" fill="hold">
+                                          <p:stCondLst>
+                                            <p:cond delay="0"/>
+                                          </p:stCondLst>
+                                        </p:cTn>
+                                        <p:tgtEl>
+                                          <p:spTgt spid="3">
+                                            <p:txEl>
+                                              <p:pRg st="4" end="4"/>
+                                            </p:txEl>
+                                          </p:spTgt>
+                                        </p:tgtEl>
+                                        <p:attrNameLst>
+                                          <p:attrName>style.visibility</p:attrName>
+                                        </p:attrNameLst>
+                                      </p:cBhvr>
+                                      <p:to>
+                                        <p:strVal val="visible"/>
+                                      </p:to>
+                                    </p:set>
+                                  </p:childTnLst>
+                                </p:cTn>
+                              </p:par>
+                            </p:childTnLst>
+                          </p:cTn>
+                        </p:par>
+                      </p:childTnLst>
+                    </p:cTn>
+                  </p:par>
+                  <p:par>
+                    <p:cTn id="17" fill="hold">
+                      <p:stCondLst>
+                        <p:cond delay="indefinite"/>
+                      </p:stCondLst>
+                      <p:childTnLst>
+                        <p:par>
+                          <p:cTn id="18" fill="hold">
+                            <p:stCondLst>
+                              <p:cond delay="0"/>
+                            </p:stCondLst>
+                            <p:childTnLst>
+                              <p:par>
+                                <p:cTn id="19" presetID="1" presetClass="entr" presetSubtype="0" fill="hold" nodeType="clickEffect">
+                                  <p:stCondLst>
+                                    <p:cond delay="0"/>
+                                  </p:stCondLst>
+                                  <p:childTnLst>
+                                    <p:set>
+                                      <p:cBhvr>
+                                        <p:cTn id="20" dur="1" fill="hold">
+                                          <p:stCondLst>
+                                            <p:cond delay="0"/>
+                                          </p:stCondLst>
+                                        </p:cTn>
+                                        <p:tgtEl>
+                                          <p:spTgt spid="3">
+                                            <p:txEl>
+                                              <p:pRg st="5" end="5"/>
+                                            </p:txEl>
+                                          </p:spTgt>
+                                        </p:tgtEl>
+                                        <p:attrNameLst>
+                                          <p:attrName>style.visibility</p:attrName>
+                                        </p:attrNameLst>
+                                      </p:cBhvr>
+                                      <p:to>
+                                        <p:strVal val="visible"/>
+                                      </p:to>
+                                    </p:set>
+                                  </p:childTnLst>
+                                </p:cTn>
+                              </p:par>
+                            </p:childTnLst>
+                          </p:cTn>
+                        </p:par>
+                      </p:childTnLst>
+                    </p:cTn>
+                  </p:par>
+                  <p:par>
+                    <p:cTn id="21" fill="hold">
+                      <p:stCondLst>
+                        <p:cond delay="indefinite"/>
+                      </p:stCondLst>
+                      <p:childTnLst>
+                        <p:par>
+                          <p:cTn id="22" fill="hold">
+                            <p:stCondLst>
+                              <p:cond delay="0"/>
+                            </p:stCondLst>
+                            <p:childTnLst>
+                              <p:par>
+                                <p:cTn id="23" presetID="1" presetClass="entr" presetSubtype="0" fill="hold" nodeType="clickEffect">
+                                  <p:stCondLst>
+                                    <p:cond delay="0"/>
+                                  </p:stCondLst>
+                                  <p:childTnLst>
+                                    <p:set>
+                                      <p:cBhvr>
+                                        <p:cTn id="24" dur="1" fill="hold">
+                                          <p:stCondLst>
+                                            <p:cond delay="0"/>
+                                          </p:stCondLst>
+                                        </p:cTn>
+                                        <p:tgtEl>
+                                          <p:spTgt spid="3">
+                                            <p:txEl>
+                                              <p:pRg st="6" end="6"/>
+                                            </p:txEl>
+                                          </p:spTgt>
+                                        </p:tgtEl>
+                                        <p:attrNameLst>
+                                          <p:attrName>style.visibility</p:attrName>
+                                        </p:attrNameLst>
+                                      </p:cBhvr>
+                                      <p:to>
+                                        <p:strVal val="visible"/>
+                                      </p:to>
+                                    </p:set>
+                                  </p:childTnLst>
+                                </p:cTn>
+                              </p:par>
+                            </p:childTnLst>
+                          </p:cTn>
+                        </p:par>
+                      </p:childTnLst>
+                    </p:cTn>
+                  </p:par>
+                </p:childTnLst>
+              </p:cTn>
+              <p:prevCondLst>
+                <p:cond evt="onPrev" delay="0">
+                  <p:tgtEl>
+                    <p:sldTgt/>
+                  </p:tgtEl>
+                </p:cond>
+              </p:prevCondLst>
+              <p:nextCondLst>
+                <p:cond evt="onNext" delay="0">
+                  <p:tgtEl>
+                    <p:sldTgt/>
+                  </p:tgtEl>
+                </p:cond>
+              </p:nextCondLst>
+            </p:seq>
+          </p:childTnLst>
+        </p:cTn>
+      </p:par>
+    </p:tnLst>
+  </p:timing>
+</p:sld>
+</file>
+
+<file path=ppt/slides/slide11.xml><?xml version="1.0" encoding="utf-8"?>
+<p:sld xmlns:a="http://schemas.openxmlformats.org/drawingml/2006/main" xmlns:r="http://schemas.openxmlformats.org/officeDocument/2006/relationships" xmlns:p="http://schemas.openxmlformats.org/presentationml/2006/main">
+  <p:cSld>
+    <p:spTree>
+      <p:nvGrpSpPr>
+        <p:cNvPr id="1" name=""/>
+        <p:cNvGrpSpPr/>
+        <p:nvPr/>
+      </p:nvGrpSpPr>
+      <p:grpSpPr>
+        <a:xfrm>
+          <a:off x="0" y="0"/>
+          <a:ext cx="0" cy="0"/>
+          <a:chOff x="0" y="0"/>
+          <a:chExt cx="0" cy="0"/>
+        </a:xfrm>
+      </p:grpSpPr>
       <p:pic>
         <p:nvPicPr>
           <p:cNvPr id="5" name="Picture 4"/>
@@ -9217,7 +10006,7 @@
 </p:sld>
 </file>
 
-<file path=ppt/slides/slide11.xml><?xml version="1.0" encoding="utf-8"?>
+<file path=ppt/slides/slide12.xml><?xml version="1.0" encoding="utf-8"?>
 <p:sld xmlns:a="http://schemas.openxmlformats.org/drawingml/2006/main" xmlns:r="http://schemas.openxmlformats.org/officeDocument/2006/relationships" xmlns:p="http://schemas.openxmlformats.org/presentationml/2006/main">
   <p:cSld>
     <p:spTree>
@@ -9703,7 +10492,7 @@
                   <a:spcPts val="1055"/>
                 </a:lnSpc>
               </a:pPr>
-              <a:t>11</a:t>
+              <a:t>12</a:t>
             </a:fld>
             <a:endParaRPr sz="1000" dirty="0">
               <a:latin typeface="Calibri"/>
@@ -9836,7 +10625,7 @@
             <a:fld id="{2BF067CD-8E6B-4360-9AA8-C5DF2A48A6D1}" type="slidenum">
               <a:rPr lang="en-US" smtClean="0"/>
               <a:pPr/>
-              <a:t>11</a:t>
+              <a:t>12</a:t>
             </a:fld>
             <a:endParaRPr lang="en-US" dirty="0"/>
           </a:p>
@@ -9942,7 +10731,7 @@
 </p:sld>
 </file>
 
-<file path=ppt/slides/slide12.xml><?xml version="1.0" encoding="utf-8"?>
+<file path=ppt/slides/slide13.xml><?xml version="1.0" encoding="utf-8"?>
 <p:sld xmlns:a="http://schemas.openxmlformats.org/drawingml/2006/main" xmlns:r="http://schemas.openxmlformats.org/officeDocument/2006/relationships" xmlns:p="http://schemas.openxmlformats.org/presentationml/2006/main">
   <p:cSld>
     <p:spTree>
@@ -10254,7 +11043,7 @@
             <a:fld id="{2BF067CD-8E6B-4360-9AA8-C5DF2A48A6D1}" type="slidenum">
               <a:rPr lang="en-US" smtClean="0"/>
               <a:pPr/>
-              <a:t>12</a:t>
+              <a:t>13</a:t>
             </a:fld>
             <a:endParaRPr lang="en-US" dirty="0"/>
           </a:p>
@@ -10360,7 +11149,7 @@
 </p:sld>
 </file>
 
-<file path=ppt/slides/slide13.xml><?xml version="1.0" encoding="utf-8"?>
+<file path=ppt/slides/slide14.xml><?xml version="1.0" encoding="utf-8"?>
 <p:sld xmlns:a="http://schemas.openxmlformats.org/drawingml/2006/main" xmlns:r="http://schemas.openxmlformats.org/officeDocument/2006/relationships" xmlns:p="http://schemas.openxmlformats.org/presentationml/2006/main">
   <p:cSld>
     <p:spTree>
@@ -12793,7 +13582,7 @@
             <a:fld id="{2BF067CD-8E6B-4360-9AA8-C5DF2A48A6D1}" type="slidenum">
               <a:rPr lang="en-US" noProof="0" smtClean="0"/>
               <a:pPr/>
-              <a:t>13</a:t>
+              <a:t>14</a:t>
             </a:fld>
             <a:endParaRPr lang="en-US" noProof="0" dirty="0"/>
           </a:p>
@@ -13129,7 +13918,7 @@
 </p:sld>
 </file>
 
-<file path=ppt/slides/slide14.xml><?xml version="1.0" encoding="utf-8"?>
+<file path=ppt/slides/slide15.xml><?xml version="1.0" encoding="utf-8"?>
 <p:sld xmlns:a="http://schemas.openxmlformats.org/drawingml/2006/main" xmlns:r="http://schemas.openxmlformats.org/officeDocument/2006/relationships" xmlns:p="http://schemas.openxmlformats.org/presentationml/2006/main">
   <p:cSld>
     <p:spTree>
@@ -13428,7 +14217,7 @@
                   <a:spcPts val="1055"/>
                 </a:lnSpc>
               </a:pPr>
-              <a:t>14</a:t>
+              <a:t>15</a:t>
             </a:fld>
             <a:endParaRPr sz="1000" dirty="0">
               <a:latin typeface="Calibri"/>
@@ -13499,7 +14288,7 @@
             <a:fld id="{2BF067CD-8E6B-4360-9AA8-C5DF2A48A6D1}" type="slidenum">
               <a:rPr lang="en-US" noProof="0" smtClean="0"/>
               <a:pPr/>
-              <a:t>14</a:t>
+              <a:t>15</a:t>
             </a:fld>
             <a:endParaRPr lang="en-US" noProof="0" dirty="0"/>
           </a:p>
@@ -13650,7 +14439,7 @@
 </p:sld>
 </file>
 
-<file path=ppt/slides/slide15.xml><?xml version="1.0" encoding="utf-8"?>
+<file path=ppt/slides/slide16.xml><?xml version="1.0" encoding="utf-8"?>
 <p:sld xmlns:a="http://schemas.openxmlformats.org/drawingml/2006/main" xmlns:r="http://schemas.openxmlformats.org/officeDocument/2006/relationships" xmlns:p="http://schemas.openxmlformats.org/presentationml/2006/main">
   <p:cSld>
     <p:spTree>
@@ -16673,7 +17462,7 @@
                   <a:spcPts val="1055"/>
                 </a:lnSpc>
               </a:pPr>
-              <a:t>15</a:t>
+              <a:t>16</a:t>
             </a:fld>
             <a:endParaRPr sz="1000" dirty="0">
               <a:latin typeface="Calibri"/>
@@ -16822,7 +17611,7 @@
             <a:fld id="{2BF067CD-8E6B-4360-9AA8-C5DF2A48A6D1}" type="slidenum">
               <a:rPr lang="en-US" noProof="0" smtClean="0"/>
               <a:pPr/>
-              <a:t>15</a:t>
+              <a:t>16</a:t>
             </a:fld>
             <a:endParaRPr lang="en-US" noProof="0" dirty="0"/>
           </a:p>
@@ -17081,7 +17870,7 @@
 </p:sld>
 </file>
 
-<file path=ppt/slides/slide16.xml><?xml version="1.0" encoding="utf-8"?>
+<file path=ppt/slides/slide17.xml><?xml version="1.0" encoding="utf-8"?>
 <p:sld xmlns:a="http://schemas.openxmlformats.org/drawingml/2006/main" xmlns:r="http://schemas.openxmlformats.org/officeDocument/2006/relationships" xmlns:p="http://schemas.openxmlformats.org/presentationml/2006/main">
   <p:cSld>
     <p:spTree>
@@ -17219,7 +18008,7 @@
 </p:sld>
 </file>
 
-<file path=ppt/slides/slide17.xml><?xml version="1.0" encoding="utf-8"?>
+<file path=ppt/slides/slide18.xml><?xml version="1.0" encoding="utf-8"?>
 <p:sld xmlns:a="http://schemas.openxmlformats.org/drawingml/2006/main" xmlns:r="http://schemas.openxmlformats.org/officeDocument/2006/relationships" xmlns:p="http://schemas.openxmlformats.org/presentationml/2006/main">
   <p:cSld>
     <p:spTree>
@@ -17692,7 +18481,7 @@
                   <a:spcPts val="1055"/>
                 </a:lnSpc>
               </a:pPr>
-              <a:t>17</a:t>
+              <a:t>18</a:t>
             </a:fld>
             <a:endParaRPr sz="1000" dirty="0">
               <a:latin typeface="Calibri"/>
@@ -17825,7 +18614,7 @@
             <a:fld id="{2BF067CD-8E6B-4360-9AA8-C5DF2A48A6D1}" type="slidenum">
               <a:rPr lang="en-US" smtClean="0"/>
               <a:pPr/>
-              <a:t>17</a:t>
+              <a:t>18</a:t>
             </a:fld>
             <a:endParaRPr lang="en-US" dirty="0"/>
           </a:p>
@@ -18109,7 +18898,7 @@
 </p:sld>
 </file>
 
-<file path=ppt/slides/slide18.xml><?xml version="1.0" encoding="utf-8"?>
+<file path=ppt/slides/slide19.xml><?xml version="1.0" encoding="utf-8"?>
 <p:sld xmlns:a="http://schemas.openxmlformats.org/drawingml/2006/main" xmlns:r="http://schemas.openxmlformats.org/officeDocument/2006/relationships" xmlns:p="http://schemas.openxmlformats.org/presentationml/2006/main">
   <p:cSld>
     <p:spTree>
@@ -18952,7 +19741,7 @@
                   <a:spcPts val="1065"/>
                 </a:lnSpc>
               </a:pPr>
-              <a:t>18</a:t>
+              <a:t>19</a:t>
             </a:fld>
             <a:endParaRPr sz="1000" dirty="0">
               <a:latin typeface="Calibri"/>
@@ -18997,7 +19786,7 @@
             <a:fld id="{2BF067CD-8E6B-4360-9AA8-C5DF2A48A6D1}" type="slidenum">
               <a:rPr lang="en-US" noProof="0" smtClean="0"/>
               <a:pPr/>
-              <a:t>18</a:t>
+              <a:t>19</a:t>
             </a:fld>
             <a:endParaRPr lang="en-US" noProof="0" dirty="0"/>
           </a:p>
@@ -19225,120 +20014,6 @@
       <p:bldP spid="19" grpId="0" animBg="1"/>
     </p:bldLst>
   </p:timing>
-</p:sld>
-</file>
-
-<file path=ppt/slides/slide19.xml><?xml version="1.0" encoding="utf-8"?>
-<p:sld xmlns:a="http://schemas.openxmlformats.org/drawingml/2006/main" xmlns:r="http://schemas.openxmlformats.org/officeDocument/2006/relationships" xmlns:p="http://schemas.openxmlformats.org/presentationml/2006/main">
-  <p:cSld>
-    <p:spTree>
-      <p:nvGrpSpPr>
-        <p:cNvPr id="1" name=""/>
-        <p:cNvGrpSpPr/>
-        <p:nvPr/>
-      </p:nvGrpSpPr>
-      <p:grpSpPr>
-        <a:xfrm>
-          <a:off x="0" y="0"/>
-          <a:ext cx="0" cy="0"/>
-          <a:chOff x="0" y="0"/>
-          <a:chExt cx="0" cy="0"/>
-        </a:xfrm>
-      </p:grpSpPr>
-      <p:pic>
-        <p:nvPicPr>
-          <p:cNvPr id="3082" name="Picture 10" descr="Ð ÐµÐ·ÑÐ»ÑÐ°Ñ Ñ Ð¸Ð·Ð¾Ð±ÑÐ°Ð¶ÐµÐ½Ð¸Ðµ Ð·Ð° sql server png">
-            <a:extLst>
-              <a:ext uri="{FF2B5EF4-FFF2-40B4-BE49-F238E27FC236}">
-                <a16:creationId xmlns:a16="http://schemas.microsoft.com/office/drawing/2014/main" id="{D87D64C2-9B46-41DD-97B7-0B78DBF62D17}"/>
-              </a:ext>
-            </a:extLst>
-          </p:cNvPr>
-          <p:cNvPicPr>
-            <a:picLocks noChangeAspect="1" noChangeArrowheads="1"/>
-          </p:cNvPicPr>
-          <p:nvPr/>
-        </p:nvPicPr>
-        <p:blipFill>
-          <a:blip r:embed="rId2" cstate="print">
-            <a:extLst>
-              <a:ext uri="{28A0092B-C50C-407E-A947-70E740481C1C}">
-                <a14:useLocalDpi xmlns:a14="http://schemas.microsoft.com/office/drawing/2010/main" val="0"/>
-              </a:ext>
-            </a:extLst>
-          </a:blip>
-          <a:srcRect/>
-          <a:stretch>
-            <a:fillRect/>
-          </a:stretch>
-        </p:blipFill>
-        <p:spPr bwMode="auto">
-          <a:xfrm>
-            <a:off x="4647372" y="1237422"/>
-            <a:ext cx="2897256" cy="2897256"/>
-          </a:xfrm>
-          <a:prstGeom prst="rect">
-            <a:avLst/>
-          </a:prstGeom>
-          <a:noFill/>
-          <a:extLst>
-            <a:ext uri="{909E8E84-426E-40DD-AFC4-6F175D3DCCD1}">
-              <a14:hiddenFill xmlns:a14="http://schemas.microsoft.com/office/drawing/2010/main">
-                <a:solidFill>
-                  <a:srgbClr val="FFFFFF"/>
-                </a:solidFill>
-              </a14:hiddenFill>
-            </a:ext>
-          </a:extLst>
-        </p:spPr>
-      </p:pic>
-      <p:sp>
-        <p:nvSpPr>
-          <p:cNvPr id="3" name="Заглавие 2">
-            <a:extLst>
-              <a:ext uri="{FF2B5EF4-FFF2-40B4-BE49-F238E27FC236}">
-                <a16:creationId xmlns:a16="http://schemas.microsoft.com/office/drawing/2014/main" id="{B98B7A04-1639-8689-56C2-5FDF05584EDF}"/>
-              </a:ext>
-            </a:extLst>
-          </p:cNvPr>
-          <p:cNvSpPr>
-            <a:spLocks noGrp="1"/>
-          </p:cNvSpPr>
-          <p:nvPr>
-            <p:ph type="title" sz="quarter" idx="10"/>
-          </p:nvPr>
-        </p:nvSpPr>
-        <p:spPr/>
-        <p:txBody>
-          <a:bodyPr/>
-          <a:lstStyle/>
-          <a:p>
-            <a:r>
-              <a:rPr lang="ru-RU"/>
-              <a:t>Типове данни в SQL Server</a:t>
-            </a:r>
-            <a:endParaRPr lang="bg-BG"/>
-          </a:p>
-        </p:txBody>
-      </p:sp>
-    </p:spTree>
-    <p:extLst>
-      <p:ext uri="{BB962C8B-B14F-4D97-AF65-F5344CB8AC3E}">
-        <p14:creationId xmlns:p14="http://schemas.microsoft.com/office/powerpoint/2010/main" val="265026508"/>
-      </p:ext>
-    </p:extLst>
-  </p:cSld>
-  <p:clrMapOvr>
-    <a:masterClrMapping/>
-  </p:clrMapOvr>
-  <mc:AlternateContent xmlns:mc="http://schemas.openxmlformats.org/markup-compatibility/2006" xmlns:p14="http://schemas.microsoft.com/office/powerpoint/2010/main">
-    <mc:Choice Requires="p14">
-      <p:transition spd="slow" p14:dur="2000" advClick="0" advTm="5000"/>
-    </mc:Choice>
-    <mc:Fallback xmlns="">
-      <p:transition spd="slow" advClick="0" advTm="5000"/>
-    </mc:Fallback>
-  </mc:AlternateContent>
 </p:sld>
 </file>
 
@@ -19851,6 +20526,120 @@
           <a:chExt cx="0" cy="0"/>
         </a:xfrm>
       </p:grpSpPr>
+      <p:pic>
+        <p:nvPicPr>
+          <p:cNvPr id="3082" name="Picture 10" descr="Ð ÐµÐ·ÑÐ»ÑÐ°Ñ Ñ Ð¸Ð·Ð¾Ð±ÑÐ°Ð¶ÐµÐ½Ð¸Ðµ Ð·Ð° sql server png">
+            <a:extLst>
+              <a:ext uri="{FF2B5EF4-FFF2-40B4-BE49-F238E27FC236}">
+                <a16:creationId xmlns:a16="http://schemas.microsoft.com/office/drawing/2014/main" id="{D87D64C2-9B46-41DD-97B7-0B78DBF62D17}"/>
+              </a:ext>
+            </a:extLst>
+          </p:cNvPr>
+          <p:cNvPicPr>
+            <a:picLocks noChangeAspect="1" noChangeArrowheads="1"/>
+          </p:cNvPicPr>
+          <p:nvPr/>
+        </p:nvPicPr>
+        <p:blipFill>
+          <a:blip r:embed="rId2" cstate="print">
+            <a:extLst>
+              <a:ext uri="{28A0092B-C50C-407E-A947-70E740481C1C}">
+                <a14:useLocalDpi xmlns:a14="http://schemas.microsoft.com/office/drawing/2010/main" val="0"/>
+              </a:ext>
+            </a:extLst>
+          </a:blip>
+          <a:srcRect/>
+          <a:stretch>
+            <a:fillRect/>
+          </a:stretch>
+        </p:blipFill>
+        <p:spPr bwMode="auto">
+          <a:xfrm>
+            <a:off x="4647372" y="1237422"/>
+            <a:ext cx="2897256" cy="2897256"/>
+          </a:xfrm>
+          <a:prstGeom prst="rect">
+            <a:avLst/>
+          </a:prstGeom>
+          <a:noFill/>
+          <a:extLst>
+            <a:ext uri="{909E8E84-426E-40DD-AFC4-6F175D3DCCD1}">
+              <a14:hiddenFill xmlns:a14="http://schemas.microsoft.com/office/drawing/2010/main">
+                <a:solidFill>
+                  <a:srgbClr val="FFFFFF"/>
+                </a:solidFill>
+              </a14:hiddenFill>
+            </a:ext>
+          </a:extLst>
+        </p:spPr>
+      </p:pic>
+      <p:sp>
+        <p:nvSpPr>
+          <p:cNvPr id="3" name="Заглавие 2">
+            <a:extLst>
+              <a:ext uri="{FF2B5EF4-FFF2-40B4-BE49-F238E27FC236}">
+                <a16:creationId xmlns:a16="http://schemas.microsoft.com/office/drawing/2014/main" id="{B98B7A04-1639-8689-56C2-5FDF05584EDF}"/>
+              </a:ext>
+            </a:extLst>
+          </p:cNvPr>
+          <p:cNvSpPr>
+            <a:spLocks noGrp="1"/>
+          </p:cNvSpPr>
+          <p:nvPr>
+            <p:ph type="title" sz="quarter" idx="10"/>
+          </p:nvPr>
+        </p:nvSpPr>
+        <p:spPr/>
+        <p:txBody>
+          <a:bodyPr/>
+          <a:lstStyle/>
+          <a:p>
+            <a:r>
+              <a:rPr lang="ru-RU"/>
+              <a:t>Типове данни в SQL Server</a:t>
+            </a:r>
+            <a:endParaRPr lang="bg-BG"/>
+          </a:p>
+        </p:txBody>
+      </p:sp>
+    </p:spTree>
+    <p:extLst>
+      <p:ext uri="{BB962C8B-B14F-4D97-AF65-F5344CB8AC3E}">
+        <p14:creationId xmlns:p14="http://schemas.microsoft.com/office/powerpoint/2010/main" val="265026508"/>
+      </p:ext>
+    </p:extLst>
+  </p:cSld>
+  <p:clrMapOvr>
+    <a:masterClrMapping/>
+  </p:clrMapOvr>
+  <mc:AlternateContent xmlns:mc="http://schemas.openxmlformats.org/markup-compatibility/2006" xmlns:p14="http://schemas.microsoft.com/office/powerpoint/2010/main">
+    <mc:Choice Requires="p14">
+      <p:transition spd="slow" p14:dur="2000" advClick="0" advTm="5000"/>
+    </mc:Choice>
+    <mc:Fallback xmlns="">
+      <p:transition spd="slow" advClick="0" advTm="5000"/>
+    </mc:Fallback>
+  </mc:AlternateContent>
+</p:sld>
+</file>
+
+<file path=ppt/slides/slide21.xml><?xml version="1.0" encoding="utf-8"?>
+<p:sld xmlns:a="http://schemas.openxmlformats.org/drawingml/2006/main" xmlns:r="http://schemas.openxmlformats.org/officeDocument/2006/relationships" xmlns:p="http://schemas.openxmlformats.org/presentationml/2006/main">
+  <p:cSld>
+    <p:spTree>
+      <p:nvGrpSpPr>
+        <p:cNvPr id="1" name=""/>
+        <p:cNvGrpSpPr/>
+        <p:nvPr/>
+      </p:nvGrpSpPr>
+      <p:grpSpPr>
+        <a:xfrm>
+          <a:off x="0" y="0"/>
+          <a:ext cx="0" cy="0"/>
+          <a:chOff x="0" y="0"/>
+          <a:chExt cx="0" cy="0"/>
+        </a:xfrm>
+      </p:grpSpPr>
       <p:sp>
         <p:nvSpPr>
           <p:cNvPr id="5" name="Text Placeholder 4"/>
@@ -20457,7 +21246,7 @@
             <a:fld id="{2BF067CD-8E6B-4360-9AA8-C5DF2A48A6D1}" type="slidenum">
               <a:rPr lang="en-US" noProof="0" smtClean="0"/>
               <a:pPr/>
-              <a:t>20</a:t>
+              <a:t>21</a:t>
             </a:fld>
             <a:endParaRPr lang="en-US" noProof="0" dirty="0"/>
           </a:p>
@@ -20839,7 +21628,7 @@
 </p:sld>
 </file>
 
-<file path=ppt/slides/slide21.xml><?xml version="1.0" encoding="utf-8"?>
+<file path=ppt/slides/slide22.xml><?xml version="1.0" encoding="utf-8"?>
 <p:sld xmlns:a="http://schemas.openxmlformats.org/drawingml/2006/main" xmlns:r="http://schemas.openxmlformats.org/officeDocument/2006/relationships" xmlns:p="http://schemas.openxmlformats.org/presentationml/2006/main">
   <p:cSld>
     <p:spTree>
@@ -21287,7 +22076,7 @@
             <a:fld id="{2BF067CD-8E6B-4360-9AA8-C5DF2A48A6D1}" type="slidenum">
               <a:rPr lang="en-US" noProof="0" smtClean="0"/>
               <a:pPr/>
-              <a:t>21</a:t>
+              <a:t>22</a:t>
             </a:fld>
             <a:endParaRPr lang="en-US" noProof="0" dirty="0"/>
           </a:p>
@@ -21314,7 +22103,7 @@
 </p:sld>
 </file>
 
-<file path=ppt/slides/slide22.xml><?xml version="1.0" encoding="utf-8"?>
+<file path=ppt/slides/slide23.xml><?xml version="1.0" encoding="utf-8"?>
 <p:sld xmlns:a="http://schemas.openxmlformats.org/drawingml/2006/main" xmlns:r="http://schemas.openxmlformats.org/officeDocument/2006/relationships" xmlns:p="http://schemas.openxmlformats.org/presentationml/2006/main">
   <p:cSld>
     <p:spTree>
@@ -21757,7 +22546,7 @@
             <a:fld id="{2BF067CD-8E6B-4360-9AA8-C5DF2A48A6D1}" type="slidenum">
               <a:rPr lang="en-US" noProof="0" smtClean="0"/>
               <a:pPr/>
-              <a:t>22</a:t>
+              <a:t>23</a:t>
             </a:fld>
             <a:endParaRPr lang="en-US" noProof="0" dirty="0"/>
           </a:p>
@@ -22188,7 +22977,7 @@
 </p:sld>
 </file>
 
-<file path=ppt/slides/slide23.xml><?xml version="1.0" encoding="utf-8"?>
+<file path=ppt/slides/slide24.xml><?xml version="1.0" encoding="utf-8"?>
 <p:sld xmlns:a="http://schemas.openxmlformats.org/drawingml/2006/main" xmlns:r="http://schemas.openxmlformats.org/officeDocument/2006/relationships" xmlns:p="http://schemas.openxmlformats.org/presentationml/2006/main">
   <p:cSld>
     <p:spTree>
@@ -22342,7 +23131,7 @@
             <a:fld id="{2BF067CD-8E6B-4360-9AA8-C5DF2A48A6D1}" type="slidenum">
               <a:rPr lang="en-US" noProof="0" smtClean="0"/>
               <a:pPr/>
-              <a:t>23</a:t>
+              <a:t>24</a:t>
             </a:fld>
             <a:endParaRPr lang="en-US" noProof="0" dirty="0"/>
           </a:p>
@@ -22369,7 +23158,7 @@
 </p:sld>
 </file>
 
-<file path=ppt/slides/slide24.xml><?xml version="1.0" encoding="utf-8"?>
+<file path=ppt/slides/slide25.xml><?xml version="1.0" encoding="utf-8"?>
 <p:sld xmlns:a="http://schemas.openxmlformats.org/drawingml/2006/main" xmlns:r="http://schemas.openxmlformats.org/officeDocument/2006/relationships" xmlns:p="http://schemas.openxmlformats.org/presentationml/2006/main">
   <p:cSld>
     <p:spTree>
@@ -22552,7 +23341,7 @@
             <a:fld id="{2BF067CD-8E6B-4360-9AA8-C5DF2A48A6D1}" type="slidenum">
               <a:rPr lang="en-US" noProof="0" smtClean="0"/>
               <a:pPr/>
-              <a:t>24</a:t>
+              <a:t>25</a:t>
             </a:fld>
             <a:endParaRPr lang="en-US" noProof="0" dirty="0"/>
           </a:p>
@@ -22658,7 +23447,7 @@
 </p:sld>
 </file>
 
-<file path=ppt/slides/slide25.xml><?xml version="1.0" encoding="utf-8"?>
+<file path=ppt/slides/slide26.xml><?xml version="1.0" encoding="utf-8"?>
 <p:sld xmlns:a="http://schemas.openxmlformats.org/drawingml/2006/main" xmlns:r="http://schemas.openxmlformats.org/officeDocument/2006/relationships" xmlns:p="http://schemas.openxmlformats.org/presentationml/2006/main">
   <p:cSld>
     <p:spTree>
@@ -23271,7 +24060,7 @@
             <a:fld id="{2BF067CD-8E6B-4360-9AA8-C5DF2A48A6D1}" type="slidenum">
               <a:rPr lang="en-US" noProof="0" smtClean="0"/>
               <a:pPr/>
-              <a:t>25</a:t>
+              <a:t>26</a:t>
             </a:fld>
             <a:endParaRPr lang="en-US" noProof="0" dirty="0"/>
           </a:p>
@@ -23653,7 +24442,7 @@
 </p:sld>
 </file>
 
-<file path=ppt/slides/slide26.xml><?xml version="1.0" encoding="utf-8"?>
+<file path=ppt/slides/slide27.xml><?xml version="1.0" encoding="utf-8"?>
 <p:sld xmlns:a="http://schemas.openxmlformats.org/drawingml/2006/main" xmlns:r="http://schemas.openxmlformats.org/officeDocument/2006/relationships" xmlns:p="http://schemas.openxmlformats.org/presentationml/2006/main">
   <p:cSld>
     <p:spTree>
@@ -23843,7 +24632,7 @@
 </p:sld>
 </file>
 
-<file path=ppt/slides/slide27.xml><?xml version="1.0" encoding="utf-8"?>
+<file path=ppt/slides/slide28.xml><?xml version="1.0" encoding="utf-8"?>
 <p:sld xmlns:a="http://schemas.openxmlformats.org/drawingml/2006/main" xmlns:r="http://schemas.openxmlformats.org/officeDocument/2006/relationships" xmlns:p="http://schemas.openxmlformats.org/presentationml/2006/main">
   <p:cSld>
     <p:spTree>
@@ -24199,7 +24988,7 @@
             <a:fld id="{2BF067CD-8E6B-4360-9AA8-C5DF2A48A6D1}" type="slidenum">
               <a:rPr lang="en-US" noProof="0" smtClean="0"/>
               <a:pPr/>
-              <a:t>27</a:t>
+              <a:t>28</a:t>
             </a:fld>
             <a:endParaRPr lang="en-US" noProof="0" dirty="0"/>
           </a:p>
@@ -27751,8 +28540,8 @@
           </p:nvSpPr>
           <p:spPr>
             <a:xfrm>
-              <a:off x="4873079" y="2394049"/>
-              <a:ext cx="2339505" cy="444352"/>
+              <a:off x="7195594" y="2433115"/>
+              <a:ext cx="1175453" cy="444352"/>
             </a:xfrm>
             <a:prstGeom prst="rect">
               <a:avLst/>
@@ -27780,7 +28569,7 @@
                   <a:latin typeface="Consolas"/>
                   <a:cs typeface="Consolas"/>
                 </a:rPr>
-                <a:t>СУБД сървър</a:t>
+                <a:t>Сървър</a:t>
               </a:r>
               <a:endParaRPr sz="2800" dirty="0">
                 <a:latin typeface="Consolas"/>
@@ -32517,12 +33306,11 @@
                 </a:tabLst>
               </a:pPr>
               <a:r>
-                <a:rPr lang="bg-BG" sz="3600" b="1" spc="-7" baseline="1157" dirty="0">
+                <a:rPr lang="bg-BG" sz="2400" b="1" dirty="0">
                   <a:solidFill>
-                    <a:schemeClr val="bg1"/>
+                    <a:srgbClr val="224464"/>
                   </a:solidFill>
                   <a:latin typeface="Consolas"/>
-                  <a:cs typeface="Consolas"/>
                 </a:rPr>
                 <a:t>Табл.</a:t>
               </a:r>

</xml_diff>

<commit_message>
Updates on SQL CRUD slides
</commit_message>
<xml_diff>
--- a/Courses/Software-Sciences/Module-3-Databases-New/02-DBMS/02-DBMS.pptx
+++ b/Courses/Software-Sciences/Module-3-Databases-New/02-DBMS/02-DBMS.pptx
@@ -5,10 +5,10 @@
     <p:sldMasterId id="2147483675" r:id="rId1"/>
   </p:sldMasterIdLst>
   <p:notesMasterIdLst>
-    <p:notesMasterId r:id="rId30"/>
+    <p:notesMasterId r:id="rId31"/>
   </p:notesMasterIdLst>
   <p:handoutMasterIdLst>
-    <p:handoutMasterId r:id="rId31"/>
+    <p:handoutMasterId r:id="rId32"/>
   </p:handoutMasterIdLst>
   <p:sldIdLst>
     <p:sldId id="627" r:id="rId2"/>
@@ -21,24 +21,25 @@
     <p:sldId id="1228" r:id="rId9"/>
     <p:sldId id="1197" r:id="rId10"/>
     <p:sldId id="1240" r:id="rId11"/>
-    <p:sldId id="1187" r:id="rId12"/>
-    <p:sldId id="1188" r:id="rId13"/>
-    <p:sldId id="1200" r:id="rId14"/>
-    <p:sldId id="1189" r:id="rId15"/>
-    <p:sldId id="1190" r:id="rId16"/>
-    <p:sldId id="1239" r:id="rId17"/>
-    <p:sldId id="1236" r:id="rId18"/>
-    <p:sldId id="1237" r:id="rId19"/>
-    <p:sldId id="1238" r:id="rId20"/>
-    <p:sldId id="1229" r:id="rId21"/>
-    <p:sldId id="1230" r:id="rId22"/>
-    <p:sldId id="1231" r:id="rId23"/>
-    <p:sldId id="1232" r:id="rId24"/>
-    <p:sldId id="1233" r:id="rId25"/>
-    <p:sldId id="1234" r:id="rId26"/>
-    <p:sldId id="349" r:id="rId27"/>
-    <p:sldId id="504" r:id="rId28"/>
-    <p:sldId id="505" r:id="rId29"/>
+    <p:sldId id="1241" r:id="rId12"/>
+    <p:sldId id="1187" r:id="rId13"/>
+    <p:sldId id="1188" r:id="rId14"/>
+    <p:sldId id="1200" r:id="rId15"/>
+    <p:sldId id="1189" r:id="rId16"/>
+    <p:sldId id="1190" r:id="rId17"/>
+    <p:sldId id="1239" r:id="rId18"/>
+    <p:sldId id="1236" r:id="rId19"/>
+    <p:sldId id="1237" r:id="rId20"/>
+    <p:sldId id="1238" r:id="rId21"/>
+    <p:sldId id="1229" r:id="rId22"/>
+    <p:sldId id="1230" r:id="rId23"/>
+    <p:sldId id="1231" r:id="rId24"/>
+    <p:sldId id="1232" r:id="rId25"/>
+    <p:sldId id="1233" r:id="rId26"/>
+    <p:sldId id="1234" r:id="rId27"/>
+    <p:sldId id="349" r:id="rId28"/>
+    <p:sldId id="504" r:id="rId29"/>
+    <p:sldId id="505" r:id="rId30"/>
   </p:sldIdLst>
   <p:sldSz cx="12192000" cy="6858000"/>
   <p:notesSz cx="6858000" cy="9144000"/>
@@ -156,6 +157,7 @@
             <p14:sldId id="1228"/>
             <p14:sldId id="1197"/>
             <p14:sldId id="1240"/>
+            <p14:sldId id="1241"/>
           </p14:sldIdLst>
         </p14:section>
         <p14:section name="Релационни БД" id="{3745F6D7-2AC2-4357-A966-2B713D2F393F}">
@@ -502,7 +504,7 @@
           <a:p>
             <a:fld id="{4E087215-0C8F-4762-A664-737A353EC9A4}" type="datetimeFigureOut">
               <a:rPr lang="bg-BG" smtClean="0"/>
-              <a:t>18.2.2024 г.</a:t>
+              <a:t>23.2.2024 г.</a:t>
             </a:fld>
             <a:endParaRPr lang="bg-BG"/>
           </a:p>
@@ -698,7 +700,7 @@
           <a:p>
             <a:fld id="{72D84649-876A-46C9-8472-14CB09C070D8}" type="datetimeFigureOut">
               <a:rPr lang="en-US" smtClean="0"/>
-              <a:t>2/18/2024</a:t>
+              <a:t>2/23/2024</a:t>
             </a:fld>
             <a:endParaRPr lang="en-US"/>
           </a:p>
@@ -1174,6 +1176,146 @@
           <a:bodyPr/>
           <a:lstStyle/>
           <a:p>
+            <a:endParaRPr lang="en-US" dirty="0"/>
+          </a:p>
+        </p:txBody>
+      </p:sp>
+      <p:sp>
+        <p:nvSpPr>
+          <p:cNvPr id="4" name="Slide Number Placeholder 3"/>
+          <p:cNvSpPr>
+            <a:spLocks noGrp="1"/>
+          </p:cNvSpPr>
+          <p:nvPr>
+            <p:ph type="sldNum" sz="quarter" idx="5"/>
+          </p:nvPr>
+        </p:nvSpPr>
+        <p:spPr/>
+        <p:txBody>
+          <a:bodyPr/>
+          <a:lstStyle/>
+          <a:p>
+            <a:fld id="{2BF067CD-8E6B-4360-9AA8-C5DF2A48A6D1}" type="slidenum">
+              <a:rPr lang="en-US" smtClean="0"/>
+              <a:pPr/>
+              <a:t>20</a:t>
+            </a:fld>
+            <a:endParaRPr lang="en-US" dirty="0"/>
+          </a:p>
+        </p:txBody>
+      </p:sp>
+      <p:sp>
+        <p:nvSpPr>
+          <p:cNvPr id="6" name="Footer Placeholder 7">
+            <a:extLst>
+              <a:ext uri="{FF2B5EF4-FFF2-40B4-BE49-F238E27FC236}">
+                <a16:creationId xmlns:a16="http://schemas.microsoft.com/office/drawing/2014/main" id="{5FD6BE1D-71A3-2260-39D0-05655C266869}"/>
+              </a:ext>
+            </a:extLst>
+          </p:cNvPr>
+          <p:cNvSpPr>
+            <a:spLocks noGrp="1"/>
+          </p:cNvSpPr>
+          <p:nvPr>
+            <p:ph type="ftr" sz="quarter" idx="4"/>
+          </p:nvPr>
+        </p:nvSpPr>
+        <p:spPr>
+          <a:xfrm>
+            <a:off x="-1" y="8892000"/>
+            <a:ext cx="6488999" cy="252000"/>
+          </a:xfrm>
+          <a:prstGeom prst="rect">
+            <a:avLst/>
+          </a:prstGeom>
+        </p:spPr>
+        <p:txBody>
+          <a:bodyPr vert="horz" lIns="91440" tIns="45720" rIns="91440" bIns="45720" rtlCol="0" anchor="b"/>
+          <a:lstStyle>
+            <a:lvl1pPr algn="l">
+              <a:defRPr sz="1100"/>
+            </a:lvl1pPr>
+          </a:lstStyle>
+          <a:p>
+            <a:r>
+              <a:rPr lang="bg-BG" sz="1100" dirty="0"/>
+              <a:t>Работна група </a:t>
+            </a:r>
+            <a:r>
+              <a:rPr lang="bg-BG" dirty="0"/>
+              <a:t>"Образование по програмиране и ИТ"</a:t>
+            </a:r>
+            <a:r>
+              <a:rPr lang="bg-BG" sz="1100" dirty="0"/>
+              <a:t>, с подкрепата на </a:t>
+            </a:r>
+            <a:r>
+              <a:rPr lang="en-US" sz="1100" dirty="0">
+                <a:hlinkClick r:id="rId3"/>
+              </a:rPr>
+              <a:t>SoftUni</a:t>
+            </a:r>
+            <a:endParaRPr lang="en-US" sz="1100" dirty="0"/>
+          </a:p>
+        </p:txBody>
+      </p:sp>
+    </p:spTree>
+    <p:extLst>
+      <p:ext uri="{BB962C8B-B14F-4D97-AF65-F5344CB8AC3E}">
+        <p14:creationId xmlns:p14="http://schemas.microsoft.com/office/powerpoint/2010/main" val="4004706591"/>
+      </p:ext>
+    </p:extLst>
+  </p:cSld>
+  <p:clrMapOvr>
+    <a:masterClrMapping/>
+  </p:clrMapOvr>
+</p:notes>
+</file>
+
+<file path=ppt/notesSlides/notesSlide11.xml><?xml version="1.0" encoding="utf-8"?>
+<p:notes xmlns:a="http://schemas.openxmlformats.org/drawingml/2006/main" xmlns:r="http://schemas.openxmlformats.org/officeDocument/2006/relationships" xmlns:p="http://schemas.openxmlformats.org/presentationml/2006/main">
+  <p:cSld>
+    <p:spTree>
+      <p:nvGrpSpPr>
+        <p:cNvPr id="1" name=""/>
+        <p:cNvGrpSpPr/>
+        <p:nvPr/>
+      </p:nvGrpSpPr>
+      <p:grpSpPr>
+        <a:xfrm>
+          <a:off x="0" y="0"/>
+          <a:ext cx="0" cy="0"/>
+          <a:chOff x="0" y="0"/>
+          <a:chExt cx="0" cy="0"/>
+        </a:xfrm>
+      </p:grpSpPr>
+      <p:sp>
+        <p:nvSpPr>
+          <p:cNvPr id="2" name="Slide Image Placeholder 1"/>
+          <p:cNvSpPr>
+            <a:spLocks noGrp="1" noRot="1" noChangeAspect="1"/>
+          </p:cNvSpPr>
+          <p:nvPr>
+            <p:ph type="sldImg"/>
+          </p:nvPr>
+        </p:nvSpPr>
+        <p:spPr/>
+      </p:sp>
+      <p:sp>
+        <p:nvSpPr>
+          <p:cNvPr id="3" name="Notes Placeholder 2"/>
+          <p:cNvSpPr>
+            <a:spLocks noGrp="1"/>
+          </p:cNvSpPr>
+          <p:nvPr>
+            <p:ph type="body" idx="1"/>
+          </p:nvPr>
+        </p:nvSpPr>
+        <p:spPr/>
+        <p:txBody>
+          <a:bodyPr/>
+          <a:lstStyle/>
+          <a:p>
             <a:r>
               <a:rPr lang="en-US" sz="1200" kern="1200" dirty="0">
                 <a:solidFill>
@@ -1256,7 +1398,7 @@
             <a:fld id="{2BF067CD-8E6B-4360-9AA8-C5DF2A48A6D1}" type="slidenum">
               <a:rPr lang="en-US" smtClean="0"/>
               <a:pPr/>
-              <a:t>21</a:t>
+              <a:t>22</a:t>
             </a:fld>
             <a:endParaRPr lang="en-US" dirty="0"/>
           </a:p>
@@ -1330,7 +1472,7 @@
 </p:notes>
 </file>
 
-<file path=ppt/notesSlides/notesSlide11.xml><?xml version="1.0" encoding="utf-8"?>
+<file path=ppt/notesSlides/notesSlide12.xml><?xml version="1.0" encoding="utf-8"?>
 <p:notes xmlns:a="http://schemas.openxmlformats.org/drawingml/2006/main" xmlns:r="http://schemas.openxmlformats.org/officeDocument/2006/relationships" xmlns:p="http://schemas.openxmlformats.org/presentationml/2006/main">
   <p:cSld>
     <p:spTree>
@@ -1396,7 +1538,7 @@
             <a:fld id="{2BF067CD-8E6B-4360-9AA8-C5DF2A48A6D1}" type="slidenum">
               <a:rPr lang="en-US" smtClean="0"/>
               <a:pPr/>
-              <a:t>23</a:t>
+              <a:t>24</a:t>
             </a:fld>
             <a:endParaRPr lang="en-US" dirty="0"/>
           </a:p>
@@ -1470,7 +1612,7 @@
 </p:notes>
 </file>
 
-<file path=ppt/notesSlides/notesSlide12.xml><?xml version="1.0" encoding="utf-8"?>
+<file path=ppt/notesSlides/notesSlide13.xml><?xml version="1.0" encoding="utf-8"?>
 <p:notes xmlns:a="http://schemas.openxmlformats.org/drawingml/2006/main" xmlns:r="http://schemas.openxmlformats.org/officeDocument/2006/relationships" xmlns:p="http://schemas.openxmlformats.org/presentationml/2006/main">
   <p:cSld>
     <p:spTree>
@@ -1535,7 +1677,7 @@
           <a:p>
             <a:fld id="{2BF067CD-8E6B-4360-9AA8-C5DF2A48A6D1}" type="slidenum">
               <a:rPr lang="en-US" smtClean="0"/>
-              <a:t>25</a:t>
+              <a:t>26</a:t>
             </a:fld>
             <a:endParaRPr lang="en-US" dirty="0"/>
           </a:p>
@@ -1591,7 +1733,7 @@
 </p:notes>
 </file>
 
-<file path=ppt/notesSlides/notesSlide13.xml><?xml version="1.0" encoding="utf-8"?>
+<file path=ppt/notesSlides/notesSlide14.xml><?xml version="1.0" encoding="utf-8"?>
 <p:notes xmlns:a="http://schemas.openxmlformats.org/drawingml/2006/main" xmlns:r="http://schemas.openxmlformats.org/officeDocument/2006/relationships" xmlns:p="http://schemas.openxmlformats.org/presentationml/2006/main">
   <p:cSld>
     <p:spTree>
@@ -1763,7 +1905,7 @@
             <a:fld id="{3EBA5BD7-F043-4D1B-AA17-CD412FC534DE}" type="slidenum">
               <a:rPr lang="en-US" smtClean="0"/>
               <a:pPr/>
-              <a:t>26</a:t>
+              <a:t>27</a:t>
             </a:fld>
             <a:endParaRPr lang="en-US" dirty="0"/>
           </a:p>
@@ -1837,7 +1979,7 @@
 </p:notes>
 </file>
 
-<file path=ppt/notesSlides/notesSlide14.xml><?xml version="1.0" encoding="utf-8"?>
+<file path=ppt/notesSlides/notesSlide15.xml><?xml version="1.0" encoding="utf-8"?>
 <p:notes xmlns:a="http://schemas.openxmlformats.org/drawingml/2006/main" xmlns:r="http://schemas.openxmlformats.org/officeDocument/2006/relationships" xmlns:p="http://schemas.openxmlformats.org/presentationml/2006/main">
   <p:cSld>
     <p:spTree>
@@ -2009,7 +2151,7 @@
             <a:fld id="{3EBA5BD7-F043-4D1B-AA17-CD412FC534DE}" type="slidenum">
               <a:rPr lang="en-US" smtClean="0"/>
               <a:pPr/>
-              <a:t>27</a:t>
+              <a:t>28</a:t>
             </a:fld>
             <a:endParaRPr lang="en-US" dirty="0"/>
           </a:p>
@@ -2083,7 +2225,7 @@
 </p:notes>
 </file>
 
-<file path=ppt/notesSlides/notesSlide15.xml><?xml version="1.0" encoding="utf-8"?>
+<file path=ppt/notesSlides/notesSlide16.xml><?xml version="1.0" encoding="utf-8"?>
 <p:notes xmlns:a="http://schemas.openxmlformats.org/drawingml/2006/main" xmlns:r="http://schemas.openxmlformats.org/officeDocument/2006/relationships" xmlns:p="http://schemas.openxmlformats.org/presentationml/2006/main">
   <p:cSld>
     <p:spTree>
@@ -2255,7 +2397,7 @@
             <a:fld id="{3EBA5BD7-F043-4D1B-AA17-CD412FC534DE}" type="slidenum">
               <a:rPr lang="en-US" smtClean="0"/>
               <a:pPr/>
-              <a:t>28</a:t>
+              <a:t>29</a:t>
             </a:fld>
             <a:endParaRPr lang="en-US" dirty="0"/>
           </a:p>
@@ -3146,128 +3288,21 @@
       </p:sp>
       <p:sp>
         <p:nvSpPr>
-          <p:cNvPr id="7" name="Slide Number Placeholder 5">
-            <a:extLst>
-              <a:ext uri="{FF2B5EF4-FFF2-40B4-BE49-F238E27FC236}">
-                <a16:creationId xmlns:a16="http://schemas.microsoft.com/office/drawing/2014/main" id="{BD88B0D8-949C-482D-990A-2DAB14AD4AD1}"/>
-              </a:ext>
-            </a:extLst>
-          </p:cNvPr>
-          <p:cNvSpPr txBox="1">
-            <a:spLocks/>
+          <p:cNvPr id="4" name="Slide Number Placeholder 3"/>
+          <p:cNvSpPr>
+            <a:spLocks noGrp="1"/>
           </p:cNvSpPr>
-          <p:nvPr/>
+          <p:nvPr>
+            <p:ph type="sldNum" sz="quarter" idx="5"/>
+          </p:nvPr>
         </p:nvSpPr>
-        <p:spPr>
-          <a:xfrm>
-            <a:off x="6488999" y="8847000"/>
-            <a:ext cx="367414" cy="297000"/>
-          </a:xfrm>
-          <a:prstGeom prst="rect">
-            <a:avLst/>
-          </a:prstGeom>
-        </p:spPr>
+        <p:spPr/>
         <p:txBody>
-          <a:bodyPr vert="horz" lIns="91440" tIns="45720" rIns="91440" bIns="45720" rtlCol="0" anchor="b"/>
-          <a:lstStyle>
-            <a:defPPr>
-              <a:defRPr lang="en-US"/>
-            </a:defPPr>
-            <a:lvl1pPr marL="0" algn="r" defTabSz="914400" rtl="0" eaLnBrk="1" latinLnBrk="0" hangingPunct="1">
-              <a:defRPr sz="1200" kern="1200">
-                <a:solidFill>
-                  <a:schemeClr val="tx1"/>
-                </a:solidFill>
-                <a:latin typeface="+mn-lt"/>
-                <a:ea typeface="+mn-ea"/>
-                <a:cs typeface="+mn-cs"/>
-              </a:defRPr>
-            </a:lvl1pPr>
-            <a:lvl2pPr marL="457200" algn="l" defTabSz="914400" rtl="0" eaLnBrk="1" latinLnBrk="0" hangingPunct="1">
-              <a:defRPr sz="1800" kern="1200">
-                <a:solidFill>
-                  <a:schemeClr val="tx1"/>
-                </a:solidFill>
-                <a:latin typeface="+mn-lt"/>
-                <a:ea typeface="+mn-ea"/>
-                <a:cs typeface="+mn-cs"/>
-              </a:defRPr>
-            </a:lvl2pPr>
-            <a:lvl3pPr marL="914400" algn="l" defTabSz="914400" rtl="0" eaLnBrk="1" latinLnBrk="0" hangingPunct="1">
-              <a:defRPr sz="1800" kern="1200">
-                <a:solidFill>
-                  <a:schemeClr val="tx1"/>
-                </a:solidFill>
-                <a:latin typeface="+mn-lt"/>
-                <a:ea typeface="+mn-ea"/>
-                <a:cs typeface="+mn-cs"/>
-              </a:defRPr>
-            </a:lvl3pPr>
-            <a:lvl4pPr marL="1371600" algn="l" defTabSz="914400" rtl="0" eaLnBrk="1" latinLnBrk="0" hangingPunct="1">
-              <a:defRPr sz="1800" kern="1200">
-                <a:solidFill>
-                  <a:schemeClr val="tx1"/>
-                </a:solidFill>
-                <a:latin typeface="+mn-lt"/>
-                <a:ea typeface="+mn-ea"/>
-                <a:cs typeface="+mn-cs"/>
-              </a:defRPr>
-            </a:lvl4pPr>
-            <a:lvl5pPr marL="1828800" algn="l" defTabSz="914400" rtl="0" eaLnBrk="1" latinLnBrk="0" hangingPunct="1">
-              <a:defRPr sz="1800" kern="1200">
-                <a:solidFill>
-                  <a:schemeClr val="tx1"/>
-                </a:solidFill>
-                <a:latin typeface="+mn-lt"/>
-                <a:ea typeface="+mn-ea"/>
-                <a:cs typeface="+mn-cs"/>
-              </a:defRPr>
-            </a:lvl5pPr>
-            <a:lvl6pPr marL="2286000" algn="l" defTabSz="914400" rtl="0" eaLnBrk="1" latinLnBrk="0" hangingPunct="1">
-              <a:defRPr sz="1800" kern="1200">
-                <a:solidFill>
-                  <a:schemeClr val="tx1"/>
-                </a:solidFill>
-                <a:latin typeface="+mn-lt"/>
-                <a:ea typeface="+mn-ea"/>
-                <a:cs typeface="+mn-cs"/>
-              </a:defRPr>
-            </a:lvl6pPr>
-            <a:lvl7pPr marL="2743200" algn="l" defTabSz="914400" rtl="0" eaLnBrk="1" latinLnBrk="0" hangingPunct="1">
-              <a:defRPr sz="1800" kern="1200">
-                <a:solidFill>
-                  <a:schemeClr val="tx1"/>
-                </a:solidFill>
-                <a:latin typeface="+mn-lt"/>
-                <a:ea typeface="+mn-ea"/>
-                <a:cs typeface="+mn-cs"/>
-              </a:defRPr>
-            </a:lvl7pPr>
-            <a:lvl8pPr marL="3200400" algn="l" defTabSz="914400" rtl="0" eaLnBrk="1" latinLnBrk="0" hangingPunct="1">
-              <a:defRPr sz="1800" kern="1200">
-                <a:solidFill>
-                  <a:schemeClr val="tx1"/>
-                </a:solidFill>
-                <a:latin typeface="+mn-lt"/>
-                <a:ea typeface="+mn-ea"/>
-                <a:cs typeface="+mn-cs"/>
-              </a:defRPr>
-            </a:lvl8pPr>
-            <a:lvl9pPr marL="3657600" algn="l" defTabSz="914400" rtl="0" eaLnBrk="1" latinLnBrk="0" hangingPunct="1">
-              <a:defRPr sz="1800" kern="1200">
-                <a:solidFill>
-                  <a:schemeClr val="tx1"/>
-                </a:solidFill>
-                <a:latin typeface="+mn-lt"/>
-                <a:ea typeface="+mn-ea"/>
-                <a:cs typeface="+mn-cs"/>
-              </a:defRPr>
-            </a:lvl9pPr>
-          </a:lstStyle>
+          <a:bodyPr/>
+          <a:lstStyle/>
           <a:p>
-            <a:fld id="{3EBA5BD7-F043-4D1B-AA17-CD412FC534DE}" type="slidenum">
+            <a:fld id="{2BF067CD-8E6B-4360-9AA8-C5DF2A48A6D1}" type="slidenum">
               <a:rPr lang="en-US" smtClean="0"/>
-              <a:pPr/>
               <a:t>11</a:t>
             </a:fld>
             <a:endParaRPr lang="en-US" dirty="0"/>
@@ -3276,13 +3311,7 @@
       </p:sp>
       <p:sp>
         <p:nvSpPr>
-          <p:cNvPr id="5" name="Footer Placeholder 7">
-            <a:extLst>
-              <a:ext uri="{FF2B5EF4-FFF2-40B4-BE49-F238E27FC236}">
-                <a16:creationId xmlns:a16="http://schemas.microsoft.com/office/drawing/2014/main" id="{0A4D3A2C-3BFC-6602-1212-E998CC7D4739}"/>
-              </a:ext>
-            </a:extLst>
-          </p:cNvPr>
+          <p:cNvPr id="5" name="Footer Placeholder 4"/>
           <p:cNvSpPr>
             <a:spLocks noGrp="1"/>
           </p:cNvSpPr>
@@ -3290,37 +3319,25 @@
             <p:ph type="ftr" sz="quarter" idx="4"/>
           </p:nvPr>
         </p:nvSpPr>
-        <p:spPr>
-          <a:xfrm>
-            <a:off x="-1" y="8892000"/>
-            <a:ext cx="6488999" cy="252000"/>
-          </a:xfrm>
-          <a:prstGeom prst="rect">
-            <a:avLst/>
-          </a:prstGeom>
-        </p:spPr>
+        <p:spPr/>
         <p:txBody>
-          <a:bodyPr vert="horz" lIns="91440" tIns="45720" rIns="91440" bIns="45720" rtlCol="0" anchor="b"/>
-          <a:lstStyle>
-            <a:lvl1pPr algn="l">
-              <a:defRPr sz="1100"/>
-            </a:lvl1pPr>
-          </a:lstStyle>
+          <a:bodyPr/>
+          <a:lstStyle/>
           <a:p>
             <a:r>
-              <a:rPr lang="bg-BG" sz="1100" dirty="0"/>
+              <a:rPr lang="bg-BG" sz="1100"/>
               <a:t>Работна група </a:t>
             </a:r>
             <a:r>
-              <a:rPr lang="bg-BG" dirty="0"/>
+              <a:rPr lang="bg-BG"/>
               <a:t>"Образование по програмиране и ИТ"</a:t>
             </a:r>
             <a:r>
-              <a:rPr lang="bg-BG" sz="1100" dirty="0"/>
+              <a:rPr lang="bg-BG" sz="1100"/>
               <a:t>, с подкрепата на </a:t>
             </a:r>
             <a:r>
-              <a:rPr lang="en-US" sz="1100" dirty="0">
+              <a:rPr lang="en-US" sz="1100">
                 <a:hlinkClick r:id="rId3"/>
               </a:rPr>
               <a:t>SoftUni</a:t>
@@ -3332,7 +3349,7 @@
     </p:spTree>
     <p:extLst>
       <p:ext uri="{BB962C8B-B14F-4D97-AF65-F5344CB8AC3E}">
-        <p14:creationId xmlns:p14="http://schemas.microsoft.com/office/powerpoint/2010/main" val="1590414964"/>
+        <p14:creationId xmlns:p14="http://schemas.microsoft.com/office/powerpoint/2010/main" val="1500821967"/>
       </p:ext>
     </p:extLst>
   </p:cSld>
@@ -3343,154 +3360,6 @@
 </file>
 
 <file path=ppt/notesSlides/notesSlide7.xml><?xml version="1.0" encoding="utf-8"?>
-<p:notes xmlns:a="http://schemas.openxmlformats.org/drawingml/2006/main" xmlns:r="http://schemas.openxmlformats.org/officeDocument/2006/relationships" xmlns:p="http://schemas.openxmlformats.org/presentationml/2006/main">
-  <p:cSld>
-    <p:spTree>
-      <p:nvGrpSpPr>
-        <p:cNvPr id="1" name=""/>
-        <p:cNvGrpSpPr/>
-        <p:nvPr/>
-      </p:nvGrpSpPr>
-      <p:grpSpPr>
-        <a:xfrm>
-          <a:off x="0" y="0"/>
-          <a:ext cx="0" cy="0"/>
-          <a:chOff x="0" y="0"/>
-          <a:chExt cx="0" cy="0"/>
-        </a:xfrm>
-      </p:grpSpPr>
-      <p:sp>
-        <p:nvSpPr>
-          <p:cNvPr id="2" name="Slide Image Placeholder 1"/>
-          <p:cNvSpPr>
-            <a:spLocks noGrp="1" noRot="1" noChangeAspect="1"/>
-          </p:cNvSpPr>
-          <p:nvPr>
-            <p:ph type="sldImg"/>
-          </p:nvPr>
-        </p:nvSpPr>
-        <p:spPr/>
-      </p:sp>
-      <p:sp>
-        <p:nvSpPr>
-          <p:cNvPr id="3" name="Notes Placeholder 2"/>
-          <p:cNvSpPr>
-            <a:spLocks noGrp="1"/>
-          </p:cNvSpPr>
-          <p:nvPr>
-            <p:ph type="body" idx="1"/>
-          </p:nvPr>
-        </p:nvSpPr>
-        <p:spPr/>
-        <p:txBody>
-          <a:bodyPr/>
-          <a:lstStyle/>
-          <a:p>
-            <a:r>
-              <a:rPr lang="en-US" dirty="0"/>
-              <a:t>The table is the</a:t>
-            </a:r>
-            <a:r>
-              <a:rPr lang="en-US" baseline="0" dirty="0"/>
-              <a:t> main unit of data storage. It has rows, columns and cells. Cells contain stored data. Each column has a data type. Types can be VARCHAR(String), INT, DATE etc.</a:t>
-            </a:r>
-            <a:endParaRPr lang="en-US" dirty="0"/>
-          </a:p>
-        </p:txBody>
-      </p:sp>
-      <p:sp>
-        <p:nvSpPr>
-          <p:cNvPr id="5" name="Slide Number Placeholder 4"/>
-          <p:cNvSpPr>
-            <a:spLocks noGrp="1"/>
-          </p:cNvSpPr>
-          <p:nvPr>
-            <p:ph type="sldNum" sz="quarter" idx="11"/>
-          </p:nvPr>
-        </p:nvSpPr>
-        <p:spPr/>
-        <p:txBody>
-          <a:bodyPr/>
-          <a:lstStyle/>
-          <a:p>
-            <a:fld id="{3EBA5BD7-F043-4D1B-AA17-CD412FC534DE}" type="slidenum">
-              <a:rPr lang="en-US" smtClean="0"/>
-              <a:pPr/>
-              <a:t>14</a:t>
-            </a:fld>
-            <a:endParaRPr lang="en-US" dirty="0"/>
-          </a:p>
-        </p:txBody>
-      </p:sp>
-      <p:sp>
-        <p:nvSpPr>
-          <p:cNvPr id="4" name="Footer Placeholder 7">
-            <a:extLst>
-              <a:ext uri="{FF2B5EF4-FFF2-40B4-BE49-F238E27FC236}">
-                <a16:creationId xmlns:a16="http://schemas.microsoft.com/office/drawing/2014/main" id="{3C6E4365-C2C6-EADC-E2EB-76A5CDFDE20C}"/>
-              </a:ext>
-            </a:extLst>
-          </p:cNvPr>
-          <p:cNvSpPr>
-            <a:spLocks noGrp="1"/>
-          </p:cNvSpPr>
-          <p:nvPr>
-            <p:ph type="ftr" sz="quarter" idx="4"/>
-          </p:nvPr>
-        </p:nvSpPr>
-        <p:spPr>
-          <a:xfrm>
-            <a:off x="-1" y="8892000"/>
-            <a:ext cx="6488999" cy="252000"/>
-          </a:xfrm>
-          <a:prstGeom prst="rect">
-            <a:avLst/>
-          </a:prstGeom>
-        </p:spPr>
-        <p:txBody>
-          <a:bodyPr vert="horz" lIns="91440" tIns="45720" rIns="91440" bIns="45720" rtlCol="0" anchor="b"/>
-          <a:lstStyle>
-            <a:lvl1pPr algn="l">
-              <a:defRPr sz="1100"/>
-            </a:lvl1pPr>
-          </a:lstStyle>
-          <a:p>
-            <a:r>
-              <a:rPr lang="bg-BG" sz="1100" dirty="0"/>
-              <a:t>Работна група </a:t>
-            </a:r>
-            <a:r>
-              <a:rPr lang="bg-BG" dirty="0"/>
-              <a:t>"Образование по програмиране и ИТ"</a:t>
-            </a:r>
-            <a:r>
-              <a:rPr lang="bg-BG" sz="1100" dirty="0"/>
-              <a:t>, с подкрепата на </a:t>
-            </a:r>
-            <a:r>
-              <a:rPr lang="en-US" sz="1100" dirty="0">
-                <a:hlinkClick r:id="rId3"/>
-              </a:rPr>
-              <a:t>SoftUni</a:t>
-            </a:r>
-            <a:endParaRPr lang="en-US" sz="1100" dirty="0"/>
-          </a:p>
-        </p:txBody>
-      </p:sp>
-    </p:spTree>
-    <p:extLst>
-      <p:ext uri="{BB962C8B-B14F-4D97-AF65-F5344CB8AC3E}">
-        <p14:creationId xmlns:p14="http://schemas.microsoft.com/office/powerpoint/2010/main" val="2324145607"/>
-      </p:ext>
-    </p:extLst>
-  </p:cSld>
-  <p:clrMapOvr>
-    <a:masterClrMapping/>
-  </p:clrMapOvr>
-</p:notes>
-</file>
-
-<file path=ppt/notesSlides/notesSlide8.xml><?xml version="1.0" encoding="utf-8"?>
 <p:notes xmlns:a="http://schemas.openxmlformats.org/drawingml/2006/main" xmlns:r="http://schemas.openxmlformats.org/officeDocument/2006/relationships" xmlns:p="http://schemas.openxmlformats.org/presentationml/2006/main">
   <p:cSld>
     <p:spTree>
@@ -3662,7 +3531,7 @@
             <a:fld id="{3EBA5BD7-F043-4D1B-AA17-CD412FC534DE}" type="slidenum">
               <a:rPr lang="en-US" smtClean="0"/>
               <a:pPr/>
-              <a:t>17</a:t>
+              <a:t>12</a:t>
             </a:fld>
             <a:endParaRPr lang="en-US" dirty="0"/>
           </a:p>
@@ -3673,7 +3542,7 @@
           <p:cNvPr id="5" name="Footer Placeholder 7">
             <a:extLst>
               <a:ext uri="{FF2B5EF4-FFF2-40B4-BE49-F238E27FC236}">
-                <a16:creationId xmlns:a16="http://schemas.microsoft.com/office/drawing/2014/main" id="{0595680F-3764-2EDC-1BBC-9E9756E08527}"/>
+                <a16:creationId xmlns:a16="http://schemas.microsoft.com/office/drawing/2014/main" id="{0A4D3A2C-3BFC-6602-1212-E998CC7D4739}"/>
               </a:ext>
             </a:extLst>
           </p:cNvPr>
@@ -3726,7 +3595,155 @@
     </p:spTree>
     <p:extLst>
       <p:ext uri="{BB962C8B-B14F-4D97-AF65-F5344CB8AC3E}">
-        <p14:creationId xmlns:p14="http://schemas.microsoft.com/office/powerpoint/2010/main" val="554297795"/>
+        <p14:creationId xmlns:p14="http://schemas.microsoft.com/office/powerpoint/2010/main" val="1590414964"/>
+      </p:ext>
+    </p:extLst>
+  </p:cSld>
+  <p:clrMapOvr>
+    <a:masterClrMapping/>
+  </p:clrMapOvr>
+</p:notes>
+</file>
+
+<file path=ppt/notesSlides/notesSlide8.xml><?xml version="1.0" encoding="utf-8"?>
+<p:notes xmlns:a="http://schemas.openxmlformats.org/drawingml/2006/main" xmlns:r="http://schemas.openxmlformats.org/officeDocument/2006/relationships" xmlns:p="http://schemas.openxmlformats.org/presentationml/2006/main">
+  <p:cSld>
+    <p:spTree>
+      <p:nvGrpSpPr>
+        <p:cNvPr id="1" name=""/>
+        <p:cNvGrpSpPr/>
+        <p:nvPr/>
+      </p:nvGrpSpPr>
+      <p:grpSpPr>
+        <a:xfrm>
+          <a:off x="0" y="0"/>
+          <a:ext cx="0" cy="0"/>
+          <a:chOff x="0" y="0"/>
+          <a:chExt cx="0" cy="0"/>
+        </a:xfrm>
+      </p:grpSpPr>
+      <p:sp>
+        <p:nvSpPr>
+          <p:cNvPr id="2" name="Slide Image Placeholder 1"/>
+          <p:cNvSpPr>
+            <a:spLocks noGrp="1" noRot="1" noChangeAspect="1"/>
+          </p:cNvSpPr>
+          <p:nvPr>
+            <p:ph type="sldImg"/>
+          </p:nvPr>
+        </p:nvSpPr>
+        <p:spPr/>
+      </p:sp>
+      <p:sp>
+        <p:nvSpPr>
+          <p:cNvPr id="3" name="Notes Placeholder 2"/>
+          <p:cNvSpPr>
+            <a:spLocks noGrp="1"/>
+          </p:cNvSpPr>
+          <p:nvPr>
+            <p:ph type="body" idx="1"/>
+          </p:nvPr>
+        </p:nvSpPr>
+        <p:spPr/>
+        <p:txBody>
+          <a:bodyPr/>
+          <a:lstStyle/>
+          <a:p>
+            <a:r>
+              <a:rPr lang="en-US" dirty="0"/>
+              <a:t>The table is the</a:t>
+            </a:r>
+            <a:r>
+              <a:rPr lang="en-US" baseline="0" dirty="0"/>
+              <a:t> main unit of data storage. It has rows, columns and cells. Cells contain stored data. Each column has a data type. Types can be VARCHAR(String), INT, DATE etc.</a:t>
+            </a:r>
+            <a:endParaRPr lang="en-US" dirty="0"/>
+          </a:p>
+        </p:txBody>
+      </p:sp>
+      <p:sp>
+        <p:nvSpPr>
+          <p:cNvPr id="5" name="Slide Number Placeholder 4"/>
+          <p:cNvSpPr>
+            <a:spLocks noGrp="1"/>
+          </p:cNvSpPr>
+          <p:nvPr>
+            <p:ph type="sldNum" sz="quarter" idx="11"/>
+          </p:nvPr>
+        </p:nvSpPr>
+        <p:spPr/>
+        <p:txBody>
+          <a:bodyPr/>
+          <a:lstStyle/>
+          <a:p>
+            <a:fld id="{3EBA5BD7-F043-4D1B-AA17-CD412FC534DE}" type="slidenum">
+              <a:rPr lang="en-US" smtClean="0"/>
+              <a:pPr/>
+              <a:t>15</a:t>
+            </a:fld>
+            <a:endParaRPr lang="en-US" dirty="0"/>
+          </a:p>
+        </p:txBody>
+      </p:sp>
+      <p:sp>
+        <p:nvSpPr>
+          <p:cNvPr id="4" name="Footer Placeholder 7">
+            <a:extLst>
+              <a:ext uri="{FF2B5EF4-FFF2-40B4-BE49-F238E27FC236}">
+                <a16:creationId xmlns:a16="http://schemas.microsoft.com/office/drawing/2014/main" id="{3C6E4365-C2C6-EADC-E2EB-76A5CDFDE20C}"/>
+              </a:ext>
+            </a:extLst>
+          </p:cNvPr>
+          <p:cNvSpPr>
+            <a:spLocks noGrp="1"/>
+          </p:cNvSpPr>
+          <p:nvPr>
+            <p:ph type="ftr" sz="quarter" idx="4"/>
+          </p:nvPr>
+        </p:nvSpPr>
+        <p:spPr>
+          <a:xfrm>
+            <a:off x="-1" y="8892000"/>
+            <a:ext cx="6488999" cy="252000"/>
+          </a:xfrm>
+          <a:prstGeom prst="rect">
+            <a:avLst/>
+          </a:prstGeom>
+        </p:spPr>
+        <p:txBody>
+          <a:bodyPr vert="horz" lIns="91440" tIns="45720" rIns="91440" bIns="45720" rtlCol="0" anchor="b"/>
+          <a:lstStyle>
+            <a:lvl1pPr algn="l">
+              <a:defRPr sz="1100"/>
+            </a:lvl1pPr>
+          </a:lstStyle>
+          <a:p>
+            <a:r>
+              <a:rPr lang="bg-BG" sz="1100" dirty="0"/>
+              <a:t>Работна група </a:t>
+            </a:r>
+            <a:r>
+              <a:rPr lang="bg-BG" dirty="0"/>
+              <a:t>"Образование по програмиране и ИТ"</a:t>
+            </a:r>
+            <a:r>
+              <a:rPr lang="bg-BG" sz="1100" dirty="0"/>
+              <a:t>, с подкрепата на </a:t>
+            </a:r>
+            <a:r>
+              <a:rPr lang="en-US" sz="1100" dirty="0">
+                <a:hlinkClick r:id="rId3"/>
+              </a:rPr>
+              <a:t>SoftUni</a:t>
+            </a:r>
+            <a:endParaRPr lang="en-US" sz="1100" dirty="0"/>
+          </a:p>
+        </p:txBody>
+      </p:sp>
+    </p:spTree>
+    <p:extLst>
+      <p:ext uri="{BB962C8B-B14F-4D97-AF65-F5344CB8AC3E}">
+        <p14:creationId xmlns:p14="http://schemas.microsoft.com/office/powerpoint/2010/main" val="2324145607"/>
       </p:ext>
     </p:extLst>
   </p:cSld>
@@ -3786,23 +3803,129 @@
       </p:sp>
       <p:sp>
         <p:nvSpPr>
-          <p:cNvPr id="4" name="Slide Number Placeholder 3"/>
-          <p:cNvSpPr>
-            <a:spLocks noGrp="1"/>
+          <p:cNvPr id="7" name="Slide Number Placeholder 5">
+            <a:extLst>
+              <a:ext uri="{FF2B5EF4-FFF2-40B4-BE49-F238E27FC236}">
+                <a16:creationId xmlns:a16="http://schemas.microsoft.com/office/drawing/2014/main" id="{BD88B0D8-949C-482D-990A-2DAB14AD4AD1}"/>
+              </a:ext>
+            </a:extLst>
+          </p:cNvPr>
+          <p:cNvSpPr txBox="1">
+            <a:spLocks/>
           </p:cNvSpPr>
-          <p:nvPr>
-            <p:ph type="sldNum" sz="quarter" idx="5"/>
-          </p:nvPr>
+          <p:nvPr/>
         </p:nvSpPr>
-        <p:spPr/>
+        <p:spPr>
+          <a:xfrm>
+            <a:off x="6488999" y="8847000"/>
+            <a:ext cx="367414" cy="297000"/>
+          </a:xfrm>
+          <a:prstGeom prst="rect">
+            <a:avLst/>
+          </a:prstGeom>
+        </p:spPr>
         <p:txBody>
-          <a:bodyPr/>
-          <a:lstStyle/>
+          <a:bodyPr vert="horz" lIns="91440" tIns="45720" rIns="91440" bIns="45720" rtlCol="0" anchor="b"/>
+          <a:lstStyle>
+            <a:defPPr>
+              <a:defRPr lang="en-US"/>
+            </a:defPPr>
+            <a:lvl1pPr marL="0" algn="r" defTabSz="914400" rtl="0" eaLnBrk="1" latinLnBrk="0" hangingPunct="1">
+              <a:defRPr sz="1200" kern="1200">
+                <a:solidFill>
+                  <a:schemeClr val="tx1"/>
+                </a:solidFill>
+                <a:latin typeface="+mn-lt"/>
+                <a:ea typeface="+mn-ea"/>
+                <a:cs typeface="+mn-cs"/>
+              </a:defRPr>
+            </a:lvl1pPr>
+            <a:lvl2pPr marL="457200" algn="l" defTabSz="914400" rtl="0" eaLnBrk="1" latinLnBrk="0" hangingPunct="1">
+              <a:defRPr sz="1800" kern="1200">
+                <a:solidFill>
+                  <a:schemeClr val="tx1"/>
+                </a:solidFill>
+                <a:latin typeface="+mn-lt"/>
+                <a:ea typeface="+mn-ea"/>
+                <a:cs typeface="+mn-cs"/>
+              </a:defRPr>
+            </a:lvl2pPr>
+            <a:lvl3pPr marL="914400" algn="l" defTabSz="914400" rtl="0" eaLnBrk="1" latinLnBrk="0" hangingPunct="1">
+              <a:defRPr sz="1800" kern="1200">
+                <a:solidFill>
+                  <a:schemeClr val="tx1"/>
+                </a:solidFill>
+                <a:latin typeface="+mn-lt"/>
+                <a:ea typeface="+mn-ea"/>
+                <a:cs typeface="+mn-cs"/>
+              </a:defRPr>
+            </a:lvl3pPr>
+            <a:lvl4pPr marL="1371600" algn="l" defTabSz="914400" rtl="0" eaLnBrk="1" latinLnBrk="0" hangingPunct="1">
+              <a:defRPr sz="1800" kern="1200">
+                <a:solidFill>
+                  <a:schemeClr val="tx1"/>
+                </a:solidFill>
+                <a:latin typeface="+mn-lt"/>
+                <a:ea typeface="+mn-ea"/>
+                <a:cs typeface="+mn-cs"/>
+              </a:defRPr>
+            </a:lvl4pPr>
+            <a:lvl5pPr marL="1828800" algn="l" defTabSz="914400" rtl="0" eaLnBrk="1" latinLnBrk="0" hangingPunct="1">
+              <a:defRPr sz="1800" kern="1200">
+                <a:solidFill>
+                  <a:schemeClr val="tx1"/>
+                </a:solidFill>
+                <a:latin typeface="+mn-lt"/>
+                <a:ea typeface="+mn-ea"/>
+                <a:cs typeface="+mn-cs"/>
+              </a:defRPr>
+            </a:lvl5pPr>
+            <a:lvl6pPr marL="2286000" algn="l" defTabSz="914400" rtl="0" eaLnBrk="1" latinLnBrk="0" hangingPunct="1">
+              <a:defRPr sz="1800" kern="1200">
+                <a:solidFill>
+                  <a:schemeClr val="tx1"/>
+                </a:solidFill>
+                <a:latin typeface="+mn-lt"/>
+                <a:ea typeface="+mn-ea"/>
+                <a:cs typeface="+mn-cs"/>
+              </a:defRPr>
+            </a:lvl6pPr>
+            <a:lvl7pPr marL="2743200" algn="l" defTabSz="914400" rtl="0" eaLnBrk="1" latinLnBrk="0" hangingPunct="1">
+              <a:defRPr sz="1800" kern="1200">
+                <a:solidFill>
+                  <a:schemeClr val="tx1"/>
+                </a:solidFill>
+                <a:latin typeface="+mn-lt"/>
+                <a:ea typeface="+mn-ea"/>
+                <a:cs typeface="+mn-cs"/>
+              </a:defRPr>
+            </a:lvl7pPr>
+            <a:lvl8pPr marL="3200400" algn="l" defTabSz="914400" rtl="0" eaLnBrk="1" latinLnBrk="0" hangingPunct="1">
+              <a:defRPr sz="1800" kern="1200">
+                <a:solidFill>
+                  <a:schemeClr val="tx1"/>
+                </a:solidFill>
+                <a:latin typeface="+mn-lt"/>
+                <a:ea typeface="+mn-ea"/>
+                <a:cs typeface="+mn-cs"/>
+              </a:defRPr>
+            </a:lvl8pPr>
+            <a:lvl9pPr marL="3657600" algn="l" defTabSz="914400" rtl="0" eaLnBrk="1" latinLnBrk="0" hangingPunct="1">
+              <a:defRPr sz="1800" kern="1200">
+                <a:solidFill>
+                  <a:schemeClr val="tx1"/>
+                </a:solidFill>
+                <a:latin typeface="+mn-lt"/>
+                <a:ea typeface="+mn-ea"/>
+                <a:cs typeface="+mn-cs"/>
+              </a:defRPr>
+            </a:lvl9pPr>
+          </a:lstStyle>
           <a:p>
-            <a:fld id="{2BF067CD-8E6B-4360-9AA8-C5DF2A48A6D1}" type="slidenum">
+            <a:fld id="{3EBA5BD7-F043-4D1B-AA17-CD412FC534DE}" type="slidenum">
               <a:rPr lang="en-US" smtClean="0"/>
               <a:pPr/>
-              <a:t>19</a:t>
+              <a:t>18</a:t>
             </a:fld>
             <a:endParaRPr lang="en-US" dirty="0"/>
           </a:p>
@@ -3810,10 +3933,10 @@
       </p:sp>
       <p:sp>
         <p:nvSpPr>
-          <p:cNvPr id="6" name="Footer Placeholder 7">
+          <p:cNvPr id="5" name="Footer Placeholder 7">
             <a:extLst>
               <a:ext uri="{FF2B5EF4-FFF2-40B4-BE49-F238E27FC236}">
-                <a16:creationId xmlns:a16="http://schemas.microsoft.com/office/drawing/2014/main" id="{5FD6BE1D-71A3-2260-39D0-05655C266869}"/>
+                <a16:creationId xmlns:a16="http://schemas.microsoft.com/office/drawing/2014/main" id="{0595680F-3764-2EDC-1BBC-9E9756E08527}"/>
               </a:ext>
             </a:extLst>
           </p:cNvPr>
@@ -3866,7 +3989,7 @@
     </p:spTree>
     <p:extLst>
       <p:ext uri="{BB962C8B-B14F-4D97-AF65-F5344CB8AC3E}">
-        <p14:creationId xmlns:p14="http://schemas.microsoft.com/office/powerpoint/2010/main" val="4004706591"/>
+        <p14:creationId xmlns:p14="http://schemas.microsoft.com/office/powerpoint/2010/main" val="554297795"/>
       </p:ext>
     </p:extLst>
   </p:cSld>
@@ -9894,6 +10017,404 @@
           <a:chExt cx="0" cy="0"/>
         </a:xfrm>
       </p:grpSpPr>
+      <p:sp>
+        <p:nvSpPr>
+          <p:cNvPr id="2" name="Slide Number Placeholder 1">
+            <a:extLst>
+              <a:ext uri="{FF2B5EF4-FFF2-40B4-BE49-F238E27FC236}">
+                <a16:creationId xmlns:a16="http://schemas.microsoft.com/office/drawing/2014/main" id="{DFE9101B-6287-9B5A-63DF-499F8F5BD7B2}"/>
+              </a:ext>
+            </a:extLst>
+          </p:cNvPr>
+          <p:cNvSpPr>
+            <a:spLocks noGrp="1"/>
+          </p:cNvSpPr>
+          <p:nvPr>
+            <p:ph type="sldNum" sz="quarter" idx="5"/>
+          </p:nvPr>
+        </p:nvSpPr>
+        <p:spPr/>
+        <p:txBody>
+          <a:bodyPr/>
+          <a:lstStyle/>
+          <a:p>
+            <a:fld id="{2BF067CD-8E6B-4360-9AA8-C5DF2A48A6D1}" type="slidenum">
+              <a:rPr lang="en-US" noProof="0" smtClean="0"/>
+              <a:pPr/>
+              <a:t>11</a:t>
+            </a:fld>
+            <a:endParaRPr lang="en-US" noProof="0" dirty="0"/>
+          </a:p>
+        </p:txBody>
+      </p:sp>
+      <p:sp>
+        <p:nvSpPr>
+          <p:cNvPr id="3" name="Text Placeholder 2">
+            <a:extLst>
+              <a:ext uri="{FF2B5EF4-FFF2-40B4-BE49-F238E27FC236}">
+                <a16:creationId xmlns:a16="http://schemas.microsoft.com/office/drawing/2014/main" id="{203D1A83-70F4-184C-8867-C371ADA541DE}"/>
+              </a:ext>
+            </a:extLst>
+          </p:cNvPr>
+          <p:cNvSpPr>
+            <a:spLocks noGrp="1"/>
+          </p:cNvSpPr>
+          <p:nvPr>
+            <p:ph type="body" sz="quarter" idx="10"/>
+          </p:nvPr>
+        </p:nvSpPr>
+        <p:spPr/>
+        <p:txBody>
+          <a:bodyPr>
+            <a:normAutofit/>
+          </a:bodyPr>
+          <a:lstStyle/>
+          <a:p>
+            <a:r>
+              <a:rPr lang="bg-BG" sz="3600" dirty="0"/>
+              <a:t>СУБД, която:</a:t>
+            </a:r>
+          </a:p>
+          <a:p>
+            <a:pPr lvl="1"/>
+            <a:r>
+              <a:rPr lang="ru-RU" sz="3200" dirty="0"/>
+              <a:t>Не се съхранява на едно място, а е </a:t>
+            </a:r>
+            <a:r>
+              <a:rPr lang="ru-RU" sz="3200" b="1" dirty="0">
+                <a:solidFill>
+                  <a:schemeClr val="bg1"/>
+                </a:solidFill>
+              </a:rPr>
+              <a:t>разпределена</a:t>
+            </a:r>
+            <a:r>
+              <a:rPr lang="ru-RU" sz="3200" dirty="0"/>
+              <a:t> между </a:t>
+            </a:r>
+            <a:r>
+              <a:rPr lang="ru-RU" sz="3200" b="1" dirty="0">
+                <a:solidFill>
+                  <a:schemeClr val="bg1"/>
+                </a:solidFill>
+              </a:rPr>
+              <a:t>различни</a:t>
+            </a:r>
+            <a:r>
+              <a:rPr lang="ru-RU" sz="3200" dirty="0"/>
+              <a:t> </a:t>
+            </a:r>
+            <a:r>
+              <a:rPr lang="ru-RU" sz="3200" b="1" dirty="0">
+                <a:solidFill>
+                  <a:schemeClr val="bg1"/>
+                </a:solidFill>
+              </a:rPr>
+              <a:t>узли</a:t>
+            </a:r>
+          </a:p>
+          <a:p>
+            <a:pPr lvl="2"/>
+            <a:r>
+              <a:rPr lang="ru-RU" sz="3200" dirty="0"/>
+              <a:t>Узлите се свързват чрез </a:t>
+            </a:r>
+            <a:r>
+              <a:rPr lang="ru-RU" sz="3200" b="1" dirty="0">
+                <a:solidFill>
+                  <a:schemeClr val="bg1"/>
+                </a:solidFill>
+              </a:rPr>
+              <a:t>мрежа</a:t>
+            </a:r>
+          </a:p>
+          <a:p>
+            <a:pPr lvl="1"/>
+            <a:r>
+              <a:rPr lang="ru-RU" sz="3200" dirty="0"/>
+              <a:t>Позволява на базата данни да бъде </a:t>
+            </a:r>
+            <a:r>
+              <a:rPr lang="ru-RU" sz="3200" b="1" dirty="0">
+                <a:solidFill>
+                  <a:schemeClr val="bg1"/>
+                </a:solidFill>
+              </a:rPr>
+              <a:t>разпределена</a:t>
+            </a:r>
+            <a:r>
+              <a:rPr lang="ru-RU" sz="3200" dirty="0"/>
+              <a:t> или </a:t>
+            </a:r>
+            <a:r>
+              <a:rPr lang="ru-RU" sz="3200" b="1" dirty="0">
+                <a:solidFill>
+                  <a:schemeClr val="bg1"/>
+                </a:solidFill>
+              </a:rPr>
+              <a:t>репликирана</a:t>
+            </a:r>
+            <a:r>
+              <a:rPr lang="ru-RU" sz="3200" dirty="0"/>
+              <a:t> между </a:t>
+            </a:r>
+            <a:r>
+              <a:rPr lang="ru-RU" sz="3200" b="1" dirty="0">
+                <a:solidFill>
+                  <a:schemeClr val="bg1"/>
+                </a:solidFill>
+              </a:rPr>
+              <a:t>различни</a:t>
+            </a:r>
+            <a:r>
+              <a:rPr lang="ru-RU" sz="3200" dirty="0"/>
+              <a:t> </a:t>
+            </a:r>
+            <a:r>
+              <a:rPr lang="ru-RU" sz="3200" b="1" dirty="0">
+                <a:solidFill>
+                  <a:schemeClr val="bg1"/>
+                </a:solidFill>
+              </a:rPr>
+              <a:t>точки</a:t>
+            </a:r>
+            <a:r>
+              <a:rPr lang="ru-RU" sz="3200" dirty="0"/>
+              <a:t> в </a:t>
+            </a:r>
+            <a:r>
+              <a:rPr lang="ru-RU" sz="3200" b="1" dirty="0">
+                <a:solidFill>
+                  <a:schemeClr val="bg1"/>
+                </a:solidFill>
+              </a:rPr>
+              <a:t>мрежата</a:t>
+            </a:r>
+          </a:p>
+          <a:p>
+            <a:pPr lvl="2"/>
+            <a:r>
+              <a:rPr lang="ru-RU" sz="3200" dirty="0"/>
+              <a:t>Подобрява </a:t>
+            </a:r>
+            <a:r>
+              <a:rPr lang="ru-RU" sz="3200" b="1" dirty="0">
+                <a:solidFill>
+                  <a:schemeClr val="bg1"/>
+                </a:solidFill>
+              </a:rPr>
+              <a:t>достъпността</a:t>
+            </a:r>
+            <a:r>
+              <a:rPr lang="ru-RU" sz="3200" dirty="0"/>
+              <a:t>,</a:t>
+            </a:r>
+            <a:r>
+              <a:rPr lang="ru-RU" sz="3200" b="1" dirty="0">
+                <a:solidFill>
+                  <a:schemeClr val="bg1"/>
+                </a:solidFill>
+              </a:rPr>
+              <a:t> надеждността </a:t>
+            </a:r>
+            <a:r>
+              <a:rPr lang="ru-RU" sz="3200" dirty="0"/>
+              <a:t>и</a:t>
+            </a:r>
+            <a:r>
+              <a:rPr lang="ru-RU" sz="3200" b="1" dirty="0">
+                <a:solidFill>
+                  <a:schemeClr val="bg1"/>
+                </a:solidFill>
+              </a:rPr>
+              <a:t> мащабируемостта</a:t>
+            </a:r>
+            <a:endParaRPr lang="en-US" sz="3200" b="1" dirty="0">
+              <a:solidFill>
+                <a:schemeClr val="bg1"/>
+              </a:solidFill>
+            </a:endParaRPr>
+          </a:p>
+        </p:txBody>
+      </p:sp>
+      <p:sp>
+        <p:nvSpPr>
+          <p:cNvPr id="4" name="Title 3">
+            <a:extLst>
+              <a:ext uri="{FF2B5EF4-FFF2-40B4-BE49-F238E27FC236}">
+                <a16:creationId xmlns:a16="http://schemas.microsoft.com/office/drawing/2014/main" id="{DCD06A0B-0005-BB8C-45C5-08075CA9915A}"/>
+              </a:ext>
+            </a:extLst>
+          </p:cNvPr>
+          <p:cNvSpPr>
+            <a:spLocks noGrp="1"/>
+          </p:cNvSpPr>
+          <p:nvPr>
+            <p:ph type="title"/>
+          </p:nvPr>
+        </p:nvSpPr>
+        <p:spPr/>
+        <p:txBody>
+          <a:bodyPr/>
+          <a:lstStyle/>
+          <a:p>
+            <a:r>
+              <a:rPr lang="bg-BG" dirty="0"/>
+              <a:t>Разпределена система</a:t>
+            </a:r>
+            <a:endParaRPr lang="en-US" dirty="0"/>
+          </a:p>
+        </p:txBody>
+      </p:sp>
+    </p:spTree>
+    <p:extLst>
+      <p:ext uri="{BB962C8B-B14F-4D97-AF65-F5344CB8AC3E}">
+        <p14:creationId xmlns:p14="http://schemas.microsoft.com/office/powerpoint/2010/main" val="2657260129"/>
+      </p:ext>
+    </p:extLst>
+  </p:cSld>
+  <p:clrMapOvr>
+    <a:masterClrMapping/>
+  </p:clrMapOvr>
+  <mc:AlternateContent xmlns:mc="http://schemas.openxmlformats.org/markup-compatibility/2006" xmlns:p14="http://schemas.microsoft.com/office/powerpoint/2010/main">
+    <mc:Choice Requires="p14">
+      <p:transition spd="slow" p14:dur="2000" advClick="0" advTm="5000"/>
+    </mc:Choice>
+    <mc:Fallback xmlns="">
+      <p:transition spd="slow" advClick="0" advTm="5000"/>
+    </mc:Fallback>
+  </mc:AlternateContent>
+  <p:timing>
+    <p:tnLst>
+      <p:par>
+        <p:cTn id="1" dur="indefinite" restart="never" nodeType="tmRoot">
+          <p:childTnLst>
+            <p:seq concurrent="1" nextAc="seek">
+              <p:cTn id="2" dur="indefinite" nodeType="mainSeq">
+                <p:childTnLst>
+                  <p:par>
+                    <p:cTn id="3" fill="hold">
+                      <p:stCondLst>
+                        <p:cond delay="indefinite"/>
+                      </p:stCondLst>
+                      <p:childTnLst>
+                        <p:par>
+                          <p:cTn id="4" fill="hold">
+                            <p:stCondLst>
+                              <p:cond delay="0"/>
+                            </p:stCondLst>
+                            <p:childTnLst>
+                              <p:par>
+                                <p:cTn id="5" presetID="1" presetClass="entr" presetSubtype="0" fill="hold" nodeType="clickEffect">
+                                  <p:stCondLst>
+                                    <p:cond delay="0"/>
+                                  </p:stCondLst>
+                                  <p:childTnLst>
+                                    <p:set>
+                                      <p:cBhvr>
+                                        <p:cTn id="6" dur="1" fill="hold">
+                                          <p:stCondLst>
+                                            <p:cond delay="0"/>
+                                          </p:stCondLst>
+                                        </p:cTn>
+                                        <p:tgtEl>
+                                          <p:spTgt spid="3">
+                                            <p:txEl>
+                                              <p:pRg st="3" end="3"/>
+                                            </p:txEl>
+                                          </p:spTgt>
+                                        </p:tgtEl>
+                                        <p:attrNameLst>
+                                          <p:attrName>style.visibility</p:attrName>
+                                        </p:attrNameLst>
+                                      </p:cBhvr>
+                                      <p:to>
+                                        <p:strVal val="visible"/>
+                                      </p:to>
+                                    </p:set>
+                                  </p:childTnLst>
+                                </p:cTn>
+                              </p:par>
+                              <p:par>
+                                <p:cTn id="7" presetID="1" presetClass="entr" presetSubtype="0" fill="hold" nodeType="withEffect">
+                                  <p:stCondLst>
+                                    <p:cond delay="0"/>
+                                  </p:stCondLst>
+                                  <p:childTnLst>
+                                    <p:set>
+                                      <p:cBhvr>
+                                        <p:cTn id="8" dur="1" fill="hold">
+                                          <p:stCondLst>
+                                            <p:cond delay="0"/>
+                                          </p:stCondLst>
+                                        </p:cTn>
+                                        <p:tgtEl>
+                                          <p:spTgt spid="3">
+                                            <p:txEl>
+                                              <p:pRg st="4" end="4"/>
+                                            </p:txEl>
+                                          </p:spTgt>
+                                        </p:tgtEl>
+                                        <p:attrNameLst>
+                                          <p:attrName>style.visibility</p:attrName>
+                                        </p:attrNameLst>
+                                      </p:cBhvr>
+                                      <p:to>
+                                        <p:strVal val="visible"/>
+                                      </p:to>
+                                    </p:set>
+                                  </p:childTnLst>
+                                </p:cTn>
+                              </p:par>
+                            </p:childTnLst>
+                          </p:cTn>
+                        </p:par>
+                      </p:childTnLst>
+                    </p:cTn>
+                  </p:par>
+                </p:childTnLst>
+              </p:cTn>
+              <p:prevCondLst>
+                <p:cond evt="onPrev" delay="0">
+                  <p:tgtEl>
+                    <p:sldTgt/>
+                  </p:tgtEl>
+                </p:cond>
+              </p:prevCondLst>
+              <p:nextCondLst>
+                <p:cond evt="onNext" delay="0">
+                  <p:tgtEl>
+                    <p:sldTgt/>
+                  </p:tgtEl>
+                </p:cond>
+              </p:nextCondLst>
+            </p:seq>
+          </p:childTnLst>
+        </p:cTn>
+      </p:par>
+    </p:tnLst>
+  </p:timing>
+</p:sld>
+</file>
+
+<file path=ppt/slides/slide12.xml><?xml version="1.0" encoding="utf-8"?>
+<p:sld xmlns:a="http://schemas.openxmlformats.org/drawingml/2006/main" xmlns:r="http://schemas.openxmlformats.org/officeDocument/2006/relationships" xmlns:p="http://schemas.openxmlformats.org/presentationml/2006/main">
+  <p:cSld>
+    <p:spTree>
+      <p:nvGrpSpPr>
+        <p:cNvPr id="1" name=""/>
+        <p:cNvGrpSpPr/>
+        <p:nvPr/>
+      </p:nvGrpSpPr>
+      <p:grpSpPr>
+        <a:xfrm>
+          <a:off x="0" y="0"/>
+          <a:ext cx="0" cy="0"/>
+          <a:chOff x="0" y="0"/>
+          <a:chExt cx="0" cy="0"/>
+        </a:xfrm>
+      </p:grpSpPr>
       <p:pic>
         <p:nvPicPr>
           <p:cNvPr id="5" name="Picture 4"/>
@@ -10006,7 +10527,7 @@
 </p:sld>
 </file>
 
-<file path=ppt/slides/slide12.xml><?xml version="1.0" encoding="utf-8"?>
+<file path=ppt/slides/slide13.xml><?xml version="1.0" encoding="utf-8"?>
 <p:sld xmlns:a="http://schemas.openxmlformats.org/drawingml/2006/main" xmlns:r="http://schemas.openxmlformats.org/officeDocument/2006/relationships" xmlns:p="http://schemas.openxmlformats.org/presentationml/2006/main">
   <p:cSld>
     <p:spTree>
@@ -10492,7 +11013,7 @@
                   <a:spcPts val="1055"/>
                 </a:lnSpc>
               </a:pPr>
-              <a:t>12</a:t>
+              <a:t>13</a:t>
             </a:fld>
             <a:endParaRPr sz="1000" dirty="0">
               <a:latin typeface="Calibri"/>
@@ -10625,7 +11146,7 @@
             <a:fld id="{2BF067CD-8E6B-4360-9AA8-C5DF2A48A6D1}" type="slidenum">
               <a:rPr lang="en-US" smtClean="0"/>
               <a:pPr/>
-              <a:t>12</a:t>
+              <a:t>13</a:t>
             </a:fld>
             <a:endParaRPr lang="en-US" dirty="0"/>
           </a:p>
@@ -10731,7 +11252,7 @@
 </p:sld>
 </file>
 
-<file path=ppt/slides/slide13.xml><?xml version="1.0" encoding="utf-8"?>
+<file path=ppt/slides/slide14.xml><?xml version="1.0" encoding="utf-8"?>
 <p:sld xmlns:a="http://schemas.openxmlformats.org/drawingml/2006/main" xmlns:r="http://schemas.openxmlformats.org/officeDocument/2006/relationships" xmlns:p="http://schemas.openxmlformats.org/presentationml/2006/main">
   <p:cSld>
     <p:spTree>
@@ -11043,7 +11564,7 @@
             <a:fld id="{2BF067CD-8E6B-4360-9AA8-C5DF2A48A6D1}" type="slidenum">
               <a:rPr lang="en-US" smtClean="0"/>
               <a:pPr/>
-              <a:t>13</a:t>
+              <a:t>14</a:t>
             </a:fld>
             <a:endParaRPr lang="en-US" dirty="0"/>
           </a:p>
@@ -11149,7 +11670,7 @@
 </p:sld>
 </file>
 
-<file path=ppt/slides/slide14.xml><?xml version="1.0" encoding="utf-8"?>
+<file path=ppt/slides/slide15.xml><?xml version="1.0" encoding="utf-8"?>
 <p:sld xmlns:a="http://schemas.openxmlformats.org/drawingml/2006/main" xmlns:r="http://schemas.openxmlformats.org/officeDocument/2006/relationships" xmlns:p="http://schemas.openxmlformats.org/presentationml/2006/main">
   <p:cSld>
     <p:spTree>
@@ -13582,7 +14103,7 @@
             <a:fld id="{2BF067CD-8E6B-4360-9AA8-C5DF2A48A6D1}" type="slidenum">
               <a:rPr lang="en-US" noProof="0" smtClean="0"/>
               <a:pPr/>
-              <a:t>14</a:t>
+              <a:t>15</a:t>
             </a:fld>
             <a:endParaRPr lang="en-US" noProof="0" dirty="0"/>
           </a:p>
@@ -13918,7 +14439,7 @@
 </p:sld>
 </file>
 
-<file path=ppt/slides/slide15.xml><?xml version="1.0" encoding="utf-8"?>
+<file path=ppt/slides/slide16.xml><?xml version="1.0" encoding="utf-8"?>
 <p:sld xmlns:a="http://schemas.openxmlformats.org/drawingml/2006/main" xmlns:r="http://schemas.openxmlformats.org/officeDocument/2006/relationships" xmlns:p="http://schemas.openxmlformats.org/presentationml/2006/main">
   <p:cSld>
     <p:spTree>
@@ -14217,7 +14738,7 @@
                   <a:spcPts val="1055"/>
                 </a:lnSpc>
               </a:pPr>
-              <a:t>15</a:t>
+              <a:t>16</a:t>
             </a:fld>
             <a:endParaRPr sz="1000" dirty="0">
               <a:latin typeface="Calibri"/>
@@ -14288,7 +14809,7 @@
             <a:fld id="{2BF067CD-8E6B-4360-9AA8-C5DF2A48A6D1}" type="slidenum">
               <a:rPr lang="en-US" noProof="0" smtClean="0"/>
               <a:pPr/>
-              <a:t>15</a:t>
+              <a:t>16</a:t>
             </a:fld>
             <a:endParaRPr lang="en-US" noProof="0" dirty="0"/>
           </a:p>
@@ -14439,7 +14960,7 @@
 </p:sld>
 </file>
 
-<file path=ppt/slides/slide16.xml><?xml version="1.0" encoding="utf-8"?>
+<file path=ppt/slides/slide17.xml><?xml version="1.0" encoding="utf-8"?>
 <p:sld xmlns:a="http://schemas.openxmlformats.org/drawingml/2006/main" xmlns:r="http://schemas.openxmlformats.org/officeDocument/2006/relationships" xmlns:p="http://schemas.openxmlformats.org/presentationml/2006/main">
   <p:cSld>
     <p:spTree>
@@ -17462,7 +17983,7 @@
                   <a:spcPts val="1055"/>
                 </a:lnSpc>
               </a:pPr>
-              <a:t>16</a:t>
+              <a:t>17</a:t>
             </a:fld>
             <a:endParaRPr sz="1000" dirty="0">
               <a:latin typeface="Calibri"/>
@@ -17611,7 +18132,7 @@
             <a:fld id="{2BF067CD-8E6B-4360-9AA8-C5DF2A48A6D1}" type="slidenum">
               <a:rPr lang="en-US" noProof="0" smtClean="0"/>
               <a:pPr/>
-              <a:t>16</a:t>
+              <a:t>17</a:t>
             </a:fld>
             <a:endParaRPr lang="en-US" noProof="0" dirty="0"/>
           </a:p>
@@ -17870,7 +18391,7 @@
 </p:sld>
 </file>
 
-<file path=ppt/slides/slide17.xml><?xml version="1.0" encoding="utf-8"?>
+<file path=ppt/slides/slide18.xml><?xml version="1.0" encoding="utf-8"?>
 <p:sld xmlns:a="http://schemas.openxmlformats.org/drawingml/2006/main" xmlns:r="http://schemas.openxmlformats.org/officeDocument/2006/relationships" xmlns:p="http://schemas.openxmlformats.org/presentationml/2006/main">
   <p:cSld>
     <p:spTree>
@@ -18008,7 +18529,7 @@
 </p:sld>
 </file>
 
-<file path=ppt/slides/slide18.xml><?xml version="1.0" encoding="utf-8"?>
+<file path=ppt/slides/slide19.xml><?xml version="1.0" encoding="utf-8"?>
 <p:sld xmlns:a="http://schemas.openxmlformats.org/drawingml/2006/main" xmlns:r="http://schemas.openxmlformats.org/officeDocument/2006/relationships" xmlns:p="http://schemas.openxmlformats.org/presentationml/2006/main">
   <p:cSld>
     <p:spTree>
@@ -18481,7 +19002,7 @@
                   <a:spcPts val="1055"/>
                 </a:lnSpc>
               </a:pPr>
-              <a:t>18</a:t>
+              <a:t>19</a:t>
             </a:fld>
             <a:endParaRPr sz="1000" dirty="0">
               <a:latin typeface="Calibri"/>
@@ -18614,7 +19135,7 @@
             <a:fld id="{2BF067CD-8E6B-4360-9AA8-C5DF2A48A6D1}" type="slidenum">
               <a:rPr lang="en-US" smtClean="0"/>
               <a:pPr/>
-              <a:t>18</a:t>
+              <a:t>19</a:t>
             </a:fld>
             <a:endParaRPr lang="en-US" dirty="0"/>
           </a:p>
@@ -18898,1125 +19419,6 @@
 </p:sld>
 </file>
 
-<file path=ppt/slides/slide19.xml><?xml version="1.0" encoding="utf-8"?>
-<p:sld xmlns:a="http://schemas.openxmlformats.org/drawingml/2006/main" xmlns:r="http://schemas.openxmlformats.org/officeDocument/2006/relationships" xmlns:p="http://schemas.openxmlformats.org/presentationml/2006/main">
-  <p:cSld>
-    <p:spTree>
-      <p:nvGrpSpPr>
-        <p:cNvPr id="1" name=""/>
-        <p:cNvGrpSpPr/>
-        <p:nvPr/>
-      </p:nvGrpSpPr>
-      <p:grpSpPr>
-        <a:xfrm>
-          <a:off x="0" y="0"/>
-          <a:ext cx="0" cy="0"/>
-          <a:chOff x="0" y="0"/>
-          <a:chExt cx="0" cy="0"/>
-        </a:xfrm>
-      </p:grpSpPr>
-      <p:sp>
-        <p:nvSpPr>
-          <p:cNvPr id="6" name="object 6"/>
-          <p:cNvSpPr txBox="1">
-            <a:spLocks noGrp="1"/>
-          </p:cNvSpPr>
-          <p:nvPr>
-            <p:ph type="title"/>
-          </p:nvPr>
-        </p:nvSpPr>
-        <p:spPr>
-          <a:xfrm>
-            <a:off x="190406" y="227247"/>
-            <a:ext cx="9715594" cy="629660"/>
-          </a:xfrm>
-          <a:prstGeom prst="rect">
-            <a:avLst/>
-          </a:prstGeom>
-        </p:spPr>
-        <p:txBody>
-          <a:bodyPr vert="horz" wrap="square" lIns="0" tIns="13970" rIns="0" bIns="0" rtlCol="0">
-            <a:spAutoFit/>
-          </a:bodyPr>
-          <a:lstStyle/>
-          <a:p>
-            <a:pPr marL="12700">
-              <a:lnSpc>
-                <a:spcPct val="100000"/>
-              </a:lnSpc>
-              <a:spcBef>
-                <a:spcPts val="110"/>
-              </a:spcBef>
-            </a:pPr>
-            <a:r>
-              <a:rPr sz="4000" spc="5" dirty="0">
-                <a:solidFill>
-                  <a:srgbClr val="FFFFFF"/>
-                </a:solidFill>
-              </a:rPr>
-              <a:t>NoSQL</a:t>
-            </a:r>
-            <a:r>
-              <a:rPr sz="4000" spc="-105" dirty="0">
-                <a:solidFill>
-                  <a:srgbClr val="FFFFFF"/>
-                </a:solidFill>
-              </a:rPr>
-              <a:t> </a:t>
-            </a:r>
-            <a:r>
-              <a:rPr lang="bg-BG" sz="4000" spc="-15" dirty="0">
-                <a:solidFill>
-                  <a:srgbClr val="FFFFFF"/>
-                </a:solidFill>
-              </a:rPr>
-              <a:t>бази данни</a:t>
-            </a:r>
-            <a:endParaRPr sz="4000" dirty="0"/>
-          </a:p>
-        </p:txBody>
-      </p:sp>
-      <p:sp>
-        <p:nvSpPr>
-          <p:cNvPr id="10" name="object 10"/>
-          <p:cNvSpPr txBox="1"/>
-          <p:nvPr/>
-        </p:nvSpPr>
-        <p:spPr>
-          <a:xfrm>
-            <a:off x="285699" y="1004956"/>
-            <a:ext cx="11672258" cy="3299621"/>
-          </a:xfrm>
-          <a:prstGeom prst="rect">
-            <a:avLst/>
-          </a:prstGeom>
-        </p:spPr>
-        <p:txBody>
-          <a:bodyPr vert="horz" wrap="square" lIns="0" tIns="204470" rIns="0" bIns="0" rtlCol="0">
-            <a:spAutoFit/>
-          </a:bodyPr>
-          <a:lstStyle/>
-          <a:p>
-            <a:pPr marL="372110" indent="-360045">
-              <a:lnSpc>
-                <a:spcPct val="100000"/>
-              </a:lnSpc>
-              <a:spcBef>
-                <a:spcPts val="1610"/>
-              </a:spcBef>
-              <a:buClr>
-                <a:srgbClr val="224464"/>
-              </a:buClr>
-              <a:buFont typeface="Wingdings"/>
-              <a:buChar char=""/>
-              <a:tabLst>
-                <a:tab pos="372745" algn="l"/>
-              </a:tabLst>
-            </a:pPr>
-            <a:r>
-              <a:rPr lang="en-US" sz="3400" b="1" dirty="0">
-                <a:solidFill>
-                  <a:schemeClr val="bg1"/>
-                </a:solidFill>
-                <a:latin typeface="Calibri"/>
-                <a:cs typeface="Calibri"/>
-              </a:rPr>
-              <a:t>NoSQL</a:t>
-            </a:r>
-            <a:r>
-              <a:rPr lang="en-US" sz="3400" b="1" spc="-65" dirty="0">
-                <a:solidFill>
-                  <a:schemeClr val="bg1"/>
-                </a:solidFill>
-                <a:latin typeface="Calibri"/>
-                <a:cs typeface="Calibri"/>
-              </a:rPr>
-              <a:t> </a:t>
-            </a:r>
-            <a:r>
-              <a:rPr lang="bg-BG" sz="3400" b="1" spc="-5" dirty="0">
-                <a:solidFill>
-                  <a:schemeClr val="bg1"/>
-                </a:solidFill>
-                <a:latin typeface="Calibri"/>
-                <a:cs typeface="Calibri"/>
-              </a:rPr>
-              <a:t>бази данни</a:t>
-            </a:r>
-            <a:r>
-              <a:rPr lang="bg-BG" sz="3400" b="1" spc="-5" dirty="0">
-                <a:solidFill>
-                  <a:srgbClr val="FF9F00"/>
-                </a:solidFill>
-                <a:latin typeface="Calibri"/>
-                <a:cs typeface="Calibri"/>
-              </a:rPr>
-              <a:t> </a:t>
-            </a:r>
-            <a:r>
-              <a:rPr lang="bg-BG" sz="3400" dirty="0">
-                <a:solidFill>
-                  <a:srgbClr val="224464"/>
-                </a:solidFill>
-                <a:latin typeface="Calibri"/>
-                <a:cs typeface="Calibri"/>
-              </a:rPr>
-              <a:t>не използват таблици и </a:t>
-            </a:r>
-            <a:r>
-              <a:rPr lang="en-US" sz="3400" dirty="0">
-                <a:solidFill>
-                  <a:srgbClr val="224464"/>
-                </a:solidFill>
-                <a:latin typeface="Calibri"/>
-                <a:cs typeface="Calibri"/>
-              </a:rPr>
-              <a:t>SQL</a:t>
-            </a:r>
-            <a:endParaRPr lang="en-US" sz="3400" dirty="0">
-              <a:latin typeface="Calibri"/>
-              <a:cs typeface="Calibri"/>
-            </a:endParaRPr>
-          </a:p>
-          <a:p>
-            <a:pPr marL="805180" lvl="1" indent="-360680">
-              <a:lnSpc>
-                <a:spcPct val="100000"/>
-              </a:lnSpc>
-              <a:spcBef>
-                <a:spcPts val="1400"/>
-              </a:spcBef>
-              <a:buFont typeface="Wingdings"/>
-              <a:buChar char=""/>
-              <a:tabLst>
-                <a:tab pos="805180" algn="l"/>
-                <a:tab pos="805815" algn="l"/>
-              </a:tabLst>
-            </a:pPr>
-            <a:r>
-              <a:rPr lang="bg-BG" sz="3200" spc="-15" dirty="0">
-                <a:solidFill>
-                  <a:srgbClr val="224464"/>
-                </a:solidFill>
-                <a:latin typeface="Calibri"/>
-                <a:cs typeface="Calibri"/>
-              </a:rPr>
-              <a:t>Вместо това</a:t>
-            </a:r>
-            <a:r>
-              <a:rPr lang="en-US" sz="3200" dirty="0">
-                <a:solidFill>
-                  <a:srgbClr val="224464"/>
-                </a:solidFill>
-                <a:latin typeface="Calibri"/>
-                <a:cs typeface="Calibri"/>
-              </a:rPr>
-              <a:t> </a:t>
-            </a:r>
-            <a:r>
-              <a:rPr lang="bg-BG" sz="3200" spc="-10" dirty="0">
-                <a:solidFill>
-                  <a:srgbClr val="224464"/>
-                </a:solidFill>
-                <a:latin typeface="Calibri"/>
-                <a:cs typeface="Calibri"/>
-              </a:rPr>
-              <a:t>използват </a:t>
-            </a:r>
-            <a:r>
-              <a:rPr lang="bg-BG" sz="3200" b="1" spc="-10" dirty="0">
-                <a:solidFill>
-                  <a:schemeClr val="bg1"/>
-                </a:solidFill>
-                <a:latin typeface="Calibri"/>
-                <a:cs typeface="Calibri"/>
-              </a:rPr>
-              <a:t>колекции от документи</a:t>
-            </a:r>
-            <a:r>
-              <a:rPr lang="bg-BG" sz="3200" b="1" spc="-10" dirty="0">
-                <a:solidFill>
-                  <a:srgbClr val="FF9F00"/>
-                </a:solidFill>
-                <a:latin typeface="Calibri"/>
-                <a:cs typeface="Calibri"/>
-              </a:rPr>
-              <a:t> </a:t>
-            </a:r>
-            <a:r>
-              <a:rPr lang="bg-BG" sz="3200" spc="-5" dirty="0">
-                <a:solidFill>
-                  <a:srgbClr val="224464"/>
-                </a:solidFill>
-                <a:latin typeface="Calibri"/>
-                <a:cs typeface="Calibri"/>
-              </a:rPr>
-              <a:t>или </a:t>
-            </a:r>
-            <a:r>
-              <a:rPr lang="bg-BG" sz="3200" b="1" spc="-25" dirty="0">
-                <a:solidFill>
-                  <a:schemeClr val="bg1"/>
-                </a:solidFill>
-                <a:latin typeface="Calibri"/>
-                <a:cs typeface="Calibri"/>
-              </a:rPr>
-              <a:t>двойки</a:t>
-            </a:r>
-            <a:r>
-              <a:rPr lang="bg-BG" sz="3200" b="1" spc="-25" dirty="0">
-                <a:solidFill>
-                  <a:srgbClr val="FF9F00"/>
-                </a:solidFill>
-                <a:latin typeface="Calibri"/>
-                <a:cs typeface="Calibri"/>
-              </a:rPr>
-              <a:t> </a:t>
-            </a:r>
-            <a:r>
-              <a:rPr lang="bg-BG" sz="3200" b="1" spc="-25" dirty="0">
-                <a:solidFill>
-                  <a:schemeClr val="bg1"/>
-                </a:solidFill>
-                <a:latin typeface="Calibri"/>
-                <a:cs typeface="Calibri"/>
-              </a:rPr>
-              <a:t>ключ-стойност</a:t>
-            </a:r>
-            <a:endParaRPr lang="en-US" sz="3200" dirty="0">
-              <a:solidFill>
-                <a:schemeClr val="bg1"/>
-              </a:solidFill>
-              <a:latin typeface="Calibri"/>
-              <a:cs typeface="Calibri"/>
-            </a:endParaRPr>
-          </a:p>
-          <a:p>
-            <a:pPr marL="372110" indent="-360045">
-              <a:lnSpc>
-                <a:spcPct val="100000"/>
-              </a:lnSpc>
-              <a:spcBef>
-                <a:spcPts val="1390"/>
-              </a:spcBef>
-              <a:buFont typeface="Wingdings"/>
-              <a:buChar char=""/>
-              <a:tabLst>
-                <a:tab pos="372745" algn="l"/>
-              </a:tabLst>
-            </a:pPr>
-            <a:r>
-              <a:rPr lang="bg-BG" sz="3600" dirty="0">
-                <a:solidFill>
-                  <a:schemeClr val="bg1"/>
-                </a:solidFill>
-              </a:rPr>
-              <a:t>По-</a:t>
-            </a:r>
-            <a:r>
-              <a:rPr lang="bg-BG" sz="3400" b="1" spc="-5" dirty="0">
-                <a:solidFill>
-                  <a:schemeClr val="bg1"/>
-                </a:solidFill>
-                <a:latin typeface="Calibri"/>
-                <a:cs typeface="Calibri"/>
-              </a:rPr>
-              <a:t>мащабируеми</a:t>
-            </a:r>
-            <a:r>
-              <a:rPr lang="bg-BG" sz="3400" b="1" spc="-5" dirty="0">
-                <a:solidFill>
-                  <a:srgbClr val="FF9F00"/>
-                </a:solidFill>
-                <a:latin typeface="Calibri"/>
-                <a:cs typeface="Calibri"/>
-              </a:rPr>
-              <a:t> </a:t>
-            </a:r>
-            <a:r>
-              <a:rPr lang="bg-BG" sz="3400" spc="5" dirty="0">
-                <a:solidFill>
-                  <a:srgbClr val="224464"/>
-                </a:solidFill>
-                <a:latin typeface="Calibri"/>
-                <a:cs typeface="Calibri"/>
-              </a:rPr>
-              <a:t>и с </a:t>
-            </a:r>
-            <a:r>
-              <a:rPr lang="bg-BG" sz="3400" b="1" dirty="0">
-                <a:solidFill>
-                  <a:schemeClr val="bg1"/>
-                </a:solidFill>
-                <a:latin typeface="Calibri"/>
-                <a:cs typeface="Calibri"/>
-              </a:rPr>
-              <a:t>висока производителност</a:t>
-            </a:r>
-            <a:endParaRPr lang="en-US" sz="3400" dirty="0">
-              <a:solidFill>
-                <a:schemeClr val="bg1"/>
-              </a:solidFill>
-              <a:latin typeface="Calibri"/>
-              <a:cs typeface="Calibri"/>
-            </a:endParaRPr>
-          </a:p>
-          <a:p>
-            <a:pPr marL="372110" indent="-360045">
-              <a:lnSpc>
-                <a:spcPct val="100000"/>
-              </a:lnSpc>
-              <a:spcBef>
-                <a:spcPts val="1415"/>
-              </a:spcBef>
-              <a:buFont typeface="Wingdings"/>
-              <a:buChar char=""/>
-              <a:tabLst>
-                <a:tab pos="372745" algn="l"/>
-              </a:tabLst>
-            </a:pPr>
-            <a:r>
-              <a:rPr lang="bg-BG" sz="3400" spc="-5" dirty="0">
-                <a:solidFill>
-                  <a:srgbClr val="224464"/>
-                </a:solidFill>
-                <a:latin typeface="Calibri"/>
-                <a:cs typeface="Calibri"/>
-              </a:rPr>
-              <a:t>Примери</a:t>
-            </a:r>
-            <a:r>
-              <a:rPr lang="en-US" sz="3400" spc="-5" dirty="0">
-                <a:solidFill>
-                  <a:srgbClr val="224464"/>
-                </a:solidFill>
-                <a:latin typeface="Calibri"/>
-                <a:cs typeface="Calibri"/>
-              </a:rPr>
-              <a:t>:</a:t>
-            </a:r>
-            <a:r>
-              <a:rPr lang="en-US" sz="3400" spc="-75" dirty="0">
-                <a:solidFill>
-                  <a:srgbClr val="224464"/>
-                </a:solidFill>
-                <a:latin typeface="Calibri"/>
-                <a:cs typeface="Calibri"/>
-              </a:rPr>
-              <a:t> </a:t>
-            </a:r>
-            <a:r>
-              <a:rPr lang="en-US" sz="3400" b="1" spc="-5" dirty="0">
-                <a:solidFill>
-                  <a:schemeClr val="bg1"/>
-                </a:solidFill>
-                <a:latin typeface="Calibri"/>
-                <a:cs typeface="Calibri"/>
-              </a:rPr>
-              <a:t>MongoDB</a:t>
-            </a:r>
-            <a:r>
-              <a:rPr lang="en-US" sz="3400" spc="-5" dirty="0">
-                <a:solidFill>
-                  <a:srgbClr val="224464"/>
-                </a:solidFill>
-                <a:latin typeface="Calibri"/>
-                <a:cs typeface="Calibri"/>
-              </a:rPr>
-              <a:t>,</a:t>
-            </a:r>
-            <a:r>
-              <a:rPr lang="en-US" sz="3400" spc="-55" dirty="0">
-                <a:solidFill>
-                  <a:srgbClr val="224464"/>
-                </a:solidFill>
-                <a:latin typeface="Calibri"/>
-                <a:cs typeface="Calibri"/>
-              </a:rPr>
-              <a:t> </a:t>
-            </a:r>
-            <a:r>
-              <a:rPr lang="en-US" sz="3400" b="1" spc="-10" dirty="0">
-                <a:solidFill>
-                  <a:schemeClr val="bg1"/>
-                </a:solidFill>
-                <a:latin typeface="Calibri"/>
-                <a:cs typeface="Calibri"/>
-              </a:rPr>
-              <a:t>Cassandra</a:t>
-            </a:r>
-            <a:r>
-              <a:rPr lang="en-US" sz="3400" spc="-10" dirty="0">
-                <a:solidFill>
-                  <a:srgbClr val="224464"/>
-                </a:solidFill>
-                <a:latin typeface="Calibri"/>
-                <a:cs typeface="Calibri"/>
-              </a:rPr>
-              <a:t>,</a:t>
-            </a:r>
-            <a:r>
-              <a:rPr lang="en-US" sz="3400" spc="-40" dirty="0">
-                <a:solidFill>
-                  <a:srgbClr val="224464"/>
-                </a:solidFill>
-                <a:latin typeface="Calibri"/>
-                <a:cs typeface="Calibri"/>
-              </a:rPr>
-              <a:t> </a:t>
-            </a:r>
-            <a:r>
-              <a:rPr lang="en-US" sz="3400" b="1" spc="-10" dirty="0">
-                <a:solidFill>
-                  <a:schemeClr val="bg1"/>
-                </a:solidFill>
-                <a:latin typeface="Calibri"/>
-                <a:cs typeface="Calibri"/>
-              </a:rPr>
-              <a:t>Redis</a:t>
-            </a:r>
-            <a:r>
-              <a:rPr lang="en-US" sz="3400" spc="-10" dirty="0">
-                <a:solidFill>
-                  <a:srgbClr val="224464"/>
-                </a:solidFill>
-                <a:latin typeface="Calibri"/>
-                <a:cs typeface="Calibri"/>
-              </a:rPr>
-              <a:t>,</a:t>
-            </a:r>
-            <a:r>
-              <a:rPr lang="en-US" sz="3400" spc="-35" dirty="0">
-                <a:solidFill>
-                  <a:srgbClr val="224464"/>
-                </a:solidFill>
-                <a:latin typeface="Calibri"/>
-                <a:cs typeface="Calibri"/>
-              </a:rPr>
-              <a:t> </a:t>
-            </a:r>
-            <a:r>
-              <a:rPr lang="en-US" sz="3400" spc="-15" dirty="0">
-                <a:solidFill>
-                  <a:srgbClr val="224464"/>
-                </a:solidFill>
-                <a:latin typeface="Calibri"/>
-                <a:cs typeface="Calibri"/>
-              </a:rPr>
-              <a:t>etc.</a:t>
-            </a:r>
-            <a:endParaRPr lang="en-US" sz="3400" dirty="0">
-              <a:latin typeface="Calibri"/>
-              <a:cs typeface="Calibri"/>
-            </a:endParaRPr>
-          </a:p>
-        </p:txBody>
-      </p:sp>
-      <p:sp>
-        <p:nvSpPr>
-          <p:cNvPr id="23" name="Rectangle 19">
-            <a:extLst>
-              <a:ext uri="{FF2B5EF4-FFF2-40B4-BE49-F238E27FC236}">
-                <a16:creationId xmlns:a16="http://schemas.microsoft.com/office/drawing/2014/main" id="{EF975B85-581B-A516-2BC0-D13E98F1E09B}"/>
-              </a:ext>
-            </a:extLst>
-          </p:cNvPr>
-          <p:cNvSpPr>
-            <a:spLocks noChangeArrowheads="1"/>
-          </p:cNvSpPr>
-          <p:nvPr/>
-        </p:nvSpPr>
-        <p:spPr bwMode="auto">
-          <a:xfrm>
-            <a:off x="609600" y="4441986"/>
-            <a:ext cx="9558654" cy="2246769"/>
-          </a:xfrm>
-          <a:prstGeom prst="rect">
-            <a:avLst/>
-          </a:prstGeom>
-          <a:solidFill>
-            <a:schemeClr val="bg2">
-              <a:lumMod val="85000"/>
-              <a:alpha val="20000"/>
-            </a:schemeClr>
-          </a:solidFill>
-          <a:ln w="12700">
-            <a:solidFill>
-              <a:schemeClr val="accent5">
-                <a:lumMod val="60000"/>
-                <a:lumOff val="40000"/>
-              </a:schemeClr>
-            </a:solidFill>
-          </a:ln>
-        </p:spPr>
-        <p:txBody>
-          <a:bodyPr wrap="square">
-            <a:spAutoFit/>
-          </a:bodyPr>
-          <a:lstStyle/>
-          <a:p>
-            <a:pPr marL="12700">
-              <a:lnSpc>
-                <a:spcPct val="100000"/>
-              </a:lnSpc>
-            </a:pPr>
-            <a:r>
-              <a:rPr lang="en-US" sz="2800" b="1" noProof="1">
-                <a:latin typeface="Consolas"/>
-                <a:cs typeface="Consolas"/>
-              </a:rPr>
-              <a:t>{</a:t>
-            </a:r>
-          </a:p>
-          <a:p>
-            <a:pPr marL="12700">
-              <a:lnSpc>
-                <a:spcPct val="100000"/>
-              </a:lnSpc>
-            </a:pPr>
-            <a:r>
-              <a:rPr lang="en-US" sz="2800" b="1" noProof="1">
-                <a:latin typeface="Consolas"/>
-                <a:cs typeface="Consolas"/>
-              </a:rPr>
-              <a:t>  "</a:t>
-            </a:r>
-            <a:r>
-              <a:rPr lang="en-US" sz="2800" b="1" noProof="1">
-                <a:solidFill>
-                  <a:schemeClr val="bg1"/>
-                </a:solidFill>
-                <a:latin typeface="Consolas"/>
-                <a:cs typeface="Consolas"/>
-              </a:rPr>
-              <a:t>_id</a:t>
-            </a:r>
-            <a:r>
-              <a:rPr lang="en-US" sz="2800" b="1" noProof="1">
-                <a:latin typeface="Consolas"/>
-                <a:cs typeface="Consolas"/>
-              </a:rPr>
-              <a:t>": </a:t>
-            </a:r>
-            <a:r>
-              <a:rPr lang="en-US" sz="2800" b="1" noProof="1">
-                <a:solidFill>
-                  <a:schemeClr val="bg1"/>
-                </a:solidFill>
-                <a:latin typeface="Consolas"/>
-                <a:cs typeface="Consolas"/>
-              </a:rPr>
-              <a:t>ObjectId</a:t>
-            </a:r>
-            <a:r>
-              <a:rPr lang="en-US" sz="2800" b="1" noProof="1">
-                <a:latin typeface="Consolas"/>
-                <a:cs typeface="Consolas"/>
-              </a:rPr>
-              <a:t>("59d3fe7ed81452db0933a871"),</a:t>
-            </a:r>
-          </a:p>
-          <a:p>
-            <a:pPr marL="12700">
-              <a:lnSpc>
-                <a:spcPct val="100000"/>
-              </a:lnSpc>
-            </a:pPr>
-            <a:r>
-              <a:rPr lang="en-US" sz="2800" b="1" noProof="1">
-                <a:latin typeface="Consolas"/>
-                <a:cs typeface="Consolas"/>
-              </a:rPr>
-              <a:t>  "</a:t>
-            </a:r>
-            <a:r>
-              <a:rPr lang="en-US" sz="2800" b="1" noProof="1">
-                <a:solidFill>
-                  <a:schemeClr val="bg1"/>
-                </a:solidFill>
-                <a:latin typeface="Consolas"/>
-                <a:cs typeface="Consolas"/>
-              </a:rPr>
-              <a:t>email</a:t>
-            </a:r>
-            <a:r>
-              <a:rPr lang="en-US" sz="2800" b="1" noProof="1">
-                <a:latin typeface="Consolas"/>
-                <a:cs typeface="Consolas"/>
-              </a:rPr>
-              <a:t>": "peter@gmail.com",</a:t>
-            </a:r>
-          </a:p>
-          <a:p>
-            <a:pPr marL="12700">
-              <a:lnSpc>
-                <a:spcPct val="100000"/>
-              </a:lnSpc>
-            </a:pPr>
-            <a:r>
-              <a:rPr lang="en-US" sz="2800" b="1" noProof="1">
-                <a:latin typeface="Consolas"/>
-                <a:cs typeface="Consolas"/>
-              </a:rPr>
-              <a:t>  "</a:t>
-            </a:r>
-            <a:r>
-              <a:rPr lang="en-US" sz="2800" b="1" noProof="1">
-                <a:solidFill>
-                  <a:schemeClr val="bg1"/>
-                </a:solidFill>
-                <a:latin typeface="Consolas"/>
-                <a:cs typeface="Consolas"/>
-              </a:rPr>
-              <a:t>age</a:t>
-            </a:r>
-            <a:r>
-              <a:rPr lang="en-US" sz="2800" b="1" noProof="1">
-                <a:latin typeface="Consolas"/>
-                <a:cs typeface="Consolas"/>
-              </a:rPr>
-              <a:t>": 22</a:t>
-            </a:r>
-          </a:p>
-          <a:p>
-            <a:pPr marL="12700">
-              <a:lnSpc>
-                <a:spcPct val="100000"/>
-              </a:lnSpc>
-            </a:pPr>
-            <a:r>
-              <a:rPr lang="en-US" sz="2800" b="1" noProof="1">
-                <a:latin typeface="Consolas"/>
-                <a:cs typeface="Consolas"/>
-              </a:rPr>
-              <a:t>}</a:t>
-            </a:r>
-          </a:p>
-        </p:txBody>
-      </p:sp>
-      <p:sp>
-        <p:nvSpPr>
-          <p:cNvPr id="19" name="AutoShape 7">
-            <a:extLst>
-              <a:ext uri="{FF2B5EF4-FFF2-40B4-BE49-F238E27FC236}">
-                <a16:creationId xmlns:a16="http://schemas.microsoft.com/office/drawing/2014/main" id="{C34A2E56-F2E7-AC46-5CE9-793C12729AC0}"/>
-              </a:ext>
-            </a:extLst>
-          </p:cNvPr>
-          <p:cNvSpPr>
-            <a:spLocks noChangeArrowheads="1"/>
-          </p:cNvSpPr>
-          <p:nvPr/>
-        </p:nvSpPr>
-        <p:spPr bwMode="auto">
-          <a:xfrm>
-            <a:off x="8077200" y="5638800"/>
-            <a:ext cx="3880757" cy="1120487"/>
-          </a:xfrm>
-          <a:prstGeom prst="wedgeRoundRectCallout">
-            <a:avLst>
-              <a:gd name="adj1" fmla="val -56372"/>
-              <a:gd name="adj2" fmla="val -35249"/>
-              <a:gd name="adj3" fmla="val 16667"/>
-            </a:avLst>
-          </a:prstGeom>
-          <a:solidFill>
-            <a:schemeClr val="dk2">
-              <a:alpha val="80000"/>
-            </a:schemeClr>
-          </a:solidFill>
-          <a:ln w="19050">
-            <a:solidFill>
-              <a:schemeClr val="tx1">
-                <a:lumMod val="75000"/>
-                <a:alpha val="80000"/>
-              </a:schemeClr>
-            </a:solidFill>
-          </a:ln>
-          <a:effectLst/>
-        </p:spPr>
-        <p:style>
-          <a:lnRef idx="2">
-            <a:schemeClr val="accent1">
-              <a:shade val="50000"/>
-            </a:schemeClr>
-          </a:lnRef>
-          <a:fillRef idx="1001">
-            <a:schemeClr val="dk2"/>
-          </a:fillRef>
-          <a:effectRef idx="0">
-            <a:schemeClr val="accent1"/>
-          </a:effectRef>
-          <a:fontRef idx="minor">
-            <a:schemeClr val="lt1"/>
-          </a:fontRef>
-        </p:style>
-        <p:txBody>
-          <a:bodyPr rot="0" spcFirstLastPara="0" vertOverflow="overflow" horzOverflow="overflow" vert="horz" wrap="square" lIns="91416" tIns="45708" rIns="91416" bIns="45708" numCol="1" spcCol="0" rtlCol="0" fromWordArt="0" anchor="ctr" anchorCtr="0" forceAA="0" compatLnSpc="1">
-            <a:prstTxWarp prst="textNoShape">
-              <a:avLst/>
-            </a:prstTxWarp>
-            <a:noAutofit/>
-          </a:bodyPr>
-          <a:lstStyle/>
-          <a:p>
-            <a:pPr algn="ctr"/>
-            <a:r>
-              <a:rPr lang="bg-BG" sz="2800" b="1" noProof="1">
-                <a:solidFill>
-                  <a:srgbClr val="FFFFFF"/>
-                </a:solidFill>
-              </a:rPr>
-              <a:t>Пример за </a:t>
-            </a:r>
-            <a:r>
-              <a:rPr lang="en-US" sz="2800" b="1" noProof="1">
-                <a:solidFill>
-                  <a:srgbClr val="FFFFFF"/>
-                </a:solidFill>
-              </a:rPr>
-              <a:t>JSON </a:t>
-            </a:r>
-            <a:r>
-              <a:rPr lang="bg-BG" sz="2800" b="1" noProof="1">
-                <a:solidFill>
-                  <a:srgbClr val="FFFFFF"/>
-                </a:solidFill>
-              </a:rPr>
-              <a:t>документ в </a:t>
-            </a:r>
-            <a:r>
-              <a:rPr lang="en-US" sz="2800" b="1" noProof="1">
-                <a:solidFill>
-                  <a:srgbClr val="FFFFFF"/>
-                </a:solidFill>
-              </a:rPr>
-              <a:t>MongoDB</a:t>
-            </a:r>
-          </a:p>
-        </p:txBody>
-      </p:sp>
-      <p:sp>
-        <p:nvSpPr>
-          <p:cNvPr id="24" name="object 15">
-            <a:extLst>
-              <a:ext uri="{FF2B5EF4-FFF2-40B4-BE49-F238E27FC236}">
-                <a16:creationId xmlns:a16="http://schemas.microsoft.com/office/drawing/2014/main" id="{F23F4A49-E31B-C517-27D9-8A20DD1D6553}"/>
-              </a:ext>
-            </a:extLst>
-          </p:cNvPr>
-          <p:cNvSpPr txBox="1"/>
-          <p:nvPr/>
-        </p:nvSpPr>
-        <p:spPr>
-          <a:xfrm>
-            <a:off x="11925300" y="6618223"/>
-            <a:ext cx="233680" cy="141064"/>
-          </a:xfrm>
-          <a:prstGeom prst="rect">
-            <a:avLst/>
-          </a:prstGeom>
-        </p:spPr>
-        <p:txBody>
-          <a:bodyPr vert="horz" wrap="square" lIns="0" tIns="0" rIns="0" bIns="0" rtlCol="0">
-            <a:spAutoFit/>
-          </a:bodyPr>
-          <a:lstStyle/>
-          <a:p>
-            <a:pPr marL="40640">
-              <a:lnSpc>
-                <a:spcPts val="1065"/>
-              </a:lnSpc>
-            </a:pPr>
-            <a:fld id="{81D60167-4931-47E6-BA6A-407CBD079E47}" type="slidenum">
-              <a:rPr sz="1000" smtClean="0">
-                <a:solidFill>
-                  <a:srgbClr val="224464"/>
-                </a:solidFill>
-                <a:latin typeface="Calibri"/>
-                <a:cs typeface="Calibri"/>
-              </a:rPr>
-              <a:pPr marL="40640">
-                <a:lnSpc>
-                  <a:spcPts val="1065"/>
-                </a:lnSpc>
-              </a:pPr>
-              <a:t>19</a:t>
-            </a:fld>
-            <a:endParaRPr sz="1000" dirty="0">
-              <a:latin typeface="Calibri"/>
-              <a:cs typeface="Calibri"/>
-            </a:endParaRPr>
-          </a:p>
-        </p:txBody>
-      </p:sp>
-      <p:sp>
-        <p:nvSpPr>
-          <p:cNvPr id="2" name="Slide Number">
-            <a:extLst>
-              <a:ext uri="{FF2B5EF4-FFF2-40B4-BE49-F238E27FC236}">
-                <a16:creationId xmlns:a16="http://schemas.microsoft.com/office/drawing/2014/main" id="{E9FF8973-211C-838A-CB0C-880AFDBB7285}"/>
-              </a:ext>
-            </a:extLst>
-          </p:cNvPr>
-          <p:cNvSpPr>
-            <a:spLocks noGrp="1"/>
-          </p:cNvSpPr>
-          <p:nvPr>
-            <p:ph type="sldNum" sz="quarter" idx="5"/>
-          </p:nvPr>
-        </p:nvSpPr>
-        <p:spPr>
-          <a:xfrm>
-            <a:off x="11753030" y="6507000"/>
-            <a:ext cx="367414" cy="297000"/>
-          </a:xfrm>
-          <a:prstGeom prst="rect">
-            <a:avLst/>
-          </a:prstGeom>
-        </p:spPr>
-        <p:txBody>
-          <a:bodyPr vert="horz" lIns="91440" tIns="45720" rIns="91440" bIns="45720" rtlCol="0" anchor="b"/>
-          <a:lstStyle>
-            <a:lvl1pPr algn="r">
-              <a:defRPr sz="1000"/>
-            </a:lvl1pPr>
-          </a:lstStyle>
-          <a:p>
-            <a:fld id="{2BF067CD-8E6B-4360-9AA8-C5DF2A48A6D1}" type="slidenum">
-              <a:rPr lang="en-US" noProof="0" smtClean="0"/>
-              <a:pPr/>
-              <a:t>19</a:t>
-            </a:fld>
-            <a:endParaRPr lang="en-US" noProof="0" dirty="0"/>
-          </a:p>
-        </p:txBody>
-      </p:sp>
-    </p:spTree>
-    <p:extLst>
-      <p:ext uri="{BB962C8B-B14F-4D97-AF65-F5344CB8AC3E}">
-        <p14:creationId xmlns:p14="http://schemas.microsoft.com/office/powerpoint/2010/main" val="309645025"/>
-      </p:ext>
-    </p:extLst>
-  </p:cSld>
-  <p:clrMapOvr>
-    <a:masterClrMapping/>
-  </p:clrMapOvr>
-  <mc:AlternateContent xmlns:mc="http://schemas.openxmlformats.org/markup-compatibility/2006" xmlns:p14="http://schemas.microsoft.com/office/powerpoint/2010/main">
-    <mc:Choice Requires="p14">
-      <p:transition spd="slow" p14:dur="2000" advClick="0" advTm="5000"/>
-    </mc:Choice>
-    <mc:Fallback xmlns="">
-      <p:transition spd="slow" advClick="0" advTm="5000"/>
-    </mc:Fallback>
-  </mc:AlternateContent>
-  <p:timing>
-    <p:tnLst>
-      <p:par>
-        <p:cTn id="1" dur="indefinite" restart="never" nodeType="tmRoot">
-          <p:childTnLst>
-            <p:seq concurrent="1" nextAc="seek">
-              <p:cTn id="2" dur="indefinite" nodeType="mainSeq">
-                <p:childTnLst>
-                  <p:par>
-                    <p:cTn id="3" fill="hold">
-                      <p:stCondLst>
-                        <p:cond delay="indefinite"/>
-                      </p:stCondLst>
-                      <p:childTnLst>
-                        <p:par>
-                          <p:cTn id="4" fill="hold">
-                            <p:stCondLst>
-                              <p:cond delay="0"/>
-                            </p:stCondLst>
-                            <p:childTnLst>
-                              <p:par>
-                                <p:cTn id="5" presetID="1" presetClass="entr" presetSubtype="0" fill="hold" nodeType="clickEffect">
-                                  <p:stCondLst>
-                                    <p:cond delay="0"/>
-                                  </p:stCondLst>
-                                  <p:childTnLst>
-                                    <p:set>
-                                      <p:cBhvr>
-                                        <p:cTn id="6" dur="1" fill="hold">
-                                          <p:stCondLst>
-                                            <p:cond delay="0"/>
-                                          </p:stCondLst>
-                                        </p:cTn>
-                                        <p:tgtEl>
-                                          <p:spTgt spid="10">
-                                            <p:txEl>
-                                              <p:pRg st="2" end="2"/>
-                                            </p:txEl>
-                                          </p:spTgt>
-                                        </p:tgtEl>
-                                        <p:attrNameLst>
-                                          <p:attrName>style.visibility</p:attrName>
-                                        </p:attrNameLst>
-                                      </p:cBhvr>
-                                      <p:to>
-                                        <p:strVal val="visible"/>
-                                      </p:to>
-                                    </p:set>
-                                  </p:childTnLst>
-                                </p:cTn>
-                              </p:par>
-                            </p:childTnLst>
-                          </p:cTn>
-                        </p:par>
-                      </p:childTnLst>
-                    </p:cTn>
-                  </p:par>
-                  <p:par>
-                    <p:cTn id="7" fill="hold">
-                      <p:stCondLst>
-                        <p:cond delay="indefinite"/>
-                      </p:stCondLst>
-                      <p:childTnLst>
-                        <p:par>
-                          <p:cTn id="8" fill="hold">
-                            <p:stCondLst>
-                              <p:cond delay="0"/>
-                            </p:stCondLst>
-                            <p:childTnLst>
-                              <p:par>
-                                <p:cTn id="9" presetID="1" presetClass="entr" presetSubtype="0" fill="hold" nodeType="clickEffect">
-                                  <p:stCondLst>
-                                    <p:cond delay="0"/>
-                                  </p:stCondLst>
-                                  <p:childTnLst>
-                                    <p:set>
-                                      <p:cBhvr>
-                                        <p:cTn id="10" dur="1" fill="hold">
-                                          <p:stCondLst>
-                                            <p:cond delay="0"/>
-                                          </p:stCondLst>
-                                        </p:cTn>
-                                        <p:tgtEl>
-                                          <p:spTgt spid="10">
-                                            <p:txEl>
-                                              <p:pRg st="3" end="3"/>
-                                            </p:txEl>
-                                          </p:spTgt>
-                                        </p:tgtEl>
-                                        <p:attrNameLst>
-                                          <p:attrName>style.visibility</p:attrName>
-                                        </p:attrNameLst>
-                                      </p:cBhvr>
-                                      <p:to>
-                                        <p:strVal val="visible"/>
-                                      </p:to>
-                                    </p:set>
-                                  </p:childTnLst>
-                                </p:cTn>
-                              </p:par>
-                            </p:childTnLst>
-                          </p:cTn>
-                        </p:par>
-                      </p:childTnLst>
-                    </p:cTn>
-                  </p:par>
-                  <p:par>
-                    <p:cTn id="11" fill="hold">
-                      <p:stCondLst>
-                        <p:cond delay="indefinite"/>
-                      </p:stCondLst>
-                      <p:childTnLst>
-                        <p:par>
-                          <p:cTn id="12" fill="hold">
-                            <p:stCondLst>
-                              <p:cond delay="0"/>
-                            </p:stCondLst>
-                            <p:childTnLst>
-                              <p:par>
-                                <p:cTn id="13" presetID="1" presetClass="entr" presetSubtype="0" fill="hold" grpId="0" nodeType="clickEffect">
-                                  <p:stCondLst>
-                                    <p:cond delay="0"/>
-                                  </p:stCondLst>
-                                  <p:childTnLst>
-                                    <p:set>
-                                      <p:cBhvr>
-                                        <p:cTn id="14" dur="1" fill="hold">
-                                          <p:stCondLst>
-                                            <p:cond delay="0"/>
-                                          </p:stCondLst>
-                                        </p:cTn>
-                                        <p:tgtEl>
-                                          <p:spTgt spid="23"/>
-                                        </p:tgtEl>
-                                        <p:attrNameLst>
-                                          <p:attrName>style.visibility</p:attrName>
-                                        </p:attrNameLst>
-                                      </p:cBhvr>
-                                      <p:to>
-                                        <p:strVal val="visible"/>
-                                      </p:to>
-                                    </p:set>
-                                  </p:childTnLst>
-                                </p:cTn>
-                              </p:par>
-                              <p:par>
-                                <p:cTn id="15" presetID="1" presetClass="entr" presetSubtype="0" fill="hold" grpId="0" nodeType="withEffect">
-                                  <p:stCondLst>
-                                    <p:cond delay="0"/>
-                                  </p:stCondLst>
-                                  <p:childTnLst>
-                                    <p:set>
-                                      <p:cBhvr>
-                                        <p:cTn id="16" dur="1" fill="hold">
-                                          <p:stCondLst>
-                                            <p:cond delay="0"/>
-                                          </p:stCondLst>
-                                        </p:cTn>
-                                        <p:tgtEl>
-                                          <p:spTgt spid="19"/>
-                                        </p:tgtEl>
-                                        <p:attrNameLst>
-                                          <p:attrName>style.visibility</p:attrName>
-                                        </p:attrNameLst>
-                                      </p:cBhvr>
-                                      <p:to>
-                                        <p:strVal val="visible"/>
-                                      </p:to>
-                                    </p:set>
-                                  </p:childTnLst>
-                                </p:cTn>
-                              </p:par>
-                            </p:childTnLst>
-                          </p:cTn>
-                        </p:par>
-                      </p:childTnLst>
-                    </p:cTn>
-                  </p:par>
-                </p:childTnLst>
-              </p:cTn>
-              <p:prevCondLst>
-                <p:cond evt="onPrev" delay="0">
-                  <p:tgtEl>
-                    <p:sldTgt/>
-                  </p:tgtEl>
-                </p:cond>
-              </p:prevCondLst>
-              <p:nextCondLst>
-                <p:cond evt="onNext" delay="0">
-                  <p:tgtEl>
-                    <p:sldTgt/>
-                  </p:tgtEl>
-                </p:cond>
-              </p:nextCondLst>
-            </p:seq>
-          </p:childTnLst>
-        </p:cTn>
-      </p:par>
-    </p:tnLst>
-    <p:bldLst>
-      <p:bldP spid="23" grpId="0" animBg="1"/>
-      <p:bldP spid="19" grpId="0" animBg="1"/>
-    </p:bldLst>
-  </p:timing>
-</p:sld>
-</file>
-
 <file path=ppt/slides/slide2.xml><?xml version="1.0" encoding="utf-8"?>
 <p:sld xmlns:a="http://schemas.openxmlformats.org/drawingml/2006/main" xmlns:r="http://schemas.openxmlformats.org/officeDocument/2006/relationships" xmlns:p="http://schemas.openxmlformats.org/presentationml/2006/main">
   <p:cSld>
@@ -20526,6 +19928,1125 @@
           <a:chExt cx="0" cy="0"/>
         </a:xfrm>
       </p:grpSpPr>
+      <p:sp>
+        <p:nvSpPr>
+          <p:cNvPr id="6" name="object 6"/>
+          <p:cNvSpPr txBox="1">
+            <a:spLocks noGrp="1"/>
+          </p:cNvSpPr>
+          <p:nvPr>
+            <p:ph type="title"/>
+          </p:nvPr>
+        </p:nvSpPr>
+        <p:spPr>
+          <a:xfrm>
+            <a:off x="190406" y="227247"/>
+            <a:ext cx="9715594" cy="629660"/>
+          </a:xfrm>
+          <a:prstGeom prst="rect">
+            <a:avLst/>
+          </a:prstGeom>
+        </p:spPr>
+        <p:txBody>
+          <a:bodyPr vert="horz" wrap="square" lIns="0" tIns="13970" rIns="0" bIns="0" rtlCol="0">
+            <a:spAutoFit/>
+          </a:bodyPr>
+          <a:lstStyle/>
+          <a:p>
+            <a:pPr marL="12700">
+              <a:lnSpc>
+                <a:spcPct val="100000"/>
+              </a:lnSpc>
+              <a:spcBef>
+                <a:spcPts val="110"/>
+              </a:spcBef>
+            </a:pPr>
+            <a:r>
+              <a:rPr sz="4000" spc="5" dirty="0">
+                <a:solidFill>
+                  <a:srgbClr val="FFFFFF"/>
+                </a:solidFill>
+              </a:rPr>
+              <a:t>NoSQL</a:t>
+            </a:r>
+            <a:r>
+              <a:rPr sz="4000" spc="-105" dirty="0">
+                <a:solidFill>
+                  <a:srgbClr val="FFFFFF"/>
+                </a:solidFill>
+              </a:rPr>
+              <a:t> </a:t>
+            </a:r>
+            <a:r>
+              <a:rPr lang="bg-BG" sz="4000" spc="-15" dirty="0">
+                <a:solidFill>
+                  <a:srgbClr val="FFFFFF"/>
+                </a:solidFill>
+              </a:rPr>
+              <a:t>бази данни</a:t>
+            </a:r>
+            <a:endParaRPr sz="4000" dirty="0"/>
+          </a:p>
+        </p:txBody>
+      </p:sp>
+      <p:sp>
+        <p:nvSpPr>
+          <p:cNvPr id="10" name="object 10"/>
+          <p:cNvSpPr txBox="1"/>
+          <p:nvPr/>
+        </p:nvSpPr>
+        <p:spPr>
+          <a:xfrm>
+            <a:off x="285699" y="1004956"/>
+            <a:ext cx="11672258" cy="3299621"/>
+          </a:xfrm>
+          <a:prstGeom prst="rect">
+            <a:avLst/>
+          </a:prstGeom>
+        </p:spPr>
+        <p:txBody>
+          <a:bodyPr vert="horz" wrap="square" lIns="0" tIns="204470" rIns="0" bIns="0" rtlCol="0">
+            <a:spAutoFit/>
+          </a:bodyPr>
+          <a:lstStyle/>
+          <a:p>
+            <a:pPr marL="372110" indent="-360045">
+              <a:lnSpc>
+                <a:spcPct val="100000"/>
+              </a:lnSpc>
+              <a:spcBef>
+                <a:spcPts val="1610"/>
+              </a:spcBef>
+              <a:buClr>
+                <a:srgbClr val="224464"/>
+              </a:buClr>
+              <a:buFont typeface="Wingdings"/>
+              <a:buChar char=""/>
+              <a:tabLst>
+                <a:tab pos="372745" algn="l"/>
+              </a:tabLst>
+            </a:pPr>
+            <a:r>
+              <a:rPr lang="en-US" sz="3400" b="1" dirty="0">
+                <a:solidFill>
+                  <a:schemeClr val="bg1"/>
+                </a:solidFill>
+                <a:latin typeface="Calibri"/>
+                <a:cs typeface="Calibri"/>
+              </a:rPr>
+              <a:t>NoSQL</a:t>
+            </a:r>
+            <a:r>
+              <a:rPr lang="en-US" sz="3400" b="1" spc="-65" dirty="0">
+                <a:solidFill>
+                  <a:schemeClr val="bg1"/>
+                </a:solidFill>
+                <a:latin typeface="Calibri"/>
+                <a:cs typeface="Calibri"/>
+              </a:rPr>
+              <a:t> </a:t>
+            </a:r>
+            <a:r>
+              <a:rPr lang="bg-BG" sz="3400" b="1" spc="-5" dirty="0">
+                <a:solidFill>
+                  <a:schemeClr val="bg1"/>
+                </a:solidFill>
+                <a:latin typeface="Calibri"/>
+                <a:cs typeface="Calibri"/>
+              </a:rPr>
+              <a:t>бази данни</a:t>
+            </a:r>
+            <a:r>
+              <a:rPr lang="bg-BG" sz="3400" b="1" spc="-5" dirty="0">
+                <a:solidFill>
+                  <a:srgbClr val="FF9F00"/>
+                </a:solidFill>
+                <a:latin typeface="Calibri"/>
+                <a:cs typeface="Calibri"/>
+              </a:rPr>
+              <a:t> </a:t>
+            </a:r>
+            <a:r>
+              <a:rPr lang="bg-BG" sz="3400" dirty="0">
+                <a:solidFill>
+                  <a:srgbClr val="224464"/>
+                </a:solidFill>
+                <a:latin typeface="Calibri"/>
+                <a:cs typeface="Calibri"/>
+              </a:rPr>
+              <a:t>не използват таблици и </a:t>
+            </a:r>
+            <a:r>
+              <a:rPr lang="en-US" sz="3400" dirty="0">
+                <a:solidFill>
+                  <a:srgbClr val="224464"/>
+                </a:solidFill>
+                <a:latin typeface="Calibri"/>
+                <a:cs typeface="Calibri"/>
+              </a:rPr>
+              <a:t>SQL</a:t>
+            </a:r>
+            <a:endParaRPr lang="en-US" sz="3400" dirty="0">
+              <a:latin typeface="Calibri"/>
+              <a:cs typeface="Calibri"/>
+            </a:endParaRPr>
+          </a:p>
+          <a:p>
+            <a:pPr marL="805180" lvl="1" indent="-360680">
+              <a:lnSpc>
+                <a:spcPct val="100000"/>
+              </a:lnSpc>
+              <a:spcBef>
+                <a:spcPts val="1400"/>
+              </a:spcBef>
+              <a:buFont typeface="Wingdings"/>
+              <a:buChar char=""/>
+              <a:tabLst>
+                <a:tab pos="805180" algn="l"/>
+                <a:tab pos="805815" algn="l"/>
+              </a:tabLst>
+            </a:pPr>
+            <a:r>
+              <a:rPr lang="bg-BG" sz="3200" spc="-15" dirty="0">
+                <a:solidFill>
+                  <a:srgbClr val="224464"/>
+                </a:solidFill>
+                <a:latin typeface="Calibri"/>
+                <a:cs typeface="Calibri"/>
+              </a:rPr>
+              <a:t>Вместо това</a:t>
+            </a:r>
+            <a:r>
+              <a:rPr lang="en-US" sz="3200" dirty="0">
+                <a:solidFill>
+                  <a:srgbClr val="224464"/>
+                </a:solidFill>
+                <a:latin typeface="Calibri"/>
+                <a:cs typeface="Calibri"/>
+              </a:rPr>
+              <a:t> </a:t>
+            </a:r>
+            <a:r>
+              <a:rPr lang="bg-BG" sz="3200" spc="-10" dirty="0">
+                <a:solidFill>
+                  <a:srgbClr val="224464"/>
+                </a:solidFill>
+                <a:latin typeface="Calibri"/>
+                <a:cs typeface="Calibri"/>
+              </a:rPr>
+              <a:t>използват </a:t>
+            </a:r>
+            <a:r>
+              <a:rPr lang="bg-BG" sz="3200" b="1" spc="-10" dirty="0">
+                <a:solidFill>
+                  <a:schemeClr val="bg1"/>
+                </a:solidFill>
+                <a:latin typeface="Calibri"/>
+                <a:cs typeface="Calibri"/>
+              </a:rPr>
+              <a:t>колекции от документи</a:t>
+            </a:r>
+            <a:r>
+              <a:rPr lang="bg-BG" sz="3200" b="1" spc="-10" dirty="0">
+                <a:solidFill>
+                  <a:srgbClr val="FF9F00"/>
+                </a:solidFill>
+                <a:latin typeface="Calibri"/>
+                <a:cs typeface="Calibri"/>
+              </a:rPr>
+              <a:t> </a:t>
+            </a:r>
+            <a:r>
+              <a:rPr lang="bg-BG" sz="3200" spc="-5" dirty="0">
+                <a:solidFill>
+                  <a:srgbClr val="224464"/>
+                </a:solidFill>
+                <a:latin typeface="Calibri"/>
+                <a:cs typeface="Calibri"/>
+              </a:rPr>
+              <a:t>или </a:t>
+            </a:r>
+            <a:r>
+              <a:rPr lang="bg-BG" sz="3200" b="1" spc="-25" dirty="0">
+                <a:solidFill>
+                  <a:schemeClr val="bg1"/>
+                </a:solidFill>
+                <a:latin typeface="Calibri"/>
+                <a:cs typeface="Calibri"/>
+              </a:rPr>
+              <a:t>двойки</a:t>
+            </a:r>
+            <a:r>
+              <a:rPr lang="bg-BG" sz="3200" b="1" spc="-25" dirty="0">
+                <a:solidFill>
+                  <a:srgbClr val="FF9F00"/>
+                </a:solidFill>
+                <a:latin typeface="Calibri"/>
+                <a:cs typeface="Calibri"/>
+              </a:rPr>
+              <a:t> </a:t>
+            </a:r>
+            <a:r>
+              <a:rPr lang="bg-BG" sz="3200" b="1" spc="-25" dirty="0">
+                <a:solidFill>
+                  <a:schemeClr val="bg1"/>
+                </a:solidFill>
+                <a:latin typeface="Calibri"/>
+                <a:cs typeface="Calibri"/>
+              </a:rPr>
+              <a:t>ключ-стойност</a:t>
+            </a:r>
+            <a:endParaRPr lang="en-US" sz="3200" dirty="0">
+              <a:solidFill>
+                <a:schemeClr val="bg1"/>
+              </a:solidFill>
+              <a:latin typeface="Calibri"/>
+              <a:cs typeface="Calibri"/>
+            </a:endParaRPr>
+          </a:p>
+          <a:p>
+            <a:pPr marL="372110" indent="-360045">
+              <a:lnSpc>
+                <a:spcPct val="100000"/>
+              </a:lnSpc>
+              <a:spcBef>
+                <a:spcPts val="1390"/>
+              </a:spcBef>
+              <a:buFont typeface="Wingdings"/>
+              <a:buChar char=""/>
+              <a:tabLst>
+                <a:tab pos="372745" algn="l"/>
+              </a:tabLst>
+            </a:pPr>
+            <a:r>
+              <a:rPr lang="bg-BG" sz="3600" dirty="0">
+                <a:solidFill>
+                  <a:schemeClr val="bg1"/>
+                </a:solidFill>
+              </a:rPr>
+              <a:t>По-</a:t>
+            </a:r>
+            <a:r>
+              <a:rPr lang="bg-BG" sz="3400" b="1" spc="-5" dirty="0">
+                <a:solidFill>
+                  <a:schemeClr val="bg1"/>
+                </a:solidFill>
+                <a:latin typeface="Calibri"/>
+                <a:cs typeface="Calibri"/>
+              </a:rPr>
+              <a:t>мащабируеми</a:t>
+            </a:r>
+            <a:r>
+              <a:rPr lang="bg-BG" sz="3400" b="1" spc="-5" dirty="0">
+                <a:solidFill>
+                  <a:srgbClr val="FF9F00"/>
+                </a:solidFill>
+                <a:latin typeface="Calibri"/>
+                <a:cs typeface="Calibri"/>
+              </a:rPr>
+              <a:t> </a:t>
+            </a:r>
+            <a:r>
+              <a:rPr lang="bg-BG" sz="3400" spc="5" dirty="0">
+                <a:solidFill>
+                  <a:srgbClr val="224464"/>
+                </a:solidFill>
+                <a:latin typeface="Calibri"/>
+                <a:cs typeface="Calibri"/>
+              </a:rPr>
+              <a:t>и с </a:t>
+            </a:r>
+            <a:r>
+              <a:rPr lang="bg-BG" sz="3400" b="1" dirty="0">
+                <a:solidFill>
+                  <a:schemeClr val="bg1"/>
+                </a:solidFill>
+                <a:latin typeface="Calibri"/>
+                <a:cs typeface="Calibri"/>
+              </a:rPr>
+              <a:t>висока производителност</a:t>
+            </a:r>
+            <a:endParaRPr lang="en-US" sz="3400" dirty="0">
+              <a:solidFill>
+                <a:schemeClr val="bg1"/>
+              </a:solidFill>
+              <a:latin typeface="Calibri"/>
+              <a:cs typeface="Calibri"/>
+            </a:endParaRPr>
+          </a:p>
+          <a:p>
+            <a:pPr marL="372110" indent="-360045">
+              <a:lnSpc>
+                <a:spcPct val="100000"/>
+              </a:lnSpc>
+              <a:spcBef>
+                <a:spcPts val="1415"/>
+              </a:spcBef>
+              <a:buFont typeface="Wingdings"/>
+              <a:buChar char=""/>
+              <a:tabLst>
+                <a:tab pos="372745" algn="l"/>
+              </a:tabLst>
+            </a:pPr>
+            <a:r>
+              <a:rPr lang="bg-BG" sz="3400" spc="-5" dirty="0">
+                <a:solidFill>
+                  <a:srgbClr val="224464"/>
+                </a:solidFill>
+                <a:latin typeface="Calibri"/>
+                <a:cs typeface="Calibri"/>
+              </a:rPr>
+              <a:t>Примери</a:t>
+            </a:r>
+            <a:r>
+              <a:rPr lang="en-US" sz="3400" spc="-5" dirty="0">
+                <a:solidFill>
+                  <a:srgbClr val="224464"/>
+                </a:solidFill>
+                <a:latin typeface="Calibri"/>
+                <a:cs typeface="Calibri"/>
+              </a:rPr>
+              <a:t>:</a:t>
+            </a:r>
+            <a:r>
+              <a:rPr lang="en-US" sz="3400" spc="-75" dirty="0">
+                <a:solidFill>
+                  <a:srgbClr val="224464"/>
+                </a:solidFill>
+                <a:latin typeface="Calibri"/>
+                <a:cs typeface="Calibri"/>
+              </a:rPr>
+              <a:t> </a:t>
+            </a:r>
+            <a:r>
+              <a:rPr lang="en-US" sz="3400" b="1" spc="-5" dirty="0">
+                <a:solidFill>
+                  <a:schemeClr val="bg1"/>
+                </a:solidFill>
+                <a:latin typeface="Calibri"/>
+                <a:cs typeface="Calibri"/>
+              </a:rPr>
+              <a:t>MongoDB</a:t>
+            </a:r>
+            <a:r>
+              <a:rPr lang="en-US" sz="3400" spc="-5" dirty="0">
+                <a:solidFill>
+                  <a:srgbClr val="224464"/>
+                </a:solidFill>
+                <a:latin typeface="Calibri"/>
+                <a:cs typeface="Calibri"/>
+              </a:rPr>
+              <a:t>,</a:t>
+            </a:r>
+            <a:r>
+              <a:rPr lang="en-US" sz="3400" spc="-55" dirty="0">
+                <a:solidFill>
+                  <a:srgbClr val="224464"/>
+                </a:solidFill>
+                <a:latin typeface="Calibri"/>
+                <a:cs typeface="Calibri"/>
+              </a:rPr>
+              <a:t> </a:t>
+            </a:r>
+            <a:r>
+              <a:rPr lang="en-US" sz="3400" b="1" spc="-10" dirty="0">
+                <a:solidFill>
+                  <a:schemeClr val="bg1"/>
+                </a:solidFill>
+                <a:latin typeface="Calibri"/>
+                <a:cs typeface="Calibri"/>
+              </a:rPr>
+              <a:t>Cassandra</a:t>
+            </a:r>
+            <a:r>
+              <a:rPr lang="en-US" sz="3400" spc="-10" dirty="0">
+                <a:solidFill>
+                  <a:srgbClr val="224464"/>
+                </a:solidFill>
+                <a:latin typeface="Calibri"/>
+                <a:cs typeface="Calibri"/>
+              </a:rPr>
+              <a:t>,</a:t>
+            </a:r>
+            <a:r>
+              <a:rPr lang="en-US" sz="3400" spc="-40" dirty="0">
+                <a:solidFill>
+                  <a:srgbClr val="224464"/>
+                </a:solidFill>
+                <a:latin typeface="Calibri"/>
+                <a:cs typeface="Calibri"/>
+              </a:rPr>
+              <a:t> </a:t>
+            </a:r>
+            <a:r>
+              <a:rPr lang="en-US" sz="3400" b="1" spc="-10" dirty="0">
+                <a:solidFill>
+                  <a:schemeClr val="bg1"/>
+                </a:solidFill>
+                <a:latin typeface="Calibri"/>
+                <a:cs typeface="Calibri"/>
+              </a:rPr>
+              <a:t>Redis</a:t>
+            </a:r>
+            <a:r>
+              <a:rPr lang="en-US" sz="3400" spc="-10" dirty="0">
+                <a:solidFill>
+                  <a:srgbClr val="224464"/>
+                </a:solidFill>
+                <a:latin typeface="Calibri"/>
+                <a:cs typeface="Calibri"/>
+              </a:rPr>
+              <a:t>,</a:t>
+            </a:r>
+            <a:r>
+              <a:rPr lang="en-US" sz="3400" spc="-35" dirty="0">
+                <a:solidFill>
+                  <a:srgbClr val="224464"/>
+                </a:solidFill>
+                <a:latin typeface="Calibri"/>
+                <a:cs typeface="Calibri"/>
+              </a:rPr>
+              <a:t> </a:t>
+            </a:r>
+            <a:r>
+              <a:rPr lang="en-US" sz="3400" spc="-15" dirty="0">
+                <a:solidFill>
+                  <a:srgbClr val="224464"/>
+                </a:solidFill>
+                <a:latin typeface="Calibri"/>
+                <a:cs typeface="Calibri"/>
+              </a:rPr>
+              <a:t>etc.</a:t>
+            </a:r>
+            <a:endParaRPr lang="en-US" sz="3400" dirty="0">
+              <a:latin typeface="Calibri"/>
+              <a:cs typeface="Calibri"/>
+            </a:endParaRPr>
+          </a:p>
+        </p:txBody>
+      </p:sp>
+      <p:sp>
+        <p:nvSpPr>
+          <p:cNvPr id="23" name="Rectangle 19">
+            <a:extLst>
+              <a:ext uri="{FF2B5EF4-FFF2-40B4-BE49-F238E27FC236}">
+                <a16:creationId xmlns:a16="http://schemas.microsoft.com/office/drawing/2014/main" id="{EF975B85-581B-A516-2BC0-D13E98F1E09B}"/>
+              </a:ext>
+            </a:extLst>
+          </p:cNvPr>
+          <p:cNvSpPr>
+            <a:spLocks noChangeArrowheads="1"/>
+          </p:cNvSpPr>
+          <p:nvPr/>
+        </p:nvSpPr>
+        <p:spPr bwMode="auto">
+          <a:xfrm>
+            <a:off x="609600" y="4441986"/>
+            <a:ext cx="9558654" cy="2246769"/>
+          </a:xfrm>
+          <a:prstGeom prst="rect">
+            <a:avLst/>
+          </a:prstGeom>
+          <a:solidFill>
+            <a:schemeClr val="bg2">
+              <a:lumMod val="85000"/>
+              <a:alpha val="20000"/>
+            </a:schemeClr>
+          </a:solidFill>
+          <a:ln w="12700">
+            <a:solidFill>
+              <a:schemeClr val="accent5">
+                <a:lumMod val="60000"/>
+                <a:lumOff val="40000"/>
+              </a:schemeClr>
+            </a:solidFill>
+          </a:ln>
+        </p:spPr>
+        <p:txBody>
+          <a:bodyPr wrap="square">
+            <a:spAutoFit/>
+          </a:bodyPr>
+          <a:lstStyle/>
+          <a:p>
+            <a:pPr marL="12700">
+              <a:lnSpc>
+                <a:spcPct val="100000"/>
+              </a:lnSpc>
+            </a:pPr>
+            <a:r>
+              <a:rPr lang="en-US" sz="2800" b="1" noProof="1">
+                <a:latin typeface="Consolas"/>
+                <a:cs typeface="Consolas"/>
+              </a:rPr>
+              <a:t>{</a:t>
+            </a:r>
+          </a:p>
+          <a:p>
+            <a:pPr marL="12700">
+              <a:lnSpc>
+                <a:spcPct val="100000"/>
+              </a:lnSpc>
+            </a:pPr>
+            <a:r>
+              <a:rPr lang="en-US" sz="2800" b="1" noProof="1">
+                <a:latin typeface="Consolas"/>
+                <a:cs typeface="Consolas"/>
+              </a:rPr>
+              <a:t>  "</a:t>
+            </a:r>
+            <a:r>
+              <a:rPr lang="en-US" sz="2800" b="1" noProof="1">
+                <a:solidFill>
+                  <a:schemeClr val="bg1"/>
+                </a:solidFill>
+                <a:latin typeface="Consolas"/>
+                <a:cs typeface="Consolas"/>
+              </a:rPr>
+              <a:t>_id</a:t>
+            </a:r>
+            <a:r>
+              <a:rPr lang="en-US" sz="2800" b="1" noProof="1">
+                <a:latin typeface="Consolas"/>
+                <a:cs typeface="Consolas"/>
+              </a:rPr>
+              <a:t>": </a:t>
+            </a:r>
+            <a:r>
+              <a:rPr lang="en-US" sz="2800" b="1" noProof="1">
+                <a:solidFill>
+                  <a:schemeClr val="bg1"/>
+                </a:solidFill>
+                <a:latin typeface="Consolas"/>
+                <a:cs typeface="Consolas"/>
+              </a:rPr>
+              <a:t>ObjectId</a:t>
+            </a:r>
+            <a:r>
+              <a:rPr lang="en-US" sz="2800" b="1" noProof="1">
+                <a:latin typeface="Consolas"/>
+                <a:cs typeface="Consolas"/>
+              </a:rPr>
+              <a:t>("59d3fe7ed81452db0933a871"),</a:t>
+            </a:r>
+          </a:p>
+          <a:p>
+            <a:pPr marL="12700">
+              <a:lnSpc>
+                <a:spcPct val="100000"/>
+              </a:lnSpc>
+            </a:pPr>
+            <a:r>
+              <a:rPr lang="en-US" sz="2800" b="1" noProof="1">
+                <a:latin typeface="Consolas"/>
+                <a:cs typeface="Consolas"/>
+              </a:rPr>
+              <a:t>  "</a:t>
+            </a:r>
+            <a:r>
+              <a:rPr lang="en-US" sz="2800" b="1" noProof="1">
+                <a:solidFill>
+                  <a:schemeClr val="bg1"/>
+                </a:solidFill>
+                <a:latin typeface="Consolas"/>
+                <a:cs typeface="Consolas"/>
+              </a:rPr>
+              <a:t>email</a:t>
+            </a:r>
+            <a:r>
+              <a:rPr lang="en-US" sz="2800" b="1" noProof="1">
+                <a:latin typeface="Consolas"/>
+                <a:cs typeface="Consolas"/>
+              </a:rPr>
+              <a:t>": "peter@gmail.com",</a:t>
+            </a:r>
+          </a:p>
+          <a:p>
+            <a:pPr marL="12700">
+              <a:lnSpc>
+                <a:spcPct val="100000"/>
+              </a:lnSpc>
+            </a:pPr>
+            <a:r>
+              <a:rPr lang="en-US" sz="2800" b="1" noProof="1">
+                <a:latin typeface="Consolas"/>
+                <a:cs typeface="Consolas"/>
+              </a:rPr>
+              <a:t>  "</a:t>
+            </a:r>
+            <a:r>
+              <a:rPr lang="en-US" sz="2800" b="1" noProof="1">
+                <a:solidFill>
+                  <a:schemeClr val="bg1"/>
+                </a:solidFill>
+                <a:latin typeface="Consolas"/>
+                <a:cs typeface="Consolas"/>
+              </a:rPr>
+              <a:t>age</a:t>
+            </a:r>
+            <a:r>
+              <a:rPr lang="en-US" sz="2800" b="1" noProof="1">
+                <a:latin typeface="Consolas"/>
+                <a:cs typeface="Consolas"/>
+              </a:rPr>
+              <a:t>": 22</a:t>
+            </a:r>
+          </a:p>
+          <a:p>
+            <a:pPr marL="12700">
+              <a:lnSpc>
+                <a:spcPct val="100000"/>
+              </a:lnSpc>
+            </a:pPr>
+            <a:r>
+              <a:rPr lang="en-US" sz="2800" b="1" noProof="1">
+                <a:latin typeface="Consolas"/>
+                <a:cs typeface="Consolas"/>
+              </a:rPr>
+              <a:t>}</a:t>
+            </a:r>
+          </a:p>
+        </p:txBody>
+      </p:sp>
+      <p:sp>
+        <p:nvSpPr>
+          <p:cNvPr id="19" name="AutoShape 7">
+            <a:extLst>
+              <a:ext uri="{FF2B5EF4-FFF2-40B4-BE49-F238E27FC236}">
+                <a16:creationId xmlns:a16="http://schemas.microsoft.com/office/drawing/2014/main" id="{C34A2E56-F2E7-AC46-5CE9-793C12729AC0}"/>
+              </a:ext>
+            </a:extLst>
+          </p:cNvPr>
+          <p:cNvSpPr>
+            <a:spLocks noChangeArrowheads="1"/>
+          </p:cNvSpPr>
+          <p:nvPr/>
+        </p:nvSpPr>
+        <p:spPr bwMode="auto">
+          <a:xfrm>
+            <a:off x="8077200" y="5638800"/>
+            <a:ext cx="3880757" cy="1120487"/>
+          </a:xfrm>
+          <a:prstGeom prst="wedgeRoundRectCallout">
+            <a:avLst>
+              <a:gd name="adj1" fmla="val -56372"/>
+              <a:gd name="adj2" fmla="val -35249"/>
+              <a:gd name="adj3" fmla="val 16667"/>
+            </a:avLst>
+          </a:prstGeom>
+          <a:solidFill>
+            <a:schemeClr val="dk2">
+              <a:alpha val="80000"/>
+            </a:schemeClr>
+          </a:solidFill>
+          <a:ln w="19050">
+            <a:solidFill>
+              <a:schemeClr val="tx1">
+                <a:lumMod val="75000"/>
+                <a:alpha val="80000"/>
+              </a:schemeClr>
+            </a:solidFill>
+          </a:ln>
+          <a:effectLst/>
+        </p:spPr>
+        <p:style>
+          <a:lnRef idx="2">
+            <a:schemeClr val="accent1">
+              <a:shade val="50000"/>
+            </a:schemeClr>
+          </a:lnRef>
+          <a:fillRef idx="1001">
+            <a:schemeClr val="dk2"/>
+          </a:fillRef>
+          <a:effectRef idx="0">
+            <a:schemeClr val="accent1"/>
+          </a:effectRef>
+          <a:fontRef idx="minor">
+            <a:schemeClr val="lt1"/>
+          </a:fontRef>
+        </p:style>
+        <p:txBody>
+          <a:bodyPr rot="0" spcFirstLastPara="0" vertOverflow="overflow" horzOverflow="overflow" vert="horz" wrap="square" lIns="91416" tIns="45708" rIns="91416" bIns="45708" numCol="1" spcCol="0" rtlCol="0" fromWordArt="0" anchor="ctr" anchorCtr="0" forceAA="0" compatLnSpc="1">
+            <a:prstTxWarp prst="textNoShape">
+              <a:avLst/>
+            </a:prstTxWarp>
+            <a:noAutofit/>
+          </a:bodyPr>
+          <a:lstStyle/>
+          <a:p>
+            <a:pPr algn="ctr"/>
+            <a:r>
+              <a:rPr lang="bg-BG" sz="2800" b="1" noProof="1">
+                <a:solidFill>
+                  <a:srgbClr val="FFFFFF"/>
+                </a:solidFill>
+              </a:rPr>
+              <a:t>Пример за </a:t>
+            </a:r>
+            <a:r>
+              <a:rPr lang="en-US" sz="2800" b="1" noProof="1">
+                <a:solidFill>
+                  <a:srgbClr val="FFFFFF"/>
+                </a:solidFill>
+              </a:rPr>
+              <a:t>JSON </a:t>
+            </a:r>
+            <a:r>
+              <a:rPr lang="bg-BG" sz="2800" b="1" noProof="1">
+                <a:solidFill>
+                  <a:srgbClr val="FFFFFF"/>
+                </a:solidFill>
+              </a:rPr>
+              <a:t>документ в </a:t>
+            </a:r>
+            <a:r>
+              <a:rPr lang="en-US" sz="2800" b="1" noProof="1">
+                <a:solidFill>
+                  <a:srgbClr val="FFFFFF"/>
+                </a:solidFill>
+              </a:rPr>
+              <a:t>MongoDB</a:t>
+            </a:r>
+          </a:p>
+        </p:txBody>
+      </p:sp>
+      <p:sp>
+        <p:nvSpPr>
+          <p:cNvPr id="24" name="object 15">
+            <a:extLst>
+              <a:ext uri="{FF2B5EF4-FFF2-40B4-BE49-F238E27FC236}">
+                <a16:creationId xmlns:a16="http://schemas.microsoft.com/office/drawing/2014/main" id="{F23F4A49-E31B-C517-27D9-8A20DD1D6553}"/>
+              </a:ext>
+            </a:extLst>
+          </p:cNvPr>
+          <p:cNvSpPr txBox="1"/>
+          <p:nvPr/>
+        </p:nvSpPr>
+        <p:spPr>
+          <a:xfrm>
+            <a:off x="11925300" y="6618223"/>
+            <a:ext cx="233680" cy="141064"/>
+          </a:xfrm>
+          <a:prstGeom prst="rect">
+            <a:avLst/>
+          </a:prstGeom>
+        </p:spPr>
+        <p:txBody>
+          <a:bodyPr vert="horz" wrap="square" lIns="0" tIns="0" rIns="0" bIns="0" rtlCol="0">
+            <a:spAutoFit/>
+          </a:bodyPr>
+          <a:lstStyle/>
+          <a:p>
+            <a:pPr marL="40640">
+              <a:lnSpc>
+                <a:spcPts val="1065"/>
+              </a:lnSpc>
+            </a:pPr>
+            <a:fld id="{81D60167-4931-47E6-BA6A-407CBD079E47}" type="slidenum">
+              <a:rPr sz="1000" smtClean="0">
+                <a:solidFill>
+                  <a:srgbClr val="224464"/>
+                </a:solidFill>
+                <a:latin typeface="Calibri"/>
+                <a:cs typeface="Calibri"/>
+              </a:rPr>
+              <a:pPr marL="40640">
+                <a:lnSpc>
+                  <a:spcPts val="1065"/>
+                </a:lnSpc>
+              </a:pPr>
+              <a:t>20</a:t>
+            </a:fld>
+            <a:endParaRPr sz="1000" dirty="0">
+              <a:latin typeface="Calibri"/>
+              <a:cs typeface="Calibri"/>
+            </a:endParaRPr>
+          </a:p>
+        </p:txBody>
+      </p:sp>
+      <p:sp>
+        <p:nvSpPr>
+          <p:cNvPr id="2" name="Slide Number">
+            <a:extLst>
+              <a:ext uri="{FF2B5EF4-FFF2-40B4-BE49-F238E27FC236}">
+                <a16:creationId xmlns:a16="http://schemas.microsoft.com/office/drawing/2014/main" id="{E9FF8973-211C-838A-CB0C-880AFDBB7285}"/>
+              </a:ext>
+            </a:extLst>
+          </p:cNvPr>
+          <p:cNvSpPr>
+            <a:spLocks noGrp="1"/>
+          </p:cNvSpPr>
+          <p:nvPr>
+            <p:ph type="sldNum" sz="quarter" idx="5"/>
+          </p:nvPr>
+        </p:nvSpPr>
+        <p:spPr>
+          <a:xfrm>
+            <a:off x="11753030" y="6507000"/>
+            <a:ext cx="367414" cy="297000"/>
+          </a:xfrm>
+          <a:prstGeom prst="rect">
+            <a:avLst/>
+          </a:prstGeom>
+        </p:spPr>
+        <p:txBody>
+          <a:bodyPr vert="horz" lIns="91440" tIns="45720" rIns="91440" bIns="45720" rtlCol="0" anchor="b"/>
+          <a:lstStyle>
+            <a:lvl1pPr algn="r">
+              <a:defRPr sz="1000"/>
+            </a:lvl1pPr>
+          </a:lstStyle>
+          <a:p>
+            <a:fld id="{2BF067CD-8E6B-4360-9AA8-C5DF2A48A6D1}" type="slidenum">
+              <a:rPr lang="en-US" noProof="0" smtClean="0"/>
+              <a:pPr/>
+              <a:t>20</a:t>
+            </a:fld>
+            <a:endParaRPr lang="en-US" noProof="0" dirty="0"/>
+          </a:p>
+        </p:txBody>
+      </p:sp>
+    </p:spTree>
+    <p:extLst>
+      <p:ext uri="{BB962C8B-B14F-4D97-AF65-F5344CB8AC3E}">
+        <p14:creationId xmlns:p14="http://schemas.microsoft.com/office/powerpoint/2010/main" val="309645025"/>
+      </p:ext>
+    </p:extLst>
+  </p:cSld>
+  <p:clrMapOvr>
+    <a:masterClrMapping/>
+  </p:clrMapOvr>
+  <mc:AlternateContent xmlns:mc="http://schemas.openxmlformats.org/markup-compatibility/2006" xmlns:p14="http://schemas.microsoft.com/office/powerpoint/2010/main">
+    <mc:Choice Requires="p14">
+      <p:transition spd="slow" p14:dur="2000" advClick="0" advTm="5000"/>
+    </mc:Choice>
+    <mc:Fallback xmlns="">
+      <p:transition spd="slow" advClick="0" advTm="5000"/>
+    </mc:Fallback>
+  </mc:AlternateContent>
+  <p:timing>
+    <p:tnLst>
+      <p:par>
+        <p:cTn id="1" dur="indefinite" restart="never" nodeType="tmRoot">
+          <p:childTnLst>
+            <p:seq concurrent="1" nextAc="seek">
+              <p:cTn id="2" dur="indefinite" nodeType="mainSeq">
+                <p:childTnLst>
+                  <p:par>
+                    <p:cTn id="3" fill="hold">
+                      <p:stCondLst>
+                        <p:cond delay="indefinite"/>
+                      </p:stCondLst>
+                      <p:childTnLst>
+                        <p:par>
+                          <p:cTn id="4" fill="hold">
+                            <p:stCondLst>
+                              <p:cond delay="0"/>
+                            </p:stCondLst>
+                            <p:childTnLst>
+                              <p:par>
+                                <p:cTn id="5" presetID="1" presetClass="entr" presetSubtype="0" fill="hold" nodeType="clickEffect">
+                                  <p:stCondLst>
+                                    <p:cond delay="0"/>
+                                  </p:stCondLst>
+                                  <p:childTnLst>
+                                    <p:set>
+                                      <p:cBhvr>
+                                        <p:cTn id="6" dur="1" fill="hold">
+                                          <p:stCondLst>
+                                            <p:cond delay="0"/>
+                                          </p:stCondLst>
+                                        </p:cTn>
+                                        <p:tgtEl>
+                                          <p:spTgt spid="10">
+                                            <p:txEl>
+                                              <p:pRg st="2" end="2"/>
+                                            </p:txEl>
+                                          </p:spTgt>
+                                        </p:tgtEl>
+                                        <p:attrNameLst>
+                                          <p:attrName>style.visibility</p:attrName>
+                                        </p:attrNameLst>
+                                      </p:cBhvr>
+                                      <p:to>
+                                        <p:strVal val="visible"/>
+                                      </p:to>
+                                    </p:set>
+                                  </p:childTnLst>
+                                </p:cTn>
+                              </p:par>
+                            </p:childTnLst>
+                          </p:cTn>
+                        </p:par>
+                      </p:childTnLst>
+                    </p:cTn>
+                  </p:par>
+                  <p:par>
+                    <p:cTn id="7" fill="hold">
+                      <p:stCondLst>
+                        <p:cond delay="indefinite"/>
+                      </p:stCondLst>
+                      <p:childTnLst>
+                        <p:par>
+                          <p:cTn id="8" fill="hold">
+                            <p:stCondLst>
+                              <p:cond delay="0"/>
+                            </p:stCondLst>
+                            <p:childTnLst>
+                              <p:par>
+                                <p:cTn id="9" presetID="1" presetClass="entr" presetSubtype="0" fill="hold" nodeType="clickEffect">
+                                  <p:stCondLst>
+                                    <p:cond delay="0"/>
+                                  </p:stCondLst>
+                                  <p:childTnLst>
+                                    <p:set>
+                                      <p:cBhvr>
+                                        <p:cTn id="10" dur="1" fill="hold">
+                                          <p:stCondLst>
+                                            <p:cond delay="0"/>
+                                          </p:stCondLst>
+                                        </p:cTn>
+                                        <p:tgtEl>
+                                          <p:spTgt spid="10">
+                                            <p:txEl>
+                                              <p:pRg st="3" end="3"/>
+                                            </p:txEl>
+                                          </p:spTgt>
+                                        </p:tgtEl>
+                                        <p:attrNameLst>
+                                          <p:attrName>style.visibility</p:attrName>
+                                        </p:attrNameLst>
+                                      </p:cBhvr>
+                                      <p:to>
+                                        <p:strVal val="visible"/>
+                                      </p:to>
+                                    </p:set>
+                                  </p:childTnLst>
+                                </p:cTn>
+                              </p:par>
+                            </p:childTnLst>
+                          </p:cTn>
+                        </p:par>
+                      </p:childTnLst>
+                    </p:cTn>
+                  </p:par>
+                  <p:par>
+                    <p:cTn id="11" fill="hold">
+                      <p:stCondLst>
+                        <p:cond delay="indefinite"/>
+                      </p:stCondLst>
+                      <p:childTnLst>
+                        <p:par>
+                          <p:cTn id="12" fill="hold">
+                            <p:stCondLst>
+                              <p:cond delay="0"/>
+                            </p:stCondLst>
+                            <p:childTnLst>
+                              <p:par>
+                                <p:cTn id="13" presetID="1" presetClass="entr" presetSubtype="0" fill="hold" grpId="0" nodeType="clickEffect">
+                                  <p:stCondLst>
+                                    <p:cond delay="0"/>
+                                  </p:stCondLst>
+                                  <p:childTnLst>
+                                    <p:set>
+                                      <p:cBhvr>
+                                        <p:cTn id="14" dur="1" fill="hold">
+                                          <p:stCondLst>
+                                            <p:cond delay="0"/>
+                                          </p:stCondLst>
+                                        </p:cTn>
+                                        <p:tgtEl>
+                                          <p:spTgt spid="23"/>
+                                        </p:tgtEl>
+                                        <p:attrNameLst>
+                                          <p:attrName>style.visibility</p:attrName>
+                                        </p:attrNameLst>
+                                      </p:cBhvr>
+                                      <p:to>
+                                        <p:strVal val="visible"/>
+                                      </p:to>
+                                    </p:set>
+                                  </p:childTnLst>
+                                </p:cTn>
+                              </p:par>
+                              <p:par>
+                                <p:cTn id="15" presetID="1" presetClass="entr" presetSubtype="0" fill="hold" grpId="0" nodeType="withEffect">
+                                  <p:stCondLst>
+                                    <p:cond delay="0"/>
+                                  </p:stCondLst>
+                                  <p:childTnLst>
+                                    <p:set>
+                                      <p:cBhvr>
+                                        <p:cTn id="16" dur="1" fill="hold">
+                                          <p:stCondLst>
+                                            <p:cond delay="0"/>
+                                          </p:stCondLst>
+                                        </p:cTn>
+                                        <p:tgtEl>
+                                          <p:spTgt spid="19"/>
+                                        </p:tgtEl>
+                                        <p:attrNameLst>
+                                          <p:attrName>style.visibility</p:attrName>
+                                        </p:attrNameLst>
+                                      </p:cBhvr>
+                                      <p:to>
+                                        <p:strVal val="visible"/>
+                                      </p:to>
+                                    </p:set>
+                                  </p:childTnLst>
+                                </p:cTn>
+                              </p:par>
+                            </p:childTnLst>
+                          </p:cTn>
+                        </p:par>
+                      </p:childTnLst>
+                    </p:cTn>
+                  </p:par>
+                </p:childTnLst>
+              </p:cTn>
+              <p:prevCondLst>
+                <p:cond evt="onPrev" delay="0">
+                  <p:tgtEl>
+                    <p:sldTgt/>
+                  </p:tgtEl>
+                </p:cond>
+              </p:prevCondLst>
+              <p:nextCondLst>
+                <p:cond evt="onNext" delay="0">
+                  <p:tgtEl>
+                    <p:sldTgt/>
+                  </p:tgtEl>
+                </p:cond>
+              </p:nextCondLst>
+            </p:seq>
+          </p:childTnLst>
+        </p:cTn>
+      </p:par>
+    </p:tnLst>
+    <p:bldLst>
+      <p:bldP spid="23" grpId="0" animBg="1"/>
+      <p:bldP spid="19" grpId="0" animBg="1"/>
+    </p:bldLst>
+  </p:timing>
+</p:sld>
+</file>
+
+<file path=ppt/slides/slide21.xml><?xml version="1.0" encoding="utf-8"?>
+<p:sld xmlns:a="http://schemas.openxmlformats.org/drawingml/2006/main" xmlns:r="http://schemas.openxmlformats.org/officeDocument/2006/relationships" xmlns:p="http://schemas.openxmlformats.org/presentationml/2006/main">
+  <p:cSld>
+    <p:spTree>
+      <p:nvGrpSpPr>
+        <p:cNvPr id="1" name=""/>
+        <p:cNvGrpSpPr/>
+        <p:nvPr/>
+      </p:nvGrpSpPr>
+      <p:grpSpPr>
+        <a:xfrm>
+          <a:off x="0" y="0"/>
+          <a:ext cx="0" cy="0"/>
+          <a:chOff x="0" y="0"/>
+          <a:chExt cx="0" cy="0"/>
+        </a:xfrm>
+      </p:grpSpPr>
       <p:pic>
         <p:nvPicPr>
           <p:cNvPr id="3082" name="Picture 10" descr="Ð ÐµÐ·ÑÐ»ÑÐ°Ñ Ñ Ð¸Ð·Ð¾Ð±ÑÐ°Ð¶ÐµÐ½Ð¸Ðµ Ð·Ð° sql server png">
@@ -20623,7 +21144,7 @@
 </p:sld>
 </file>
 
-<file path=ppt/slides/slide21.xml><?xml version="1.0" encoding="utf-8"?>
+<file path=ppt/slides/slide22.xml><?xml version="1.0" encoding="utf-8"?>
 <p:sld xmlns:a="http://schemas.openxmlformats.org/drawingml/2006/main" xmlns:r="http://schemas.openxmlformats.org/officeDocument/2006/relationships" xmlns:p="http://schemas.openxmlformats.org/presentationml/2006/main">
   <p:cSld>
     <p:spTree>
@@ -21246,7 +21767,7 @@
             <a:fld id="{2BF067CD-8E6B-4360-9AA8-C5DF2A48A6D1}" type="slidenum">
               <a:rPr lang="en-US" noProof="0" smtClean="0"/>
               <a:pPr/>
-              <a:t>21</a:t>
+              <a:t>22</a:t>
             </a:fld>
             <a:endParaRPr lang="en-US" noProof="0" dirty="0"/>
           </a:p>
@@ -21628,7 +22149,7 @@
 </p:sld>
 </file>
 
-<file path=ppt/slides/slide22.xml><?xml version="1.0" encoding="utf-8"?>
+<file path=ppt/slides/slide23.xml><?xml version="1.0" encoding="utf-8"?>
 <p:sld xmlns:a="http://schemas.openxmlformats.org/drawingml/2006/main" xmlns:r="http://schemas.openxmlformats.org/officeDocument/2006/relationships" xmlns:p="http://schemas.openxmlformats.org/presentationml/2006/main">
   <p:cSld>
     <p:spTree>
@@ -22076,7 +22597,7 @@
             <a:fld id="{2BF067CD-8E6B-4360-9AA8-C5DF2A48A6D1}" type="slidenum">
               <a:rPr lang="en-US" noProof="0" smtClean="0"/>
               <a:pPr/>
-              <a:t>22</a:t>
+              <a:t>23</a:t>
             </a:fld>
             <a:endParaRPr lang="en-US" noProof="0" dirty="0"/>
           </a:p>
@@ -22103,7 +22624,7 @@
 </p:sld>
 </file>
 
-<file path=ppt/slides/slide23.xml><?xml version="1.0" encoding="utf-8"?>
+<file path=ppt/slides/slide24.xml><?xml version="1.0" encoding="utf-8"?>
 <p:sld xmlns:a="http://schemas.openxmlformats.org/drawingml/2006/main" xmlns:r="http://schemas.openxmlformats.org/officeDocument/2006/relationships" xmlns:p="http://schemas.openxmlformats.org/presentationml/2006/main">
   <p:cSld>
     <p:spTree>
@@ -22546,7 +23067,7 @@
             <a:fld id="{2BF067CD-8E6B-4360-9AA8-C5DF2A48A6D1}" type="slidenum">
               <a:rPr lang="en-US" noProof="0" smtClean="0"/>
               <a:pPr/>
-              <a:t>23</a:t>
+              <a:t>24</a:t>
             </a:fld>
             <a:endParaRPr lang="en-US" noProof="0" dirty="0"/>
           </a:p>
@@ -22977,7 +23498,7 @@
 </p:sld>
 </file>
 
-<file path=ppt/slides/slide24.xml><?xml version="1.0" encoding="utf-8"?>
+<file path=ppt/slides/slide25.xml><?xml version="1.0" encoding="utf-8"?>
 <p:sld xmlns:a="http://schemas.openxmlformats.org/drawingml/2006/main" xmlns:r="http://schemas.openxmlformats.org/officeDocument/2006/relationships" xmlns:p="http://schemas.openxmlformats.org/presentationml/2006/main">
   <p:cSld>
     <p:spTree>
@@ -23131,7 +23652,7 @@
             <a:fld id="{2BF067CD-8E6B-4360-9AA8-C5DF2A48A6D1}" type="slidenum">
               <a:rPr lang="en-US" noProof="0" smtClean="0"/>
               <a:pPr/>
-              <a:t>24</a:t>
+              <a:t>25</a:t>
             </a:fld>
             <a:endParaRPr lang="en-US" noProof="0" dirty="0"/>
           </a:p>
@@ -23158,7 +23679,7 @@
 </p:sld>
 </file>
 
-<file path=ppt/slides/slide25.xml><?xml version="1.0" encoding="utf-8"?>
+<file path=ppt/slides/slide26.xml><?xml version="1.0" encoding="utf-8"?>
 <p:sld xmlns:a="http://schemas.openxmlformats.org/drawingml/2006/main" xmlns:r="http://schemas.openxmlformats.org/officeDocument/2006/relationships" xmlns:p="http://schemas.openxmlformats.org/presentationml/2006/main">
   <p:cSld>
     <p:spTree>
@@ -23341,7 +23862,7 @@
             <a:fld id="{2BF067CD-8E6B-4360-9AA8-C5DF2A48A6D1}" type="slidenum">
               <a:rPr lang="en-US" noProof="0" smtClean="0"/>
               <a:pPr/>
-              <a:t>25</a:t>
+              <a:t>26</a:t>
             </a:fld>
             <a:endParaRPr lang="en-US" noProof="0" dirty="0"/>
           </a:p>
@@ -23447,7 +23968,7 @@
 </p:sld>
 </file>
 
-<file path=ppt/slides/slide26.xml><?xml version="1.0" encoding="utf-8"?>
+<file path=ppt/slides/slide27.xml><?xml version="1.0" encoding="utf-8"?>
 <p:sld xmlns:a="http://schemas.openxmlformats.org/drawingml/2006/main" xmlns:r="http://schemas.openxmlformats.org/officeDocument/2006/relationships" xmlns:p="http://schemas.openxmlformats.org/presentationml/2006/main">
   <p:cSld>
     <p:spTree>
@@ -24060,7 +24581,7 @@
             <a:fld id="{2BF067CD-8E6B-4360-9AA8-C5DF2A48A6D1}" type="slidenum">
               <a:rPr lang="en-US" noProof="0" smtClean="0"/>
               <a:pPr/>
-              <a:t>26</a:t>
+              <a:t>27</a:t>
             </a:fld>
             <a:endParaRPr lang="en-US" noProof="0" dirty="0"/>
           </a:p>
@@ -24442,7 +24963,7 @@
 </p:sld>
 </file>
 
-<file path=ppt/slides/slide27.xml><?xml version="1.0" encoding="utf-8"?>
+<file path=ppt/slides/slide28.xml><?xml version="1.0" encoding="utf-8"?>
 <p:sld xmlns:a="http://schemas.openxmlformats.org/drawingml/2006/main" xmlns:r="http://schemas.openxmlformats.org/officeDocument/2006/relationships" xmlns:p="http://schemas.openxmlformats.org/presentationml/2006/main">
   <p:cSld>
     <p:spTree>
@@ -24632,7 +25153,7 @@
 </p:sld>
 </file>
 
-<file path=ppt/slides/slide28.xml><?xml version="1.0" encoding="utf-8"?>
+<file path=ppt/slides/slide29.xml><?xml version="1.0" encoding="utf-8"?>
 <p:sld xmlns:a="http://schemas.openxmlformats.org/drawingml/2006/main" xmlns:r="http://schemas.openxmlformats.org/officeDocument/2006/relationships" xmlns:p="http://schemas.openxmlformats.org/presentationml/2006/main">
   <p:cSld>
     <p:spTree>
@@ -24988,7 +25509,7 @@
             <a:fld id="{2BF067CD-8E6B-4360-9AA8-C5DF2A48A6D1}" type="slidenum">
               <a:rPr lang="en-US" noProof="0" smtClean="0"/>
               <a:pPr/>
-              <a:t>28</a:t>
+              <a:t>29</a:t>
             </a:fld>
             <a:endParaRPr lang="en-US" noProof="0" dirty="0"/>
           </a:p>

</xml_diff>

<commit_message>
Updating slides for DBMS
</commit_message>
<xml_diff>
--- a/Courses/Software-Sciences/Module-3-Databases-New/02-DBMS/02-DBMS.pptx
+++ b/Courses/Software-Sciences/Module-3-Databases-New/02-DBMS/02-DBMS.pptx
@@ -5,10 +5,10 @@
     <p:sldMasterId id="2147483675" r:id="rId1"/>
   </p:sldMasterIdLst>
   <p:notesMasterIdLst>
-    <p:notesMasterId r:id="rId36"/>
+    <p:notesMasterId r:id="rId37"/>
   </p:notesMasterIdLst>
   <p:handoutMasterIdLst>
-    <p:handoutMasterId r:id="rId37"/>
+    <p:handoutMasterId r:id="rId38"/>
   </p:handoutMasterIdLst>
   <p:sldIdLst>
     <p:sldId id="627" r:id="rId2"/>
@@ -27,24 +27,25 @@
     <p:sldId id="1243" r:id="rId15"/>
     <p:sldId id="1244" r:id="rId16"/>
     <p:sldId id="1245" r:id="rId17"/>
-    <p:sldId id="1187" r:id="rId18"/>
-    <p:sldId id="1188" r:id="rId19"/>
-    <p:sldId id="1200" r:id="rId20"/>
-    <p:sldId id="1189" r:id="rId21"/>
-    <p:sldId id="1190" r:id="rId22"/>
-    <p:sldId id="1239" r:id="rId23"/>
-    <p:sldId id="1236" r:id="rId24"/>
-    <p:sldId id="1237" r:id="rId25"/>
-    <p:sldId id="1238" r:id="rId26"/>
-    <p:sldId id="1229" r:id="rId27"/>
-    <p:sldId id="1230" r:id="rId28"/>
-    <p:sldId id="1231" r:id="rId29"/>
-    <p:sldId id="1232" r:id="rId30"/>
-    <p:sldId id="1233" r:id="rId31"/>
-    <p:sldId id="1234" r:id="rId32"/>
-    <p:sldId id="349" r:id="rId33"/>
-    <p:sldId id="504" r:id="rId34"/>
-    <p:sldId id="505" r:id="rId35"/>
+    <p:sldId id="1247" r:id="rId18"/>
+    <p:sldId id="1187" r:id="rId19"/>
+    <p:sldId id="1188" r:id="rId20"/>
+    <p:sldId id="1200" r:id="rId21"/>
+    <p:sldId id="1189" r:id="rId22"/>
+    <p:sldId id="1190" r:id="rId23"/>
+    <p:sldId id="1239" r:id="rId24"/>
+    <p:sldId id="1236" r:id="rId25"/>
+    <p:sldId id="1237" r:id="rId26"/>
+    <p:sldId id="1238" r:id="rId27"/>
+    <p:sldId id="1229" r:id="rId28"/>
+    <p:sldId id="1230" r:id="rId29"/>
+    <p:sldId id="1231" r:id="rId30"/>
+    <p:sldId id="1232" r:id="rId31"/>
+    <p:sldId id="1233" r:id="rId32"/>
+    <p:sldId id="1234" r:id="rId33"/>
+    <p:sldId id="349" r:id="rId34"/>
+    <p:sldId id="504" r:id="rId35"/>
+    <p:sldId id="505" r:id="rId36"/>
   </p:sldIdLst>
   <p:sldSz cx="12192000" cy="6858000"/>
   <p:notesSz cx="6858000" cy="9144000"/>
@@ -168,6 +169,7 @@
             <p14:sldId id="1243"/>
             <p14:sldId id="1244"/>
             <p14:sldId id="1245"/>
+            <p14:sldId id="1247"/>
           </p14:sldIdLst>
         </p14:section>
         <p14:section name="Релационни БД" id="{3745F6D7-2AC2-4357-A966-2B713D2F393F}">
@@ -514,7 +516,7 @@
           <a:p>
             <a:fld id="{4E087215-0C8F-4762-A664-737A353EC9A4}" type="datetimeFigureOut">
               <a:rPr lang="bg-BG" smtClean="0"/>
-              <a:t>25.2.2024 г.</a:t>
+              <a:t>26.2.2024 г.</a:t>
             </a:fld>
             <a:endParaRPr lang="bg-BG"/>
           </a:p>
@@ -710,7 +712,7 @@
           <a:p>
             <a:fld id="{72D84649-876A-46C9-8472-14CB09C070D8}" type="datetimeFigureOut">
               <a:rPr lang="en-US" smtClean="0"/>
-              <a:t>2/25/2024</a:t>
+              <a:t>2/26/2024</a:t>
             </a:fld>
             <a:endParaRPr lang="en-US"/>
           </a:p>
@@ -1216,7 +1218,7 @@
             <a:fld id="{3EBA5BD7-F043-4D1B-AA17-CD412FC534DE}" type="slidenum">
               <a:rPr lang="en-US" smtClean="0"/>
               <a:pPr/>
-              <a:t>20</a:t>
+              <a:t>21</a:t>
             </a:fld>
             <a:endParaRPr lang="en-US" dirty="0"/>
           </a:p>
@@ -1462,7 +1464,7 @@
             <a:fld id="{3EBA5BD7-F043-4D1B-AA17-CD412FC534DE}" type="slidenum">
               <a:rPr lang="en-US" smtClean="0"/>
               <a:pPr/>
-              <a:t>23</a:t>
+              <a:t>24</a:t>
             </a:fld>
             <a:endParaRPr lang="en-US" dirty="0"/>
           </a:p>
@@ -1602,7 +1604,7 @@
             <a:fld id="{2BF067CD-8E6B-4360-9AA8-C5DF2A48A6D1}" type="slidenum">
               <a:rPr lang="en-US" smtClean="0"/>
               <a:pPr/>
-              <a:t>25</a:t>
+              <a:t>26</a:t>
             </a:fld>
             <a:endParaRPr lang="en-US" dirty="0"/>
           </a:p>
@@ -1802,7 +1804,7 @@
             <a:fld id="{2BF067CD-8E6B-4360-9AA8-C5DF2A48A6D1}" type="slidenum">
               <a:rPr lang="en-US" smtClean="0"/>
               <a:pPr/>
-              <a:t>27</a:t>
+              <a:t>28</a:t>
             </a:fld>
             <a:endParaRPr lang="en-US" dirty="0"/>
           </a:p>
@@ -1942,7 +1944,7 @@
             <a:fld id="{2BF067CD-8E6B-4360-9AA8-C5DF2A48A6D1}" type="slidenum">
               <a:rPr lang="en-US" smtClean="0"/>
               <a:pPr/>
-              <a:t>29</a:t>
+              <a:t>30</a:t>
             </a:fld>
             <a:endParaRPr lang="en-US" dirty="0"/>
           </a:p>
@@ -2081,7 +2083,7 @@
           <a:p>
             <a:fld id="{2BF067CD-8E6B-4360-9AA8-C5DF2A48A6D1}" type="slidenum">
               <a:rPr lang="en-US" smtClean="0"/>
-              <a:t>31</a:t>
+              <a:t>32</a:t>
             </a:fld>
             <a:endParaRPr lang="en-US" dirty="0"/>
           </a:p>
@@ -2309,7 +2311,7 @@
             <a:fld id="{3EBA5BD7-F043-4D1B-AA17-CD412FC534DE}" type="slidenum">
               <a:rPr lang="en-US" smtClean="0"/>
               <a:pPr/>
-              <a:t>32</a:t>
+              <a:t>33</a:t>
             </a:fld>
             <a:endParaRPr lang="en-US" dirty="0"/>
           </a:p>
@@ -2555,7 +2557,7 @@
             <a:fld id="{3EBA5BD7-F043-4D1B-AA17-CD412FC534DE}" type="slidenum">
               <a:rPr lang="en-US" smtClean="0"/>
               <a:pPr/>
-              <a:t>33</a:t>
+              <a:t>34</a:t>
             </a:fld>
             <a:endParaRPr lang="en-US" dirty="0"/>
           </a:p>
@@ -2801,7 +2803,7 @@
             <a:fld id="{3EBA5BD7-F043-4D1B-AA17-CD412FC534DE}" type="slidenum">
               <a:rPr lang="en-US" smtClean="0"/>
               <a:pPr/>
-              <a:t>34</a:t>
+              <a:t>35</a:t>
             </a:fld>
             <a:endParaRPr lang="en-US" dirty="0"/>
           </a:p>
@@ -4177,7 +4179,7 @@
             <a:fld id="{3EBA5BD7-F043-4D1B-AA17-CD412FC534DE}" type="slidenum">
               <a:rPr lang="en-US" smtClean="0"/>
               <a:pPr/>
-              <a:t>17</a:t>
+              <a:t>18</a:t>
             </a:fld>
             <a:endParaRPr lang="en-US" dirty="0"/>
           </a:p>
@@ -13111,6 +13113,548 @@
           <a:chExt cx="0" cy="0"/>
         </a:xfrm>
       </p:grpSpPr>
+      <p:sp>
+        <p:nvSpPr>
+          <p:cNvPr id="2" name="Slide Number Placeholder 1">
+            <a:extLst>
+              <a:ext uri="{FF2B5EF4-FFF2-40B4-BE49-F238E27FC236}">
+                <a16:creationId xmlns:a16="http://schemas.microsoft.com/office/drawing/2014/main" id="{3E06D921-477A-E392-D89B-8DAC8E5D1ACA}"/>
+              </a:ext>
+            </a:extLst>
+          </p:cNvPr>
+          <p:cNvSpPr>
+            <a:spLocks noGrp="1"/>
+          </p:cNvSpPr>
+          <p:nvPr>
+            <p:ph type="sldNum" sz="quarter" idx="5"/>
+          </p:nvPr>
+        </p:nvSpPr>
+        <p:spPr/>
+        <p:txBody>
+          <a:bodyPr/>
+          <a:lstStyle/>
+          <a:p>
+            <a:fld id="{2BF067CD-8E6B-4360-9AA8-C5DF2A48A6D1}" type="slidenum">
+              <a:rPr lang="en-US" noProof="0" smtClean="0"/>
+              <a:pPr/>
+              <a:t>17</a:t>
+            </a:fld>
+            <a:endParaRPr lang="en-US" noProof="0" dirty="0"/>
+          </a:p>
+        </p:txBody>
+      </p:sp>
+      <p:sp>
+        <p:nvSpPr>
+          <p:cNvPr id="3" name="Text Placeholder 2">
+            <a:extLst>
+              <a:ext uri="{FF2B5EF4-FFF2-40B4-BE49-F238E27FC236}">
+                <a16:creationId xmlns:a16="http://schemas.microsoft.com/office/drawing/2014/main" id="{4430CC8B-5CB8-04A4-FE01-F8269BD1659E}"/>
+              </a:ext>
+            </a:extLst>
+          </p:cNvPr>
+          <p:cNvSpPr>
+            <a:spLocks noGrp="1"/>
+          </p:cNvSpPr>
+          <p:nvPr>
+            <p:ph type="body" sz="quarter" idx="10"/>
+          </p:nvPr>
+        </p:nvSpPr>
+        <p:spPr/>
+        <p:txBody>
+          <a:bodyPr>
+            <a:normAutofit lnSpcReduction="10000"/>
+          </a:bodyPr>
+          <a:lstStyle/>
+          <a:p>
+            <a:r>
+              <a:rPr lang="bg-BG" dirty="0"/>
+              <a:t>Приложение на </a:t>
+            </a:r>
+            <a:r>
+              <a:rPr lang="bg-BG" b="1" dirty="0">
+                <a:solidFill>
+                  <a:schemeClr val="bg1"/>
+                </a:solidFill>
+              </a:rPr>
+              <a:t>унарните</a:t>
+            </a:r>
+            <a:r>
+              <a:rPr lang="bg-BG" dirty="0"/>
+              <a:t> релации:</a:t>
+            </a:r>
+          </a:p>
+          <a:p>
+            <a:pPr lvl="1"/>
+            <a:r>
+              <a:rPr lang="ru-RU" sz="3398" dirty="0"/>
+              <a:t>Единични стойности или константи</a:t>
+            </a:r>
+          </a:p>
+          <a:p>
+            <a:pPr lvl="1"/>
+            <a:r>
+              <a:rPr lang="ru-RU" sz="3398" dirty="0"/>
+              <a:t>Списък с </a:t>
+            </a:r>
+            <a:r>
+              <a:rPr lang="ru-RU" sz="3398" b="1" dirty="0">
+                <a:solidFill>
+                  <a:schemeClr val="bg1"/>
+                </a:solidFill>
+              </a:rPr>
+              <a:t>уникални</a:t>
+            </a:r>
+            <a:r>
+              <a:rPr lang="ru-RU" sz="3398" dirty="0"/>
+              <a:t> стойности</a:t>
+            </a:r>
+          </a:p>
+          <a:p>
+            <a:pPr lvl="1"/>
+            <a:r>
+              <a:rPr lang="ru-RU" sz="3398" dirty="0"/>
+              <a:t>Референтен или изгледов модел</a:t>
+            </a:r>
+          </a:p>
+          <a:p>
+            <a:r>
+              <a:rPr lang="bg-BG" sz="3600" dirty="0"/>
+              <a:t>Приложение на </a:t>
+            </a:r>
+            <a:r>
+              <a:rPr lang="bg-BG" sz="3600" b="1" dirty="0">
+                <a:solidFill>
+                  <a:schemeClr val="bg1"/>
+                </a:solidFill>
+              </a:rPr>
+              <a:t>бинарните</a:t>
+            </a:r>
+            <a:r>
+              <a:rPr lang="bg-BG" sz="3600" dirty="0"/>
+              <a:t> релации:</a:t>
+            </a:r>
+          </a:p>
+          <a:p>
+            <a:pPr lvl="1"/>
+            <a:r>
+              <a:rPr lang="bg-BG" sz="3400" dirty="0"/>
+              <a:t>Асоциации между същности</a:t>
+            </a:r>
+          </a:p>
+          <a:p>
+            <a:pPr lvl="1"/>
+            <a:r>
+              <a:rPr lang="bg-BG" sz="3400" dirty="0"/>
+              <a:t>Връзки </a:t>
+            </a:r>
+            <a:r>
+              <a:rPr lang="bg-BG" sz="3400" b="1" dirty="0">
+                <a:solidFill>
+                  <a:schemeClr val="bg1"/>
+                </a:solidFill>
+              </a:rPr>
+              <a:t>много</a:t>
+            </a:r>
+            <a:r>
+              <a:rPr lang="bg-BG" sz="3400" dirty="0"/>
+              <a:t> към </a:t>
+            </a:r>
+            <a:r>
+              <a:rPr lang="bg-BG" sz="3400" b="1" dirty="0">
+                <a:solidFill>
+                  <a:schemeClr val="bg1"/>
+                </a:solidFill>
+              </a:rPr>
+              <a:t>много</a:t>
+            </a:r>
+          </a:p>
+          <a:p>
+            <a:pPr lvl="1"/>
+            <a:r>
+              <a:rPr lang="ru-RU" sz="3400" dirty="0"/>
+              <a:t>Референтни ограничения</a:t>
+            </a:r>
+            <a:endParaRPr lang="bg-BG" sz="3400" dirty="0"/>
+          </a:p>
+          <a:p>
+            <a:pPr lvl="1"/>
+            <a:endParaRPr lang="en-US" sz="3398" dirty="0"/>
+          </a:p>
+        </p:txBody>
+      </p:sp>
+      <p:sp>
+        <p:nvSpPr>
+          <p:cNvPr id="4" name="Title 3">
+            <a:extLst>
+              <a:ext uri="{FF2B5EF4-FFF2-40B4-BE49-F238E27FC236}">
+                <a16:creationId xmlns:a16="http://schemas.microsoft.com/office/drawing/2014/main" id="{FAE9165F-EFCD-1BA0-13D0-1D4E1BF2B62D}"/>
+              </a:ext>
+            </a:extLst>
+          </p:cNvPr>
+          <p:cNvSpPr>
+            <a:spLocks noGrp="1"/>
+          </p:cNvSpPr>
+          <p:nvPr>
+            <p:ph type="title"/>
+          </p:nvPr>
+        </p:nvSpPr>
+        <p:spPr/>
+        <p:txBody>
+          <a:bodyPr/>
+          <a:lstStyle/>
+          <a:p>
+            <a:r>
+              <a:rPr lang="bg-BG" dirty="0"/>
+              <a:t>Унарни и бинарни релации</a:t>
+            </a:r>
+            <a:endParaRPr lang="en-US" dirty="0"/>
+          </a:p>
+        </p:txBody>
+      </p:sp>
+    </p:spTree>
+    <p:extLst>
+      <p:ext uri="{BB962C8B-B14F-4D97-AF65-F5344CB8AC3E}">
+        <p14:creationId xmlns:p14="http://schemas.microsoft.com/office/powerpoint/2010/main" val="3734857020"/>
+      </p:ext>
+    </p:extLst>
+  </p:cSld>
+  <p:clrMapOvr>
+    <a:masterClrMapping/>
+  </p:clrMapOvr>
+  <mc:AlternateContent xmlns:mc="http://schemas.openxmlformats.org/markup-compatibility/2006" xmlns:p14="http://schemas.microsoft.com/office/powerpoint/2010/main">
+    <mc:Choice Requires="p14">
+      <p:transition spd="slow" p14:dur="2000" advClick="0" advTm="5000"/>
+    </mc:Choice>
+    <mc:Fallback xmlns="">
+      <p:transition spd="slow" advClick="0" advTm="5000"/>
+    </mc:Fallback>
+  </mc:AlternateContent>
+  <p:timing>
+    <p:tnLst>
+      <p:par>
+        <p:cTn id="1" dur="indefinite" restart="never" nodeType="tmRoot">
+          <p:childTnLst>
+            <p:seq concurrent="1" nextAc="seek">
+              <p:cTn id="2" dur="indefinite" nodeType="mainSeq">
+                <p:childTnLst>
+                  <p:par>
+                    <p:cTn id="3" fill="hold">
+                      <p:stCondLst>
+                        <p:cond delay="indefinite"/>
+                      </p:stCondLst>
+                      <p:childTnLst>
+                        <p:par>
+                          <p:cTn id="4" fill="hold">
+                            <p:stCondLst>
+                              <p:cond delay="0"/>
+                            </p:stCondLst>
+                            <p:childTnLst>
+                              <p:par>
+                                <p:cTn id="5" presetID="1" presetClass="entr" presetSubtype="0" fill="hold" nodeType="clickEffect">
+                                  <p:stCondLst>
+                                    <p:cond delay="0"/>
+                                  </p:stCondLst>
+                                  <p:childTnLst>
+                                    <p:set>
+                                      <p:cBhvr>
+                                        <p:cTn id="6" dur="1" fill="hold">
+                                          <p:stCondLst>
+                                            <p:cond delay="0"/>
+                                          </p:stCondLst>
+                                        </p:cTn>
+                                        <p:tgtEl>
+                                          <p:spTgt spid="3">
+                                            <p:txEl>
+                                              <p:pRg st="2" end="2"/>
+                                            </p:txEl>
+                                          </p:spTgt>
+                                        </p:tgtEl>
+                                        <p:attrNameLst>
+                                          <p:attrName>style.visibility</p:attrName>
+                                        </p:attrNameLst>
+                                      </p:cBhvr>
+                                      <p:to>
+                                        <p:strVal val="visible"/>
+                                      </p:to>
+                                    </p:set>
+                                  </p:childTnLst>
+                                </p:cTn>
+                              </p:par>
+                            </p:childTnLst>
+                          </p:cTn>
+                        </p:par>
+                      </p:childTnLst>
+                    </p:cTn>
+                  </p:par>
+                  <p:par>
+                    <p:cTn id="7" fill="hold">
+                      <p:stCondLst>
+                        <p:cond delay="indefinite"/>
+                      </p:stCondLst>
+                      <p:childTnLst>
+                        <p:par>
+                          <p:cTn id="8" fill="hold">
+                            <p:stCondLst>
+                              <p:cond delay="0"/>
+                            </p:stCondLst>
+                            <p:childTnLst>
+                              <p:par>
+                                <p:cTn id="9" presetID="1" presetClass="entr" presetSubtype="0" fill="hold" nodeType="clickEffect">
+                                  <p:stCondLst>
+                                    <p:cond delay="0"/>
+                                  </p:stCondLst>
+                                  <p:childTnLst>
+                                    <p:set>
+                                      <p:cBhvr>
+                                        <p:cTn id="10" dur="1" fill="hold">
+                                          <p:stCondLst>
+                                            <p:cond delay="0"/>
+                                          </p:stCondLst>
+                                        </p:cTn>
+                                        <p:tgtEl>
+                                          <p:spTgt spid="3">
+                                            <p:txEl>
+                                              <p:pRg st="3" end="3"/>
+                                            </p:txEl>
+                                          </p:spTgt>
+                                        </p:tgtEl>
+                                        <p:attrNameLst>
+                                          <p:attrName>style.visibility</p:attrName>
+                                        </p:attrNameLst>
+                                      </p:cBhvr>
+                                      <p:to>
+                                        <p:strVal val="visible"/>
+                                      </p:to>
+                                    </p:set>
+                                  </p:childTnLst>
+                                </p:cTn>
+                              </p:par>
+                            </p:childTnLst>
+                          </p:cTn>
+                        </p:par>
+                      </p:childTnLst>
+                    </p:cTn>
+                  </p:par>
+                  <p:par>
+                    <p:cTn id="11" fill="hold">
+                      <p:stCondLst>
+                        <p:cond delay="indefinite"/>
+                      </p:stCondLst>
+                      <p:childTnLst>
+                        <p:par>
+                          <p:cTn id="12" fill="hold">
+                            <p:stCondLst>
+                              <p:cond delay="0"/>
+                            </p:stCondLst>
+                            <p:childTnLst>
+                              <p:par>
+                                <p:cTn id="13" presetID="1" presetClass="entr" presetSubtype="0" fill="hold" nodeType="clickEffect">
+                                  <p:stCondLst>
+                                    <p:cond delay="0"/>
+                                  </p:stCondLst>
+                                  <p:childTnLst>
+                                    <p:set>
+                                      <p:cBhvr>
+                                        <p:cTn id="14" dur="1" fill="hold">
+                                          <p:stCondLst>
+                                            <p:cond delay="0"/>
+                                          </p:stCondLst>
+                                        </p:cTn>
+                                        <p:tgtEl>
+                                          <p:spTgt spid="3">
+                                            <p:txEl>
+                                              <p:pRg st="4" end="4"/>
+                                            </p:txEl>
+                                          </p:spTgt>
+                                        </p:tgtEl>
+                                        <p:attrNameLst>
+                                          <p:attrName>style.visibility</p:attrName>
+                                        </p:attrNameLst>
+                                      </p:cBhvr>
+                                      <p:to>
+                                        <p:strVal val="visible"/>
+                                      </p:to>
+                                    </p:set>
+                                  </p:childTnLst>
+                                </p:cTn>
+                              </p:par>
+                              <p:par>
+                                <p:cTn id="15" presetID="1" presetClass="entr" presetSubtype="0" fill="hold" nodeType="withEffect">
+                                  <p:stCondLst>
+                                    <p:cond delay="0"/>
+                                  </p:stCondLst>
+                                  <p:childTnLst>
+                                    <p:set>
+                                      <p:cBhvr>
+                                        <p:cTn id="16" dur="1" fill="hold">
+                                          <p:stCondLst>
+                                            <p:cond delay="0"/>
+                                          </p:stCondLst>
+                                        </p:cTn>
+                                        <p:tgtEl>
+                                          <p:spTgt spid="3">
+                                            <p:txEl>
+                                              <p:pRg st="5" end="5"/>
+                                            </p:txEl>
+                                          </p:spTgt>
+                                        </p:tgtEl>
+                                        <p:attrNameLst>
+                                          <p:attrName>style.visibility</p:attrName>
+                                        </p:attrNameLst>
+                                      </p:cBhvr>
+                                      <p:to>
+                                        <p:strVal val="visible"/>
+                                      </p:to>
+                                    </p:set>
+                                  </p:childTnLst>
+                                </p:cTn>
+                              </p:par>
+                            </p:childTnLst>
+                          </p:cTn>
+                        </p:par>
+                      </p:childTnLst>
+                    </p:cTn>
+                  </p:par>
+                  <p:par>
+                    <p:cTn id="17" fill="hold">
+                      <p:stCondLst>
+                        <p:cond delay="indefinite"/>
+                      </p:stCondLst>
+                      <p:childTnLst>
+                        <p:par>
+                          <p:cTn id="18" fill="hold">
+                            <p:stCondLst>
+                              <p:cond delay="0"/>
+                            </p:stCondLst>
+                            <p:childTnLst>
+                              <p:par>
+                                <p:cTn id="19" presetID="1" presetClass="entr" presetSubtype="0" fill="hold" nodeType="clickEffect">
+                                  <p:stCondLst>
+                                    <p:cond delay="0"/>
+                                  </p:stCondLst>
+                                  <p:childTnLst>
+                                    <p:set>
+                                      <p:cBhvr>
+                                        <p:cTn id="20" dur="1" fill="hold">
+                                          <p:stCondLst>
+                                            <p:cond delay="0"/>
+                                          </p:stCondLst>
+                                        </p:cTn>
+                                        <p:tgtEl>
+                                          <p:spTgt spid="3">
+                                            <p:txEl>
+                                              <p:pRg st="6" end="6"/>
+                                            </p:txEl>
+                                          </p:spTgt>
+                                        </p:tgtEl>
+                                        <p:attrNameLst>
+                                          <p:attrName>style.visibility</p:attrName>
+                                        </p:attrNameLst>
+                                      </p:cBhvr>
+                                      <p:to>
+                                        <p:strVal val="visible"/>
+                                      </p:to>
+                                    </p:set>
+                                  </p:childTnLst>
+                                </p:cTn>
+                              </p:par>
+                            </p:childTnLst>
+                          </p:cTn>
+                        </p:par>
+                      </p:childTnLst>
+                    </p:cTn>
+                  </p:par>
+                  <p:par>
+                    <p:cTn id="21" fill="hold">
+                      <p:stCondLst>
+                        <p:cond delay="indefinite"/>
+                      </p:stCondLst>
+                      <p:childTnLst>
+                        <p:par>
+                          <p:cTn id="22" fill="hold">
+                            <p:stCondLst>
+                              <p:cond delay="0"/>
+                            </p:stCondLst>
+                            <p:childTnLst>
+                              <p:par>
+                                <p:cTn id="23" presetID="1" presetClass="entr" presetSubtype="0" fill="hold" nodeType="clickEffect">
+                                  <p:stCondLst>
+                                    <p:cond delay="0"/>
+                                  </p:stCondLst>
+                                  <p:childTnLst>
+                                    <p:set>
+                                      <p:cBhvr>
+                                        <p:cTn id="24" dur="1" fill="hold">
+                                          <p:stCondLst>
+                                            <p:cond delay="0"/>
+                                          </p:stCondLst>
+                                        </p:cTn>
+                                        <p:tgtEl>
+                                          <p:spTgt spid="3">
+                                            <p:txEl>
+                                              <p:pRg st="7" end="7"/>
+                                            </p:txEl>
+                                          </p:spTgt>
+                                        </p:tgtEl>
+                                        <p:attrNameLst>
+                                          <p:attrName>style.visibility</p:attrName>
+                                        </p:attrNameLst>
+                                      </p:cBhvr>
+                                      <p:to>
+                                        <p:strVal val="visible"/>
+                                      </p:to>
+                                    </p:set>
+                                  </p:childTnLst>
+                                </p:cTn>
+                              </p:par>
+                            </p:childTnLst>
+                          </p:cTn>
+                        </p:par>
+                      </p:childTnLst>
+                    </p:cTn>
+                  </p:par>
+                </p:childTnLst>
+              </p:cTn>
+              <p:prevCondLst>
+                <p:cond evt="onPrev" delay="0">
+                  <p:tgtEl>
+                    <p:sldTgt/>
+                  </p:tgtEl>
+                </p:cond>
+              </p:prevCondLst>
+              <p:nextCondLst>
+                <p:cond evt="onNext" delay="0">
+                  <p:tgtEl>
+                    <p:sldTgt/>
+                  </p:tgtEl>
+                </p:cond>
+              </p:nextCondLst>
+            </p:seq>
+          </p:childTnLst>
+        </p:cTn>
+      </p:par>
+    </p:tnLst>
+  </p:timing>
+</p:sld>
+</file>
+
+<file path=ppt/slides/slide18.xml><?xml version="1.0" encoding="utf-8"?>
+<p:sld xmlns:a="http://schemas.openxmlformats.org/drawingml/2006/main" xmlns:r="http://schemas.openxmlformats.org/officeDocument/2006/relationships" xmlns:p="http://schemas.openxmlformats.org/presentationml/2006/main">
+  <p:cSld>
+    <p:spTree>
+      <p:nvGrpSpPr>
+        <p:cNvPr id="1" name=""/>
+        <p:cNvGrpSpPr/>
+        <p:nvPr/>
+      </p:nvGrpSpPr>
+      <p:grpSpPr>
+        <a:xfrm>
+          <a:off x="0" y="0"/>
+          <a:ext cx="0" cy="0"/>
+          <a:chOff x="0" y="0"/>
+          <a:chExt cx="0" cy="0"/>
+        </a:xfrm>
+      </p:grpSpPr>
       <p:pic>
         <p:nvPicPr>
           <p:cNvPr id="5" name="Picture 4"/>
@@ -13223,7 +13767,7 @@
 </p:sld>
 </file>
 
-<file path=ppt/slides/slide18.xml><?xml version="1.0" encoding="utf-8"?>
+<file path=ppt/slides/slide19.xml><?xml version="1.0" encoding="utf-8"?>
 <p:sld xmlns:a="http://schemas.openxmlformats.org/drawingml/2006/main" xmlns:r="http://schemas.openxmlformats.org/officeDocument/2006/relationships" xmlns:p="http://schemas.openxmlformats.org/presentationml/2006/main">
   <p:cSld>
     <p:spTree>
@@ -13709,7 +14253,7 @@
                   <a:spcPts val="1055"/>
                 </a:lnSpc>
               </a:pPr>
-              <a:t>18</a:t>
+              <a:t>19</a:t>
             </a:fld>
             <a:endParaRPr sz="1000" dirty="0">
               <a:latin typeface="Calibri"/>
@@ -13842,7 +14386,7 @@
             <a:fld id="{2BF067CD-8E6B-4360-9AA8-C5DF2A48A6D1}" type="slidenum">
               <a:rPr lang="en-US" smtClean="0"/>
               <a:pPr/>
-              <a:t>18</a:t>
+              <a:t>19</a:t>
             </a:fld>
             <a:endParaRPr lang="en-US" dirty="0"/>
           </a:p>
@@ -13901,424 +14445,6 @@
                                         </p:cTn>
                                         <p:tgtEl>
                                           <p:spTgt spid="13">
-                                            <p:txEl>
-                                              <p:pRg st="2" end="2"/>
-                                            </p:txEl>
-                                          </p:spTgt>
-                                        </p:tgtEl>
-                                        <p:attrNameLst>
-                                          <p:attrName>style.visibility</p:attrName>
-                                        </p:attrNameLst>
-                                      </p:cBhvr>
-                                      <p:to>
-                                        <p:strVal val="visible"/>
-                                      </p:to>
-                                    </p:set>
-                                  </p:childTnLst>
-                                </p:cTn>
-                              </p:par>
-                            </p:childTnLst>
-                          </p:cTn>
-                        </p:par>
-                      </p:childTnLst>
-                    </p:cTn>
-                  </p:par>
-                </p:childTnLst>
-              </p:cTn>
-              <p:prevCondLst>
-                <p:cond evt="onPrev" delay="0">
-                  <p:tgtEl>
-                    <p:sldTgt/>
-                  </p:tgtEl>
-                </p:cond>
-              </p:prevCondLst>
-              <p:nextCondLst>
-                <p:cond evt="onNext" delay="0">
-                  <p:tgtEl>
-                    <p:sldTgt/>
-                  </p:tgtEl>
-                </p:cond>
-              </p:nextCondLst>
-            </p:seq>
-          </p:childTnLst>
-        </p:cTn>
-      </p:par>
-    </p:tnLst>
-  </p:timing>
-</p:sld>
-</file>
-
-<file path=ppt/slides/slide19.xml><?xml version="1.0" encoding="utf-8"?>
-<p:sld xmlns:a="http://schemas.openxmlformats.org/drawingml/2006/main" xmlns:r="http://schemas.openxmlformats.org/officeDocument/2006/relationships" xmlns:p="http://schemas.openxmlformats.org/presentationml/2006/main">
-  <p:cSld>
-    <p:spTree>
-      <p:nvGrpSpPr>
-        <p:cNvPr id="1" name=""/>
-        <p:cNvGrpSpPr/>
-        <p:nvPr/>
-      </p:nvGrpSpPr>
-      <p:grpSpPr>
-        <a:xfrm>
-          <a:off x="0" y="0"/>
-          <a:ext cx="0" cy="0"/>
-          <a:chOff x="0" y="0"/>
-          <a:chExt cx="0" cy="0"/>
-        </a:xfrm>
-      </p:grpSpPr>
-      <p:sp>
-        <p:nvSpPr>
-          <p:cNvPr id="3" name="Text Placeholder 2"/>
-          <p:cNvSpPr>
-            <a:spLocks noGrp="1"/>
-          </p:cNvSpPr>
-          <p:nvPr>
-            <p:ph type="body" sz="quarter" idx="10"/>
-          </p:nvPr>
-        </p:nvSpPr>
-        <p:spPr/>
-        <p:txBody>
-          <a:bodyPr>
-            <a:normAutofit/>
-          </a:bodyPr>
-          <a:lstStyle/>
-          <a:p>
-            <a:pPr marL="372110" marR="5080" indent="-360045">
-              <a:lnSpc>
-                <a:spcPct val="105300"/>
-              </a:lnSpc>
-              <a:spcBef>
-                <a:spcPts val="1175"/>
-              </a:spcBef>
-              <a:buFont typeface="Wingdings"/>
-              <a:buChar char=""/>
-              <a:tabLst>
-                <a:tab pos="372745" algn="l"/>
-              </a:tabLst>
-            </a:pPr>
-            <a:r>
-              <a:rPr lang="ru-RU" sz="3800" spc="-10" dirty="0">
-                <a:solidFill>
-                  <a:srgbClr val="224464"/>
-                </a:solidFill>
-                <a:cs typeface="Calibri"/>
-              </a:rPr>
-              <a:t>Релационните бази данни използват </a:t>
-            </a:r>
-            <a:r>
-              <a:rPr lang="ru-RU" sz="3800" b="1" dirty="0">
-                <a:solidFill>
-                  <a:srgbClr val="224464"/>
-                </a:solidFill>
-                <a:cs typeface="Calibri"/>
-              </a:rPr>
-              <a:t>SQL</a:t>
-            </a:r>
-            <a:r>
-              <a:rPr lang="ru-RU" sz="3800" spc="-40" dirty="0">
-                <a:solidFill>
-                  <a:srgbClr val="224464"/>
-                </a:solidFill>
-                <a:cs typeface="Calibri"/>
-              </a:rPr>
-              <a:t> </a:t>
-            </a:r>
-            <a:r>
-              <a:rPr lang="ru-RU" sz="3800" spc="-30" dirty="0">
-                <a:solidFill>
-                  <a:srgbClr val="224464"/>
-                </a:solidFill>
-                <a:cs typeface="Calibri"/>
-              </a:rPr>
-              <a:t>за дефиниране и манипулиране на данни.</a:t>
-            </a:r>
-            <a:endParaRPr lang="ru-RU" sz="3800" dirty="0">
-              <a:cs typeface="Calibri"/>
-            </a:endParaRPr>
-          </a:p>
-          <a:p>
-            <a:pPr marL="805180" lvl="1" indent="-360680">
-              <a:lnSpc>
-                <a:spcPct val="100000"/>
-              </a:lnSpc>
-              <a:spcBef>
-                <a:spcPts val="1400"/>
-              </a:spcBef>
-              <a:buFont typeface="Wingdings"/>
-              <a:buChar char=""/>
-              <a:tabLst>
-                <a:tab pos="805180" algn="l"/>
-                <a:tab pos="805815" algn="l"/>
-              </a:tabLst>
-            </a:pPr>
-            <a:r>
-              <a:rPr lang="ru-RU" sz="3600" spc="-15" dirty="0">
-                <a:solidFill>
-                  <a:srgbClr val="224464"/>
-                </a:solidFill>
-                <a:cs typeface="Calibri"/>
-              </a:rPr>
-              <a:t>Изключително мощен за сложни заявки</a:t>
-            </a:r>
-          </a:p>
-          <a:p>
-            <a:pPr marL="805180" lvl="1" indent="-360680">
-              <a:lnSpc>
-                <a:spcPct val="100000"/>
-              </a:lnSpc>
-              <a:spcBef>
-                <a:spcPts val="1400"/>
-              </a:spcBef>
-              <a:buClr>
-                <a:schemeClr val="tx1"/>
-              </a:buClr>
-              <a:buFont typeface="Wingdings"/>
-              <a:buChar char=""/>
-              <a:tabLst>
-                <a:tab pos="805180" algn="l"/>
-                <a:tab pos="805815" algn="l"/>
-              </a:tabLst>
-            </a:pPr>
-            <a:r>
-              <a:rPr lang="ru-RU" sz="3600" b="1" spc="-10" dirty="0">
-                <a:solidFill>
-                  <a:schemeClr val="bg1"/>
-                </a:solidFill>
-                <a:cs typeface="Calibri"/>
-              </a:rPr>
-              <a:t>Релационните бази данни </a:t>
-            </a:r>
-            <a:r>
-              <a:rPr lang="ru-RU" sz="3600" dirty="0"/>
-              <a:t>са най-използваната технология за управление на данни.</a:t>
-            </a:r>
-            <a:endParaRPr lang="ru-RU" sz="3600" dirty="0">
-              <a:cs typeface="Calibri"/>
-            </a:endParaRPr>
-          </a:p>
-        </p:txBody>
-      </p:sp>
-      <p:sp>
-        <p:nvSpPr>
-          <p:cNvPr id="4" name="Title 3"/>
-          <p:cNvSpPr>
-            <a:spLocks noGrp="1"/>
-          </p:cNvSpPr>
-          <p:nvPr>
-            <p:ph type="title"/>
-          </p:nvPr>
-        </p:nvSpPr>
-        <p:spPr/>
-        <p:txBody>
-          <a:bodyPr/>
-          <a:lstStyle/>
-          <a:p>
-            <a:r>
-              <a:rPr lang="en-US" sz="4000" spc="5" dirty="0"/>
-              <a:t>SQL</a:t>
-            </a:r>
-            <a:r>
-              <a:rPr lang="en-US" sz="4000" spc="-40" dirty="0"/>
-              <a:t> </a:t>
-            </a:r>
-            <a:r>
-              <a:rPr lang="bg-BG" sz="4000" spc="-15" dirty="0"/>
-              <a:t>бази данни </a:t>
-            </a:r>
-            <a:r>
-              <a:rPr lang="bg-BG" sz="4000" spc="-10" dirty="0"/>
-              <a:t>(релационни)</a:t>
-            </a:r>
-            <a:r>
-              <a:rPr lang="en-US" sz="4000" spc="-10" dirty="0"/>
-              <a:t> (2)</a:t>
-            </a:r>
-            <a:endParaRPr lang="en-US" dirty="0"/>
-          </a:p>
-        </p:txBody>
-      </p:sp>
-      <p:sp>
-        <p:nvSpPr>
-          <p:cNvPr id="5" name="Slide Number">
-            <a:extLst>
-              <a:ext uri="{FF2B5EF4-FFF2-40B4-BE49-F238E27FC236}">
-                <a16:creationId xmlns:a16="http://schemas.microsoft.com/office/drawing/2014/main" id="{CA29E6B0-9ABC-ED7E-6B26-26594269E39E}"/>
-              </a:ext>
-            </a:extLst>
-          </p:cNvPr>
-          <p:cNvSpPr txBox="1">
-            <a:spLocks/>
-          </p:cNvSpPr>
-          <p:nvPr/>
-        </p:nvSpPr>
-        <p:spPr>
-          <a:xfrm>
-            <a:off x="11753030" y="6507000"/>
-            <a:ext cx="367414" cy="297000"/>
-          </a:xfrm>
-          <a:prstGeom prst="rect">
-            <a:avLst/>
-          </a:prstGeom>
-        </p:spPr>
-        <p:txBody>
-          <a:bodyPr vert="horz" lIns="91440" tIns="45720" rIns="91440" bIns="45720" rtlCol="0" anchor="b"/>
-          <a:lstStyle>
-            <a:defPPr>
-              <a:defRPr lang="en-US"/>
-            </a:defPPr>
-            <a:lvl1pPr marL="0" algn="r" defTabSz="914400" rtl="0" eaLnBrk="1" latinLnBrk="0" hangingPunct="1">
-              <a:defRPr sz="1000" kern="1200">
-                <a:solidFill>
-                  <a:schemeClr val="tx1"/>
-                </a:solidFill>
-                <a:latin typeface="+mn-lt"/>
-                <a:ea typeface="+mn-ea"/>
-                <a:cs typeface="+mn-cs"/>
-              </a:defRPr>
-            </a:lvl1pPr>
-            <a:lvl2pPr marL="457200" algn="l" defTabSz="914400" rtl="0" eaLnBrk="1" latinLnBrk="0" hangingPunct="1">
-              <a:defRPr sz="1800" kern="1200">
-                <a:solidFill>
-                  <a:schemeClr val="tx1"/>
-                </a:solidFill>
-                <a:latin typeface="+mn-lt"/>
-                <a:ea typeface="+mn-ea"/>
-                <a:cs typeface="+mn-cs"/>
-              </a:defRPr>
-            </a:lvl2pPr>
-            <a:lvl3pPr marL="914400" algn="l" defTabSz="914400" rtl="0" eaLnBrk="1" latinLnBrk="0" hangingPunct="1">
-              <a:defRPr sz="1800" kern="1200">
-                <a:solidFill>
-                  <a:schemeClr val="tx1"/>
-                </a:solidFill>
-                <a:latin typeface="+mn-lt"/>
-                <a:ea typeface="+mn-ea"/>
-                <a:cs typeface="+mn-cs"/>
-              </a:defRPr>
-            </a:lvl3pPr>
-            <a:lvl4pPr marL="1371600" algn="l" defTabSz="914400" rtl="0" eaLnBrk="1" latinLnBrk="0" hangingPunct="1">
-              <a:defRPr sz="1800" kern="1200">
-                <a:solidFill>
-                  <a:schemeClr val="tx1"/>
-                </a:solidFill>
-                <a:latin typeface="+mn-lt"/>
-                <a:ea typeface="+mn-ea"/>
-                <a:cs typeface="+mn-cs"/>
-              </a:defRPr>
-            </a:lvl4pPr>
-            <a:lvl5pPr marL="1828800" algn="l" defTabSz="914400" rtl="0" eaLnBrk="1" latinLnBrk="0" hangingPunct="1">
-              <a:defRPr sz="1800" kern="1200">
-                <a:solidFill>
-                  <a:schemeClr val="tx1"/>
-                </a:solidFill>
-                <a:latin typeface="+mn-lt"/>
-                <a:ea typeface="+mn-ea"/>
-                <a:cs typeface="+mn-cs"/>
-              </a:defRPr>
-            </a:lvl5pPr>
-            <a:lvl6pPr marL="2286000" algn="l" defTabSz="914400" rtl="0" eaLnBrk="1" latinLnBrk="0" hangingPunct="1">
-              <a:defRPr sz="1800" kern="1200">
-                <a:solidFill>
-                  <a:schemeClr val="tx1"/>
-                </a:solidFill>
-                <a:latin typeface="+mn-lt"/>
-                <a:ea typeface="+mn-ea"/>
-                <a:cs typeface="+mn-cs"/>
-              </a:defRPr>
-            </a:lvl6pPr>
-            <a:lvl7pPr marL="2743200" algn="l" defTabSz="914400" rtl="0" eaLnBrk="1" latinLnBrk="0" hangingPunct="1">
-              <a:defRPr sz="1800" kern="1200">
-                <a:solidFill>
-                  <a:schemeClr val="tx1"/>
-                </a:solidFill>
-                <a:latin typeface="+mn-lt"/>
-                <a:ea typeface="+mn-ea"/>
-                <a:cs typeface="+mn-cs"/>
-              </a:defRPr>
-            </a:lvl7pPr>
-            <a:lvl8pPr marL="3200400" algn="l" defTabSz="914400" rtl="0" eaLnBrk="1" latinLnBrk="0" hangingPunct="1">
-              <a:defRPr sz="1800" kern="1200">
-                <a:solidFill>
-                  <a:schemeClr val="tx1"/>
-                </a:solidFill>
-                <a:latin typeface="+mn-lt"/>
-                <a:ea typeface="+mn-ea"/>
-                <a:cs typeface="+mn-cs"/>
-              </a:defRPr>
-            </a:lvl8pPr>
-            <a:lvl9pPr marL="3657600" algn="l" defTabSz="914400" rtl="0" eaLnBrk="1" latinLnBrk="0" hangingPunct="1">
-              <a:defRPr sz="1800" kern="1200">
-                <a:solidFill>
-                  <a:schemeClr val="tx1"/>
-                </a:solidFill>
-                <a:latin typeface="+mn-lt"/>
-                <a:ea typeface="+mn-ea"/>
-                <a:cs typeface="+mn-cs"/>
-              </a:defRPr>
-            </a:lvl9pPr>
-          </a:lstStyle>
-          <a:p>
-            <a:fld id="{2BF067CD-8E6B-4360-9AA8-C5DF2A48A6D1}" type="slidenum">
-              <a:rPr lang="en-US" smtClean="0"/>
-              <a:pPr/>
-              <a:t>19</a:t>
-            </a:fld>
-            <a:endParaRPr lang="en-US" dirty="0"/>
-          </a:p>
-        </p:txBody>
-      </p:sp>
-    </p:spTree>
-    <p:extLst>
-      <p:ext uri="{BB962C8B-B14F-4D97-AF65-F5344CB8AC3E}">
-        <p14:creationId xmlns:p14="http://schemas.microsoft.com/office/powerpoint/2010/main" val="1226421516"/>
-      </p:ext>
-    </p:extLst>
-  </p:cSld>
-  <p:clrMapOvr>
-    <a:masterClrMapping/>
-  </p:clrMapOvr>
-  <mc:AlternateContent xmlns:mc="http://schemas.openxmlformats.org/markup-compatibility/2006" xmlns:p14="http://schemas.microsoft.com/office/powerpoint/2010/main">
-    <mc:Choice Requires="p14">
-      <p:transition spd="slow" p14:dur="2000" advClick="0" advTm="5000"/>
-    </mc:Choice>
-    <mc:Fallback xmlns="">
-      <p:transition spd="slow" advClick="0" advTm="5000"/>
-    </mc:Fallback>
-  </mc:AlternateContent>
-  <p:timing>
-    <p:tnLst>
-      <p:par>
-        <p:cTn id="1" dur="indefinite" restart="never" nodeType="tmRoot">
-          <p:childTnLst>
-            <p:seq concurrent="1" nextAc="seek">
-              <p:cTn id="2" dur="indefinite" nodeType="mainSeq">
-                <p:childTnLst>
-                  <p:par>
-                    <p:cTn id="3" fill="hold">
-                      <p:stCondLst>
-                        <p:cond delay="indefinite"/>
-                      </p:stCondLst>
-                      <p:childTnLst>
-                        <p:par>
-                          <p:cTn id="4" fill="hold">
-                            <p:stCondLst>
-                              <p:cond delay="0"/>
-                            </p:stCondLst>
-                            <p:childTnLst>
-                              <p:par>
-                                <p:cTn id="5" presetID="1" presetClass="entr" presetSubtype="0" fill="hold" nodeType="clickEffect">
-                                  <p:stCondLst>
-                                    <p:cond delay="0"/>
-                                  </p:stCondLst>
-                                  <p:childTnLst>
-                                    <p:set>
-                                      <p:cBhvr>
-                                        <p:cTn id="6" dur="1" fill="hold">
-                                          <p:stCondLst>
-                                            <p:cond delay="0"/>
-                                          </p:stCondLst>
-                                        </p:cTn>
-                                        <p:tgtEl>
-                                          <p:spTgt spid="3">
                                             <p:txEl>
                                               <p:pRg st="2" end="2"/>
                                             </p:txEl>
@@ -14859,6 +14985,424 @@
 </file>
 
 <file path=ppt/slides/slide20.xml><?xml version="1.0" encoding="utf-8"?>
+<p:sld xmlns:a="http://schemas.openxmlformats.org/drawingml/2006/main" xmlns:r="http://schemas.openxmlformats.org/officeDocument/2006/relationships" xmlns:p="http://schemas.openxmlformats.org/presentationml/2006/main">
+  <p:cSld>
+    <p:spTree>
+      <p:nvGrpSpPr>
+        <p:cNvPr id="1" name=""/>
+        <p:cNvGrpSpPr/>
+        <p:nvPr/>
+      </p:nvGrpSpPr>
+      <p:grpSpPr>
+        <a:xfrm>
+          <a:off x="0" y="0"/>
+          <a:ext cx="0" cy="0"/>
+          <a:chOff x="0" y="0"/>
+          <a:chExt cx="0" cy="0"/>
+        </a:xfrm>
+      </p:grpSpPr>
+      <p:sp>
+        <p:nvSpPr>
+          <p:cNvPr id="3" name="Text Placeholder 2"/>
+          <p:cNvSpPr>
+            <a:spLocks noGrp="1"/>
+          </p:cNvSpPr>
+          <p:nvPr>
+            <p:ph type="body" sz="quarter" idx="10"/>
+          </p:nvPr>
+        </p:nvSpPr>
+        <p:spPr/>
+        <p:txBody>
+          <a:bodyPr>
+            <a:normAutofit/>
+          </a:bodyPr>
+          <a:lstStyle/>
+          <a:p>
+            <a:pPr marL="372110" marR="5080" indent="-360045">
+              <a:lnSpc>
+                <a:spcPct val="105300"/>
+              </a:lnSpc>
+              <a:spcBef>
+                <a:spcPts val="1175"/>
+              </a:spcBef>
+              <a:buFont typeface="Wingdings"/>
+              <a:buChar char=""/>
+              <a:tabLst>
+                <a:tab pos="372745" algn="l"/>
+              </a:tabLst>
+            </a:pPr>
+            <a:r>
+              <a:rPr lang="ru-RU" sz="3800" spc="-10" dirty="0">
+                <a:solidFill>
+                  <a:srgbClr val="224464"/>
+                </a:solidFill>
+                <a:cs typeface="Calibri"/>
+              </a:rPr>
+              <a:t>Релационните бази данни използват </a:t>
+            </a:r>
+            <a:r>
+              <a:rPr lang="ru-RU" sz="3800" b="1" dirty="0">
+                <a:solidFill>
+                  <a:srgbClr val="224464"/>
+                </a:solidFill>
+                <a:cs typeface="Calibri"/>
+              </a:rPr>
+              <a:t>SQL</a:t>
+            </a:r>
+            <a:r>
+              <a:rPr lang="ru-RU" sz="3800" spc="-40" dirty="0">
+                <a:solidFill>
+                  <a:srgbClr val="224464"/>
+                </a:solidFill>
+                <a:cs typeface="Calibri"/>
+              </a:rPr>
+              <a:t> </a:t>
+            </a:r>
+            <a:r>
+              <a:rPr lang="ru-RU" sz="3800" spc="-30" dirty="0">
+                <a:solidFill>
+                  <a:srgbClr val="224464"/>
+                </a:solidFill>
+                <a:cs typeface="Calibri"/>
+              </a:rPr>
+              <a:t>за дефиниране и манипулиране на данни.</a:t>
+            </a:r>
+            <a:endParaRPr lang="ru-RU" sz="3800" dirty="0">
+              <a:cs typeface="Calibri"/>
+            </a:endParaRPr>
+          </a:p>
+          <a:p>
+            <a:pPr marL="805180" lvl="1" indent="-360680">
+              <a:lnSpc>
+                <a:spcPct val="100000"/>
+              </a:lnSpc>
+              <a:spcBef>
+                <a:spcPts val="1400"/>
+              </a:spcBef>
+              <a:buFont typeface="Wingdings"/>
+              <a:buChar char=""/>
+              <a:tabLst>
+                <a:tab pos="805180" algn="l"/>
+                <a:tab pos="805815" algn="l"/>
+              </a:tabLst>
+            </a:pPr>
+            <a:r>
+              <a:rPr lang="ru-RU" sz="3600" spc="-15" dirty="0">
+                <a:solidFill>
+                  <a:srgbClr val="224464"/>
+                </a:solidFill>
+                <a:cs typeface="Calibri"/>
+              </a:rPr>
+              <a:t>Изключително мощен за сложни заявки</a:t>
+            </a:r>
+          </a:p>
+          <a:p>
+            <a:pPr marL="805180" lvl="1" indent="-360680">
+              <a:lnSpc>
+                <a:spcPct val="100000"/>
+              </a:lnSpc>
+              <a:spcBef>
+                <a:spcPts val="1400"/>
+              </a:spcBef>
+              <a:buClr>
+                <a:schemeClr val="tx1"/>
+              </a:buClr>
+              <a:buFont typeface="Wingdings"/>
+              <a:buChar char=""/>
+              <a:tabLst>
+                <a:tab pos="805180" algn="l"/>
+                <a:tab pos="805815" algn="l"/>
+              </a:tabLst>
+            </a:pPr>
+            <a:r>
+              <a:rPr lang="ru-RU" sz="3600" b="1" spc="-10" dirty="0">
+                <a:solidFill>
+                  <a:schemeClr val="bg1"/>
+                </a:solidFill>
+                <a:cs typeface="Calibri"/>
+              </a:rPr>
+              <a:t>Релационните бази данни </a:t>
+            </a:r>
+            <a:r>
+              <a:rPr lang="ru-RU" sz="3600" dirty="0"/>
+              <a:t>са най-използваната технология за управление на данни.</a:t>
+            </a:r>
+            <a:endParaRPr lang="ru-RU" sz="3600" dirty="0">
+              <a:cs typeface="Calibri"/>
+            </a:endParaRPr>
+          </a:p>
+        </p:txBody>
+      </p:sp>
+      <p:sp>
+        <p:nvSpPr>
+          <p:cNvPr id="4" name="Title 3"/>
+          <p:cNvSpPr>
+            <a:spLocks noGrp="1"/>
+          </p:cNvSpPr>
+          <p:nvPr>
+            <p:ph type="title"/>
+          </p:nvPr>
+        </p:nvSpPr>
+        <p:spPr/>
+        <p:txBody>
+          <a:bodyPr/>
+          <a:lstStyle/>
+          <a:p>
+            <a:r>
+              <a:rPr lang="en-US" sz="4000" spc="5" dirty="0"/>
+              <a:t>SQL</a:t>
+            </a:r>
+            <a:r>
+              <a:rPr lang="en-US" sz="4000" spc="-40" dirty="0"/>
+              <a:t> </a:t>
+            </a:r>
+            <a:r>
+              <a:rPr lang="bg-BG" sz="4000" spc="-15" dirty="0"/>
+              <a:t>бази данни </a:t>
+            </a:r>
+            <a:r>
+              <a:rPr lang="bg-BG" sz="4000" spc="-10" dirty="0"/>
+              <a:t>(релационни)</a:t>
+            </a:r>
+            <a:r>
+              <a:rPr lang="en-US" sz="4000" spc="-10" dirty="0"/>
+              <a:t> (2)</a:t>
+            </a:r>
+            <a:endParaRPr lang="en-US" dirty="0"/>
+          </a:p>
+        </p:txBody>
+      </p:sp>
+      <p:sp>
+        <p:nvSpPr>
+          <p:cNvPr id="5" name="Slide Number">
+            <a:extLst>
+              <a:ext uri="{FF2B5EF4-FFF2-40B4-BE49-F238E27FC236}">
+                <a16:creationId xmlns:a16="http://schemas.microsoft.com/office/drawing/2014/main" id="{CA29E6B0-9ABC-ED7E-6B26-26594269E39E}"/>
+              </a:ext>
+            </a:extLst>
+          </p:cNvPr>
+          <p:cNvSpPr txBox="1">
+            <a:spLocks/>
+          </p:cNvSpPr>
+          <p:nvPr/>
+        </p:nvSpPr>
+        <p:spPr>
+          <a:xfrm>
+            <a:off x="11753030" y="6507000"/>
+            <a:ext cx="367414" cy="297000"/>
+          </a:xfrm>
+          <a:prstGeom prst="rect">
+            <a:avLst/>
+          </a:prstGeom>
+        </p:spPr>
+        <p:txBody>
+          <a:bodyPr vert="horz" lIns="91440" tIns="45720" rIns="91440" bIns="45720" rtlCol="0" anchor="b"/>
+          <a:lstStyle>
+            <a:defPPr>
+              <a:defRPr lang="en-US"/>
+            </a:defPPr>
+            <a:lvl1pPr marL="0" algn="r" defTabSz="914400" rtl="0" eaLnBrk="1" latinLnBrk="0" hangingPunct="1">
+              <a:defRPr sz="1000" kern="1200">
+                <a:solidFill>
+                  <a:schemeClr val="tx1"/>
+                </a:solidFill>
+                <a:latin typeface="+mn-lt"/>
+                <a:ea typeface="+mn-ea"/>
+                <a:cs typeface="+mn-cs"/>
+              </a:defRPr>
+            </a:lvl1pPr>
+            <a:lvl2pPr marL="457200" algn="l" defTabSz="914400" rtl="0" eaLnBrk="1" latinLnBrk="0" hangingPunct="1">
+              <a:defRPr sz="1800" kern="1200">
+                <a:solidFill>
+                  <a:schemeClr val="tx1"/>
+                </a:solidFill>
+                <a:latin typeface="+mn-lt"/>
+                <a:ea typeface="+mn-ea"/>
+                <a:cs typeface="+mn-cs"/>
+              </a:defRPr>
+            </a:lvl2pPr>
+            <a:lvl3pPr marL="914400" algn="l" defTabSz="914400" rtl="0" eaLnBrk="1" latinLnBrk="0" hangingPunct="1">
+              <a:defRPr sz="1800" kern="1200">
+                <a:solidFill>
+                  <a:schemeClr val="tx1"/>
+                </a:solidFill>
+                <a:latin typeface="+mn-lt"/>
+                <a:ea typeface="+mn-ea"/>
+                <a:cs typeface="+mn-cs"/>
+              </a:defRPr>
+            </a:lvl3pPr>
+            <a:lvl4pPr marL="1371600" algn="l" defTabSz="914400" rtl="0" eaLnBrk="1" latinLnBrk="0" hangingPunct="1">
+              <a:defRPr sz="1800" kern="1200">
+                <a:solidFill>
+                  <a:schemeClr val="tx1"/>
+                </a:solidFill>
+                <a:latin typeface="+mn-lt"/>
+                <a:ea typeface="+mn-ea"/>
+                <a:cs typeface="+mn-cs"/>
+              </a:defRPr>
+            </a:lvl4pPr>
+            <a:lvl5pPr marL="1828800" algn="l" defTabSz="914400" rtl="0" eaLnBrk="1" latinLnBrk="0" hangingPunct="1">
+              <a:defRPr sz="1800" kern="1200">
+                <a:solidFill>
+                  <a:schemeClr val="tx1"/>
+                </a:solidFill>
+                <a:latin typeface="+mn-lt"/>
+                <a:ea typeface="+mn-ea"/>
+                <a:cs typeface="+mn-cs"/>
+              </a:defRPr>
+            </a:lvl5pPr>
+            <a:lvl6pPr marL="2286000" algn="l" defTabSz="914400" rtl="0" eaLnBrk="1" latinLnBrk="0" hangingPunct="1">
+              <a:defRPr sz="1800" kern="1200">
+                <a:solidFill>
+                  <a:schemeClr val="tx1"/>
+                </a:solidFill>
+                <a:latin typeface="+mn-lt"/>
+                <a:ea typeface="+mn-ea"/>
+                <a:cs typeface="+mn-cs"/>
+              </a:defRPr>
+            </a:lvl6pPr>
+            <a:lvl7pPr marL="2743200" algn="l" defTabSz="914400" rtl="0" eaLnBrk="1" latinLnBrk="0" hangingPunct="1">
+              <a:defRPr sz="1800" kern="1200">
+                <a:solidFill>
+                  <a:schemeClr val="tx1"/>
+                </a:solidFill>
+                <a:latin typeface="+mn-lt"/>
+                <a:ea typeface="+mn-ea"/>
+                <a:cs typeface="+mn-cs"/>
+              </a:defRPr>
+            </a:lvl7pPr>
+            <a:lvl8pPr marL="3200400" algn="l" defTabSz="914400" rtl="0" eaLnBrk="1" latinLnBrk="0" hangingPunct="1">
+              <a:defRPr sz="1800" kern="1200">
+                <a:solidFill>
+                  <a:schemeClr val="tx1"/>
+                </a:solidFill>
+                <a:latin typeface="+mn-lt"/>
+                <a:ea typeface="+mn-ea"/>
+                <a:cs typeface="+mn-cs"/>
+              </a:defRPr>
+            </a:lvl8pPr>
+            <a:lvl9pPr marL="3657600" algn="l" defTabSz="914400" rtl="0" eaLnBrk="1" latinLnBrk="0" hangingPunct="1">
+              <a:defRPr sz="1800" kern="1200">
+                <a:solidFill>
+                  <a:schemeClr val="tx1"/>
+                </a:solidFill>
+                <a:latin typeface="+mn-lt"/>
+                <a:ea typeface="+mn-ea"/>
+                <a:cs typeface="+mn-cs"/>
+              </a:defRPr>
+            </a:lvl9pPr>
+          </a:lstStyle>
+          <a:p>
+            <a:fld id="{2BF067CD-8E6B-4360-9AA8-C5DF2A48A6D1}" type="slidenum">
+              <a:rPr lang="en-US" smtClean="0"/>
+              <a:pPr/>
+              <a:t>20</a:t>
+            </a:fld>
+            <a:endParaRPr lang="en-US" dirty="0"/>
+          </a:p>
+        </p:txBody>
+      </p:sp>
+    </p:spTree>
+    <p:extLst>
+      <p:ext uri="{BB962C8B-B14F-4D97-AF65-F5344CB8AC3E}">
+        <p14:creationId xmlns:p14="http://schemas.microsoft.com/office/powerpoint/2010/main" val="1226421516"/>
+      </p:ext>
+    </p:extLst>
+  </p:cSld>
+  <p:clrMapOvr>
+    <a:masterClrMapping/>
+  </p:clrMapOvr>
+  <mc:AlternateContent xmlns:mc="http://schemas.openxmlformats.org/markup-compatibility/2006" xmlns:p14="http://schemas.microsoft.com/office/powerpoint/2010/main">
+    <mc:Choice Requires="p14">
+      <p:transition spd="slow" p14:dur="2000" advClick="0" advTm="5000"/>
+    </mc:Choice>
+    <mc:Fallback xmlns="">
+      <p:transition spd="slow" advClick="0" advTm="5000"/>
+    </mc:Fallback>
+  </mc:AlternateContent>
+  <p:timing>
+    <p:tnLst>
+      <p:par>
+        <p:cTn id="1" dur="indefinite" restart="never" nodeType="tmRoot">
+          <p:childTnLst>
+            <p:seq concurrent="1" nextAc="seek">
+              <p:cTn id="2" dur="indefinite" nodeType="mainSeq">
+                <p:childTnLst>
+                  <p:par>
+                    <p:cTn id="3" fill="hold">
+                      <p:stCondLst>
+                        <p:cond delay="indefinite"/>
+                      </p:stCondLst>
+                      <p:childTnLst>
+                        <p:par>
+                          <p:cTn id="4" fill="hold">
+                            <p:stCondLst>
+                              <p:cond delay="0"/>
+                            </p:stCondLst>
+                            <p:childTnLst>
+                              <p:par>
+                                <p:cTn id="5" presetID="1" presetClass="entr" presetSubtype="0" fill="hold" nodeType="clickEffect">
+                                  <p:stCondLst>
+                                    <p:cond delay="0"/>
+                                  </p:stCondLst>
+                                  <p:childTnLst>
+                                    <p:set>
+                                      <p:cBhvr>
+                                        <p:cTn id="6" dur="1" fill="hold">
+                                          <p:stCondLst>
+                                            <p:cond delay="0"/>
+                                          </p:stCondLst>
+                                        </p:cTn>
+                                        <p:tgtEl>
+                                          <p:spTgt spid="3">
+                                            <p:txEl>
+                                              <p:pRg st="2" end="2"/>
+                                            </p:txEl>
+                                          </p:spTgt>
+                                        </p:tgtEl>
+                                        <p:attrNameLst>
+                                          <p:attrName>style.visibility</p:attrName>
+                                        </p:attrNameLst>
+                                      </p:cBhvr>
+                                      <p:to>
+                                        <p:strVal val="visible"/>
+                                      </p:to>
+                                    </p:set>
+                                  </p:childTnLst>
+                                </p:cTn>
+                              </p:par>
+                            </p:childTnLst>
+                          </p:cTn>
+                        </p:par>
+                      </p:childTnLst>
+                    </p:cTn>
+                  </p:par>
+                </p:childTnLst>
+              </p:cTn>
+              <p:prevCondLst>
+                <p:cond evt="onPrev" delay="0">
+                  <p:tgtEl>
+                    <p:sldTgt/>
+                  </p:tgtEl>
+                </p:cond>
+              </p:prevCondLst>
+              <p:nextCondLst>
+                <p:cond evt="onNext" delay="0">
+                  <p:tgtEl>
+                    <p:sldTgt/>
+                  </p:tgtEl>
+                </p:cond>
+              </p:nextCondLst>
+            </p:seq>
+          </p:childTnLst>
+        </p:cTn>
+      </p:par>
+    </p:tnLst>
+  </p:timing>
+</p:sld>
+</file>
+
+<file path=ppt/slides/slide21.xml><?xml version="1.0" encoding="utf-8"?>
 <p:sld xmlns:a="http://schemas.openxmlformats.org/drawingml/2006/main" xmlns:r="http://schemas.openxmlformats.org/officeDocument/2006/relationships" xmlns:p="http://schemas.openxmlformats.org/presentationml/2006/main">
   <p:cSld>
     <p:spTree>
@@ -17291,7 +17835,7 @@
             <a:fld id="{2BF067CD-8E6B-4360-9AA8-C5DF2A48A6D1}" type="slidenum">
               <a:rPr lang="en-US" noProof="0" smtClean="0"/>
               <a:pPr/>
-              <a:t>20</a:t>
+              <a:t>21</a:t>
             </a:fld>
             <a:endParaRPr lang="en-US" noProof="0" dirty="0"/>
           </a:p>
@@ -17627,7 +18171,7 @@
 </p:sld>
 </file>
 
-<file path=ppt/slides/slide21.xml><?xml version="1.0" encoding="utf-8"?>
+<file path=ppt/slides/slide22.xml><?xml version="1.0" encoding="utf-8"?>
 <p:sld xmlns:a="http://schemas.openxmlformats.org/drawingml/2006/main" xmlns:r="http://schemas.openxmlformats.org/officeDocument/2006/relationships" xmlns:p="http://schemas.openxmlformats.org/presentationml/2006/main">
   <p:cSld>
     <p:spTree>
@@ -17926,7 +18470,7 @@
                   <a:spcPts val="1055"/>
                 </a:lnSpc>
               </a:pPr>
-              <a:t>21</a:t>
+              <a:t>22</a:t>
             </a:fld>
             <a:endParaRPr sz="1000" dirty="0">
               <a:latin typeface="Calibri"/>
@@ -17997,7 +18541,7 @@
             <a:fld id="{2BF067CD-8E6B-4360-9AA8-C5DF2A48A6D1}" type="slidenum">
               <a:rPr lang="en-US" noProof="0" smtClean="0"/>
               <a:pPr/>
-              <a:t>21</a:t>
+              <a:t>22</a:t>
             </a:fld>
             <a:endParaRPr lang="en-US" noProof="0" dirty="0"/>
           </a:p>
@@ -18148,7 +18692,7 @@
 </p:sld>
 </file>
 
-<file path=ppt/slides/slide22.xml><?xml version="1.0" encoding="utf-8"?>
+<file path=ppt/slides/slide23.xml><?xml version="1.0" encoding="utf-8"?>
 <p:sld xmlns:a="http://schemas.openxmlformats.org/drawingml/2006/main" xmlns:r="http://schemas.openxmlformats.org/officeDocument/2006/relationships" xmlns:p="http://schemas.openxmlformats.org/presentationml/2006/main">
   <p:cSld>
     <p:spTree>
@@ -21171,7 +21715,7 @@
                   <a:spcPts val="1055"/>
                 </a:lnSpc>
               </a:pPr>
-              <a:t>22</a:t>
+              <a:t>23</a:t>
             </a:fld>
             <a:endParaRPr sz="1000" dirty="0">
               <a:latin typeface="Calibri"/>
@@ -21320,7 +21864,7 @@
             <a:fld id="{2BF067CD-8E6B-4360-9AA8-C5DF2A48A6D1}" type="slidenum">
               <a:rPr lang="en-US" noProof="0" smtClean="0"/>
               <a:pPr/>
-              <a:t>22</a:t>
+              <a:t>23</a:t>
             </a:fld>
             <a:endParaRPr lang="en-US" noProof="0" dirty="0"/>
           </a:p>
@@ -21579,7 +22123,7 @@
 </p:sld>
 </file>
 
-<file path=ppt/slides/slide23.xml><?xml version="1.0" encoding="utf-8"?>
+<file path=ppt/slides/slide24.xml><?xml version="1.0" encoding="utf-8"?>
 <p:sld xmlns:a="http://schemas.openxmlformats.org/drawingml/2006/main" xmlns:r="http://schemas.openxmlformats.org/officeDocument/2006/relationships" xmlns:p="http://schemas.openxmlformats.org/presentationml/2006/main">
   <p:cSld>
     <p:spTree>
@@ -21717,7 +22261,7 @@
 </p:sld>
 </file>
 
-<file path=ppt/slides/slide24.xml><?xml version="1.0" encoding="utf-8"?>
+<file path=ppt/slides/slide25.xml><?xml version="1.0" encoding="utf-8"?>
 <p:sld xmlns:a="http://schemas.openxmlformats.org/drawingml/2006/main" xmlns:r="http://schemas.openxmlformats.org/officeDocument/2006/relationships" xmlns:p="http://schemas.openxmlformats.org/presentationml/2006/main">
   <p:cSld>
     <p:spTree>
@@ -22190,7 +22734,7 @@
                   <a:spcPts val="1055"/>
                 </a:lnSpc>
               </a:pPr>
-              <a:t>24</a:t>
+              <a:t>25</a:t>
             </a:fld>
             <a:endParaRPr sz="1000" dirty="0">
               <a:latin typeface="Calibri"/>
@@ -22323,7 +22867,7 @@
             <a:fld id="{2BF067CD-8E6B-4360-9AA8-C5DF2A48A6D1}" type="slidenum">
               <a:rPr lang="en-US" smtClean="0"/>
               <a:pPr/>
-              <a:t>24</a:t>
+              <a:t>25</a:t>
             </a:fld>
             <a:endParaRPr lang="en-US" dirty="0"/>
           </a:p>
@@ -22607,7 +23151,7 @@
 </p:sld>
 </file>
 
-<file path=ppt/slides/slide25.xml><?xml version="1.0" encoding="utf-8"?>
+<file path=ppt/slides/slide26.xml><?xml version="1.0" encoding="utf-8"?>
 <p:sld xmlns:a="http://schemas.openxmlformats.org/drawingml/2006/main" xmlns:r="http://schemas.openxmlformats.org/officeDocument/2006/relationships" xmlns:p="http://schemas.openxmlformats.org/presentationml/2006/main">
   <p:cSld>
     <p:spTree>
@@ -23450,7 +23994,7 @@
                   <a:spcPts val="1065"/>
                 </a:lnSpc>
               </a:pPr>
-              <a:t>25</a:t>
+              <a:t>26</a:t>
             </a:fld>
             <a:endParaRPr sz="1000" dirty="0">
               <a:latin typeface="Calibri"/>
@@ -23495,7 +24039,7 @@
             <a:fld id="{2BF067CD-8E6B-4360-9AA8-C5DF2A48A6D1}" type="slidenum">
               <a:rPr lang="en-US" noProof="0" smtClean="0"/>
               <a:pPr/>
-              <a:t>25</a:t>
+              <a:t>26</a:t>
             </a:fld>
             <a:endParaRPr lang="en-US" noProof="0" dirty="0"/>
           </a:p>
@@ -23726,7 +24270,7 @@
 </p:sld>
 </file>
 
-<file path=ppt/slides/slide26.xml><?xml version="1.0" encoding="utf-8"?>
+<file path=ppt/slides/slide27.xml><?xml version="1.0" encoding="utf-8"?>
 <p:sld xmlns:a="http://schemas.openxmlformats.org/drawingml/2006/main" xmlns:r="http://schemas.openxmlformats.org/officeDocument/2006/relationships" xmlns:p="http://schemas.openxmlformats.org/presentationml/2006/main">
   <p:cSld>
     <p:spTree>
@@ -23840,7 +24384,7 @@
 </p:sld>
 </file>
 
-<file path=ppt/slides/slide27.xml><?xml version="1.0" encoding="utf-8"?>
+<file path=ppt/slides/slide28.xml><?xml version="1.0" encoding="utf-8"?>
 <p:sld xmlns:a="http://schemas.openxmlformats.org/drawingml/2006/main" xmlns:r="http://schemas.openxmlformats.org/officeDocument/2006/relationships" xmlns:p="http://schemas.openxmlformats.org/presentationml/2006/main">
   <p:cSld>
     <p:spTree>
@@ -23870,7 +24414,7 @@
         <p:spPr/>
         <p:txBody>
           <a:bodyPr>
-            <a:normAutofit fontScale="92500" lnSpcReduction="10000"/>
+            <a:normAutofit fontScale="77500" lnSpcReduction="20000"/>
           </a:bodyPr>
           <a:lstStyle/>
           <a:p>
@@ -23883,7 +24427,140 @@
               <a:rPr lang="bg-BG" sz="3500" dirty="0"/>
               <a:t>Числови</a:t>
             </a:r>
-            <a:endParaRPr lang="en-US" sz="3500" noProof="1"/>
+          </a:p>
+          <a:p>
+            <a:pPr lvl="1">
+              <a:lnSpc>
+                <a:spcPct val="100000"/>
+              </a:lnSpc>
+            </a:pPr>
+            <a:r>
+              <a:rPr lang="bg-BG" sz="3300" noProof="1"/>
+              <a:t>Целочислени типове данни:</a:t>
+            </a:r>
+            <a:endParaRPr lang="en-US" sz="3300" noProof="1"/>
+          </a:p>
+          <a:p>
+            <a:pPr lvl="2">
+              <a:lnSpc>
+                <a:spcPct val="100000"/>
+              </a:lnSpc>
+              <a:buClr>
+                <a:schemeClr val="tx1"/>
+              </a:buClr>
+            </a:pPr>
+            <a:r>
+              <a:rPr lang="en-US" b="1" noProof="1">
+                <a:solidFill>
+                  <a:schemeClr val="bg1"/>
+                </a:solidFill>
+                <a:latin typeface="Consolas" panose="020B0609020204030204" pitchFamily="49" charset="0"/>
+                <a:cs typeface="Consolas" pitchFamily="49" charset="0"/>
+              </a:rPr>
+              <a:t>BIT</a:t>
+            </a:r>
+            <a:r>
+              <a:rPr lang="en-US" noProof="1">
+                <a:solidFill>
+                  <a:schemeClr val="tx2">
+                    <a:lumMod val="75000"/>
+                  </a:schemeClr>
+                </a:solidFill>
+              </a:rPr>
+              <a:t> </a:t>
+            </a:r>
+            <a:r>
+              <a:rPr lang="en-US" noProof="1"/>
+              <a:t>(1-bit), </a:t>
+            </a:r>
+            <a:r>
+              <a:rPr lang="en-US" b="1" noProof="1">
+                <a:solidFill>
+                  <a:schemeClr val="bg1"/>
+                </a:solidFill>
+                <a:latin typeface="Consolas" panose="020B0609020204030204" pitchFamily="49" charset="0"/>
+                <a:cs typeface="Consolas" pitchFamily="49" charset="0"/>
+              </a:rPr>
+              <a:t>TINYINT</a:t>
+            </a:r>
+            <a:r>
+              <a:rPr lang="en-US" noProof="1"/>
+              <a:t> (8-bit), </a:t>
+            </a:r>
+            <a:r>
+              <a:rPr lang="en-US" b="1" noProof="1">
+                <a:solidFill>
+                  <a:schemeClr val="bg1"/>
+                </a:solidFill>
+                <a:latin typeface="Consolas" panose="020B0609020204030204" pitchFamily="49" charset="0"/>
+                <a:cs typeface="Consolas" pitchFamily="49" charset="0"/>
+              </a:rPr>
+              <a:t>SMALLINT</a:t>
+            </a:r>
+            <a:r>
+              <a:rPr lang="en-US" noProof="1"/>
+              <a:t> (16-bit)</a:t>
+            </a:r>
+          </a:p>
+          <a:p>
+            <a:pPr lvl="2">
+              <a:lnSpc>
+                <a:spcPct val="100000"/>
+              </a:lnSpc>
+              <a:buClr>
+                <a:schemeClr val="tx1"/>
+              </a:buClr>
+            </a:pPr>
+            <a:r>
+              <a:rPr lang="en-US" b="1" noProof="1">
+                <a:solidFill>
+                  <a:schemeClr val="bg1"/>
+                </a:solidFill>
+                <a:latin typeface="Consolas" panose="020B0609020204030204" pitchFamily="49" charset="0"/>
+                <a:cs typeface="Consolas" pitchFamily="49" charset="0"/>
+              </a:rPr>
+              <a:t>INT</a:t>
+            </a:r>
+            <a:r>
+              <a:rPr lang="en-US" b="1" noProof="1">
+                <a:solidFill>
+                  <a:schemeClr val="tx2">
+                    <a:lumMod val="75000"/>
+                  </a:schemeClr>
+                </a:solidFill>
+                <a:cs typeface="Consolas" pitchFamily="49" charset="0"/>
+              </a:rPr>
+              <a:t> </a:t>
+            </a:r>
+            <a:r>
+              <a:rPr lang="en-US" noProof="1"/>
+              <a:t>(32-bit), </a:t>
+            </a:r>
+            <a:r>
+              <a:rPr lang="en-US" b="1" noProof="1">
+                <a:solidFill>
+                  <a:schemeClr val="bg1"/>
+                </a:solidFill>
+                <a:latin typeface="Consolas" panose="020B0609020204030204" pitchFamily="49" charset="0"/>
+                <a:cs typeface="Consolas" pitchFamily="49" charset="0"/>
+              </a:rPr>
+              <a:t>BIGINT</a:t>
+            </a:r>
+            <a:r>
+              <a:rPr lang="en-US" noProof="1">
+                <a:solidFill>
+                  <a:schemeClr val="tx2">
+                    <a:lumMod val="75000"/>
+                  </a:schemeClr>
+                </a:solidFill>
+              </a:rPr>
+              <a:t> </a:t>
+            </a:r>
+            <a:r>
+              <a:rPr lang="en-US" noProof="1"/>
+              <a:t>(64-bit)</a:t>
+            </a:r>
+            <a:endParaRPr lang="bg-BG" noProof="1"/>
           </a:p>
           <a:p>
             <a:pPr lvl="1">
@@ -23895,6 +24572,21 @@
               </a:buClr>
             </a:pPr>
             <a:r>
+              <a:rPr lang="bg-BG" noProof="1"/>
+              <a:t>Типове данни с плаваща запетая:</a:t>
+            </a:r>
+            <a:endParaRPr lang="en-US" noProof="1"/>
+          </a:p>
+          <a:p>
+            <a:pPr lvl="2">
+              <a:lnSpc>
+                <a:spcPct val="100000"/>
+              </a:lnSpc>
+              <a:buClr>
+                <a:schemeClr val="tx1"/>
+              </a:buClr>
+            </a:pPr>
+            <a:r>
               <a:rPr lang="en-US" b="1" noProof="1">
                 <a:solidFill>
                   <a:schemeClr val="bg1"/>
@@ -23902,50 +24594,85 @@
                 <a:latin typeface="Consolas" panose="020B0609020204030204" pitchFamily="49" charset="0"/>
                 <a:cs typeface="Consolas" pitchFamily="49" charset="0"/>
               </a:rPr>
-              <a:t>BIT</a:t>
-            </a:r>
-            <a:r>
-              <a:rPr lang="en-US" noProof="1">
+              <a:t>FLOAT</a:t>
+            </a:r>
+            <a:r>
+              <a:rPr lang="en-US" noProof="1"/>
+              <a:t>, </a:t>
+            </a:r>
+            <a:r>
+              <a:rPr lang="en-US" b="1" noProof="1">
+                <a:solidFill>
+                  <a:schemeClr val="bg1"/>
+                </a:solidFill>
+                <a:latin typeface="Consolas" panose="020B0609020204030204" pitchFamily="49" charset="0"/>
+                <a:cs typeface="Consolas" pitchFamily="49" charset="0"/>
+              </a:rPr>
+              <a:t>REAL</a:t>
+            </a:r>
+            <a:r>
+              <a:rPr lang="en-US" noProof="1"/>
+              <a:t>, </a:t>
+            </a:r>
+            <a:r>
+              <a:rPr lang="en-US" b="1" noProof="1">
+                <a:solidFill>
+                  <a:schemeClr val="bg1"/>
+                </a:solidFill>
+                <a:latin typeface="Consolas" panose="020B0609020204030204" pitchFamily="49" charset="0"/>
+                <a:cs typeface="Consolas" pitchFamily="49" charset="0"/>
+              </a:rPr>
+              <a:t>DECIMAL</a:t>
+            </a:r>
+            <a:r>
+              <a:rPr lang="en-US" b="1" noProof="1">
                 <a:solidFill>
                   <a:schemeClr val="tx2">
                     <a:lumMod val="75000"/>
                   </a:schemeClr>
                 </a:solidFill>
-              </a:rPr>
-              <a:t> </a:t>
-            </a:r>
-            <a:r>
-              <a:rPr lang="en-US" noProof="1"/>
-              <a:t>(1-bit), </a:t>
-            </a:r>
-            <a:r>
-              <a:rPr lang="en-US" b="1" noProof="1">
-                <a:solidFill>
-                  <a:schemeClr val="bg1"/>
-                </a:solidFill>
                 <a:latin typeface="Consolas" panose="020B0609020204030204" pitchFamily="49" charset="0"/>
                 <a:cs typeface="Consolas" pitchFamily="49" charset="0"/>
               </a:rPr>
-              <a:t>TINYINT</a:t>
-            </a:r>
-            <a:r>
-              <a:rPr lang="en-US" noProof="1"/>
-              <a:t> (8-bit), </a:t>
+              <a:t>(</a:t>
             </a:r>
             <a:r>
               <a:rPr lang="en-US" b="1" noProof="1">
                 <a:solidFill>
                   <a:schemeClr val="bg1"/>
                 </a:solidFill>
-                <a:latin typeface="Consolas" panose="020B0609020204030204" pitchFamily="49" charset="0"/>
+                <a:latin typeface="Consolas" pitchFamily="49" charset="0"/>
                 <a:cs typeface="Consolas" pitchFamily="49" charset="0"/>
               </a:rPr>
-              <a:t>SMALLINT</a:t>
-            </a:r>
-            <a:r>
-              <a:rPr lang="en-US" noProof="1"/>
-              <a:t> (16-bit)</a:t>
-            </a:r>
+              <a:t>precision, scale</a:t>
+            </a:r>
+            <a:r>
+              <a:rPr lang="en-US" b="1" noProof="1">
+                <a:solidFill>
+                  <a:schemeClr val="tx2">
+                    <a:lumMod val="75000"/>
+                  </a:schemeClr>
+                </a:solidFill>
+                <a:latin typeface="Consolas" pitchFamily="49" charset="0"/>
+                <a:cs typeface="Consolas" pitchFamily="49" charset="0"/>
+              </a:rPr>
+              <a:t>)</a:t>
+            </a:r>
+          </a:p>
+          <a:p>
+            <a:pPr>
+              <a:lnSpc>
+                <a:spcPct val="100000"/>
+              </a:lnSpc>
+              <a:buClr>
+                <a:schemeClr val="tx1"/>
+              </a:buClr>
+            </a:pPr>
+            <a:r>
+              <a:rPr lang="bg-BG" sz="3500" dirty="0"/>
+              <a:t>Текстови</a:t>
+            </a:r>
+            <a:endParaRPr lang="en-US" sz="3500" noProof="1"/>
           </a:p>
           <a:p>
             <a:pPr lvl="1">
@@ -23957,54 +24684,70 @@
               </a:buClr>
             </a:pPr>
             <a:r>
-              <a:rPr lang="en-US" b="1" noProof="1">
+              <a:rPr lang="en-US" sz="3000" b="1" noProof="1">
                 <a:solidFill>
                   <a:schemeClr val="bg1"/>
                 </a:solidFill>
                 <a:latin typeface="Consolas" panose="020B0609020204030204" pitchFamily="49" charset="0"/>
                 <a:cs typeface="Consolas" pitchFamily="49" charset="0"/>
               </a:rPr>
-              <a:t>INT</a:t>
-            </a:r>
-            <a:r>
-              <a:rPr lang="en-US" b="1" noProof="1">
+              <a:t>CHAR</a:t>
+            </a:r>
+            <a:r>
+              <a:rPr lang="en-US" sz="3000" b="1" noProof="1">
                 <a:solidFill>
                   <a:schemeClr val="tx2">
                     <a:lumMod val="75000"/>
                   </a:schemeClr>
                 </a:solidFill>
-                <a:cs typeface="Consolas" pitchFamily="49" charset="0"/>
-              </a:rPr>
-              <a:t> </a:t>
-            </a:r>
-            <a:r>
-              <a:rPr lang="en-US" noProof="1"/>
-              <a:t>(32-bit), </a:t>
-            </a:r>
-            <a:r>
-              <a:rPr lang="en-US" b="1" noProof="1">
-                <a:solidFill>
-                  <a:schemeClr val="bg1"/>
-                </a:solidFill>
                 <a:latin typeface="Consolas" panose="020B0609020204030204" pitchFamily="49" charset="0"/>
                 <a:cs typeface="Consolas" pitchFamily="49" charset="0"/>
               </a:rPr>
-              <a:t>BIGINT</a:t>
-            </a:r>
-            <a:r>
-              <a:rPr lang="en-US" noProof="1">
+              <a:t>(</a:t>
+            </a:r>
+            <a:r>
+              <a:rPr lang="en-US" sz="3000" b="1" noProof="1">
+                <a:solidFill>
+                  <a:schemeClr val="bg1"/>
+                </a:solidFill>
+                <a:latin typeface="Consolas" panose="020B0609020204030204" pitchFamily="49" charset="0"/>
+                <a:cs typeface="Consolas" pitchFamily="49" charset="0"/>
+              </a:rPr>
+              <a:t>size</a:t>
+            </a:r>
+            <a:r>
+              <a:rPr lang="en-US" sz="3000" b="1" noProof="1">
                 <a:solidFill>
                   <a:schemeClr val="tx2">
                     <a:lumMod val="75000"/>
                   </a:schemeClr>
                 </a:solidFill>
+                <a:latin typeface="Consolas" panose="020B0609020204030204" pitchFamily="49" charset="0"/>
+                <a:cs typeface="Consolas" pitchFamily="49" charset="0"/>
+              </a:rPr>
+              <a:t>)</a:t>
+            </a:r>
+            <a:r>
+              <a:rPr lang="en-US" sz="2800" noProof="1">
+                <a:solidFill>
+                  <a:schemeClr val="accent5">
+                    <a:lumMod val="20000"/>
+                    <a:lumOff val="80000"/>
+                  </a:schemeClr>
+                </a:solidFill>
+                <a:cs typeface="Consolas" pitchFamily="49" charset="0"/>
               </a:rPr>
               <a:t> </a:t>
             </a:r>
             <a:r>
               <a:rPr lang="en-US" noProof="1"/>
-              <a:t>(64-bit)</a:t>
-            </a:r>
+              <a:t>– </a:t>
+            </a:r>
+            <a:r>
+              <a:rPr lang="bg-BG" dirty="0"/>
+              <a:t>низ с фиксиран размер</a:t>
+            </a:r>
+            <a:endParaRPr lang="en-US" noProof="1"/>
           </a:p>
           <a:p>
             <a:pPr lvl="1">
@@ -24016,45 +24759,17 @@
               </a:buClr>
             </a:pPr>
             <a:r>
-              <a:rPr lang="en-US" b="1" noProof="1">
+              <a:rPr lang="en-US" sz="3000" b="1" noProof="1">
                 <a:solidFill>
                   <a:schemeClr val="bg1"/>
                 </a:solidFill>
                 <a:latin typeface="Consolas" panose="020B0609020204030204" pitchFamily="49" charset="0"/>
                 <a:cs typeface="Consolas" pitchFamily="49" charset="0"/>
               </a:rPr>
-              <a:t>FLOAT</a:t>
-            </a:r>
-            <a:r>
-              <a:rPr lang="en-US" noProof="1"/>
-              <a:t>, </a:t>
-            </a:r>
-            <a:r>
-              <a:rPr lang="en-US" b="1" noProof="1">
-                <a:solidFill>
-                  <a:schemeClr val="bg1"/>
-                </a:solidFill>
-                <a:latin typeface="Consolas" panose="020B0609020204030204" pitchFamily="49" charset="0"/>
-                <a:cs typeface="Consolas" pitchFamily="49" charset="0"/>
-              </a:rPr>
-              <a:t>REAL</a:t>
-            </a:r>
-            <a:r>
-              <a:rPr lang="en-US" noProof="1"/>
-              <a:t>, </a:t>
-            </a:r>
-            <a:r>
-              <a:rPr lang="en-US" b="1" noProof="1">
-                <a:solidFill>
-                  <a:schemeClr val="bg1"/>
-                </a:solidFill>
-                <a:latin typeface="Consolas" panose="020B0609020204030204" pitchFamily="49" charset="0"/>
-                <a:cs typeface="Consolas" pitchFamily="49" charset="0"/>
-              </a:rPr>
-              <a:t>DECIMAL</a:t>
-            </a:r>
-            <a:r>
-              <a:rPr lang="en-US" b="1" noProof="1">
+              <a:t>VARCHAR</a:t>
+            </a:r>
+            <a:r>
+              <a:rPr lang="en-US" sz="3000" b="1" noProof="1">
                 <a:solidFill>
                   <a:schemeClr val="tx2">
                     <a:lumMod val="75000"/>
@@ -24066,27 +24781,202 @@
               <a:t>(</a:t>
             </a:r>
             <a:r>
-              <a:rPr lang="en-US" b="1" noProof="1">
+              <a:rPr lang="en-US" sz="3000" b="1" noProof="1">
                 <a:solidFill>
                   <a:schemeClr val="bg1"/>
                 </a:solidFill>
-                <a:latin typeface="Consolas" pitchFamily="49" charset="0"/>
+                <a:latin typeface="Consolas" panose="020B0609020204030204" pitchFamily="49" charset="0"/>
                 <a:cs typeface="Consolas" pitchFamily="49" charset="0"/>
               </a:rPr>
-              <a:t>precision, scale</a:t>
-            </a:r>
-            <a:r>
-              <a:rPr lang="en-US" b="1" noProof="1">
+              <a:t>size</a:t>
+            </a:r>
+            <a:r>
+              <a:rPr lang="en-US" sz="3000" b="1" noProof="1">
                 <a:solidFill>
                   <a:schemeClr val="tx2">
                     <a:lumMod val="75000"/>
                   </a:schemeClr>
                 </a:solidFill>
-                <a:latin typeface="Consolas" pitchFamily="49" charset="0"/>
+                <a:latin typeface="Consolas" panose="020B0609020204030204" pitchFamily="49" charset="0"/>
                 <a:cs typeface="Consolas" pitchFamily="49" charset="0"/>
               </a:rPr>
               <a:t>)</a:t>
             </a:r>
+            <a:r>
+              <a:rPr lang="en-US" sz="3000" noProof="1">
+                <a:solidFill>
+                  <a:schemeClr val="accent5">
+                    <a:lumMod val="20000"/>
+                    <a:lumOff val="80000"/>
+                  </a:schemeClr>
+                </a:solidFill>
+                <a:cs typeface="Consolas" pitchFamily="49" charset="0"/>
+              </a:rPr>
+              <a:t> </a:t>
+            </a:r>
+            <a:r>
+              <a:rPr lang="en-US" noProof="1"/>
+              <a:t>– </a:t>
+            </a:r>
+            <a:r>
+              <a:rPr lang="ru-RU" dirty="0"/>
+              <a:t>символен </a:t>
+            </a:r>
+            <a:r>
+              <a:rPr lang="bg-BG" dirty="0"/>
+              <a:t>низ с променлив размер</a:t>
+            </a:r>
+            <a:endParaRPr lang="en-US" dirty="0"/>
+          </a:p>
+          <a:p>
+            <a:pPr lvl="1">
+              <a:lnSpc>
+                <a:spcPct val="100000"/>
+              </a:lnSpc>
+              <a:buClr>
+                <a:schemeClr val="tx1"/>
+              </a:buClr>
+            </a:pPr>
+            <a:r>
+              <a:rPr lang="en-US" sz="3000" b="1" noProof="1">
+                <a:solidFill>
+                  <a:schemeClr val="bg1"/>
+                </a:solidFill>
+                <a:latin typeface="Consolas" panose="020B0609020204030204" pitchFamily="49" charset="0"/>
+                <a:cs typeface="Consolas" pitchFamily="49" charset="0"/>
+              </a:rPr>
+              <a:t>NCHAR</a:t>
+            </a:r>
+            <a:r>
+              <a:rPr lang="en-US" sz="3000" b="1" noProof="1">
+                <a:solidFill>
+                  <a:schemeClr val="tx2">
+                    <a:lumMod val="75000"/>
+                  </a:schemeClr>
+                </a:solidFill>
+                <a:latin typeface="Consolas" panose="020B0609020204030204" pitchFamily="49" charset="0"/>
+                <a:cs typeface="Consolas" pitchFamily="49" charset="0"/>
+              </a:rPr>
+              <a:t>(</a:t>
+            </a:r>
+            <a:r>
+              <a:rPr lang="en-US" sz="3000" b="1" noProof="1">
+                <a:solidFill>
+                  <a:schemeClr val="bg1"/>
+                </a:solidFill>
+                <a:latin typeface="Consolas" panose="020B0609020204030204" pitchFamily="49" charset="0"/>
+                <a:cs typeface="Consolas" pitchFamily="49" charset="0"/>
+              </a:rPr>
+              <a:t>size</a:t>
+            </a:r>
+            <a:r>
+              <a:rPr lang="en-US" sz="3000" b="1" noProof="1">
+                <a:solidFill>
+                  <a:schemeClr val="tx2">
+                    <a:lumMod val="75000"/>
+                  </a:schemeClr>
+                </a:solidFill>
+                <a:latin typeface="Consolas" panose="020B0609020204030204" pitchFamily="49" charset="0"/>
+                <a:cs typeface="Consolas" pitchFamily="49" charset="0"/>
+              </a:rPr>
+              <a:t>)</a:t>
+            </a:r>
+            <a:r>
+              <a:rPr lang="en-US" sz="3500" noProof="1"/>
+              <a:t> </a:t>
+            </a:r>
+            <a:r>
+              <a:rPr lang="en-US" noProof="1"/>
+              <a:t>– </a:t>
+            </a:r>
+            <a:r>
+              <a:rPr lang="ru-RU" noProof="1"/>
+              <a:t>Unicode низ с фиксиран размер</a:t>
+            </a:r>
+            <a:endParaRPr lang="bg-BG" dirty="0"/>
+          </a:p>
+          <a:p>
+            <a:pPr lvl="1">
+              <a:lnSpc>
+                <a:spcPct val="100000"/>
+              </a:lnSpc>
+              <a:buClr>
+                <a:schemeClr val="tx1"/>
+              </a:buClr>
+            </a:pPr>
+            <a:r>
+              <a:rPr lang="en-US" sz="3000" b="1" noProof="1">
+                <a:solidFill>
+                  <a:schemeClr val="bg1"/>
+                </a:solidFill>
+                <a:latin typeface="Consolas" panose="020B0609020204030204" pitchFamily="49" charset="0"/>
+                <a:cs typeface="Consolas" pitchFamily="49" charset="0"/>
+              </a:rPr>
+              <a:t>NVARCHAR</a:t>
+            </a:r>
+            <a:r>
+              <a:rPr lang="en-US" sz="3000" b="1" noProof="1">
+                <a:solidFill>
+                  <a:schemeClr val="tx2">
+                    <a:lumMod val="75000"/>
+                  </a:schemeClr>
+                </a:solidFill>
+                <a:latin typeface="Consolas" panose="020B0609020204030204" pitchFamily="49" charset="0"/>
+                <a:cs typeface="Consolas" pitchFamily="49" charset="0"/>
+              </a:rPr>
+              <a:t>(</a:t>
+            </a:r>
+            <a:r>
+              <a:rPr lang="en-US" sz="3000" b="1" noProof="1">
+                <a:solidFill>
+                  <a:schemeClr val="bg1"/>
+                </a:solidFill>
+                <a:latin typeface="Consolas" panose="020B0609020204030204" pitchFamily="49" charset="0"/>
+                <a:cs typeface="Consolas" pitchFamily="49" charset="0"/>
+              </a:rPr>
+              <a:t>size</a:t>
+            </a:r>
+            <a:r>
+              <a:rPr lang="en-US" sz="3000" b="1" noProof="1">
+                <a:solidFill>
+                  <a:schemeClr val="tx2">
+                    <a:lumMod val="75000"/>
+                  </a:schemeClr>
+                </a:solidFill>
+                <a:latin typeface="Consolas" panose="020B0609020204030204" pitchFamily="49" charset="0"/>
+                <a:cs typeface="Consolas" pitchFamily="49" charset="0"/>
+              </a:rPr>
+              <a:t>)</a:t>
+            </a:r>
+            <a:r>
+              <a:rPr lang="en-US" sz="2800" noProof="1">
+                <a:solidFill>
+                  <a:schemeClr val="accent5">
+                    <a:lumMod val="20000"/>
+                    <a:lumOff val="80000"/>
+                  </a:schemeClr>
+                </a:solidFill>
+                <a:cs typeface="Consolas" pitchFamily="49" charset="0"/>
+              </a:rPr>
+              <a:t> </a:t>
+            </a:r>
+            <a:r>
+              <a:rPr lang="en-US" noProof="1"/>
+              <a:t>– </a:t>
+            </a:r>
+            <a:r>
+              <a:rPr lang="ru-RU" noProof="1"/>
+              <a:t>Unicode </a:t>
+            </a:r>
+            <a:r>
+              <a:rPr lang="ru-RU" dirty="0"/>
+              <a:t>символен</a:t>
+            </a:r>
+            <a:r>
+              <a:rPr lang="ru-RU" noProof="1"/>
+              <a:t> низ с променлив размер</a:t>
+            </a:r>
+            <a:endParaRPr lang="en-US" noProof="1"/>
           </a:p>
           <a:p>
             <a:pPr>
@@ -24098,300 +24988,20 @@
               </a:buClr>
             </a:pPr>
             <a:r>
-              <a:rPr lang="bg-BG" sz="3500" dirty="0"/>
-              <a:t>Текстови</a:t>
-            </a:r>
-            <a:endParaRPr lang="en-US" sz="3500" noProof="1"/>
-          </a:p>
-          <a:p>
-            <a:pPr lvl="1">
-              <a:lnSpc>
-                <a:spcPct val="100000"/>
-              </a:lnSpc>
-              <a:buClr>
-                <a:schemeClr val="tx1"/>
-              </a:buClr>
-            </a:pPr>
-            <a:r>
-              <a:rPr lang="en-US" sz="3000" b="1" noProof="1">
+              <a:rPr lang="en-US" b="1" noProof="1">
                 <a:solidFill>
                   <a:schemeClr val="bg1"/>
                 </a:solidFill>
-                <a:latin typeface="Consolas" panose="020B0609020204030204" pitchFamily="49" charset="0"/>
-                <a:cs typeface="Consolas" pitchFamily="49" charset="0"/>
-              </a:rPr>
-              <a:t>CHAR</a:t>
-            </a:r>
-            <a:r>
-              <a:rPr lang="en-US" sz="3000" b="1" noProof="1">
-                <a:solidFill>
-                  <a:schemeClr val="tx2">
-                    <a:lumMod val="75000"/>
-                  </a:schemeClr>
-                </a:solidFill>
-                <a:latin typeface="Consolas" panose="020B0609020204030204" pitchFamily="49" charset="0"/>
-                <a:cs typeface="Consolas" pitchFamily="49" charset="0"/>
-              </a:rPr>
-              <a:t>(</a:t>
-            </a:r>
-            <a:r>
-              <a:rPr lang="en-US" sz="3000" b="1" noProof="1">
-                <a:solidFill>
-                  <a:schemeClr val="bg1"/>
-                </a:solidFill>
-                <a:latin typeface="Consolas" panose="020B0609020204030204" pitchFamily="49" charset="0"/>
-                <a:cs typeface="Consolas" pitchFamily="49" charset="0"/>
-              </a:rPr>
-              <a:t>size</a:t>
-            </a:r>
-            <a:r>
-              <a:rPr lang="en-US" sz="3000" b="1" noProof="1">
-                <a:solidFill>
-                  <a:schemeClr val="tx2">
-                    <a:lumMod val="75000"/>
-                  </a:schemeClr>
-                </a:solidFill>
-                <a:latin typeface="Consolas" panose="020B0609020204030204" pitchFamily="49" charset="0"/>
-                <a:cs typeface="Consolas" pitchFamily="49" charset="0"/>
-              </a:rPr>
-              <a:t>)</a:t>
-            </a:r>
-            <a:r>
-              <a:rPr lang="en-US" sz="2800" noProof="1">
-                <a:solidFill>
-                  <a:schemeClr val="accent5">
-                    <a:lumMod val="20000"/>
-                    <a:lumOff val="80000"/>
-                  </a:schemeClr>
-                </a:solidFill>
-                <a:cs typeface="Consolas" pitchFamily="49" charset="0"/>
-              </a:rPr>
+              </a:rPr>
+              <a:t>NULL</a:t>
+            </a:r>
+            <a:r>
+              <a:rPr lang="en-US" noProof="1"/>
               <a:t> </a:t>
             </a:r>
             <a:r>
-              <a:rPr lang="en-US" noProof="1"/>
-              <a:t>– </a:t>
-            </a:r>
-            <a:r>
-              <a:rPr lang="bg-BG" dirty="0"/>
-              <a:t>низ с фиксиран размер</a:t>
-            </a:r>
-            <a:endParaRPr lang="en-US" noProof="1"/>
-          </a:p>
-          <a:p>
-            <a:pPr lvl="1">
-              <a:lnSpc>
-                <a:spcPct val="100000"/>
-              </a:lnSpc>
-              <a:buClr>
-                <a:schemeClr val="tx1"/>
-              </a:buClr>
-            </a:pPr>
-            <a:r>
-              <a:rPr lang="en-US" sz="3000" b="1" noProof="1">
-                <a:solidFill>
-                  <a:schemeClr val="bg1"/>
-                </a:solidFill>
-                <a:latin typeface="Consolas" panose="020B0609020204030204" pitchFamily="49" charset="0"/>
-                <a:cs typeface="Consolas" pitchFamily="49" charset="0"/>
-              </a:rPr>
-              <a:t>VARCHAR</a:t>
-            </a:r>
-            <a:r>
-              <a:rPr lang="en-US" sz="3000" b="1" noProof="1">
-                <a:solidFill>
-                  <a:schemeClr val="tx2">
-                    <a:lumMod val="75000"/>
-                  </a:schemeClr>
-                </a:solidFill>
-                <a:latin typeface="Consolas" panose="020B0609020204030204" pitchFamily="49" charset="0"/>
-                <a:cs typeface="Consolas" pitchFamily="49" charset="0"/>
-              </a:rPr>
-              <a:t>(</a:t>
-            </a:r>
-            <a:r>
-              <a:rPr lang="en-US" sz="3000" b="1" noProof="1">
-                <a:solidFill>
-                  <a:schemeClr val="bg1"/>
-                </a:solidFill>
-                <a:latin typeface="Consolas" panose="020B0609020204030204" pitchFamily="49" charset="0"/>
-                <a:cs typeface="Consolas" pitchFamily="49" charset="0"/>
-              </a:rPr>
-              <a:t>size</a:t>
-            </a:r>
-            <a:r>
-              <a:rPr lang="en-US" sz="3000" b="1" noProof="1">
-                <a:solidFill>
-                  <a:schemeClr val="tx2">
-                    <a:lumMod val="75000"/>
-                  </a:schemeClr>
-                </a:solidFill>
-                <a:latin typeface="Consolas" panose="020B0609020204030204" pitchFamily="49" charset="0"/>
-                <a:cs typeface="Consolas" pitchFamily="49" charset="0"/>
-              </a:rPr>
-              <a:t>)</a:t>
-            </a:r>
-            <a:r>
-              <a:rPr lang="en-US" sz="3000" noProof="1">
-                <a:solidFill>
-                  <a:schemeClr val="accent5">
-                    <a:lumMod val="20000"/>
-                    <a:lumOff val="80000"/>
-                  </a:schemeClr>
-                </a:solidFill>
-                <a:cs typeface="Consolas" pitchFamily="49" charset="0"/>
-              </a:rPr>
-              <a:t> </a:t>
-            </a:r>
-            <a:r>
-              <a:rPr lang="en-US" noProof="1"/>
-              <a:t>– </a:t>
-            </a:r>
-            <a:r>
-              <a:rPr lang="bg-BG" dirty="0"/>
-              <a:t>низ с променлив размер</a:t>
-            </a:r>
-            <a:endParaRPr lang="en-US" dirty="0"/>
-          </a:p>
-          <a:p>
-            <a:pPr lvl="1">
-              <a:lnSpc>
-                <a:spcPct val="100000"/>
-              </a:lnSpc>
-              <a:buClr>
-                <a:schemeClr val="tx1"/>
-              </a:buClr>
-            </a:pPr>
-            <a:r>
-              <a:rPr lang="en-US" sz="3000" b="1" noProof="1">
-                <a:solidFill>
-                  <a:schemeClr val="bg1"/>
-                </a:solidFill>
-                <a:latin typeface="Consolas" panose="020B0609020204030204" pitchFamily="49" charset="0"/>
-                <a:cs typeface="Consolas" pitchFamily="49" charset="0"/>
-              </a:rPr>
-              <a:t>NCHAR</a:t>
-            </a:r>
-            <a:r>
-              <a:rPr lang="en-US" sz="3000" b="1" noProof="1">
-                <a:solidFill>
-                  <a:schemeClr val="tx2">
-                    <a:lumMod val="75000"/>
-                  </a:schemeClr>
-                </a:solidFill>
-                <a:latin typeface="Consolas" panose="020B0609020204030204" pitchFamily="49" charset="0"/>
-                <a:cs typeface="Consolas" pitchFamily="49" charset="0"/>
-              </a:rPr>
-              <a:t>(</a:t>
-            </a:r>
-            <a:r>
-              <a:rPr lang="en-US" sz="3000" b="1" noProof="1">
-                <a:solidFill>
-                  <a:schemeClr val="bg1"/>
-                </a:solidFill>
-                <a:latin typeface="Consolas" panose="020B0609020204030204" pitchFamily="49" charset="0"/>
-                <a:cs typeface="Consolas" pitchFamily="49" charset="0"/>
-              </a:rPr>
-              <a:t>size</a:t>
-            </a:r>
-            <a:r>
-              <a:rPr lang="en-US" sz="3000" b="1" noProof="1">
-                <a:solidFill>
-                  <a:schemeClr val="tx2">
-                    <a:lumMod val="75000"/>
-                  </a:schemeClr>
-                </a:solidFill>
-                <a:latin typeface="Consolas" panose="020B0609020204030204" pitchFamily="49" charset="0"/>
-                <a:cs typeface="Consolas" pitchFamily="49" charset="0"/>
-              </a:rPr>
-              <a:t>)</a:t>
-            </a:r>
-            <a:r>
-              <a:rPr lang="en-US" sz="3500" noProof="1"/>
-              <a:t> </a:t>
-            </a:r>
-            <a:r>
-              <a:rPr lang="en-US" noProof="1"/>
-              <a:t>– </a:t>
-            </a:r>
-            <a:r>
-              <a:rPr lang="ru-RU" noProof="1"/>
-              <a:t>Unicode низ с фиксиран размер</a:t>
-            </a:r>
-            <a:endParaRPr lang="bg-BG" dirty="0"/>
-          </a:p>
-          <a:p>
-            <a:pPr lvl="1">
-              <a:lnSpc>
-                <a:spcPct val="100000"/>
-              </a:lnSpc>
-              <a:buClr>
-                <a:schemeClr val="tx1"/>
-              </a:buClr>
-            </a:pPr>
-            <a:r>
-              <a:rPr lang="en-US" sz="3000" b="1" noProof="1">
-                <a:solidFill>
-                  <a:schemeClr val="bg1"/>
-                </a:solidFill>
-                <a:latin typeface="Consolas" panose="020B0609020204030204" pitchFamily="49" charset="0"/>
-                <a:cs typeface="Consolas" pitchFamily="49" charset="0"/>
-              </a:rPr>
-              <a:t>NVARCHAR</a:t>
-            </a:r>
-            <a:r>
-              <a:rPr lang="en-US" sz="3000" b="1" noProof="1">
-                <a:solidFill>
-                  <a:schemeClr val="tx2">
-                    <a:lumMod val="75000"/>
-                  </a:schemeClr>
-                </a:solidFill>
-                <a:latin typeface="Consolas" panose="020B0609020204030204" pitchFamily="49" charset="0"/>
-                <a:cs typeface="Consolas" pitchFamily="49" charset="0"/>
-              </a:rPr>
-              <a:t>(</a:t>
-            </a:r>
-            <a:r>
-              <a:rPr lang="en-US" sz="3000" b="1" noProof="1">
-                <a:solidFill>
-                  <a:schemeClr val="bg1"/>
-                </a:solidFill>
-                <a:latin typeface="Consolas" panose="020B0609020204030204" pitchFamily="49" charset="0"/>
-                <a:cs typeface="Consolas" pitchFamily="49" charset="0"/>
-              </a:rPr>
-              <a:t>size</a:t>
-            </a:r>
-            <a:r>
-              <a:rPr lang="en-US" sz="3000" b="1" noProof="1">
-                <a:solidFill>
-                  <a:schemeClr val="tx2">
-                    <a:lumMod val="75000"/>
-                  </a:schemeClr>
-                </a:solidFill>
-                <a:latin typeface="Consolas" panose="020B0609020204030204" pitchFamily="49" charset="0"/>
-                <a:cs typeface="Consolas" pitchFamily="49" charset="0"/>
-              </a:rPr>
-              <a:t>)</a:t>
-            </a:r>
-            <a:r>
-              <a:rPr lang="en-US" sz="2800" noProof="1">
-                <a:solidFill>
-                  <a:schemeClr val="accent5">
-                    <a:lumMod val="20000"/>
-                    <a:lumOff val="80000"/>
-                  </a:schemeClr>
-                </a:solidFill>
-                <a:cs typeface="Consolas" pitchFamily="49" charset="0"/>
-              </a:rPr>
-              <a:t> </a:t>
-            </a:r>
-            <a:r>
-              <a:rPr lang="en-US" noProof="1"/>
-              <a:t>– </a:t>
-            </a:r>
-            <a:r>
-              <a:rPr lang="ru-RU" noProof="1"/>
-              <a:t>Unicode низ с променлив размер</a:t>
+              <a:rPr lang="bg-BG" noProof="1"/>
+              <a:t>– празна стойност</a:t>
             </a:r>
             <a:endParaRPr lang="en-US" dirty="0"/>
           </a:p>
@@ -24463,7 +25073,7 @@
             <a:fld id="{2BF067CD-8E6B-4360-9AA8-C5DF2A48A6D1}" type="slidenum">
               <a:rPr lang="en-US" noProof="0" smtClean="0"/>
               <a:pPr/>
-              <a:t>27</a:t>
+              <a:t>28</a:t>
             </a:fld>
             <a:endParaRPr lang="en-US" noProof="0" dirty="0"/>
           </a:p>
@@ -24523,7 +25133,7 @@
                                         <p:tgtEl>
                                           <p:spTgt spid="5">
                                             <p:txEl>
-                                              <p:pRg st="2" end="2"/>
+                                              <p:pRg st="3" end="3"/>
                                             </p:txEl>
                                           </p:spTgt>
                                         </p:tgtEl>
@@ -24572,55 +25182,6 @@
                                         <p:tgtEl>
                                           <p:spTgt spid="5">
                                             <p:txEl>
-                                              <p:pRg st="3" end="3"/>
-                                            </p:txEl>
-                                          </p:spTgt>
-                                        </p:tgtEl>
-                                        <p:attrNameLst>
-                                          <p:attrName>style.visibility</p:attrName>
-                                        </p:attrNameLst>
-                                      </p:cBhvr>
-                                      <p:to>
-                                        <p:strVal val="visible"/>
-                                      </p:to>
-                                    </p:set>
-                                  </p:childTnLst>
-                                </p:cTn>
-                              </p:par>
-                            </p:childTnLst>
-                          </p:cTn>
-                        </p:par>
-                      </p:childTnLst>
-                    </p:cTn>
-                  </p:par>
-                  <p:par>
-                    <p:cTn id="11" fill="hold">
-                      <p:stCondLst>
-                        <p:cond delay="indefinite"/>
-                      </p:stCondLst>
-                      <p:childTnLst>
-                        <p:par>
-                          <p:cTn id="12" fill="hold">
-                            <p:stCondLst>
-                              <p:cond delay="0"/>
-                            </p:stCondLst>
-                            <p:childTnLst>
-                              <p:par>
-                                <p:cTn id="13" presetID="1" presetClass="entr" presetSubtype="0" fill="hold" nodeType="clickEffect">
-                                  <p:stCondLst>
-                                    <p:cond delay="0"/>
-                                  </p:stCondLst>
-                                  <p:childTnLst>
-                                    <p:set>
-                                      <p:cBhvr>
-                                        <p:cTn id="14" dur="1" fill="hold">
-                                          <p:stCondLst>
-                                            <p:cond delay="0"/>
-                                          </p:stCondLst>
-                                        </p:cTn>
-                                        <p:tgtEl>
-                                          <p:spTgt spid="5">
-                                            <p:txEl>
                                               <p:pRg st="4" end="4"/>
                                             </p:txEl>
                                           </p:spTgt>
@@ -24637,14 +25198,14 @@
                                 </p:cTn>
                               </p:par>
                               <p:par>
-                                <p:cTn id="15" presetID="1" presetClass="entr" presetSubtype="0" fill="hold" nodeType="withEffect">
+                                <p:cTn id="11" presetID="1" presetClass="entr" presetSubtype="0" fill="hold" nodeType="withEffect">
                                   <p:stCondLst>
                                     <p:cond delay="0"/>
                                   </p:stCondLst>
                                   <p:childTnLst>
                                     <p:set>
                                       <p:cBhvr>
-                                        <p:cTn id="16" dur="1" fill="hold">
+                                        <p:cTn id="12" dur="1" fill="hold">
                                           <p:stCondLst>
                                             <p:cond delay="0"/>
                                           </p:stCondLst>
@@ -24674,26 +25235,26 @@
                     </p:cTn>
                   </p:par>
                   <p:par>
-                    <p:cTn id="17" fill="hold">
+                    <p:cTn id="13" fill="hold">
                       <p:stCondLst>
                         <p:cond delay="indefinite"/>
                       </p:stCondLst>
                       <p:childTnLst>
                         <p:par>
-                          <p:cTn id="18" fill="hold">
+                          <p:cTn id="14" fill="hold">
                             <p:stCondLst>
                               <p:cond delay="0"/>
                             </p:stCondLst>
                             <p:childTnLst>
                               <p:par>
-                                <p:cTn id="19" presetID="1" presetClass="entr" presetSubtype="0" fill="hold" nodeType="clickEffect">
+                                <p:cTn id="15" presetID="1" presetClass="entr" presetSubtype="0" fill="hold" nodeType="clickEffect">
                                   <p:stCondLst>
                                     <p:cond delay="0"/>
                                   </p:stCondLst>
                                   <p:childTnLst>
                                     <p:set>
                                       <p:cBhvr>
-                                        <p:cTn id="20" dur="1" fill="hold">
+                                        <p:cTn id="16" dur="1" fill="hold">
                                           <p:stCondLst>
                                             <p:cond delay="0"/>
                                           </p:stCondLst>
@@ -24716,33 +25277,15 @@
                                   </p:childTnLst>
                                 </p:cTn>
                               </p:par>
-                            </p:childTnLst>
-                          </p:cTn>
-                        </p:par>
-                      </p:childTnLst>
-                    </p:cTn>
-                  </p:par>
-                  <p:par>
-                    <p:cTn id="21" fill="hold">
-                      <p:stCondLst>
-                        <p:cond delay="indefinite"/>
-                      </p:stCondLst>
-                      <p:childTnLst>
-                        <p:par>
-                          <p:cTn id="22" fill="hold">
-                            <p:stCondLst>
-                              <p:cond delay="0"/>
-                            </p:stCondLst>
-                            <p:childTnLst>
                               <p:par>
-                                <p:cTn id="23" presetID="1" presetClass="entr" presetSubtype="0" fill="hold" nodeType="clickEffect">
+                                <p:cTn id="17" presetID="1" presetClass="entr" presetSubtype="0" fill="hold" nodeType="withEffect">
                                   <p:stCondLst>
                                     <p:cond delay="0"/>
                                   </p:stCondLst>
                                   <p:childTnLst>
                                     <p:set>
                                       <p:cBhvr>
-                                        <p:cTn id="24" dur="1" fill="hold">
+                                        <p:cTn id="18" dur="1" fill="hold">
                                           <p:stCondLst>
                                             <p:cond delay="0"/>
                                           </p:stCondLst>
@@ -24772,26 +25315,26 @@
                     </p:cTn>
                   </p:par>
                   <p:par>
-                    <p:cTn id="25" fill="hold">
+                    <p:cTn id="19" fill="hold">
                       <p:stCondLst>
                         <p:cond delay="indefinite"/>
                       </p:stCondLst>
                       <p:childTnLst>
                         <p:par>
-                          <p:cTn id="26" fill="hold">
+                          <p:cTn id="20" fill="hold">
                             <p:stCondLst>
                               <p:cond delay="0"/>
                             </p:stCondLst>
                             <p:childTnLst>
                               <p:par>
-                                <p:cTn id="27" presetID="1" presetClass="entr" presetSubtype="0" fill="hold" nodeType="clickEffect">
+                                <p:cTn id="21" presetID="1" presetClass="entr" presetSubtype="0" fill="hold" nodeType="clickEffect">
                                   <p:stCondLst>
                                     <p:cond delay="0"/>
                                   </p:stCondLst>
                                   <p:childTnLst>
                                     <p:set>
                                       <p:cBhvr>
-                                        <p:cTn id="28" dur="1" fill="hold">
+                                        <p:cTn id="22" dur="1" fill="hold">
                                           <p:stCondLst>
                                             <p:cond delay="0"/>
                                           </p:stCondLst>
@@ -24800,6 +25343,153 @@
                                           <p:spTgt spid="5">
                                             <p:txEl>
                                               <p:pRg st="8" end="8"/>
+                                            </p:txEl>
+                                          </p:spTgt>
+                                        </p:tgtEl>
+                                        <p:attrNameLst>
+                                          <p:attrName>style.visibility</p:attrName>
+                                        </p:attrNameLst>
+                                      </p:cBhvr>
+                                      <p:to>
+                                        <p:strVal val="visible"/>
+                                      </p:to>
+                                    </p:set>
+                                  </p:childTnLst>
+                                </p:cTn>
+                              </p:par>
+                            </p:childTnLst>
+                          </p:cTn>
+                        </p:par>
+                      </p:childTnLst>
+                    </p:cTn>
+                  </p:par>
+                  <p:par>
+                    <p:cTn id="23" fill="hold">
+                      <p:stCondLst>
+                        <p:cond delay="indefinite"/>
+                      </p:stCondLst>
+                      <p:childTnLst>
+                        <p:par>
+                          <p:cTn id="24" fill="hold">
+                            <p:stCondLst>
+                              <p:cond delay="0"/>
+                            </p:stCondLst>
+                            <p:childTnLst>
+                              <p:par>
+                                <p:cTn id="25" presetID="1" presetClass="entr" presetSubtype="0" fill="hold" nodeType="clickEffect">
+                                  <p:stCondLst>
+                                    <p:cond delay="0"/>
+                                  </p:stCondLst>
+                                  <p:childTnLst>
+                                    <p:set>
+                                      <p:cBhvr>
+                                        <p:cTn id="26" dur="1" fill="hold">
+                                          <p:stCondLst>
+                                            <p:cond delay="0"/>
+                                          </p:stCondLst>
+                                        </p:cTn>
+                                        <p:tgtEl>
+                                          <p:spTgt spid="5">
+                                            <p:txEl>
+                                              <p:pRg st="9" end="9"/>
+                                            </p:txEl>
+                                          </p:spTgt>
+                                        </p:tgtEl>
+                                        <p:attrNameLst>
+                                          <p:attrName>style.visibility</p:attrName>
+                                        </p:attrNameLst>
+                                      </p:cBhvr>
+                                      <p:to>
+                                        <p:strVal val="visible"/>
+                                      </p:to>
+                                    </p:set>
+                                  </p:childTnLst>
+                                </p:cTn>
+                              </p:par>
+                            </p:childTnLst>
+                          </p:cTn>
+                        </p:par>
+                      </p:childTnLst>
+                    </p:cTn>
+                  </p:par>
+                  <p:par>
+                    <p:cTn id="27" fill="hold">
+                      <p:stCondLst>
+                        <p:cond delay="indefinite"/>
+                      </p:stCondLst>
+                      <p:childTnLst>
+                        <p:par>
+                          <p:cTn id="28" fill="hold">
+                            <p:stCondLst>
+                              <p:cond delay="0"/>
+                            </p:stCondLst>
+                            <p:childTnLst>
+                              <p:par>
+                                <p:cTn id="29" presetID="1" presetClass="entr" presetSubtype="0" fill="hold" nodeType="clickEffect">
+                                  <p:stCondLst>
+                                    <p:cond delay="0"/>
+                                  </p:stCondLst>
+                                  <p:childTnLst>
+                                    <p:set>
+                                      <p:cBhvr>
+                                        <p:cTn id="30" dur="1" fill="hold">
+                                          <p:stCondLst>
+                                            <p:cond delay="0"/>
+                                          </p:stCondLst>
+                                        </p:cTn>
+                                        <p:tgtEl>
+                                          <p:spTgt spid="5">
+                                            <p:txEl>
+                                              <p:pRg st="10" end="10"/>
+                                            </p:txEl>
+                                          </p:spTgt>
+                                        </p:tgtEl>
+                                        <p:attrNameLst>
+                                          <p:attrName>style.visibility</p:attrName>
+                                        </p:attrNameLst>
+                                      </p:cBhvr>
+                                      <p:to>
+                                        <p:strVal val="visible"/>
+                                      </p:to>
+                                    </p:set>
+                                  </p:childTnLst>
+                                </p:cTn>
+                              </p:par>
+                            </p:childTnLst>
+                          </p:cTn>
+                        </p:par>
+                      </p:childTnLst>
+                    </p:cTn>
+                  </p:par>
+                  <p:par>
+                    <p:cTn id="31" fill="hold">
+                      <p:stCondLst>
+                        <p:cond delay="indefinite"/>
+                      </p:stCondLst>
+                      <p:childTnLst>
+                        <p:par>
+                          <p:cTn id="32" fill="hold">
+                            <p:stCondLst>
+                              <p:cond delay="0"/>
+                            </p:stCondLst>
+                            <p:childTnLst>
+                              <p:par>
+                                <p:cTn id="33" presetID="1" presetClass="entr" presetSubtype="0" fill="hold" nodeType="clickEffect">
+                                  <p:stCondLst>
+                                    <p:cond delay="0"/>
+                                  </p:stCondLst>
+                                  <p:childTnLst>
+                                    <p:set>
+                                      <p:cBhvr>
+                                        <p:cTn id="34" dur="1" fill="hold">
+                                          <p:stCondLst>
+                                            <p:cond delay="0"/>
+                                          </p:stCondLst>
+                                        </p:cTn>
+                                        <p:tgtEl>
+                                          <p:spTgt spid="5">
+                                            <p:txEl>
+                                              <p:pRg st="11" end="11"/>
                                             </p:txEl>
                                           </p:spTgt>
                                         </p:tgtEl>
@@ -24845,7 +25535,7 @@
 </p:sld>
 </file>
 
-<file path=ppt/slides/slide28.xml><?xml version="1.0" encoding="utf-8"?>
+<file path=ppt/slides/slide29.xml><?xml version="1.0" encoding="utf-8"?>
 <p:sld xmlns:a="http://schemas.openxmlformats.org/drawingml/2006/main" xmlns:r="http://schemas.openxmlformats.org/officeDocument/2006/relationships" xmlns:p="http://schemas.openxmlformats.org/presentationml/2006/main">
   <p:cSld>
     <p:spTree>
@@ -25293,7 +25983,7 @@
             <a:fld id="{2BF067CD-8E6B-4360-9AA8-C5DF2A48A6D1}" type="slidenum">
               <a:rPr lang="en-US" noProof="0" smtClean="0"/>
               <a:pPr/>
-              <a:t>28</a:t>
+              <a:t>29</a:t>
             </a:fld>
             <a:endParaRPr lang="en-US" noProof="0" dirty="0"/>
           </a:p>
@@ -25320,7 +26010,177 @@
 </p:sld>
 </file>
 
-<file path=ppt/slides/slide29.xml><?xml version="1.0" encoding="utf-8"?>
+<file path=ppt/slides/slide3.xml><?xml version="1.0" encoding="utf-8"?>
+<p:sld xmlns:a="http://schemas.openxmlformats.org/drawingml/2006/main" xmlns:r="http://schemas.openxmlformats.org/officeDocument/2006/relationships" xmlns:p="http://schemas.openxmlformats.org/presentationml/2006/main">
+  <p:cSld>
+    <p:spTree>
+      <p:nvGrpSpPr>
+        <p:cNvPr id="1" name=""/>
+        <p:cNvGrpSpPr/>
+        <p:nvPr/>
+      </p:nvGrpSpPr>
+      <p:grpSpPr>
+        <a:xfrm>
+          <a:off x="0" y="0"/>
+          <a:ext cx="0" cy="0"/>
+          <a:chOff x="0" y="0"/>
+          <a:chExt cx="0" cy="0"/>
+        </a:xfrm>
+      </p:grpSpPr>
+      <p:grpSp>
+        <p:nvGrpSpPr>
+          <p:cNvPr id="2" name="Group 9"/>
+          <p:cNvGrpSpPr/>
+          <p:nvPr/>
+        </p:nvGrpSpPr>
+        <p:grpSpPr>
+          <a:xfrm>
+            <a:off x="4912827" y="1596574"/>
+            <a:ext cx="2347876" cy="2362038"/>
+            <a:chOff x="3878107" y="914400"/>
+            <a:chExt cx="4159406" cy="4184495"/>
+          </a:xfrm>
+        </p:grpSpPr>
+        <p:pic>
+          <p:nvPicPr>
+            <p:cNvPr id="11" name="Picture 10"/>
+            <p:cNvPicPr>
+              <a:picLocks noChangeAspect="1"/>
+            </p:cNvPicPr>
+            <p:nvPr/>
+          </p:nvPicPr>
+          <p:blipFill>
+            <a:blip r:embed="rId3" cstate="print">
+              <a:extLst>
+                <a:ext uri="{28A0092B-C50C-407E-A947-70E740481C1C}">
+                  <a14:useLocalDpi xmlns:a14="http://schemas.microsoft.com/office/drawing/2010/main" val="0"/>
+                </a:ext>
+              </a:extLst>
+            </a:blip>
+            <a:stretch>
+              <a:fillRect/>
+            </a:stretch>
+          </p:blipFill>
+          <p:spPr>
+            <a:xfrm>
+              <a:off x="4151313" y="914400"/>
+              <a:ext cx="3886200" cy="3886200"/>
+            </a:xfrm>
+            <a:prstGeom prst="rect">
+              <a:avLst/>
+            </a:prstGeom>
+          </p:spPr>
+        </p:pic>
+        <p:pic>
+          <p:nvPicPr>
+            <p:cNvPr id="12" name="Picture 11"/>
+            <p:cNvPicPr>
+              <a:picLocks noChangeAspect="1"/>
+            </p:cNvPicPr>
+            <p:nvPr/>
+          </p:nvPicPr>
+          <p:blipFill>
+            <a:blip r:embed="rId4" cstate="print">
+              <a:extLst>
+                <a:ext uri="{28A0092B-C50C-407E-A947-70E740481C1C}">
+                  <a14:useLocalDpi xmlns:a14="http://schemas.microsoft.com/office/drawing/2010/main" val="0"/>
+                </a:ext>
+              </a:extLst>
+            </a:blip>
+            <a:stretch>
+              <a:fillRect/>
+            </a:stretch>
+          </p:blipFill>
+          <p:spPr>
+            <a:xfrm rot="18746218">
+              <a:off x="3732212" y="2503574"/>
+              <a:ext cx="2741216" cy="2449426"/>
+            </a:xfrm>
+            <a:prstGeom prst="rect">
+              <a:avLst/>
+            </a:prstGeom>
+          </p:spPr>
+        </p:pic>
+      </p:grpSp>
+      <p:sp>
+        <p:nvSpPr>
+          <p:cNvPr id="5" name="Подзаглавие 4">
+            <a:extLst>
+              <a:ext uri="{FF2B5EF4-FFF2-40B4-BE49-F238E27FC236}">
+                <a16:creationId xmlns:a16="http://schemas.microsoft.com/office/drawing/2014/main" id="{4786CD85-17B4-5582-0A31-340E498ED1C0}"/>
+              </a:ext>
+            </a:extLst>
+          </p:cNvPr>
+          <p:cNvSpPr>
+            <a:spLocks noGrp="1"/>
+          </p:cNvSpPr>
+          <p:nvPr>
+            <p:ph type="subTitle" sz="quarter" idx="11"/>
+          </p:nvPr>
+        </p:nvSpPr>
+        <p:spPr/>
+        <p:txBody>
+          <a:bodyPr/>
+          <a:lstStyle/>
+          <a:p>
+            <a:r>
+              <a:rPr lang="ru-RU"/>
+              <a:t>Системи за управление на бази данни</a:t>
+            </a:r>
+            <a:endParaRPr lang="bg-BG"/>
+          </a:p>
+        </p:txBody>
+      </p:sp>
+      <p:sp>
+        <p:nvSpPr>
+          <p:cNvPr id="8" name="Заглавие 7">
+            <a:extLst>
+              <a:ext uri="{FF2B5EF4-FFF2-40B4-BE49-F238E27FC236}">
+                <a16:creationId xmlns:a16="http://schemas.microsoft.com/office/drawing/2014/main" id="{1E46FA96-85EE-79F7-A20C-97A1852A90FE}"/>
+              </a:ext>
+            </a:extLst>
+          </p:cNvPr>
+          <p:cNvSpPr>
+            <a:spLocks noGrp="1"/>
+          </p:cNvSpPr>
+          <p:nvPr>
+            <p:ph type="title" sz="quarter" idx="10"/>
+          </p:nvPr>
+        </p:nvSpPr>
+        <p:spPr/>
+        <p:txBody>
+          <a:bodyPr/>
+          <a:lstStyle/>
+          <a:p>
+            <a:r>
+              <a:rPr lang="bg-BG"/>
+              <a:t>Сървъри за бази данни</a:t>
+            </a:r>
+          </a:p>
+        </p:txBody>
+      </p:sp>
+    </p:spTree>
+    <p:extLst>
+      <p:ext uri="{BB962C8B-B14F-4D97-AF65-F5344CB8AC3E}">
+        <p14:creationId xmlns:p14="http://schemas.microsoft.com/office/powerpoint/2010/main" val="3454804543"/>
+      </p:ext>
+    </p:extLst>
+  </p:cSld>
+  <p:clrMapOvr>
+    <a:masterClrMapping/>
+  </p:clrMapOvr>
+  <mc:AlternateContent xmlns:mc="http://schemas.openxmlformats.org/markup-compatibility/2006" xmlns:p14="http://schemas.microsoft.com/office/powerpoint/2010/main">
+    <mc:Choice Requires="p14">
+      <p:transition spd="slow" p14:dur="2000" advClick="0" advTm="5000"/>
+    </mc:Choice>
+    <mc:Fallback xmlns="">
+      <p:transition spd="slow" advClick="0" advTm="5000"/>
+    </mc:Fallback>
+  </mc:AlternateContent>
+</p:sld>
+</file>
+
+<file path=ppt/slides/slide30.xml><?xml version="1.0" encoding="utf-8"?>
 <p:sld xmlns:a="http://schemas.openxmlformats.org/drawingml/2006/main" xmlns:r="http://schemas.openxmlformats.org/officeDocument/2006/relationships" xmlns:p="http://schemas.openxmlformats.org/presentationml/2006/main">
   <p:cSld>
     <p:spTree>
@@ -25505,7 +26365,11 @@
             </a:pPr>
             <a:r>
               <a:rPr lang="bg-BG" sz="3500" dirty="0"/>
-              <a:t>Дата и време</a:t>
+              <a:t>Дата и време (т</a:t>
+            </a:r>
+            <a:r>
+              <a:rPr lang="ru-RU" sz="3500" dirty="0"/>
+              <a:t>ипове данни за дата и час)</a:t>
             </a:r>
             <a:endParaRPr lang="en-US" sz="3500" dirty="0"/>
           </a:p>
@@ -25763,7 +26627,7 @@
             <a:fld id="{2BF067CD-8E6B-4360-9AA8-C5DF2A48A6D1}" type="slidenum">
               <a:rPr lang="en-US" noProof="0" smtClean="0"/>
               <a:pPr/>
-              <a:t>29</a:t>
+              <a:t>30</a:t>
             </a:fld>
             <a:endParaRPr lang="en-US" noProof="0" dirty="0"/>
           </a:p>
@@ -26194,177 +27058,7 @@
 </p:sld>
 </file>
 
-<file path=ppt/slides/slide3.xml><?xml version="1.0" encoding="utf-8"?>
-<p:sld xmlns:a="http://schemas.openxmlformats.org/drawingml/2006/main" xmlns:r="http://schemas.openxmlformats.org/officeDocument/2006/relationships" xmlns:p="http://schemas.openxmlformats.org/presentationml/2006/main">
-  <p:cSld>
-    <p:spTree>
-      <p:nvGrpSpPr>
-        <p:cNvPr id="1" name=""/>
-        <p:cNvGrpSpPr/>
-        <p:nvPr/>
-      </p:nvGrpSpPr>
-      <p:grpSpPr>
-        <a:xfrm>
-          <a:off x="0" y="0"/>
-          <a:ext cx="0" cy="0"/>
-          <a:chOff x="0" y="0"/>
-          <a:chExt cx="0" cy="0"/>
-        </a:xfrm>
-      </p:grpSpPr>
-      <p:grpSp>
-        <p:nvGrpSpPr>
-          <p:cNvPr id="2" name="Group 9"/>
-          <p:cNvGrpSpPr/>
-          <p:nvPr/>
-        </p:nvGrpSpPr>
-        <p:grpSpPr>
-          <a:xfrm>
-            <a:off x="4912827" y="1596574"/>
-            <a:ext cx="2347876" cy="2362038"/>
-            <a:chOff x="3878107" y="914400"/>
-            <a:chExt cx="4159406" cy="4184495"/>
-          </a:xfrm>
-        </p:grpSpPr>
-        <p:pic>
-          <p:nvPicPr>
-            <p:cNvPr id="11" name="Picture 10"/>
-            <p:cNvPicPr>
-              <a:picLocks noChangeAspect="1"/>
-            </p:cNvPicPr>
-            <p:nvPr/>
-          </p:nvPicPr>
-          <p:blipFill>
-            <a:blip r:embed="rId3" cstate="print">
-              <a:extLst>
-                <a:ext uri="{28A0092B-C50C-407E-A947-70E740481C1C}">
-                  <a14:useLocalDpi xmlns:a14="http://schemas.microsoft.com/office/drawing/2010/main" val="0"/>
-                </a:ext>
-              </a:extLst>
-            </a:blip>
-            <a:stretch>
-              <a:fillRect/>
-            </a:stretch>
-          </p:blipFill>
-          <p:spPr>
-            <a:xfrm>
-              <a:off x="4151313" y="914400"/>
-              <a:ext cx="3886200" cy="3886200"/>
-            </a:xfrm>
-            <a:prstGeom prst="rect">
-              <a:avLst/>
-            </a:prstGeom>
-          </p:spPr>
-        </p:pic>
-        <p:pic>
-          <p:nvPicPr>
-            <p:cNvPr id="12" name="Picture 11"/>
-            <p:cNvPicPr>
-              <a:picLocks noChangeAspect="1"/>
-            </p:cNvPicPr>
-            <p:nvPr/>
-          </p:nvPicPr>
-          <p:blipFill>
-            <a:blip r:embed="rId4" cstate="print">
-              <a:extLst>
-                <a:ext uri="{28A0092B-C50C-407E-A947-70E740481C1C}">
-                  <a14:useLocalDpi xmlns:a14="http://schemas.microsoft.com/office/drawing/2010/main" val="0"/>
-                </a:ext>
-              </a:extLst>
-            </a:blip>
-            <a:stretch>
-              <a:fillRect/>
-            </a:stretch>
-          </p:blipFill>
-          <p:spPr>
-            <a:xfrm rot="18746218">
-              <a:off x="3732212" y="2503574"/>
-              <a:ext cx="2741216" cy="2449426"/>
-            </a:xfrm>
-            <a:prstGeom prst="rect">
-              <a:avLst/>
-            </a:prstGeom>
-          </p:spPr>
-        </p:pic>
-      </p:grpSp>
-      <p:sp>
-        <p:nvSpPr>
-          <p:cNvPr id="5" name="Подзаглавие 4">
-            <a:extLst>
-              <a:ext uri="{FF2B5EF4-FFF2-40B4-BE49-F238E27FC236}">
-                <a16:creationId xmlns:a16="http://schemas.microsoft.com/office/drawing/2014/main" id="{4786CD85-17B4-5582-0A31-340E498ED1C0}"/>
-              </a:ext>
-            </a:extLst>
-          </p:cNvPr>
-          <p:cNvSpPr>
-            <a:spLocks noGrp="1"/>
-          </p:cNvSpPr>
-          <p:nvPr>
-            <p:ph type="subTitle" sz="quarter" idx="11"/>
-          </p:nvPr>
-        </p:nvSpPr>
-        <p:spPr/>
-        <p:txBody>
-          <a:bodyPr/>
-          <a:lstStyle/>
-          <a:p>
-            <a:r>
-              <a:rPr lang="ru-RU"/>
-              <a:t>Системи за управление на бази данни</a:t>
-            </a:r>
-            <a:endParaRPr lang="bg-BG"/>
-          </a:p>
-        </p:txBody>
-      </p:sp>
-      <p:sp>
-        <p:nvSpPr>
-          <p:cNvPr id="8" name="Заглавие 7">
-            <a:extLst>
-              <a:ext uri="{FF2B5EF4-FFF2-40B4-BE49-F238E27FC236}">
-                <a16:creationId xmlns:a16="http://schemas.microsoft.com/office/drawing/2014/main" id="{1E46FA96-85EE-79F7-A20C-97A1852A90FE}"/>
-              </a:ext>
-            </a:extLst>
-          </p:cNvPr>
-          <p:cNvSpPr>
-            <a:spLocks noGrp="1"/>
-          </p:cNvSpPr>
-          <p:nvPr>
-            <p:ph type="title" sz="quarter" idx="10"/>
-          </p:nvPr>
-        </p:nvSpPr>
-        <p:spPr/>
-        <p:txBody>
-          <a:bodyPr/>
-          <a:lstStyle/>
-          <a:p>
-            <a:r>
-              <a:rPr lang="bg-BG"/>
-              <a:t>Сървъри за бази данни</a:t>
-            </a:r>
-          </a:p>
-        </p:txBody>
-      </p:sp>
-    </p:spTree>
-    <p:extLst>
-      <p:ext uri="{BB962C8B-B14F-4D97-AF65-F5344CB8AC3E}">
-        <p14:creationId xmlns:p14="http://schemas.microsoft.com/office/powerpoint/2010/main" val="3454804543"/>
-      </p:ext>
-    </p:extLst>
-  </p:cSld>
-  <p:clrMapOvr>
-    <a:masterClrMapping/>
-  </p:clrMapOvr>
-  <mc:AlternateContent xmlns:mc="http://schemas.openxmlformats.org/markup-compatibility/2006" xmlns:p14="http://schemas.microsoft.com/office/powerpoint/2010/main">
-    <mc:Choice Requires="p14">
-      <p:transition spd="slow" p14:dur="2000" advClick="0" advTm="5000"/>
-    </mc:Choice>
-    <mc:Fallback xmlns="">
-      <p:transition spd="slow" advClick="0" advTm="5000"/>
-    </mc:Fallback>
-  </mc:AlternateContent>
-</p:sld>
-</file>
-
-<file path=ppt/slides/slide30.xml><?xml version="1.0" encoding="utf-8"?>
+<file path=ppt/slides/slide31.xml><?xml version="1.0" encoding="utf-8"?>
 <p:sld xmlns:a="http://schemas.openxmlformats.org/drawingml/2006/main" xmlns:r="http://schemas.openxmlformats.org/officeDocument/2006/relationships" xmlns:p="http://schemas.openxmlformats.org/presentationml/2006/main">
   <p:cSld>
     <p:spTree>
@@ -26518,7 +27212,7 @@
             <a:fld id="{2BF067CD-8E6B-4360-9AA8-C5DF2A48A6D1}" type="slidenum">
               <a:rPr lang="en-US" noProof="0" smtClean="0"/>
               <a:pPr/>
-              <a:t>30</a:t>
+              <a:t>31</a:t>
             </a:fld>
             <a:endParaRPr lang="en-US" noProof="0" dirty="0"/>
           </a:p>
@@ -26545,7 +27239,7 @@
 </p:sld>
 </file>
 
-<file path=ppt/slides/slide31.xml><?xml version="1.0" encoding="utf-8"?>
+<file path=ppt/slides/slide32.xml><?xml version="1.0" encoding="utf-8"?>
 <p:sld xmlns:a="http://schemas.openxmlformats.org/drawingml/2006/main" xmlns:r="http://schemas.openxmlformats.org/officeDocument/2006/relationships" xmlns:p="http://schemas.openxmlformats.org/presentationml/2006/main">
   <p:cSld>
     <p:spTree>
@@ -26728,7 +27422,7 @@
             <a:fld id="{2BF067CD-8E6B-4360-9AA8-C5DF2A48A6D1}" type="slidenum">
               <a:rPr lang="en-US" noProof="0" smtClean="0"/>
               <a:pPr/>
-              <a:t>31</a:t>
+              <a:t>32</a:t>
             </a:fld>
             <a:endParaRPr lang="en-US" noProof="0" dirty="0"/>
           </a:p>
@@ -26834,7 +27528,7 @@
 </p:sld>
 </file>
 
-<file path=ppt/slides/slide32.xml><?xml version="1.0" encoding="utf-8"?>
+<file path=ppt/slides/slide33.xml><?xml version="1.0" encoding="utf-8"?>
 <p:sld xmlns:a="http://schemas.openxmlformats.org/drawingml/2006/main" xmlns:r="http://schemas.openxmlformats.org/officeDocument/2006/relationships" xmlns:p="http://schemas.openxmlformats.org/presentationml/2006/main">
   <p:cSld>
     <p:spTree>
@@ -27447,7 +28141,7 @@
             <a:fld id="{2BF067CD-8E6B-4360-9AA8-C5DF2A48A6D1}" type="slidenum">
               <a:rPr lang="en-US" noProof="0" smtClean="0"/>
               <a:pPr/>
-              <a:t>32</a:t>
+              <a:t>33</a:t>
             </a:fld>
             <a:endParaRPr lang="en-US" noProof="0" dirty="0"/>
           </a:p>
@@ -27829,7 +28523,7 @@
 </p:sld>
 </file>
 
-<file path=ppt/slides/slide33.xml><?xml version="1.0" encoding="utf-8"?>
+<file path=ppt/slides/slide34.xml><?xml version="1.0" encoding="utf-8"?>
 <p:sld xmlns:a="http://schemas.openxmlformats.org/drawingml/2006/main" xmlns:r="http://schemas.openxmlformats.org/officeDocument/2006/relationships" xmlns:p="http://schemas.openxmlformats.org/presentationml/2006/main">
   <p:cSld>
     <p:spTree>
@@ -28019,7 +28713,7 @@
 </p:sld>
 </file>
 
-<file path=ppt/slides/slide34.xml><?xml version="1.0" encoding="utf-8"?>
+<file path=ppt/slides/slide35.xml><?xml version="1.0" encoding="utf-8"?>
 <p:sld xmlns:a="http://schemas.openxmlformats.org/drawingml/2006/main" xmlns:r="http://schemas.openxmlformats.org/officeDocument/2006/relationships" xmlns:p="http://schemas.openxmlformats.org/presentationml/2006/main">
   <p:cSld>
     <p:spTree>
@@ -28375,7 +29069,7 @@
             <a:fld id="{2BF067CD-8E6B-4360-9AA8-C5DF2A48A6D1}" type="slidenum">
               <a:rPr lang="en-US" noProof="0" smtClean="0"/>
               <a:pPr/>
-              <a:t>34</a:t>
+              <a:t>35</a:t>
             </a:fld>
             <a:endParaRPr lang="en-US" noProof="0" dirty="0"/>
           </a:p>

</xml_diff>

<commit_message>
Updates on DBMS slides
</commit_message>
<xml_diff>
--- a/Courses/Software-Sciences/Module-3-Databases-New/02-DBMS/02-DBMS.pptx
+++ b/Courses/Software-Sciences/Module-3-Databases-New/02-DBMS/02-DBMS.pptx
@@ -516,7 +516,7 @@
           <a:p>
             <a:fld id="{4E087215-0C8F-4762-A664-737A353EC9A4}" type="datetimeFigureOut">
               <a:rPr lang="bg-BG" smtClean="0"/>
-              <a:t>26.2.2024 г.</a:t>
+              <a:t>30.3.2024 г.</a:t>
             </a:fld>
             <a:endParaRPr lang="bg-BG"/>
           </a:p>
@@ -712,7 +712,7 @@
           <a:p>
             <a:fld id="{72D84649-876A-46C9-8472-14CB09C070D8}" type="datetimeFigureOut">
               <a:rPr lang="en-US" smtClean="0"/>
-              <a:t>2/26/2024</a:t>
+              <a:t>3/30/2024</a:t>
             </a:fld>
             <a:endParaRPr lang="en-US"/>
           </a:p>
@@ -18753,7 +18753,7 @@
               </a:rPr>
               <a:t>пример</a:t>
             </a:r>
-            <a:endParaRPr lang="x-none"/>
+            <a:endParaRPr lang="x-none" dirty="0"/>
           </a:p>
         </p:txBody>
       </p:sp>
@@ -24287,53 +24287,6 @@
           <a:chExt cx="0" cy="0"/>
         </a:xfrm>
       </p:grpSpPr>
-      <p:pic>
-        <p:nvPicPr>
-          <p:cNvPr id="3082" name="Picture 10" descr="Ð ÐµÐ·ÑÐ»ÑÐ°Ñ Ñ Ð¸Ð·Ð¾Ð±ÑÐ°Ð¶ÐµÐ½Ð¸Ðµ Ð·Ð° sql server png">
-            <a:extLst>
-              <a:ext uri="{FF2B5EF4-FFF2-40B4-BE49-F238E27FC236}">
-                <a16:creationId xmlns:a16="http://schemas.microsoft.com/office/drawing/2014/main" id="{D87D64C2-9B46-41DD-97B7-0B78DBF62D17}"/>
-              </a:ext>
-            </a:extLst>
-          </p:cNvPr>
-          <p:cNvPicPr>
-            <a:picLocks noChangeAspect="1" noChangeArrowheads="1"/>
-          </p:cNvPicPr>
-          <p:nvPr/>
-        </p:nvPicPr>
-        <p:blipFill>
-          <a:blip r:embed="rId2" cstate="print">
-            <a:extLst>
-              <a:ext uri="{28A0092B-C50C-407E-A947-70E740481C1C}">
-                <a14:useLocalDpi xmlns:a14="http://schemas.microsoft.com/office/drawing/2010/main" val="0"/>
-              </a:ext>
-            </a:extLst>
-          </a:blip>
-          <a:srcRect/>
-          <a:stretch>
-            <a:fillRect/>
-          </a:stretch>
-        </p:blipFill>
-        <p:spPr bwMode="auto">
-          <a:xfrm>
-            <a:off x="4647372" y="1237422"/>
-            <a:ext cx="2897256" cy="2897256"/>
-          </a:xfrm>
-          <a:prstGeom prst="rect">
-            <a:avLst/>
-          </a:prstGeom>
-          <a:noFill/>
-          <a:extLst>
-            <a:ext uri="{909E8E84-426E-40DD-AFC4-6F175D3DCCD1}">
-              <a14:hiddenFill xmlns:a14="http://schemas.microsoft.com/office/drawing/2010/main">
-                <a:solidFill>
-                  <a:srgbClr val="FFFFFF"/>
-                </a:solidFill>
-              </a14:hiddenFill>
-            </a:ext>
-          </a:extLst>
-        </p:spPr>
-      </p:pic>
       <p:sp>
         <p:nvSpPr>
           <p:cNvPr id="3" name="Заглавие 2">
@@ -24356,13 +24309,43 @@
           <a:lstStyle/>
           <a:p>
             <a:r>
-              <a:rPr lang="ru-RU"/>
+              <a:rPr lang="ru-RU" dirty="0"/>
               <a:t>Типове данни в SQL Server</a:t>
             </a:r>
-            <a:endParaRPr lang="bg-BG"/>
+            <a:endParaRPr lang="bg-BG" dirty="0"/>
           </a:p>
         </p:txBody>
       </p:sp>
+      <p:pic>
+        <p:nvPicPr>
+          <p:cNvPr id="4" name="Picture 3">
+            <a:extLst>
+              <a:ext uri="{FF2B5EF4-FFF2-40B4-BE49-F238E27FC236}">
+                <a16:creationId xmlns:a16="http://schemas.microsoft.com/office/drawing/2014/main" id="{EE97C4C6-7D49-0A5E-2E38-DDD9BE719ED8}"/>
+              </a:ext>
+            </a:extLst>
+          </p:cNvPr>
+          <p:cNvPicPr>
+            <a:picLocks noChangeAspect="1"/>
+          </p:cNvPicPr>
+          <p:nvPr/>
+        </p:nvPicPr>
+        <p:blipFill>
+          <a:blip r:embed="rId2"/>
+          <a:stretch>
+            <a:fillRect/>
+          </a:stretch>
+        </p:blipFill>
+        <p:spPr>
+          <a:xfrm>
+            <a:off x="4822854" y="1629000"/>
+            <a:ext cx="2546292" cy="2030377"/>
+          </a:xfrm>
+          <a:prstGeom prst="rect">
+            <a:avLst/>
+          </a:prstGeom>
+        </p:spPr>
+      </p:pic>
     </p:spTree>
     <p:extLst>
       <p:ext uri="{BB962C8B-B14F-4D97-AF65-F5344CB8AC3E}">

</xml_diff>

<commit_message>
Updates on IT Systems and DBMS
</commit_message>
<xml_diff>
--- a/Courses/Software-Sciences/Module-3-Databases-New/02-DBMS/02-DBMS.pptx
+++ b/Courses/Software-Sciences/Module-3-Databases-New/02-DBMS/02-DBMS.pptx
@@ -516,7 +516,7 @@
           <a:p>
             <a:fld id="{4E087215-0C8F-4762-A664-737A353EC9A4}" type="datetimeFigureOut">
               <a:rPr lang="bg-BG" smtClean="0"/>
-              <a:t>13.07.24 г.</a:t>
+              <a:t>13.7.2024 г.</a:t>
             </a:fld>
             <a:endParaRPr lang="bg-BG"/>
           </a:p>
@@ -712,7 +712,7 @@
           <a:p>
             <a:fld id="{72D84649-876A-46C9-8472-14CB09C070D8}" type="datetimeFigureOut">
               <a:rPr lang="en-US" smtClean="0"/>
-              <a:t>7/13/24</a:t>
+              <a:t>7/13/2024</a:t>
             </a:fld>
             <a:endParaRPr lang="en-US"/>
           </a:p>
@@ -30675,10 +30675,132 @@
         </p:nvSpPr>
         <p:spPr/>
         <p:txBody>
-          <a:bodyPr/>
+          <a:bodyPr>
+            <a:normAutofit lnSpcReduction="10000"/>
+          </a:bodyPr>
           <a:lstStyle/>
           <a:p>
-            <a:endParaRPr lang="bg-BG"/>
+            <a:pPr>
+              <a:buClr>
+                <a:schemeClr val="tx1"/>
+              </a:buClr>
+            </a:pPr>
+            <a:r>
+              <a:rPr lang="ru-RU" b="1" dirty="0">
+                <a:solidFill>
+                  <a:schemeClr val="bg1"/>
+                </a:solidFill>
+              </a:rPr>
+              <a:t>Абстракцията</a:t>
+            </a:r>
+            <a:r>
+              <a:rPr lang="ru-RU" dirty="0"/>
+              <a:t> в системите за управление на бази данни е </a:t>
+            </a:r>
+            <a:r>
+              <a:rPr lang="ru-RU" b="1" dirty="0">
+                <a:solidFill>
+                  <a:schemeClr val="bg1"/>
+                </a:solidFill>
+              </a:rPr>
+              <a:t>ключова концепция</a:t>
+            </a:r>
+            <a:r>
+              <a:rPr lang="ru-RU" dirty="0"/>
+              <a:t>, която улеснява взаимодействието между потребителите и самите бази данни</a:t>
+            </a:r>
+          </a:p>
+          <a:p>
+            <a:pPr>
+              <a:buClr>
+                <a:schemeClr val="tx1"/>
+              </a:buClr>
+            </a:pPr>
+            <a:r>
+              <a:rPr lang="ru-RU" b="1" dirty="0">
+                <a:solidFill>
+                  <a:schemeClr val="bg1"/>
+                </a:solidFill>
+              </a:rPr>
+              <a:t>Скрива</a:t>
+            </a:r>
+            <a:r>
+              <a:rPr lang="ru-RU" dirty="0"/>
+              <a:t> сложността на физическото съхранение на данните</a:t>
+            </a:r>
+          </a:p>
+          <a:p>
+            <a:pPr>
+              <a:buClr>
+                <a:schemeClr val="tx1"/>
+              </a:buClr>
+            </a:pPr>
+            <a:r>
+              <a:rPr lang="ru-RU" b="1" dirty="0">
+                <a:solidFill>
+                  <a:schemeClr val="bg1"/>
+                </a:solidFill>
+              </a:rPr>
+              <a:t>Представя</a:t>
+            </a:r>
+            <a:r>
+              <a:rPr lang="ru-RU" dirty="0"/>
+              <a:t> само </a:t>
+            </a:r>
+            <a:r>
+              <a:rPr lang="ru-RU" b="1" dirty="0">
+                <a:solidFill>
+                  <a:schemeClr val="bg1"/>
+                </a:solidFill>
+              </a:rPr>
+              <a:t>необходимата</a:t>
+            </a:r>
+            <a:r>
+              <a:rPr lang="ru-RU" dirty="0"/>
+              <a:t> информация на различните </a:t>
+            </a:r>
+            <a:r>
+              <a:rPr lang="ru-RU" b="1" dirty="0">
+                <a:solidFill>
+                  <a:schemeClr val="bg1"/>
+                </a:solidFill>
+              </a:rPr>
+              <a:t>нива</a:t>
+            </a:r>
+          </a:p>
+          <a:p>
+            <a:pPr lvl="1">
+              <a:buClr>
+                <a:schemeClr val="tx1"/>
+              </a:buClr>
+            </a:pPr>
+            <a:r>
+              <a:rPr lang="ru-RU" b="1" dirty="0"/>
+              <a:t>Външно</a:t>
+            </a:r>
+          </a:p>
+          <a:p>
+            <a:pPr lvl="1">
+              <a:buClr>
+                <a:schemeClr val="tx1"/>
+              </a:buClr>
+            </a:pPr>
+            <a:r>
+              <a:rPr lang="ru-RU" b="1" dirty="0"/>
+              <a:t>Концептуално</a:t>
+            </a:r>
+          </a:p>
+          <a:p>
+            <a:pPr lvl="1">
+              <a:buClr>
+                <a:schemeClr val="tx1"/>
+              </a:buClr>
+            </a:pPr>
+            <a:r>
+              <a:rPr lang="ru-RU" b="1" dirty="0"/>
+              <a:t>Вътрешно</a:t>
+            </a:r>
+            <a:endParaRPr lang="bg-BG" b="1" dirty="0"/>
           </a:p>
         </p:txBody>
       </p:sp>
@@ -30701,25 +30823,13 @@
         <p:spPr/>
         <p:txBody>
           <a:bodyPr>
-            <a:normAutofit fontScale="90000"/>
+            <a:normAutofit/>
           </a:bodyPr>
           <a:lstStyle/>
           <a:p>
             <a:r>
-              <a:rPr lang="en-US" dirty="0">
-                <a:highlight>
-                  <a:srgbClr val="FFFF00"/>
-                </a:highlight>
-              </a:rPr>
-              <a:t>TODO: </a:t>
-            </a:r>
-            <a:r>
-              <a:rPr lang="bg-BG" dirty="0">
-                <a:highlight>
-                  <a:srgbClr val="FFFF00"/>
-                </a:highlight>
-              </a:rPr>
-              <a:t>Генерален слайд за абстракция + нивата</a:t>
+              <a:rPr lang="bg-BG" dirty="0"/>
+              <a:t>Абстракция в СУБД</a:t>
             </a:r>
           </a:p>
         </p:txBody>
@@ -30742,6 +30852,263 @@
       <p:transition spd="slow" advClick="0" advTm="5000"/>
     </mc:Fallback>
   </mc:AlternateContent>
+  <p:timing>
+    <p:tnLst>
+      <p:par>
+        <p:cTn id="1" dur="indefinite" restart="never" nodeType="tmRoot">
+          <p:childTnLst>
+            <p:seq concurrent="1" nextAc="seek">
+              <p:cTn id="2" dur="indefinite" nodeType="mainSeq">
+                <p:childTnLst>
+                  <p:par>
+                    <p:cTn id="3" fill="hold">
+                      <p:stCondLst>
+                        <p:cond delay="indefinite"/>
+                      </p:stCondLst>
+                      <p:childTnLst>
+                        <p:par>
+                          <p:cTn id="4" fill="hold">
+                            <p:stCondLst>
+                              <p:cond delay="0"/>
+                            </p:stCondLst>
+                            <p:childTnLst>
+                              <p:par>
+                                <p:cTn id="5" presetID="1" presetClass="entr" presetSubtype="0" fill="hold" nodeType="clickEffect">
+                                  <p:stCondLst>
+                                    <p:cond delay="0"/>
+                                  </p:stCondLst>
+                                  <p:childTnLst>
+                                    <p:set>
+                                      <p:cBhvr>
+                                        <p:cTn id="6" dur="1" fill="hold">
+                                          <p:stCondLst>
+                                            <p:cond delay="0"/>
+                                          </p:stCondLst>
+                                        </p:cTn>
+                                        <p:tgtEl>
+                                          <p:spTgt spid="3">
+                                            <p:txEl>
+                                              <p:pRg st="1" end="1"/>
+                                            </p:txEl>
+                                          </p:spTgt>
+                                        </p:tgtEl>
+                                        <p:attrNameLst>
+                                          <p:attrName>style.visibility</p:attrName>
+                                        </p:attrNameLst>
+                                      </p:cBhvr>
+                                      <p:to>
+                                        <p:strVal val="visible"/>
+                                      </p:to>
+                                    </p:set>
+                                  </p:childTnLst>
+                                </p:cTn>
+                              </p:par>
+                            </p:childTnLst>
+                          </p:cTn>
+                        </p:par>
+                      </p:childTnLst>
+                    </p:cTn>
+                  </p:par>
+                  <p:par>
+                    <p:cTn id="7" fill="hold">
+                      <p:stCondLst>
+                        <p:cond delay="indefinite"/>
+                      </p:stCondLst>
+                      <p:childTnLst>
+                        <p:par>
+                          <p:cTn id="8" fill="hold">
+                            <p:stCondLst>
+                              <p:cond delay="0"/>
+                            </p:stCondLst>
+                            <p:childTnLst>
+                              <p:par>
+                                <p:cTn id="9" presetID="1" presetClass="entr" presetSubtype="0" fill="hold" nodeType="clickEffect">
+                                  <p:stCondLst>
+                                    <p:cond delay="0"/>
+                                  </p:stCondLst>
+                                  <p:childTnLst>
+                                    <p:set>
+                                      <p:cBhvr>
+                                        <p:cTn id="10" dur="1" fill="hold">
+                                          <p:stCondLst>
+                                            <p:cond delay="0"/>
+                                          </p:stCondLst>
+                                        </p:cTn>
+                                        <p:tgtEl>
+                                          <p:spTgt spid="3">
+                                            <p:txEl>
+                                              <p:pRg st="2" end="2"/>
+                                            </p:txEl>
+                                          </p:spTgt>
+                                        </p:tgtEl>
+                                        <p:attrNameLst>
+                                          <p:attrName>style.visibility</p:attrName>
+                                        </p:attrNameLst>
+                                      </p:cBhvr>
+                                      <p:to>
+                                        <p:strVal val="visible"/>
+                                      </p:to>
+                                    </p:set>
+                                  </p:childTnLst>
+                                </p:cTn>
+                              </p:par>
+                              <p:par>
+                                <p:cTn id="11" presetID="1" presetClass="entr" presetSubtype="0" fill="hold" nodeType="withEffect">
+                                  <p:stCondLst>
+                                    <p:cond delay="0"/>
+                                  </p:stCondLst>
+                                  <p:childTnLst>
+                                    <p:set>
+                                      <p:cBhvr>
+                                        <p:cTn id="12" dur="1" fill="hold">
+                                          <p:stCondLst>
+                                            <p:cond delay="0"/>
+                                          </p:stCondLst>
+                                        </p:cTn>
+                                        <p:tgtEl>
+                                          <p:spTgt spid="3">
+                                            <p:txEl>
+                                              <p:pRg st="3" end="3"/>
+                                            </p:txEl>
+                                          </p:spTgt>
+                                        </p:tgtEl>
+                                        <p:attrNameLst>
+                                          <p:attrName>style.visibility</p:attrName>
+                                        </p:attrNameLst>
+                                      </p:cBhvr>
+                                      <p:to>
+                                        <p:strVal val="visible"/>
+                                      </p:to>
+                                    </p:set>
+                                  </p:childTnLst>
+                                </p:cTn>
+                              </p:par>
+                            </p:childTnLst>
+                          </p:cTn>
+                        </p:par>
+                      </p:childTnLst>
+                    </p:cTn>
+                  </p:par>
+                  <p:par>
+                    <p:cTn id="13" fill="hold">
+                      <p:stCondLst>
+                        <p:cond delay="indefinite"/>
+                      </p:stCondLst>
+                      <p:childTnLst>
+                        <p:par>
+                          <p:cTn id="14" fill="hold">
+                            <p:stCondLst>
+                              <p:cond delay="0"/>
+                            </p:stCondLst>
+                            <p:childTnLst>
+                              <p:par>
+                                <p:cTn id="15" presetID="1" presetClass="entr" presetSubtype="0" fill="hold" nodeType="clickEffect">
+                                  <p:stCondLst>
+                                    <p:cond delay="0"/>
+                                  </p:stCondLst>
+                                  <p:childTnLst>
+                                    <p:set>
+                                      <p:cBhvr>
+                                        <p:cTn id="16" dur="1" fill="hold">
+                                          <p:stCondLst>
+                                            <p:cond delay="0"/>
+                                          </p:stCondLst>
+                                        </p:cTn>
+                                        <p:tgtEl>
+                                          <p:spTgt spid="3">
+                                            <p:txEl>
+                                              <p:pRg st="4" end="4"/>
+                                            </p:txEl>
+                                          </p:spTgt>
+                                        </p:tgtEl>
+                                        <p:attrNameLst>
+                                          <p:attrName>style.visibility</p:attrName>
+                                        </p:attrNameLst>
+                                      </p:cBhvr>
+                                      <p:to>
+                                        <p:strVal val="visible"/>
+                                      </p:to>
+                                    </p:set>
+                                  </p:childTnLst>
+                                </p:cTn>
+                              </p:par>
+                            </p:childTnLst>
+                          </p:cTn>
+                        </p:par>
+                      </p:childTnLst>
+                    </p:cTn>
+                  </p:par>
+                  <p:par>
+                    <p:cTn id="17" fill="hold">
+                      <p:stCondLst>
+                        <p:cond delay="indefinite"/>
+                      </p:stCondLst>
+                      <p:childTnLst>
+                        <p:par>
+                          <p:cTn id="18" fill="hold">
+                            <p:stCondLst>
+                              <p:cond delay="0"/>
+                            </p:stCondLst>
+                            <p:childTnLst>
+                              <p:par>
+                                <p:cTn id="19" presetID="1" presetClass="entr" presetSubtype="0" fill="hold" nodeType="clickEffect">
+                                  <p:stCondLst>
+                                    <p:cond delay="0"/>
+                                  </p:stCondLst>
+                                  <p:childTnLst>
+                                    <p:set>
+                                      <p:cBhvr>
+                                        <p:cTn id="20" dur="1" fill="hold">
+                                          <p:stCondLst>
+                                            <p:cond delay="0"/>
+                                          </p:stCondLst>
+                                        </p:cTn>
+                                        <p:tgtEl>
+                                          <p:spTgt spid="3">
+                                            <p:txEl>
+                                              <p:pRg st="5" end="5"/>
+                                            </p:txEl>
+                                          </p:spTgt>
+                                        </p:tgtEl>
+                                        <p:attrNameLst>
+                                          <p:attrName>style.visibility</p:attrName>
+                                        </p:attrNameLst>
+                                      </p:cBhvr>
+                                      <p:to>
+                                        <p:strVal val="visible"/>
+                                      </p:to>
+                                    </p:set>
+                                  </p:childTnLst>
+                                </p:cTn>
+                              </p:par>
+                            </p:childTnLst>
+                          </p:cTn>
+                        </p:par>
+                      </p:childTnLst>
+                    </p:cTn>
+                  </p:par>
+                </p:childTnLst>
+              </p:cTn>
+              <p:prevCondLst>
+                <p:cond evt="onPrev" delay="0">
+                  <p:tgtEl>
+                    <p:sldTgt/>
+                  </p:tgtEl>
+                </p:cond>
+              </p:prevCondLst>
+              <p:nextCondLst>
+                <p:cond evt="onNext" delay="0">
+                  <p:tgtEl>
+                    <p:sldTgt/>
+                  </p:tgtEl>
+                </p:cond>
+              </p:nextCondLst>
+            </p:seq>
+          </p:childTnLst>
+        </p:cTn>
+      </p:par>
+    </p:tnLst>
+  </p:timing>
 </p:sld>
 </file>
 

</xml_diff>

<commit_message>
Reorganization of content and additions
</commit_message>
<xml_diff>
--- a/Courses/Software-Sciences/Module-3-Databases-New/02-DBMS/02-DBMS.pptx
+++ b/Courses/Software-Sciences/Module-3-Databases-New/02-DBMS/02-DBMS.pptx
@@ -516,7 +516,7 @@
           <a:p>
             <a:fld id="{4E087215-0C8F-4762-A664-737A353EC9A4}" type="datetimeFigureOut">
               <a:rPr lang="bg-BG" smtClean="0"/>
-              <a:t>13.7.2024 г.</a:t>
+              <a:t>15.07.24 г.</a:t>
             </a:fld>
             <a:endParaRPr lang="bg-BG"/>
           </a:p>
@@ -712,7 +712,7 @@
           <a:p>
             <a:fld id="{72D84649-876A-46C9-8472-14CB09C070D8}" type="datetimeFigureOut">
               <a:rPr lang="en-US" smtClean="0"/>
-              <a:t>7/13/2024</a:t>
+              <a:t>7/15/24</a:t>
             </a:fld>
             <a:endParaRPr lang="en-US"/>
           </a:p>
@@ -9674,8 +9674,8 @@
         </p:nvSpPr>
         <p:spPr>
           <a:xfrm>
-            <a:off x="554746" y="1851129"/>
-            <a:ext cx="11083636" cy="767871"/>
+            <a:off x="554746" y="1900580"/>
+            <a:ext cx="11083636" cy="583420"/>
           </a:xfrm>
         </p:spPr>
         <p:txBody>
@@ -9779,7 +9779,7 @@
       </p:pic>
       <p:pic>
         <p:nvPicPr>
-          <p:cNvPr id="3" name="Picture 2" descr="A yellow and blue sign with white text&#10;&#10;Description automatically generated">
+          <p:cNvPr id="3" name="Picture 2">
             <a:extLst>
               <a:ext uri="{FF2B5EF4-FFF2-40B4-BE49-F238E27FC236}">
                 <a16:creationId xmlns:a16="http://schemas.microsoft.com/office/drawing/2014/main" id="{35D4182D-FCC2-4B4A-20C9-6464900A14C0}"/>
@@ -9799,14 +9799,13 @@
               </a:ext>
             </a:extLst>
           </a:blip>
-          <a:stretch>
-            <a:fillRect/>
-          </a:stretch>
+          <a:srcRect/>
+          <a:stretch/>
         </p:blipFill>
         <p:spPr>
           <a:xfrm>
-            <a:off x="584311" y="3001428"/>
-            <a:ext cx="1956689" cy="877572"/>
+            <a:off x="584311" y="3002368"/>
+            <a:ext cx="1956689" cy="875691"/>
           </a:xfrm>
           <a:prstGeom prst="rect">
             <a:avLst/>
@@ -14304,7 +14303,7 @@
             </a:r>
             <a:r>
               <a:rPr lang="en-US" dirty="0"/>
-              <a:t>NoSQL)</a:t>
+              <a:t>NoSQL) </a:t>
             </a:r>
             <a:r>
               <a:rPr lang="bg-BG" dirty="0"/>
@@ -15198,14 +15197,6 @@
               </a:tabLst>
             </a:pPr>
             <a:r>
-              <a:rPr lang="bg-BG" sz="3600" b="1" dirty="0">
-                <a:solidFill>
-                  <a:schemeClr val="bg1"/>
-                </a:solidFill>
-              </a:rPr>
-              <a:t>По-</a:t>
-            </a:r>
-            <a:r>
               <a:rPr lang="bg-BG" sz="3400" b="1" spc="-5" dirty="0">
                 <a:solidFill>
                   <a:schemeClr val="bg1"/>
@@ -15213,7 +15204,7 @@
                 <a:latin typeface="Calibri"/>
                 <a:cs typeface="Calibri"/>
               </a:rPr>
-              <a:t>мащабируеми</a:t>
+              <a:t>Мащабируеми</a:t>
             </a:r>
             <a:r>
               <a:rPr lang="bg-BG" sz="3400" b="1" spc="-5" dirty="0">
@@ -18853,10 +18844,24 @@
             </a:r>
           </a:p>
           <a:p>
+            <a:pPr lvl="1" fontAlgn="base"/>
+            <a:r>
+              <a:rPr lang="ru-RU" dirty="0"/>
+              <a:t>Релационни БД</a:t>
+            </a:r>
+          </a:p>
+          <a:p>
+            <a:pPr lvl="1" fontAlgn="base"/>
+            <a:r>
+              <a:rPr lang="ru-RU" dirty="0"/>
+              <a:t>Нерелационни БД</a:t>
+            </a:r>
+          </a:p>
+          <a:p>
             <a:pPr fontAlgn="base"/>
             <a:r>
               <a:rPr lang="bg-BG" dirty="0"/>
-              <a:t>Какво е СУБД?</a:t>
+              <a:t>Типове данни</a:t>
             </a:r>
             <a:endParaRPr lang="ru-RU" dirty="0"/>
           </a:p>
@@ -18864,15 +18869,9 @@
             <a:pPr fontAlgn="base"/>
             <a:r>
               <a:rPr lang="bg-BG" dirty="0"/>
-              <a:t>Типове данни</a:t>
-            </a:r>
-          </a:p>
-          <a:p>
-            <a:r>
-              <a:rPr lang="bg-BG" dirty="0"/>
-              <a:t>Демо</a:t>
-            </a:r>
-            <a:endParaRPr lang="en-US" dirty="0"/>
+              <a:t>Какво е СУБД?</a:t>
+            </a:r>
+            <a:endParaRPr lang="ru-RU" dirty="0"/>
           </a:p>
         </p:txBody>
       </p:sp>
@@ -19186,6 +19185,55 @@
                                           <p:spTgt spid="444419">
                                             <p:txEl>
                                               <p:pRg st="3" end="3"/>
+                                            </p:txEl>
+                                          </p:spTgt>
+                                        </p:tgtEl>
+                                        <p:attrNameLst>
+                                          <p:attrName>style.visibility</p:attrName>
+                                        </p:attrNameLst>
+                                      </p:cBhvr>
+                                      <p:to>
+                                        <p:strVal val="visible"/>
+                                      </p:to>
+                                    </p:set>
+                                  </p:childTnLst>
+                                </p:cTn>
+                              </p:par>
+                            </p:childTnLst>
+                          </p:cTn>
+                        </p:par>
+                      </p:childTnLst>
+                    </p:cTn>
+                  </p:par>
+                  <p:par>
+                    <p:cTn id="15" fill="hold">
+                      <p:stCondLst>
+                        <p:cond delay="indefinite"/>
+                      </p:stCondLst>
+                      <p:childTnLst>
+                        <p:par>
+                          <p:cTn id="16" fill="hold">
+                            <p:stCondLst>
+                              <p:cond delay="0"/>
+                            </p:stCondLst>
+                            <p:childTnLst>
+                              <p:par>
+                                <p:cTn id="17" presetID="1" presetClass="entr" presetSubtype="0" fill="hold" nodeType="clickEffect">
+                                  <p:stCondLst>
+                                    <p:cond delay="0"/>
+                                  </p:stCondLst>
+                                  <p:childTnLst>
+                                    <p:set>
+                                      <p:cBhvr>
+                                        <p:cTn id="18" dur="1" fill="hold">
+                                          <p:stCondLst>
+                                            <p:cond delay="0"/>
+                                          </p:stCondLst>
+                                        </p:cTn>
+                                        <p:tgtEl>
+                                          <p:spTgt spid="444419">
+                                            <p:txEl>
+                                              <p:pRg st="4" end="4"/>
                                             </p:txEl>
                                           </p:spTgt>
                                         </p:tgtEl>
@@ -23096,6 +23144,55 @@
                                         <p:tgtEl>
                                           <p:spTgt spid="3">
                                             <p:txEl>
+                                              <p:pRg st="1" end="1"/>
+                                            </p:txEl>
+                                          </p:spTgt>
+                                        </p:tgtEl>
+                                        <p:attrNameLst>
+                                          <p:attrName>style.visibility</p:attrName>
+                                        </p:attrNameLst>
+                                      </p:cBhvr>
+                                      <p:to>
+                                        <p:strVal val="visible"/>
+                                      </p:to>
+                                    </p:set>
+                                  </p:childTnLst>
+                                </p:cTn>
+                              </p:par>
+                            </p:childTnLst>
+                          </p:cTn>
+                        </p:par>
+                      </p:childTnLst>
+                    </p:cTn>
+                  </p:par>
+                  <p:par>
+                    <p:cTn id="7" fill="hold">
+                      <p:stCondLst>
+                        <p:cond delay="indefinite"/>
+                      </p:stCondLst>
+                      <p:childTnLst>
+                        <p:par>
+                          <p:cTn id="8" fill="hold">
+                            <p:stCondLst>
+                              <p:cond delay="0"/>
+                            </p:stCondLst>
+                            <p:childTnLst>
+                              <p:par>
+                                <p:cTn id="9" presetID="1" presetClass="entr" presetSubtype="0" fill="hold" nodeType="clickEffect">
+                                  <p:stCondLst>
+                                    <p:cond delay="0"/>
+                                  </p:stCondLst>
+                                  <p:childTnLst>
+                                    <p:set>
+                                      <p:cBhvr>
+                                        <p:cTn id="10" dur="1" fill="hold">
+                                          <p:stCondLst>
+                                            <p:cond delay="0"/>
+                                          </p:stCondLst>
+                                        </p:cTn>
+                                        <p:tgtEl>
+                                          <p:spTgt spid="3">
+                                            <p:txEl>
                                               <p:pRg st="2" end="2"/>
                                             </p:txEl>
                                           </p:spTgt>
@@ -23112,14 +23209,14 @@
                                 </p:cTn>
                               </p:par>
                               <p:par>
-                                <p:cTn id="7" presetID="1" presetClass="entr" presetSubtype="0" fill="hold" nodeType="withEffect">
+                                <p:cTn id="11" presetID="1" presetClass="entr" presetSubtype="0" fill="hold" nodeType="withEffect">
                                   <p:stCondLst>
                                     <p:cond delay="0"/>
                                   </p:stCondLst>
                                   <p:childTnLst>
                                     <p:set>
                                       <p:cBhvr>
-                                        <p:cTn id="8" dur="1" fill="hold">
+                                        <p:cTn id="12" dur="1" fill="hold">
                                           <p:stCondLst>
                                             <p:cond delay="0"/>
                                           </p:stCondLst>
@@ -23145,26 +23242,26 @@
                     </p:cTn>
                   </p:par>
                   <p:par>
-                    <p:cTn id="9" fill="hold">
+                    <p:cTn id="13" fill="hold">
                       <p:stCondLst>
                         <p:cond delay="indefinite"/>
                       </p:stCondLst>
                       <p:childTnLst>
                         <p:par>
-                          <p:cTn id="10" fill="hold">
+                          <p:cTn id="14" fill="hold">
                             <p:stCondLst>
                               <p:cond delay="0"/>
                             </p:stCondLst>
                             <p:childTnLst>
                               <p:par>
-                                <p:cTn id="11" presetID="1" presetClass="entr" presetSubtype="0" fill="hold" nodeType="clickEffect">
+                                <p:cTn id="15" presetID="1" presetClass="entr" presetSubtype="0" fill="hold" nodeType="clickEffect">
                                   <p:stCondLst>
                                     <p:cond delay="0"/>
                                   </p:stCondLst>
                                   <p:childTnLst>
                                     <p:set>
                                       <p:cBhvr>
-                                        <p:cTn id="12" dur="1" fill="hold">
+                                        <p:cTn id="16" dur="1" fill="hold">
                                           <p:stCondLst>
                                             <p:cond delay="0"/>
                                           </p:stCondLst>
@@ -23188,14 +23285,14 @@
                                 </p:cTn>
                               </p:par>
                               <p:par>
-                                <p:cTn id="13" presetID="1" presetClass="entr" presetSubtype="0" fill="hold" nodeType="withEffect">
+                                <p:cTn id="17" presetID="1" presetClass="entr" presetSubtype="0" fill="hold" nodeType="withEffect">
                                   <p:stCondLst>
                                     <p:cond delay="0"/>
                                   </p:stCondLst>
                                   <p:childTnLst>
                                     <p:set>
                                       <p:cBhvr>
-                                        <p:cTn id="14" dur="1" fill="hold">
+                                        <p:cTn id="18" dur="1" fill="hold">
                                           <p:stCondLst>
                                             <p:cond delay="0"/>
                                           </p:stCondLst>
@@ -28858,6 +28955,25 @@
             </a:r>
           </a:p>
           <a:p>
+            <a:pPr>
+              <a:buClr>
+                <a:schemeClr val="tx1"/>
+              </a:buClr>
+            </a:pPr>
+            <a:r>
+              <a:rPr lang="ru-RU" b="1" dirty="0">
+                <a:solidFill>
+                  <a:schemeClr val="bg1"/>
+                </a:solidFill>
+              </a:rPr>
+              <a:t>Създаване</a:t>
+            </a:r>
+            <a:r>
+              <a:rPr lang="ru-RU" dirty="0"/>
+              <a:t> на таблици</a:t>
+            </a:r>
+          </a:p>
+          <a:p>
             <a:pPr algn="l">
               <a:buClr>
                 <a:schemeClr val="tx1"/>
@@ -29367,6 +29483,55 @@
                                           <p:spTgt spid="3">
                                             <p:txEl>
                                               <p:pRg st="6" end="6"/>
+                                            </p:txEl>
+                                          </p:spTgt>
+                                        </p:tgtEl>
+                                        <p:attrNameLst>
+                                          <p:attrName>style.visibility</p:attrName>
+                                        </p:attrNameLst>
+                                      </p:cBhvr>
+                                      <p:to>
+                                        <p:strVal val="visible"/>
+                                      </p:to>
+                                    </p:set>
+                                  </p:childTnLst>
+                                </p:cTn>
+                              </p:par>
+                            </p:childTnLst>
+                          </p:cTn>
+                        </p:par>
+                      </p:childTnLst>
+                    </p:cTn>
+                  </p:par>
+                  <p:par>
+                    <p:cTn id="27" fill="hold">
+                      <p:stCondLst>
+                        <p:cond delay="indefinite"/>
+                      </p:stCondLst>
+                      <p:childTnLst>
+                        <p:par>
+                          <p:cTn id="28" fill="hold">
+                            <p:stCondLst>
+                              <p:cond delay="0"/>
+                            </p:stCondLst>
+                            <p:childTnLst>
+                              <p:par>
+                                <p:cTn id="29" presetID="1" presetClass="entr" presetSubtype="0" fill="hold" nodeType="clickEffect">
+                                  <p:stCondLst>
+                                    <p:cond delay="0"/>
+                                  </p:stCondLst>
+                                  <p:childTnLst>
+                                    <p:set>
+                                      <p:cBhvr>
+                                        <p:cTn id="30" dur="1" fill="hold">
+                                          <p:stCondLst>
+                                            <p:cond delay="0"/>
+                                          </p:stCondLst>
+                                        </p:cTn>
+                                        <p:tgtEl>
+                                          <p:spTgt spid="3">
+                                            <p:txEl>
+                                              <p:pRg st="7" end="7"/>
                                             </p:txEl>
                                           </p:spTgt>
                                         </p:tgtEl>
@@ -30695,7 +30860,7 @@
             </a:r>
             <a:r>
               <a:rPr lang="ru-RU" dirty="0"/>
-              <a:t> в системите за управление на бази данни е </a:t>
+              <a:t> в СУБД е </a:t>
             </a:r>
             <a:r>
               <a:rPr lang="ru-RU" b="1" dirty="0">
@@ -30757,7 +30922,15 @@
             </a:r>
             <a:r>
               <a:rPr lang="ru-RU" dirty="0"/>
-              <a:t> информация на различните </a:t>
+              <a:t> информация на </a:t>
+            </a:r>
+            <a:r>
+              <a:rPr lang="ru-RU" dirty="0" err="1"/>
+              <a:t>различните</a:t>
+            </a:r>
+            <a:r>
+              <a:rPr lang="ru-RU" dirty="0"/>
+              <a:t> </a:t>
             </a:r>
             <a:r>
               <a:rPr lang="ru-RU" b="1" dirty="0">
@@ -30766,6 +30939,10 @@
                 </a:solidFill>
               </a:rPr>
               <a:t>нива</a:t>
+            </a:r>
+            <a:r>
+              <a:rPr lang="ru-RU" dirty="0"/>
+              <a:t>:</a:t>
             </a:r>
           </a:p>
           <a:p>
@@ -30952,15 +31129,33 @@
                                   </p:childTnLst>
                                 </p:cTn>
                               </p:par>
+                            </p:childTnLst>
+                          </p:cTn>
+                        </p:par>
+                      </p:childTnLst>
+                    </p:cTn>
+                  </p:par>
+                  <p:par>
+                    <p:cTn id="11" fill="hold">
+                      <p:stCondLst>
+                        <p:cond delay="indefinite"/>
+                      </p:stCondLst>
+                      <p:childTnLst>
+                        <p:par>
+                          <p:cTn id="12" fill="hold">
+                            <p:stCondLst>
+                              <p:cond delay="0"/>
+                            </p:stCondLst>
+                            <p:childTnLst>
                               <p:par>
-                                <p:cTn id="11" presetID="1" presetClass="entr" presetSubtype="0" fill="hold" nodeType="withEffect">
+                                <p:cTn id="13" presetID="1" presetClass="entr" presetSubtype="0" fill="hold" nodeType="clickEffect">
                                   <p:stCondLst>
                                     <p:cond delay="0"/>
                                   </p:stCondLst>
                                   <p:childTnLst>
                                     <p:set>
                                       <p:cBhvr>
-                                        <p:cTn id="12" dur="1" fill="hold">
+                                        <p:cTn id="14" dur="1" fill="hold">
                                           <p:stCondLst>
                                             <p:cond delay="0"/>
                                           </p:stCondLst>
@@ -30990,26 +31185,26 @@
                     </p:cTn>
                   </p:par>
                   <p:par>
-                    <p:cTn id="13" fill="hold">
+                    <p:cTn id="15" fill="hold">
                       <p:stCondLst>
                         <p:cond delay="indefinite"/>
                       </p:stCondLst>
                       <p:childTnLst>
                         <p:par>
-                          <p:cTn id="14" fill="hold">
+                          <p:cTn id="16" fill="hold">
                             <p:stCondLst>
                               <p:cond delay="0"/>
                             </p:stCondLst>
                             <p:childTnLst>
                               <p:par>
-                                <p:cTn id="15" presetID="1" presetClass="entr" presetSubtype="0" fill="hold" nodeType="clickEffect">
+                                <p:cTn id="17" presetID="1" presetClass="entr" presetSubtype="0" fill="hold" nodeType="clickEffect">
                                   <p:stCondLst>
                                     <p:cond delay="0"/>
                                   </p:stCondLst>
                                   <p:childTnLst>
                                     <p:set>
                                       <p:cBhvr>
-                                        <p:cTn id="16" dur="1" fill="hold">
+                                        <p:cTn id="18" dur="1" fill="hold">
                                           <p:stCondLst>
                                             <p:cond delay="0"/>
                                           </p:stCondLst>
@@ -31039,26 +31234,26 @@
                     </p:cTn>
                   </p:par>
                   <p:par>
-                    <p:cTn id="17" fill="hold">
+                    <p:cTn id="19" fill="hold">
                       <p:stCondLst>
                         <p:cond delay="indefinite"/>
                       </p:stCondLst>
                       <p:childTnLst>
                         <p:par>
-                          <p:cTn id="18" fill="hold">
+                          <p:cTn id="20" fill="hold">
                             <p:stCondLst>
                               <p:cond delay="0"/>
                             </p:stCondLst>
                             <p:childTnLst>
                               <p:par>
-                                <p:cTn id="19" presetID="1" presetClass="entr" presetSubtype="0" fill="hold" nodeType="clickEffect">
+                                <p:cTn id="21" presetID="1" presetClass="entr" presetSubtype="0" fill="hold" nodeType="clickEffect">
                                   <p:stCondLst>
                                     <p:cond delay="0"/>
                                   </p:stCondLst>
                                   <p:childTnLst>
                                     <p:set>
                                       <p:cBhvr>
-                                        <p:cTn id="20" dur="1" fill="hold">
+                                        <p:cTn id="22" dur="1" fill="hold">
                                           <p:stCondLst>
                                             <p:cond delay="0"/>
                                           </p:stCondLst>
@@ -35741,7 +35936,7 @@
             <a:pPr lvl="1"/>
             <a:r>
               <a:rPr lang="en-US" dirty="0"/>
-              <a:t>Microsoft SQL Server</a:t>
+              <a:t>Microsoft SQL</a:t>
             </a:r>
           </a:p>
           <a:p>
@@ -39903,8 +40098,8 @@
         </p:nvSpPr>
         <p:spPr>
           <a:xfrm>
-            <a:off x="1704011" y="3503666"/>
-            <a:ext cx="9255889" cy="672924"/>
+            <a:off x="1704011" y="3564000"/>
+            <a:ext cx="9255889" cy="505227"/>
           </a:xfrm>
           <a:prstGeom prst="roundRect">
             <a:avLst>
@@ -39970,8 +40165,8 @@
         </p:nvSpPr>
         <p:spPr>
           <a:xfrm>
-            <a:off x="3913235" y="2424446"/>
-            <a:ext cx="2869453" cy="2679002"/>
+            <a:off x="4026000" y="2424446"/>
+            <a:ext cx="2610000" cy="2679002"/>
           </a:xfrm>
           <a:prstGeom prst="roundRect">
             <a:avLst>
@@ -40033,7 +40228,7 @@
         </p:nvSpPr>
         <p:spPr bwMode="auto">
           <a:xfrm>
-            <a:off x="7518428" y="1804483"/>
+            <a:off x="6766599" y="1814889"/>
             <a:ext cx="1588272" cy="609557"/>
           </a:xfrm>
           <a:prstGeom prst="wedgeRoundRectCallout">
@@ -40108,8 +40303,8 @@
         </p:nvSpPr>
         <p:spPr>
           <a:xfrm>
-            <a:off x="3913235" y="3516362"/>
-            <a:ext cx="2869453" cy="647531"/>
+            <a:off x="4026000" y="3564000"/>
+            <a:ext cx="2610000" cy="505227"/>
           </a:xfrm>
           <a:prstGeom prst="roundRect">
             <a:avLst>

</xml_diff>